<commit_message>
update Design components in DevelopGuide.adoc
</commit_message>
<xml_diff>
--- a/docs/diagrams/ModelComponentClassDiagram.pptx
+++ b/docs/diagrams/ModelComponentClassDiagram.pptx
@@ -126,6 +126,10 @@
 </p:presentation>
 </file>
 
+<file path=ppt/revisionInfo.xml><?xml version="1.0" encoding="utf-8"?>
+<p1510:revInfo xmlns:a="http://schemas.openxmlformats.org/drawingml/2006/main" xmlns:r="http://schemas.openxmlformats.org/officeDocument/2006/relationships" xmlns:p1510="http://schemas.microsoft.com/office/powerpoint/2015/10/main"/>
+</file>
+
 <file path=ppt/notesMasters/notesMaster1.xml><?xml version="1.0" encoding="utf-8"?>
 <p:notesMaster xmlns:a="http://schemas.openxmlformats.org/drawingml/2006/main" xmlns:r="http://schemas.openxmlformats.org/officeDocument/2006/relationships" xmlns:p="http://schemas.openxmlformats.org/presentationml/2006/main">
   <p:cSld>
@@ -208,7 +212,7 @@
           <a:p>
             <a:fld id="{F5CC4B3F-88C1-4FFA-B1B6-F41C21DC6924}" type="datetimeFigureOut">
               <a:rPr lang="en-US" smtClean="0"/>
-              <a:t>9/4/17</a:t>
+              <a:t>10/13/2017</a:t>
             </a:fld>
             <a:endParaRPr lang="en-US"/>
           </a:p>
@@ -272,38 +276,37 @@
           <a:p>
             <a:pPr lvl="0"/>
             <a:r>
-              <a:rPr lang="en-US" smtClean="0"/>
+              <a:rPr lang="en-US"/>
               <a:t>Click to edit Master text styles</a:t>
             </a:r>
           </a:p>
           <a:p>
             <a:pPr lvl="1"/>
             <a:r>
-              <a:rPr lang="en-US" smtClean="0"/>
+              <a:rPr lang="en-US"/>
               <a:t>Second level</a:t>
             </a:r>
           </a:p>
           <a:p>
             <a:pPr lvl="2"/>
             <a:r>
-              <a:rPr lang="en-US" smtClean="0"/>
+              <a:rPr lang="en-US"/>
               <a:t>Third level</a:t>
             </a:r>
           </a:p>
           <a:p>
             <a:pPr lvl="3"/>
             <a:r>
-              <a:rPr lang="en-US" smtClean="0"/>
+              <a:rPr lang="en-US"/>
               <a:t>Fourth level</a:t>
             </a:r>
           </a:p>
           <a:p>
             <a:pPr lvl="4"/>
             <a:r>
-              <a:rPr lang="en-US" smtClean="0"/>
+              <a:rPr lang="en-US"/>
               <a:t>Fifth level</a:t>
             </a:r>
-            <a:endParaRPr lang="en-US"/>
           </a:p>
         </p:txBody>
       </p:sp>
@@ -514,10 +517,9 @@
           <a:lstStyle/>
           <a:p>
             <a:r>
-              <a:rPr lang="en-US" smtClean="0"/>
+              <a:rPr lang="en-US"/>
               <a:t>Click to edit Master title style</a:t>
             </a:r>
-            <a:endParaRPr lang="en-US"/>
           </a:p>
         </p:txBody>
       </p:sp>
@@ -633,10 +635,9 @@
           </a:lstStyle>
           <a:p>
             <a:r>
-              <a:rPr lang="en-US" smtClean="0"/>
+              <a:rPr lang="en-US"/>
               <a:t>Click to edit Master subtitle style</a:t>
             </a:r>
-            <a:endParaRPr lang="en-US"/>
           </a:p>
         </p:txBody>
       </p:sp>
@@ -657,7 +658,7 @@
           <a:p>
             <a:fld id="{78C97017-6FC3-485B-9764-EAC9E56C1D49}" type="datetimeFigureOut">
               <a:rPr lang="en-US" smtClean="0"/>
-              <a:t>9/4/17</a:t>
+              <a:t>10/13/2017</a:t>
             </a:fld>
             <a:endParaRPr lang="en-US"/>
           </a:p>
@@ -751,10 +752,9 @@
           <a:lstStyle/>
           <a:p>
             <a:r>
-              <a:rPr lang="en-US" smtClean="0"/>
+              <a:rPr lang="en-US"/>
               <a:t>Click to edit Master title style</a:t>
             </a:r>
-            <a:endParaRPr lang="en-US"/>
           </a:p>
         </p:txBody>
       </p:sp>
@@ -775,38 +775,37 @@
           <a:p>
             <a:pPr lvl="0"/>
             <a:r>
-              <a:rPr lang="en-US" smtClean="0"/>
+              <a:rPr lang="en-US"/>
               <a:t>Click to edit Master text styles</a:t>
             </a:r>
           </a:p>
           <a:p>
             <a:pPr lvl="1"/>
             <a:r>
-              <a:rPr lang="en-US" smtClean="0"/>
+              <a:rPr lang="en-US"/>
               <a:t>Second level</a:t>
             </a:r>
           </a:p>
           <a:p>
             <a:pPr lvl="2"/>
             <a:r>
-              <a:rPr lang="en-US" smtClean="0"/>
+              <a:rPr lang="en-US"/>
               <a:t>Third level</a:t>
             </a:r>
           </a:p>
           <a:p>
             <a:pPr lvl="3"/>
             <a:r>
-              <a:rPr lang="en-US" smtClean="0"/>
+              <a:rPr lang="en-US"/>
               <a:t>Fourth level</a:t>
             </a:r>
           </a:p>
           <a:p>
             <a:pPr lvl="4"/>
             <a:r>
-              <a:rPr lang="en-US" smtClean="0"/>
+              <a:rPr lang="en-US"/>
               <a:t>Fifth level</a:t>
             </a:r>
-            <a:endParaRPr lang="en-US"/>
           </a:p>
         </p:txBody>
       </p:sp>
@@ -827,7 +826,7 @@
           <a:p>
             <a:fld id="{78C97017-6FC3-485B-9764-EAC9E56C1D49}" type="datetimeFigureOut">
               <a:rPr lang="en-US" smtClean="0"/>
-              <a:t>9/4/17</a:t>
+              <a:t>10/13/2017</a:t>
             </a:fld>
             <a:endParaRPr lang="en-US"/>
           </a:p>
@@ -926,10 +925,9 @@
           <a:lstStyle/>
           <a:p>
             <a:r>
-              <a:rPr lang="en-US" smtClean="0"/>
+              <a:rPr lang="en-US"/>
               <a:t>Click to edit Master title style</a:t>
             </a:r>
-            <a:endParaRPr lang="en-US"/>
           </a:p>
         </p:txBody>
       </p:sp>
@@ -955,38 +953,37 @@
           <a:p>
             <a:pPr lvl="0"/>
             <a:r>
-              <a:rPr lang="en-US" smtClean="0"/>
+              <a:rPr lang="en-US"/>
               <a:t>Click to edit Master text styles</a:t>
             </a:r>
           </a:p>
           <a:p>
             <a:pPr lvl="1"/>
             <a:r>
-              <a:rPr lang="en-US" smtClean="0"/>
+              <a:rPr lang="en-US"/>
               <a:t>Second level</a:t>
             </a:r>
           </a:p>
           <a:p>
             <a:pPr lvl="2"/>
             <a:r>
-              <a:rPr lang="en-US" smtClean="0"/>
+              <a:rPr lang="en-US"/>
               <a:t>Third level</a:t>
             </a:r>
           </a:p>
           <a:p>
             <a:pPr lvl="3"/>
             <a:r>
-              <a:rPr lang="en-US" smtClean="0"/>
+              <a:rPr lang="en-US"/>
               <a:t>Fourth level</a:t>
             </a:r>
           </a:p>
           <a:p>
             <a:pPr lvl="4"/>
             <a:r>
-              <a:rPr lang="en-US" smtClean="0"/>
+              <a:rPr lang="en-US"/>
               <a:t>Fifth level</a:t>
             </a:r>
-            <a:endParaRPr lang="en-US"/>
           </a:p>
         </p:txBody>
       </p:sp>
@@ -1007,7 +1004,7 @@
           <a:p>
             <a:fld id="{78C97017-6FC3-485B-9764-EAC9E56C1D49}" type="datetimeFigureOut">
               <a:rPr lang="en-US" smtClean="0"/>
-              <a:t>9/4/17</a:t>
+              <a:t>10/13/2017</a:t>
             </a:fld>
             <a:endParaRPr lang="en-US"/>
           </a:p>
@@ -1101,10 +1098,9 @@
           <a:lstStyle/>
           <a:p>
             <a:r>
-              <a:rPr lang="en-US" smtClean="0"/>
+              <a:rPr lang="en-US"/>
               <a:t>Click to edit Master title style</a:t>
             </a:r>
-            <a:endParaRPr lang="en-US"/>
           </a:p>
         </p:txBody>
       </p:sp>
@@ -1125,38 +1121,37 @@
           <a:p>
             <a:pPr lvl="0"/>
             <a:r>
-              <a:rPr lang="en-US" smtClean="0"/>
+              <a:rPr lang="en-US"/>
               <a:t>Click to edit Master text styles</a:t>
             </a:r>
           </a:p>
           <a:p>
             <a:pPr lvl="1"/>
             <a:r>
-              <a:rPr lang="en-US" smtClean="0"/>
+              <a:rPr lang="en-US"/>
               <a:t>Second level</a:t>
             </a:r>
           </a:p>
           <a:p>
             <a:pPr lvl="2"/>
             <a:r>
-              <a:rPr lang="en-US" smtClean="0"/>
+              <a:rPr lang="en-US"/>
               <a:t>Third level</a:t>
             </a:r>
           </a:p>
           <a:p>
             <a:pPr lvl="3"/>
             <a:r>
-              <a:rPr lang="en-US" smtClean="0"/>
+              <a:rPr lang="en-US"/>
               <a:t>Fourth level</a:t>
             </a:r>
           </a:p>
           <a:p>
             <a:pPr lvl="4"/>
             <a:r>
-              <a:rPr lang="en-US" smtClean="0"/>
+              <a:rPr lang="en-US"/>
               <a:t>Fifth level</a:t>
             </a:r>
-            <a:endParaRPr lang="en-US"/>
           </a:p>
         </p:txBody>
       </p:sp>
@@ -1177,7 +1172,7 @@
           <a:p>
             <a:fld id="{78C97017-6FC3-485B-9764-EAC9E56C1D49}" type="datetimeFigureOut">
               <a:rPr lang="en-US" smtClean="0"/>
-              <a:t>9/4/17</a:t>
+              <a:t>10/13/2017</a:t>
             </a:fld>
             <a:endParaRPr lang="en-US"/>
           </a:p>
@@ -1280,10 +1275,9 @@
           </a:lstStyle>
           <a:p>
             <a:r>
-              <a:rPr lang="en-US" smtClean="0"/>
+              <a:rPr lang="en-US"/>
               <a:t>Click to edit Master title style</a:t>
             </a:r>
-            <a:endParaRPr lang="en-US"/>
           </a:p>
         </p:txBody>
       </p:sp>
@@ -1400,7 +1394,7 @@
           <a:p>
             <a:pPr lvl="0"/>
             <a:r>
-              <a:rPr lang="en-US" smtClean="0"/>
+              <a:rPr lang="en-US"/>
               <a:t>Click to edit Master text styles</a:t>
             </a:r>
           </a:p>
@@ -1423,7 +1417,7 @@
           <a:p>
             <a:fld id="{78C97017-6FC3-485B-9764-EAC9E56C1D49}" type="datetimeFigureOut">
               <a:rPr lang="en-US" smtClean="0"/>
-              <a:t>9/4/17</a:t>
+              <a:t>10/13/2017</a:t>
             </a:fld>
             <a:endParaRPr lang="en-US"/>
           </a:p>
@@ -1517,10 +1511,9 @@
           <a:lstStyle/>
           <a:p>
             <a:r>
-              <a:rPr lang="en-US" smtClean="0"/>
+              <a:rPr lang="en-US"/>
               <a:t>Click to edit Master title style</a:t>
             </a:r>
-            <a:endParaRPr lang="en-US"/>
           </a:p>
         </p:txBody>
       </p:sp>
@@ -1574,38 +1567,37 @@
           <a:p>
             <a:pPr lvl="0"/>
             <a:r>
-              <a:rPr lang="en-US" smtClean="0"/>
+              <a:rPr lang="en-US"/>
               <a:t>Click to edit Master text styles</a:t>
             </a:r>
           </a:p>
           <a:p>
             <a:pPr lvl="1"/>
             <a:r>
-              <a:rPr lang="en-US" smtClean="0"/>
+              <a:rPr lang="en-US"/>
               <a:t>Second level</a:t>
             </a:r>
           </a:p>
           <a:p>
             <a:pPr lvl="2"/>
             <a:r>
-              <a:rPr lang="en-US" smtClean="0"/>
+              <a:rPr lang="en-US"/>
               <a:t>Third level</a:t>
             </a:r>
           </a:p>
           <a:p>
             <a:pPr lvl="3"/>
             <a:r>
-              <a:rPr lang="en-US" smtClean="0"/>
+              <a:rPr lang="en-US"/>
               <a:t>Fourth level</a:t>
             </a:r>
           </a:p>
           <a:p>
             <a:pPr lvl="4"/>
             <a:r>
-              <a:rPr lang="en-US" smtClean="0"/>
+              <a:rPr lang="en-US"/>
               <a:t>Fifth level</a:t>
             </a:r>
-            <a:endParaRPr lang="en-US"/>
           </a:p>
         </p:txBody>
       </p:sp>
@@ -1659,38 +1651,37 @@
           <a:p>
             <a:pPr lvl="0"/>
             <a:r>
-              <a:rPr lang="en-US" smtClean="0"/>
+              <a:rPr lang="en-US"/>
               <a:t>Click to edit Master text styles</a:t>
             </a:r>
           </a:p>
           <a:p>
             <a:pPr lvl="1"/>
             <a:r>
-              <a:rPr lang="en-US" smtClean="0"/>
+              <a:rPr lang="en-US"/>
               <a:t>Second level</a:t>
             </a:r>
           </a:p>
           <a:p>
             <a:pPr lvl="2"/>
             <a:r>
-              <a:rPr lang="en-US" smtClean="0"/>
+              <a:rPr lang="en-US"/>
               <a:t>Third level</a:t>
             </a:r>
           </a:p>
           <a:p>
             <a:pPr lvl="3"/>
             <a:r>
-              <a:rPr lang="en-US" smtClean="0"/>
+              <a:rPr lang="en-US"/>
               <a:t>Fourth level</a:t>
             </a:r>
           </a:p>
           <a:p>
             <a:pPr lvl="4"/>
             <a:r>
-              <a:rPr lang="en-US" smtClean="0"/>
+              <a:rPr lang="en-US"/>
               <a:t>Fifth level</a:t>
             </a:r>
-            <a:endParaRPr lang="en-US"/>
           </a:p>
         </p:txBody>
       </p:sp>
@@ -1711,7 +1702,7 @@
           <a:p>
             <a:fld id="{78C97017-6FC3-485B-9764-EAC9E56C1D49}" type="datetimeFigureOut">
               <a:rPr lang="en-US" smtClean="0"/>
-              <a:t>9/4/17</a:t>
+              <a:t>10/13/2017</a:t>
             </a:fld>
             <a:endParaRPr lang="en-US"/>
           </a:p>
@@ -1809,10 +1800,9 @@
           </a:lstStyle>
           <a:p>
             <a:r>
-              <a:rPr lang="en-US" smtClean="0"/>
+              <a:rPr lang="en-US"/>
               <a:t>Click to edit Master title style</a:t>
             </a:r>
-            <a:endParaRPr lang="en-US"/>
           </a:p>
         </p:txBody>
       </p:sp>
@@ -1875,7 +1865,7 @@
           <a:p>
             <a:pPr lvl="0"/>
             <a:r>
-              <a:rPr lang="en-US" smtClean="0"/>
+              <a:rPr lang="en-US"/>
               <a:t>Click to edit Master text styles</a:t>
             </a:r>
           </a:p>
@@ -1931,38 +1921,37 @@
           <a:p>
             <a:pPr lvl="0"/>
             <a:r>
-              <a:rPr lang="en-US" smtClean="0"/>
+              <a:rPr lang="en-US"/>
               <a:t>Click to edit Master text styles</a:t>
             </a:r>
           </a:p>
           <a:p>
             <a:pPr lvl="1"/>
             <a:r>
-              <a:rPr lang="en-US" smtClean="0"/>
+              <a:rPr lang="en-US"/>
               <a:t>Second level</a:t>
             </a:r>
           </a:p>
           <a:p>
             <a:pPr lvl="2"/>
             <a:r>
-              <a:rPr lang="en-US" smtClean="0"/>
+              <a:rPr lang="en-US"/>
               <a:t>Third level</a:t>
             </a:r>
           </a:p>
           <a:p>
             <a:pPr lvl="3"/>
             <a:r>
-              <a:rPr lang="en-US" smtClean="0"/>
+              <a:rPr lang="en-US"/>
               <a:t>Fourth level</a:t>
             </a:r>
           </a:p>
           <a:p>
             <a:pPr lvl="4"/>
             <a:r>
-              <a:rPr lang="en-US" smtClean="0"/>
+              <a:rPr lang="en-US"/>
               <a:t>Fifth level</a:t>
             </a:r>
-            <a:endParaRPr lang="en-US"/>
           </a:p>
         </p:txBody>
       </p:sp>
@@ -2025,7 +2014,7 @@
           <a:p>
             <a:pPr lvl="0"/>
             <a:r>
-              <a:rPr lang="en-US" smtClean="0"/>
+              <a:rPr lang="en-US"/>
               <a:t>Click to edit Master text styles</a:t>
             </a:r>
           </a:p>
@@ -2081,38 +2070,37 @@
           <a:p>
             <a:pPr lvl="0"/>
             <a:r>
-              <a:rPr lang="en-US" smtClean="0"/>
+              <a:rPr lang="en-US"/>
               <a:t>Click to edit Master text styles</a:t>
             </a:r>
           </a:p>
           <a:p>
             <a:pPr lvl="1"/>
             <a:r>
-              <a:rPr lang="en-US" smtClean="0"/>
+              <a:rPr lang="en-US"/>
               <a:t>Second level</a:t>
             </a:r>
           </a:p>
           <a:p>
             <a:pPr lvl="2"/>
             <a:r>
-              <a:rPr lang="en-US" smtClean="0"/>
+              <a:rPr lang="en-US"/>
               <a:t>Third level</a:t>
             </a:r>
           </a:p>
           <a:p>
             <a:pPr lvl="3"/>
             <a:r>
-              <a:rPr lang="en-US" smtClean="0"/>
+              <a:rPr lang="en-US"/>
               <a:t>Fourth level</a:t>
             </a:r>
           </a:p>
           <a:p>
             <a:pPr lvl="4"/>
             <a:r>
-              <a:rPr lang="en-US" smtClean="0"/>
+              <a:rPr lang="en-US"/>
               <a:t>Fifth level</a:t>
             </a:r>
-            <a:endParaRPr lang="en-US"/>
           </a:p>
         </p:txBody>
       </p:sp>
@@ -2133,7 +2121,7 @@
           <a:p>
             <a:fld id="{78C97017-6FC3-485B-9764-EAC9E56C1D49}" type="datetimeFigureOut">
               <a:rPr lang="en-US" smtClean="0"/>
-              <a:t>9/4/17</a:t>
+              <a:t>10/13/2017</a:t>
             </a:fld>
             <a:endParaRPr lang="en-US"/>
           </a:p>
@@ -2227,10 +2215,9 @@
           <a:lstStyle/>
           <a:p>
             <a:r>
-              <a:rPr lang="en-US" smtClean="0"/>
+              <a:rPr lang="en-US"/>
               <a:t>Click to edit Master title style</a:t>
             </a:r>
-            <a:endParaRPr lang="en-US"/>
           </a:p>
         </p:txBody>
       </p:sp>
@@ -2251,7 +2238,7 @@
           <a:p>
             <a:fld id="{78C97017-6FC3-485B-9764-EAC9E56C1D49}" type="datetimeFigureOut">
               <a:rPr lang="en-US" smtClean="0"/>
-              <a:t>9/4/17</a:t>
+              <a:t>10/13/2017</a:t>
             </a:fld>
             <a:endParaRPr lang="en-US"/>
           </a:p>
@@ -2346,7 +2333,7 @@
           <a:p>
             <a:fld id="{78C97017-6FC3-485B-9764-EAC9E56C1D49}" type="datetimeFigureOut">
               <a:rPr lang="en-US" smtClean="0"/>
-              <a:t>9/4/17</a:t>
+              <a:t>10/13/2017</a:t>
             </a:fld>
             <a:endParaRPr lang="en-US"/>
           </a:p>
@@ -2449,10 +2436,9 @@
           </a:lstStyle>
           <a:p>
             <a:r>
-              <a:rPr lang="en-US" smtClean="0"/>
+              <a:rPr lang="en-US"/>
               <a:t>Click to edit Master title style</a:t>
             </a:r>
-            <a:endParaRPr lang="en-US"/>
           </a:p>
         </p:txBody>
       </p:sp>
@@ -2506,38 +2492,37 @@
           <a:p>
             <a:pPr lvl="0"/>
             <a:r>
-              <a:rPr lang="en-US" smtClean="0"/>
+              <a:rPr lang="en-US"/>
               <a:t>Click to edit Master text styles</a:t>
             </a:r>
           </a:p>
           <a:p>
             <a:pPr lvl="1"/>
             <a:r>
-              <a:rPr lang="en-US" smtClean="0"/>
+              <a:rPr lang="en-US"/>
               <a:t>Second level</a:t>
             </a:r>
           </a:p>
           <a:p>
             <a:pPr lvl="2"/>
             <a:r>
-              <a:rPr lang="en-US" smtClean="0"/>
+              <a:rPr lang="en-US"/>
               <a:t>Third level</a:t>
             </a:r>
           </a:p>
           <a:p>
             <a:pPr lvl="3"/>
             <a:r>
-              <a:rPr lang="en-US" smtClean="0"/>
+              <a:rPr lang="en-US"/>
               <a:t>Fourth level</a:t>
             </a:r>
           </a:p>
           <a:p>
             <a:pPr lvl="4"/>
             <a:r>
-              <a:rPr lang="en-US" smtClean="0"/>
+              <a:rPr lang="en-US"/>
               <a:t>Fifth level</a:t>
             </a:r>
-            <a:endParaRPr lang="en-US"/>
           </a:p>
         </p:txBody>
       </p:sp>
@@ -2600,7 +2585,7 @@
           <a:p>
             <a:pPr lvl="0"/>
             <a:r>
-              <a:rPr lang="en-US" smtClean="0"/>
+              <a:rPr lang="en-US"/>
               <a:t>Click to edit Master text styles</a:t>
             </a:r>
           </a:p>
@@ -2623,7 +2608,7 @@
           <a:p>
             <a:fld id="{78C97017-6FC3-485B-9764-EAC9E56C1D49}" type="datetimeFigureOut">
               <a:rPr lang="en-US" smtClean="0"/>
-              <a:t>9/4/17</a:t>
+              <a:t>10/13/2017</a:t>
             </a:fld>
             <a:endParaRPr lang="en-US"/>
           </a:p>
@@ -2726,10 +2711,9 @@
           </a:lstStyle>
           <a:p>
             <a:r>
-              <a:rPr lang="en-US" smtClean="0"/>
+              <a:rPr lang="en-US"/>
               <a:t>Click to edit Master title style</a:t>
             </a:r>
-            <a:endParaRPr lang="en-US"/>
           </a:p>
         </p:txBody>
       </p:sp>
@@ -2853,7 +2837,7 @@
           <a:p>
             <a:pPr lvl="0"/>
             <a:r>
-              <a:rPr lang="en-US" smtClean="0"/>
+              <a:rPr lang="en-US"/>
               <a:t>Click to edit Master text styles</a:t>
             </a:r>
           </a:p>
@@ -2876,7 +2860,7 @@
           <a:p>
             <a:fld id="{78C97017-6FC3-485B-9764-EAC9E56C1D49}" type="datetimeFigureOut">
               <a:rPr lang="en-US" smtClean="0"/>
-              <a:t>9/4/17</a:t>
+              <a:t>10/13/2017</a:t>
             </a:fld>
             <a:endParaRPr lang="en-US"/>
           </a:p>
@@ -2985,10 +2969,9 @@
           <a:lstStyle/>
           <a:p>
             <a:r>
-              <a:rPr lang="en-US" smtClean="0"/>
+              <a:rPr lang="en-US"/>
               <a:t>Click to edit Master title style</a:t>
             </a:r>
-            <a:endParaRPr lang="en-US"/>
           </a:p>
         </p:txBody>
       </p:sp>
@@ -3019,38 +3002,37 @@
           <a:p>
             <a:pPr lvl="0"/>
             <a:r>
-              <a:rPr lang="en-US" smtClean="0"/>
+              <a:rPr lang="en-US"/>
               <a:t>Click to edit Master text styles</a:t>
             </a:r>
           </a:p>
           <a:p>
             <a:pPr lvl="1"/>
             <a:r>
-              <a:rPr lang="en-US" smtClean="0"/>
+              <a:rPr lang="en-US"/>
               <a:t>Second level</a:t>
             </a:r>
           </a:p>
           <a:p>
             <a:pPr lvl="2"/>
             <a:r>
-              <a:rPr lang="en-US" smtClean="0"/>
+              <a:rPr lang="en-US"/>
               <a:t>Third level</a:t>
             </a:r>
           </a:p>
           <a:p>
             <a:pPr lvl="3"/>
             <a:r>
-              <a:rPr lang="en-US" smtClean="0"/>
+              <a:rPr lang="en-US"/>
               <a:t>Fourth level</a:t>
             </a:r>
           </a:p>
           <a:p>
             <a:pPr lvl="4"/>
             <a:r>
-              <a:rPr lang="en-US" smtClean="0"/>
+              <a:rPr lang="en-US"/>
               <a:t>Fifth level</a:t>
             </a:r>
-            <a:endParaRPr lang="en-US"/>
           </a:p>
         </p:txBody>
       </p:sp>
@@ -3089,7 +3071,7 @@
           <a:p>
             <a:fld id="{78C97017-6FC3-485B-9764-EAC9E56C1D49}" type="datetimeFigureOut">
               <a:rPr lang="en-US" smtClean="0"/>
-              <a:t>9/4/17</a:t>
+              <a:t>10/13/2017</a:t>
             </a:fld>
             <a:endParaRPr lang="en-US"/>
           </a:p>
@@ -3472,7 +3454,7 @@
         </p:nvSpPr>
         <p:spPr>
           <a:xfrm>
-            <a:off x="1119865" y="1727200"/>
+            <a:off x="1143000" y="1738947"/>
             <a:ext cx="7490735" cy="2997200"/>
           </a:xfrm>
           <a:prstGeom prst="roundRect">
@@ -3510,7 +3492,7 @@
           <a:lstStyle/>
           <a:p>
             <a:r>
-              <a:rPr lang="en-US" sz="1200" b="1" dirty="0" smtClean="0">
+              <a:rPr lang="en-US" sz="1200" b="1" dirty="0">
                 <a:solidFill>
                   <a:srgbClr val="7030A0"/>
                 </a:solidFill>
@@ -3569,7 +3551,7 @@
           <a:p>
             <a:pPr algn="ctr"/>
             <a:r>
-              <a:rPr lang="en-US" sz="1050" dirty="0" err="1" smtClean="0">
+              <a:rPr lang="en-US" sz="1050" dirty="0" err="1">
                 <a:solidFill>
                   <a:schemeClr val="bg1"/>
                 </a:solidFill>
@@ -3628,7 +3610,7 @@
           <a:p>
             <a:pPr algn="ctr"/>
             <a:r>
-              <a:rPr lang="en-US" sz="1050" dirty="0" err="1" smtClean="0">
+              <a:rPr lang="en-US" sz="1050" dirty="0" err="1">
                 <a:solidFill>
                   <a:schemeClr val="bg1"/>
                 </a:solidFill>
@@ -3783,7 +3765,7 @@
           <a:p>
             <a:pPr algn="ctr"/>
             <a:r>
-              <a:rPr lang="en-US" sz="1050" dirty="0" smtClean="0">
+              <a:rPr lang="en-US" sz="1050" dirty="0">
                 <a:solidFill>
                   <a:schemeClr val="bg1"/>
                 </a:solidFill>
@@ -4107,7 +4089,7 @@
           <a:p>
             <a:pPr algn="ctr"/>
             <a:r>
-              <a:rPr lang="en-US" sz="1050" dirty="0" err="1" smtClean="0">
+              <a:rPr lang="en-US" sz="1050" dirty="0" err="1">
                 <a:solidFill>
                   <a:srgbClr val="7030A0"/>
                 </a:solidFill>
@@ -4249,12 +4231,12 @@
           <a:p>
             <a:pPr algn="ctr"/>
             <a:r>
-              <a:rPr lang="en-US" sz="1050" dirty="0" err="1" smtClean="0">
+              <a:rPr lang="en-US" sz="1050" dirty="0" err="1">
                 <a:solidFill>
                   <a:srgbClr val="7030A0"/>
                 </a:solidFill>
               </a:rPr>
-              <a:t>UniquePersonList</a:t>
+              <a:t>UniqueParcelList</a:t>
             </a:r>
             <a:endParaRPr lang="en-SG" sz="1050" dirty="0">
               <a:solidFill>
@@ -4393,7 +4375,7 @@
           <a:p>
             <a:pPr algn="ctr"/>
             <a:r>
-              <a:rPr lang="en-US" sz="1050" dirty="0" err="1" smtClean="0">
+              <a:rPr lang="en-US" sz="1050" dirty="0" err="1">
                 <a:solidFill>
                   <a:srgbClr val="7030A0"/>
                 </a:solidFill>
@@ -4492,12 +4474,12 @@
           <a:p>
             <a:pPr algn="ctr"/>
             <a:r>
-              <a:rPr lang="en-US" sz="1050" dirty="0" smtClean="0">
+              <a:rPr lang="en-US" sz="1050" dirty="0">
                 <a:solidFill>
                   <a:srgbClr val="7030A0"/>
                 </a:solidFill>
               </a:rPr>
-              <a:t>Person</a:t>
+              <a:t>Parcel</a:t>
             </a:r>
             <a:endParaRPr lang="en-SG" sz="1050" dirty="0">
               <a:solidFill>
@@ -4634,7 +4616,7 @@
           <a:p>
             <a:pPr algn="ctr"/>
             <a:r>
-              <a:rPr lang="en-US" sz="1050" dirty="0" smtClean="0">
+              <a:rPr lang="en-US" sz="1050" dirty="0">
                 <a:solidFill>
                   <a:srgbClr val="7030A0"/>
                 </a:solidFill>
@@ -4776,7 +4758,7 @@
           <a:p>
             <a:pPr algn="ctr"/>
             <a:r>
-              <a:rPr lang="en-US" sz="1050" dirty="0" smtClean="0">
+              <a:rPr lang="en-US" sz="1050" dirty="0">
                 <a:solidFill>
                   <a:srgbClr val="7030A0"/>
                 </a:solidFill>
@@ -4784,19 +4766,19 @@
               <a:t>&lt;&lt;interface&gt;&gt;</a:t>
             </a:r>
             <a:br>
-              <a:rPr lang="en-US" sz="1050" dirty="0" smtClean="0">
+              <a:rPr lang="en-US" sz="1050" dirty="0">
                 <a:solidFill>
                   <a:srgbClr val="7030A0"/>
                 </a:solidFill>
               </a:rPr>
             </a:br>
             <a:r>
-              <a:rPr lang="en-US" sz="1050" dirty="0" err="1" smtClean="0">
+              <a:rPr lang="en-US" sz="1050" dirty="0" err="1">
                 <a:solidFill>
                   <a:srgbClr val="7030A0"/>
                 </a:solidFill>
               </a:rPr>
-              <a:t>ReadOnlyPerson</a:t>
+              <a:t>ReadOnlyParcel</a:t>
             </a:r>
             <a:endParaRPr lang="en-SG" sz="1050" dirty="0">
               <a:solidFill>
@@ -4847,7 +4829,7 @@
           <a:p>
             <a:pPr algn="ctr"/>
             <a:r>
-              <a:rPr lang="en-US" sz="1050" dirty="0" smtClean="0">
+              <a:rPr lang="en-US" sz="1050" dirty="0">
                 <a:solidFill>
                   <a:srgbClr val="7030A0"/>
                 </a:solidFill>
@@ -4991,7 +4973,7 @@
           <a:p>
             <a:pPr algn="ctr"/>
             <a:r>
-              <a:rPr lang="en-US" sz="1050" dirty="0" smtClean="0">
+              <a:rPr lang="en-US" sz="1050" dirty="0">
                 <a:solidFill>
                   <a:srgbClr val="7030A0"/>
                 </a:solidFill>
@@ -5088,7 +5070,7 @@
           <a:p>
             <a:pPr algn="ctr"/>
             <a:r>
-              <a:rPr lang="en-US" sz="1050" dirty="0" smtClean="0">
+              <a:rPr lang="en-US" sz="1050" dirty="0">
                 <a:solidFill>
                   <a:srgbClr val="7030A0"/>
                 </a:solidFill>
@@ -5185,7 +5167,7 @@
           <a:p>
             <a:pPr algn="ctr"/>
             <a:r>
-              <a:rPr lang="en-US" sz="1050" dirty="0" smtClean="0">
+              <a:rPr lang="en-US" sz="1050" dirty="0">
                 <a:solidFill>
                   <a:srgbClr val="7030A0"/>
                 </a:solidFill>
@@ -5373,7 +5355,7 @@
           <a:p>
             <a:pPr algn="ctr"/>
             <a:r>
-              <a:rPr lang="en-US" sz="1050" dirty="0" smtClean="0">
+              <a:rPr lang="en-US" sz="1050" dirty="0">
                 <a:solidFill>
                   <a:srgbClr val="7030A0"/>
                 </a:solidFill>
@@ -5381,14 +5363,14 @@
               <a:t>&lt;&lt;interface&gt;&gt;</a:t>
             </a:r>
             <a:br>
-              <a:rPr lang="en-US" sz="1050" dirty="0" smtClean="0">
+              <a:rPr lang="en-US" sz="1050" dirty="0">
                 <a:solidFill>
                   <a:srgbClr val="7030A0"/>
                 </a:solidFill>
               </a:rPr>
             </a:br>
             <a:r>
-              <a:rPr lang="en-US" sz="1050" dirty="0" err="1" smtClean="0">
+              <a:rPr lang="en-US" sz="1050" dirty="0" err="1">
                 <a:solidFill>
                   <a:srgbClr val="7030A0"/>
                 </a:solidFill>
@@ -5427,7 +5409,7 @@
           <a:p>
             <a:pPr algn="r"/>
             <a:r>
-              <a:rPr lang="en-US" sz="1100" dirty="0" smtClean="0">
+              <a:rPr lang="en-US" sz="1100" dirty="0">
                 <a:solidFill>
                   <a:srgbClr val="7030A0"/>
                 </a:solidFill>
@@ -5483,20 +5465,12 @@
           <a:p>
             <a:pPr algn="ctr"/>
             <a:r>
-              <a:rPr lang="en-US" sz="1050" dirty="0" smtClean="0">
+              <a:rPr lang="en-US" sz="1050" dirty="0">
                 <a:solidFill>
                   <a:srgbClr val="7030A0"/>
                 </a:solidFill>
               </a:rPr>
               <a:t>&lt;&lt;interface&gt;&gt;</a:t>
-            </a:r>
-            <a:r>
-              <a:rPr lang="en-US" sz="1050">
-                <a:solidFill>
-                  <a:srgbClr val="7030A0"/>
-                </a:solidFill>
-              </a:rPr>
-              <a:t/>
             </a:r>
             <a:br>
               <a:rPr lang="en-US" sz="1050">
@@ -5506,7 +5480,7 @@
               </a:rPr>
             </a:br>
             <a:r>
-              <a:rPr lang="en-US" sz="1050" dirty="0" err="1" smtClean="0">
+              <a:rPr lang="en-US" sz="1050" dirty="0" err="1">
                 <a:solidFill>
                   <a:srgbClr val="7030A0"/>
                 </a:solidFill>
@@ -5628,7 +5602,7 @@
           <a:p>
             <a:pPr algn="ctr"/>
             <a:r>
-              <a:rPr lang="en-US" sz="1100" dirty="0" smtClean="0">
+              <a:rPr lang="en-US" sz="1100" dirty="0">
                 <a:solidFill>
                   <a:srgbClr val="7030A0"/>
                 </a:solidFill>
@@ -5667,7 +5641,7 @@
           <a:p>
             <a:pPr algn="ctr"/>
             <a:r>
-              <a:rPr lang="en-US" sz="1100" dirty="0" smtClean="0">
+              <a:rPr lang="en-US" sz="1100" dirty="0">
                 <a:solidFill>
                   <a:srgbClr val="7030A0"/>
                 </a:solidFill>
@@ -5706,7 +5680,7 @@
           <a:p>
             <a:pPr algn="ctr"/>
             <a:r>
-              <a:rPr lang="en-US" sz="1100" dirty="0" smtClean="0">
+              <a:rPr lang="en-US" sz="1100" dirty="0">
                 <a:solidFill>
                   <a:srgbClr val="7030A0"/>
                 </a:solidFill>
@@ -5745,7 +5719,7 @@
           <a:p>
             <a:pPr algn="ctr"/>
             <a:r>
-              <a:rPr lang="en-US" sz="1100" dirty="0" smtClean="0">
+              <a:rPr lang="en-US" sz="1100" dirty="0">
                 <a:solidFill>
                   <a:srgbClr val="7030A0"/>
                 </a:solidFill>
@@ -5784,7 +5758,7 @@
           <a:p>
             <a:pPr algn="ctr"/>
             <a:r>
-              <a:rPr lang="en-US" sz="1100" dirty="0" smtClean="0">
+              <a:rPr lang="en-US" sz="1100" dirty="0">
                 <a:solidFill>
                   <a:srgbClr val="7030A0"/>
                 </a:solidFill>
@@ -5823,7 +5797,7 @@
           <a:p>
             <a:pPr algn="ctr"/>
             <a:r>
-              <a:rPr lang="en-US" sz="1100" dirty="0" smtClean="0">
+              <a:rPr lang="en-US" sz="1100" dirty="0">
                 <a:solidFill>
                   <a:srgbClr val="7030A0"/>
                 </a:solidFill>
@@ -5862,7 +5836,7 @@
           <a:p>
             <a:pPr algn="ctr"/>
             <a:r>
-              <a:rPr lang="en-US" sz="1100" dirty="0" smtClean="0">
+              <a:rPr lang="en-US" sz="1100" dirty="0">
                 <a:solidFill>
                   <a:srgbClr val="7030A0"/>
                 </a:solidFill>
@@ -5901,7 +5875,7 @@
           <a:p>
             <a:pPr algn="ctr"/>
             <a:r>
-              <a:rPr lang="en-US" sz="1100" dirty="0" smtClean="0">
+              <a:rPr lang="en-US" sz="1100" dirty="0">
                 <a:solidFill>
                   <a:srgbClr val="7030A0"/>
                 </a:solidFill>
@@ -5916,6 +5890,199 @@
           </a:p>
         </p:txBody>
       </p:sp>
+      <p:sp>
+        <p:nvSpPr>
+          <p:cNvPr id="55" name="Flowchart: Decision 96">
+            <a:extLst>
+              <a:ext uri="{FF2B5EF4-FFF2-40B4-BE49-F238E27FC236}">
+                <a16:creationId xmlns:a16="http://schemas.microsoft.com/office/drawing/2014/main" id="{3A1C590C-CEBC-4228-912C-91C0F2C82489}"/>
+              </a:ext>
+            </a:extLst>
+          </p:cNvPr>
+          <p:cNvSpPr/>
+          <p:nvPr/>
+        </p:nvSpPr>
+        <p:spPr>
+          <a:xfrm rot="5400000">
+            <a:off x="7948466" y="3850288"/>
+            <a:ext cx="236048" cy="173380"/>
+          </a:xfrm>
+          <a:prstGeom prst="flowChartDecision">
+            <a:avLst/>
+          </a:prstGeom>
+          <a:solidFill>
+            <a:srgbClr val="7030A0"/>
+          </a:solidFill>
+          <a:ln w="19050">
+            <a:solidFill>
+              <a:srgbClr val="7030A0"/>
+            </a:solidFill>
+          </a:ln>
+          <a:effectLst/>
+        </p:spPr>
+        <p:style>
+          <a:lnRef idx="1">
+            <a:schemeClr val="accent6"/>
+          </a:lnRef>
+          <a:fillRef idx="2">
+            <a:schemeClr val="accent6"/>
+          </a:fillRef>
+          <a:effectRef idx="1">
+            <a:schemeClr val="accent6"/>
+          </a:effectRef>
+          <a:fontRef idx="minor">
+            <a:schemeClr val="dk1"/>
+          </a:fontRef>
+        </p:style>
+        <p:txBody>
+          <a:bodyPr rtlCol="0" anchor="ctr"/>
+          <a:lstStyle/>
+          <a:p>
+            <a:pPr algn="ctr"/>
+            <a:endParaRPr lang="en-US" sz="1050"/>
+          </a:p>
+        </p:txBody>
+      </p:sp>
+      <p:cxnSp>
+        <p:nvCxnSpPr>
+          <p:cNvPr id="77" name="Elbow Connector 80">
+            <a:extLst>
+              <a:ext uri="{FF2B5EF4-FFF2-40B4-BE49-F238E27FC236}">
+                <a16:creationId xmlns:a16="http://schemas.microsoft.com/office/drawing/2014/main" id="{1F679A69-F819-4117-B97B-3D277BB5D777}"/>
+              </a:ext>
+            </a:extLst>
+          </p:cNvPr>
+          <p:cNvCxnSpPr>
+            <a:cxnSpLocks/>
+          </p:cNvCxnSpPr>
+          <p:nvPr/>
+        </p:nvCxnSpPr>
+        <p:spPr>
+          <a:xfrm rot="5400000">
+            <a:off x="7913586" y="4101596"/>
+            <a:ext cx="318508" cy="12700"/>
+          </a:xfrm>
+          <a:prstGeom prst="bentConnector3">
+            <a:avLst>
+              <a:gd name="adj1" fmla="val 16873"/>
+            </a:avLst>
+          </a:prstGeom>
+          <a:ln w="19050">
+            <a:solidFill>
+              <a:srgbClr val="7030A0"/>
+            </a:solidFill>
+            <a:headEnd type="none" w="med" len="med"/>
+            <a:tailEnd type="arrow" w="med" len="med"/>
+          </a:ln>
+          <a:effectLst/>
+        </p:spPr>
+        <p:style>
+          <a:lnRef idx="1">
+            <a:schemeClr val="accent2"/>
+          </a:lnRef>
+          <a:fillRef idx="2">
+            <a:schemeClr val="accent2"/>
+          </a:fillRef>
+          <a:effectRef idx="1">
+            <a:schemeClr val="accent2"/>
+          </a:effectRef>
+          <a:fontRef idx="minor">
+            <a:schemeClr val="dk1"/>
+          </a:fontRef>
+        </p:style>
+      </p:cxnSp>
+      <p:sp>
+        <p:nvSpPr>
+          <p:cNvPr id="82" name="Rectangle 8">
+            <a:extLst>
+              <a:ext uri="{FF2B5EF4-FFF2-40B4-BE49-F238E27FC236}">
+                <a16:creationId xmlns:a16="http://schemas.microsoft.com/office/drawing/2014/main" id="{146D6CF7-CA4C-466B-B486-5E1F267919D1}"/>
+              </a:ext>
+            </a:extLst>
+          </p:cNvPr>
+          <p:cNvSpPr/>
+          <p:nvPr/>
+        </p:nvSpPr>
+        <p:spPr>
+          <a:xfrm>
+            <a:off x="7672548" y="4267200"/>
+            <a:ext cx="800583" cy="285783"/>
+          </a:xfrm>
+          <a:prstGeom prst="rect">
+            <a:avLst/>
+          </a:prstGeom>
+          <a:ln w="19050">
+            <a:solidFill>
+              <a:srgbClr val="7030A0"/>
+            </a:solidFill>
+          </a:ln>
+          <a:effectLst/>
+        </p:spPr>
+        <p:style>
+          <a:lnRef idx="1">
+            <a:schemeClr val="accent4"/>
+          </a:lnRef>
+          <a:fillRef idx="2">
+            <a:schemeClr val="accent4"/>
+          </a:fillRef>
+          <a:effectRef idx="1">
+            <a:schemeClr val="accent4"/>
+          </a:effectRef>
+          <a:fontRef idx="minor">
+            <a:schemeClr val="dk1"/>
+          </a:fontRef>
+        </p:style>
+        <p:txBody>
+          <a:bodyPr rtlCol="0" anchor="ctr"/>
+          <a:lstStyle/>
+          <a:p>
+            <a:pPr algn="ctr"/>
+            <a:r>
+              <a:rPr lang="en-US" sz="1050" dirty="0" err="1">
+                <a:solidFill>
+                  <a:srgbClr val="7030A0"/>
+                </a:solidFill>
+              </a:rPr>
+              <a:t>PostalCode</a:t>
+            </a:r>
+            <a:endParaRPr lang="en-SG" sz="1050" dirty="0">
+              <a:solidFill>
+                <a:srgbClr val="7030A0"/>
+              </a:solidFill>
+            </a:endParaRPr>
+          </a:p>
+        </p:txBody>
+      </p:sp>
+      <p:pic>
+        <p:nvPicPr>
+          <p:cNvPr id="12" name="Picture 11">
+            <a:extLst>
+              <a:ext uri="{FF2B5EF4-FFF2-40B4-BE49-F238E27FC236}">
+                <a16:creationId xmlns:a16="http://schemas.microsoft.com/office/drawing/2014/main" id="{97F3A8FE-40BC-4769-B8BA-B2565AAB561D}"/>
+              </a:ext>
+            </a:extLst>
+          </p:cNvPr>
+          <p:cNvPicPr>
+            <a:picLocks noChangeAspect="1"/>
+          </p:cNvPicPr>
+          <p:nvPr/>
+        </p:nvPicPr>
+        <p:blipFill>
+          <a:blip r:embed="rId2"/>
+          <a:stretch>
+            <a:fillRect/>
+          </a:stretch>
+        </p:blipFill>
+        <p:spPr>
+          <a:xfrm>
+            <a:off x="4209256" y="3276587"/>
+            <a:ext cx="725487" cy="304826"/>
+          </a:xfrm>
+          <a:prstGeom prst="rect">
+            <a:avLst/>
+          </a:prstGeom>
+        </p:spPr>
+      </p:pic>
     </p:spTree>
     <p:extLst>
       <p:ext uri="{BB962C8B-B14F-4D97-AF65-F5344CB8AC3E}">
@@ -5926,13 +6093,6 @@
   <p:clrMapOvr>
     <a:masterClrMapping/>
   </p:clrMapOvr>
-  <p:timing>
-    <p:tnLst>
-      <p:par>
-        <p:cTn id="1" dur="indefinite" restart="never" nodeType="tmRoot"/>
-      </p:par>
-    </p:tnLst>
-  </p:timing>
 </p:sld>
 </file>
 

</xml_diff>

<commit_message>
Update diagrams Update Developer's guide Remove not needed pictures of AB4 team
</commit_message>
<xml_diff>
--- a/docs/diagrams/ModelComponentClassDiagram.pptx
+++ b/docs/diagrams/ModelComponentClassDiagram.pptx
@@ -109,7 +109,7 @@
   </p:defaultTextStyle>
   <p:extLst>
     <p:ext uri="{EFAFB233-063F-42B5-8137-9DF3F51BA10A}">
-      <p15:sldGuideLst xmlns:p15="http://schemas.microsoft.com/office/powerpoint/2012/main" xmlns="">
+      <p15:sldGuideLst xmlns="" xmlns:p15="http://schemas.microsoft.com/office/powerpoint/2012/main">
         <p15:guide id="1" orient="horz" pos="1488">
           <p15:clr>
             <a:srgbClr val="A4A3A4"/>
@@ -208,7 +208,7 @@
           <a:p>
             <a:fld id="{F5CC4B3F-88C1-4FFA-B1B6-F41C21DC6924}" type="datetimeFigureOut">
               <a:rPr lang="en-US" smtClean="0"/>
-              <a:t>10/11/2017</a:t>
+              <a:t>10/16/2017</a:t>
             </a:fld>
             <a:endParaRPr lang="en-US"/>
           </a:p>
@@ -657,7 +657,7 @@
           <a:p>
             <a:fld id="{78C97017-6FC3-485B-9764-EAC9E56C1D49}" type="datetimeFigureOut">
               <a:rPr lang="en-US" smtClean="0"/>
-              <a:t>10/11/2017</a:t>
+              <a:t>10/16/2017</a:t>
             </a:fld>
             <a:endParaRPr lang="en-US"/>
           </a:p>
@@ -827,7 +827,7 @@
           <a:p>
             <a:fld id="{78C97017-6FC3-485B-9764-EAC9E56C1D49}" type="datetimeFigureOut">
               <a:rPr lang="en-US" smtClean="0"/>
-              <a:t>10/11/2017</a:t>
+              <a:t>10/16/2017</a:t>
             </a:fld>
             <a:endParaRPr lang="en-US"/>
           </a:p>
@@ -1007,7 +1007,7 @@
           <a:p>
             <a:fld id="{78C97017-6FC3-485B-9764-EAC9E56C1D49}" type="datetimeFigureOut">
               <a:rPr lang="en-US" smtClean="0"/>
-              <a:t>10/11/2017</a:t>
+              <a:t>10/16/2017</a:t>
             </a:fld>
             <a:endParaRPr lang="en-US"/>
           </a:p>
@@ -1177,7 +1177,7 @@
           <a:p>
             <a:fld id="{78C97017-6FC3-485B-9764-EAC9E56C1D49}" type="datetimeFigureOut">
               <a:rPr lang="en-US" smtClean="0"/>
-              <a:t>10/11/2017</a:t>
+              <a:t>10/16/2017</a:t>
             </a:fld>
             <a:endParaRPr lang="en-US"/>
           </a:p>
@@ -1423,7 +1423,7 @@
           <a:p>
             <a:fld id="{78C97017-6FC3-485B-9764-EAC9E56C1D49}" type="datetimeFigureOut">
               <a:rPr lang="en-US" smtClean="0"/>
-              <a:t>10/11/2017</a:t>
+              <a:t>10/16/2017</a:t>
             </a:fld>
             <a:endParaRPr lang="en-US"/>
           </a:p>
@@ -1711,7 +1711,7 @@
           <a:p>
             <a:fld id="{78C97017-6FC3-485B-9764-EAC9E56C1D49}" type="datetimeFigureOut">
               <a:rPr lang="en-US" smtClean="0"/>
-              <a:t>10/11/2017</a:t>
+              <a:t>10/16/2017</a:t>
             </a:fld>
             <a:endParaRPr lang="en-US"/>
           </a:p>
@@ -2133,7 +2133,7 @@
           <a:p>
             <a:fld id="{78C97017-6FC3-485B-9764-EAC9E56C1D49}" type="datetimeFigureOut">
               <a:rPr lang="en-US" smtClean="0"/>
-              <a:t>10/11/2017</a:t>
+              <a:t>10/16/2017</a:t>
             </a:fld>
             <a:endParaRPr lang="en-US"/>
           </a:p>
@@ -2251,7 +2251,7 @@
           <a:p>
             <a:fld id="{78C97017-6FC3-485B-9764-EAC9E56C1D49}" type="datetimeFigureOut">
               <a:rPr lang="en-US" smtClean="0"/>
-              <a:t>10/11/2017</a:t>
+              <a:t>10/16/2017</a:t>
             </a:fld>
             <a:endParaRPr lang="en-US"/>
           </a:p>
@@ -2346,7 +2346,7 @@
           <a:p>
             <a:fld id="{78C97017-6FC3-485B-9764-EAC9E56C1D49}" type="datetimeFigureOut">
               <a:rPr lang="en-US" smtClean="0"/>
-              <a:t>10/11/2017</a:t>
+              <a:t>10/16/2017</a:t>
             </a:fld>
             <a:endParaRPr lang="en-US"/>
           </a:p>
@@ -2623,7 +2623,7 @@
           <a:p>
             <a:fld id="{78C97017-6FC3-485B-9764-EAC9E56C1D49}" type="datetimeFigureOut">
               <a:rPr lang="en-US" smtClean="0"/>
-              <a:t>10/11/2017</a:t>
+              <a:t>10/16/2017</a:t>
             </a:fld>
             <a:endParaRPr lang="en-US"/>
           </a:p>
@@ -2876,7 +2876,7 @@
           <a:p>
             <a:fld id="{78C97017-6FC3-485B-9764-EAC9E56C1D49}" type="datetimeFigureOut">
               <a:rPr lang="en-US" smtClean="0"/>
-              <a:t>10/11/2017</a:t>
+              <a:t>10/16/2017</a:t>
             </a:fld>
             <a:endParaRPr lang="en-US"/>
           </a:p>
@@ -3089,7 +3089,7 @@
           <a:p>
             <a:fld id="{78C97017-6FC3-485B-9764-EAC9E56C1D49}" type="datetimeFigureOut">
               <a:rPr lang="en-US" smtClean="0"/>
-              <a:t>10/11/2017</a:t>
+              <a:t>10/16/2017</a:t>
             </a:fld>
             <a:endParaRPr lang="en-US"/>
           </a:p>
@@ -3472,8 +3472,8 @@
         </p:nvSpPr>
         <p:spPr>
           <a:xfrm>
-            <a:off x="1119865" y="1727200"/>
-            <a:ext cx="7490735" cy="2997200"/>
+            <a:off x="1119865" y="961788"/>
+            <a:ext cx="7490735" cy="3657600"/>
           </a:xfrm>
           <a:prstGeom prst="roundRect">
             <a:avLst>
@@ -4601,7 +4601,7 @@
         </p:nvSpPr>
         <p:spPr>
           <a:xfrm>
-            <a:off x="5336105" y="1809332"/>
+            <a:off x="6000656" y="1849180"/>
             <a:ext cx="483700" cy="346760"/>
           </a:xfrm>
           <a:prstGeom prst="rect">
@@ -4705,8 +4705,8 @@
         </p:nvCxnSpPr>
         <p:spPr>
           <a:xfrm rot="5400000" flipH="1" flipV="1">
-            <a:off x="5161650" y="1860752"/>
-            <a:ext cx="52494" cy="296415"/>
+            <a:off x="5513850" y="1548400"/>
+            <a:ext cx="12646" cy="960966"/>
           </a:xfrm>
           <a:prstGeom prst="bentConnector2">
             <a:avLst/>
@@ -5886,6 +5886,439 @@
         <p:spPr>
           <a:xfrm>
             <a:off x="6667770" y="3210194"/>
+            <a:ext cx="189257" cy="178683"/>
+          </a:xfrm>
+          <a:prstGeom prst="rect">
+            <a:avLst/>
+          </a:prstGeom>
+          <a:noFill/>
+        </p:spPr>
+        <p:txBody>
+          <a:bodyPr wrap="square" lIns="0" tIns="0" rIns="0" bIns="0" rtlCol="0">
+            <a:noAutofit/>
+          </a:bodyPr>
+          <a:lstStyle/>
+          <a:p>
+            <a:pPr algn="ctr"/>
+            <a:r>
+              <a:rPr lang="en-US" sz="1100" dirty="0" smtClean="0">
+                <a:solidFill>
+                  <a:srgbClr val="7030A0"/>
+                </a:solidFill>
+              </a:rPr>
+              <a:t>1</a:t>
+            </a:r>
+            <a:endParaRPr lang="en-SG" sz="1100" dirty="0">
+              <a:solidFill>
+                <a:srgbClr val="7030A0"/>
+              </a:solidFill>
+            </a:endParaRPr>
+          </a:p>
+        </p:txBody>
+      </p:sp>
+      <p:sp>
+        <p:nvSpPr>
+          <p:cNvPr id="93" name="TextBox 92"/>
+          <p:cNvSpPr txBox="1"/>
+          <p:nvPr/>
+        </p:nvSpPr>
+        <p:spPr>
+          <a:xfrm>
+            <a:off x="5787566" y="1843085"/>
+            <a:ext cx="189257" cy="178683"/>
+          </a:xfrm>
+          <a:prstGeom prst="rect">
+            <a:avLst/>
+          </a:prstGeom>
+          <a:noFill/>
+        </p:spPr>
+        <p:txBody>
+          <a:bodyPr wrap="square" lIns="0" tIns="0" rIns="0" bIns="0" rtlCol="0">
+            <a:noAutofit/>
+          </a:bodyPr>
+          <a:lstStyle/>
+          <a:p>
+            <a:pPr algn="ctr"/>
+            <a:r>
+              <a:rPr lang="en-US" sz="1100" dirty="0" smtClean="0">
+                <a:solidFill>
+                  <a:srgbClr val="7030A0"/>
+                </a:solidFill>
+              </a:rPr>
+              <a:t>*</a:t>
+            </a:r>
+            <a:endParaRPr lang="en-SG" sz="1100" dirty="0">
+              <a:solidFill>
+                <a:srgbClr val="7030A0"/>
+              </a:solidFill>
+            </a:endParaRPr>
+          </a:p>
+        </p:txBody>
+      </p:sp>
+      <p:sp>
+        <p:nvSpPr>
+          <p:cNvPr id="94" name="Rectangle 8"/>
+          <p:cNvSpPr/>
+          <p:nvPr/>
+        </p:nvSpPr>
+        <p:spPr>
+          <a:xfrm>
+            <a:off x="4461205" y="1561108"/>
+            <a:ext cx="1156969" cy="346760"/>
+          </a:xfrm>
+          <a:prstGeom prst="rect">
+            <a:avLst/>
+          </a:prstGeom>
+          <a:ln w="19050">
+            <a:solidFill>
+              <a:srgbClr val="7030A0"/>
+            </a:solidFill>
+          </a:ln>
+          <a:effectLst/>
+        </p:spPr>
+        <p:style>
+          <a:lnRef idx="1">
+            <a:schemeClr val="accent4"/>
+          </a:lnRef>
+          <a:fillRef idx="2">
+            <a:schemeClr val="accent4"/>
+          </a:fillRef>
+          <a:effectRef idx="1">
+            <a:schemeClr val="accent4"/>
+          </a:effectRef>
+          <a:fontRef idx="minor">
+            <a:schemeClr val="dk1"/>
+          </a:fontRef>
+        </p:style>
+        <p:txBody>
+          <a:bodyPr rtlCol="0" anchor="ctr"/>
+          <a:lstStyle/>
+          <a:p>
+            <a:pPr algn="ctr"/>
+            <a:r>
+              <a:rPr lang="en-US" sz="1050" dirty="0" smtClean="0">
+                <a:solidFill>
+                  <a:srgbClr val="7030A0"/>
+                </a:solidFill>
+              </a:rPr>
+              <a:t>UniqueGroupList</a:t>
+            </a:r>
+            <a:endParaRPr lang="en-SG" sz="1050" dirty="0">
+              <a:solidFill>
+                <a:srgbClr val="7030A0"/>
+              </a:solidFill>
+            </a:endParaRPr>
+          </a:p>
+        </p:txBody>
+      </p:sp>
+      <p:sp>
+        <p:nvSpPr>
+          <p:cNvPr id="95" name="Rectangle 8"/>
+          <p:cNvSpPr/>
+          <p:nvPr/>
+        </p:nvSpPr>
+        <p:spPr>
+          <a:xfrm>
+            <a:off x="6122736" y="1146965"/>
+            <a:ext cx="550394" cy="346760"/>
+          </a:xfrm>
+          <a:prstGeom prst="rect">
+            <a:avLst/>
+          </a:prstGeom>
+          <a:ln w="19050">
+            <a:solidFill>
+              <a:srgbClr val="7030A0"/>
+            </a:solidFill>
+          </a:ln>
+          <a:effectLst/>
+        </p:spPr>
+        <p:style>
+          <a:lnRef idx="1">
+            <a:schemeClr val="accent4"/>
+          </a:lnRef>
+          <a:fillRef idx="2">
+            <a:schemeClr val="accent4"/>
+          </a:fillRef>
+          <a:effectRef idx="1">
+            <a:schemeClr val="accent4"/>
+          </a:effectRef>
+          <a:fontRef idx="minor">
+            <a:schemeClr val="dk1"/>
+          </a:fontRef>
+        </p:style>
+        <p:txBody>
+          <a:bodyPr rtlCol="0" anchor="ctr"/>
+          <a:lstStyle/>
+          <a:p>
+            <a:pPr algn="ctr"/>
+            <a:r>
+              <a:rPr lang="en-US" sz="1050" dirty="0" smtClean="0">
+                <a:solidFill>
+                  <a:srgbClr val="7030A0"/>
+                </a:solidFill>
+              </a:rPr>
+              <a:t>Group</a:t>
+            </a:r>
+            <a:endParaRPr lang="en-SG" sz="1050" dirty="0">
+              <a:solidFill>
+                <a:srgbClr val="7030A0"/>
+              </a:solidFill>
+            </a:endParaRPr>
+          </a:p>
+        </p:txBody>
+      </p:sp>
+      <p:sp>
+        <p:nvSpPr>
+          <p:cNvPr id="96" name="Flowchart: Decision 96"/>
+          <p:cNvSpPr/>
+          <p:nvPr/>
+        </p:nvSpPr>
+        <p:spPr>
+          <a:xfrm rot="16200000">
+            <a:off x="4937788" y="1351678"/>
+            <a:ext cx="236048" cy="173380"/>
+          </a:xfrm>
+          <a:prstGeom prst="flowChartDecision">
+            <a:avLst/>
+          </a:prstGeom>
+          <a:noFill/>
+          <a:ln w="19050">
+            <a:solidFill>
+              <a:srgbClr val="7030A0"/>
+            </a:solidFill>
+          </a:ln>
+          <a:effectLst/>
+        </p:spPr>
+        <p:style>
+          <a:lnRef idx="1">
+            <a:schemeClr val="accent6"/>
+          </a:lnRef>
+          <a:fillRef idx="2">
+            <a:schemeClr val="accent6"/>
+          </a:fillRef>
+          <a:effectRef idx="1">
+            <a:schemeClr val="accent6"/>
+          </a:effectRef>
+          <a:fontRef idx="minor">
+            <a:schemeClr val="dk1"/>
+          </a:fontRef>
+        </p:style>
+        <p:txBody>
+          <a:bodyPr rtlCol="0" anchor="ctr"/>
+          <a:lstStyle/>
+          <a:p>
+            <a:pPr algn="ctr"/>
+            <a:endParaRPr lang="en-US" sz="1050"/>
+          </a:p>
+        </p:txBody>
+      </p:sp>
+      <p:cxnSp>
+        <p:nvCxnSpPr>
+          <p:cNvPr id="98" name="Elbow Connector 97"/>
+          <p:cNvCxnSpPr>
+            <a:stCxn id="96" idx="3"/>
+          </p:cNvCxnSpPr>
+          <p:nvPr/>
+        </p:nvCxnSpPr>
+        <p:spPr>
+          <a:xfrm rot="5400000" flipH="1" flipV="1">
+            <a:off x="5590311" y="785133"/>
+            <a:ext cx="712" cy="1069711"/>
+          </a:xfrm>
+          <a:prstGeom prst="bentConnector2">
+            <a:avLst/>
+          </a:prstGeom>
+          <a:ln w="19050">
+            <a:solidFill>
+              <a:srgbClr val="7030A0"/>
+            </a:solidFill>
+            <a:headEnd type="none" w="med" len="med"/>
+            <a:tailEnd type="arrow" w="med" len="med"/>
+          </a:ln>
+          <a:effectLst/>
+        </p:spPr>
+        <p:style>
+          <a:lnRef idx="1">
+            <a:schemeClr val="accent2"/>
+          </a:lnRef>
+          <a:fillRef idx="2">
+            <a:schemeClr val="accent2"/>
+          </a:fillRef>
+          <a:effectRef idx="1">
+            <a:schemeClr val="accent2"/>
+          </a:effectRef>
+          <a:fontRef idx="minor">
+            <a:schemeClr val="dk1"/>
+          </a:fontRef>
+        </p:style>
+      </p:cxnSp>
+      <p:cxnSp>
+        <p:nvCxnSpPr>
+          <p:cNvPr id="101" name="Elbow Connector 100"/>
+          <p:cNvCxnSpPr/>
+          <p:nvPr/>
+        </p:nvCxnSpPr>
+        <p:spPr>
+          <a:xfrm rot="10800000">
+            <a:off x="5634297" y="1734488"/>
+            <a:ext cx="1046318" cy="748140"/>
+          </a:xfrm>
+          <a:prstGeom prst="bentConnector3">
+            <a:avLst>
+              <a:gd name="adj1" fmla="val 1570"/>
+            </a:avLst>
+          </a:prstGeom>
+          <a:ln w="19050">
+            <a:solidFill>
+              <a:srgbClr val="7030A0"/>
+            </a:solidFill>
+            <a:headEnd type="none" w="med" len="med"/>
+            <a:tailEnd type="arrow" w="med" len="med"/>
+          </a:ln>
+          <a:effectLst/>
+        </p:spPr>
+        <p:style>
+          <a:lnRef idx="1">
+            <a:schemeClr val="accent2"/>
+          </a:lnRef>
+          <a:fillRef idx="2">
+            <a:schemeClr val="accent2"/>
+          </a:fillRef>
+          <a:effectRef idx="1">
+            <a:schemeClr val="accent2"/>
+          </a:effectRef>
+          <a:fontRef idx="minor">
+            <a:schemeClr val="dk1"/>
+          </a:fontRef>
+        </p:style>
+      </p:cxnSp>
+      <p:sp>
+        <p:nvSpPr>
+          <p:cNvPr id="102" name="TextBox 101"/>
+          <p:cNvSpPr txBox="1"/>
+          <p:nvPr/>
+        </p:nvSpPr>
+        <p:spPr>
+          <a:xfrm>
+            <a:off x="5933479" y="1146965"/>
+            <a:ext cx="189257" cy="178683"/>
+          </a:xfrm>
+          <a:prstGeom prst="rect">
+            <a:avLst/>
+          </a:prstGeom>
+          <a:noFill/>
+        </p:spPr>
+        <p:txBody>
+          <a:bodyPr wrap="square" lIns="0" tIns="0" rIns="0" bIns="0" rtlCol="0">
+            <a:noAutofit/>
+          </a:bodyPr>
+          <a:lstStyle/>
+          <a:p>
+            <a:pPr algn="ctr"/>
+            <a:r>
+              <a:rPr lang="en-US" sz="1100" dirty="0" smtClean="0">
+                <a:solidFill>
+                  <a:srgbClr val="7030A0"/>
+                </a:solidFill>
+              </a:rPr>
+              <a:t>*</a:t>
+            </a:r>
+            <a:endParaRPr lang="en-SG" sz="1100" dirty="0">
+              <a:solidFill>
+                <a:srgbClr val="7030A0"/>
+              </a:solidFill>
+            </a:endParaRPr>
+          </a:p>
+        </p:txBody>
+      </p:sp>
+      <p:sp>
+        <p:nvSpPr>
+          <p:cNvPr id="117" name="TextBox 116"/>
+          <p:cNvSpPr txBox="1"/>
+          <p:nvPr/>
+        </p:nvSpPr>
+        <p:spPr>
+          <a:xfrm>
+            <a:off x="5652904" y="1496593"/>
+            <a:ext cx="189257" cy="178683"/>
+          </a:xfrm>
+          <a:prstGeom prst="rect">
+            <a:avLst/>
+          </a:prstGeom>
+          <a:noFill/>
+        </p:spPr>
+        <p:txBody>
+          <a:bodyPr wrap="square" lIns="0" tIns="0" rIns="0" bIns="0" rtlCol="0">
+            <a:noAutofit/>
+          </a:bodyPr>
+          <a:lstStyle/>
+          <a:p>
+            <a:pPr algn="ctr"/>
+            <a:r>
+              <a:rPr lang="en-US" sz="1100" dirty="0" smtClean="0">
+                <a:solidFill>
+                  <a:srgbClr val="7030A0"/>
+                </a:solidFill>
+              </a:rPr>
+              <a:t>1</a:t>
+            </a:r>
+            <a:endParaRPr lang="en-SG" sz="1100" dirty="0">
+              <a:solidFill>
+                <a:srgbClr val="7030A0"/>
+              </a:solidFill>
+            </a:endParaRPr>
+          </a:p>
+        </p:txBody>
+      </p:sp>
+      <p:cxnSp>
+        <p:nvCxnSpPr>
+          <p:cNvPr id="121" name="Elbow Connector 120"/>
+          <p:cNvCxnSpPr/>
+          <p:nvPr/>
+        </p:nvCxnSpPr>
+        <p:spPr>
+          <a:xfrm rot="5400000" flipH="1" flipV="1">
+            <a:off x="4037231" y="2017232"/>
+            <a:ext cx="719461" cy="153972"/>
+          </a:xfrm>
+          <a:prstGeom prst="bentConnector3">
+            <a:avLst>
+              <a:gd name="adj1" fmla="val 100309"/>
+            </a:avLst>
+          </a:prstGeom>
+          <a:ln w="19050">
+            <a:solidFill>
+              <a:srgbClr val="7030A0"/>
+            </a:solidFill>
+            <a:headEnd type="none" w="med" len="med"/>
+            <a:tailEnd type="arrow" w="med" len="med"/>
+          </a:ln>
+          <a:effectLst/>
+        </p:spPr>
+        <p:style>
+          <a:lnRef idx="1">
+            <a:schemeClr val="accent2"/>
+          </a:lnRef>
+          <a:fillRef idx="2">
+            <a:schemeClr val="accent2"/>
+          </a:fillRef>
+          <a:effectRef idx="1">
+            <a:schemeClr val="accent2"/>
+          </a:effectRef>
+          <a:fontRef idx="minor">
+            <a:schemeClr val="dk1"/>
+          </a:fontRef>
+        </p:style>
+      </p:cxnSp>
+      <p:sp>
+        <p:nvSpPr>
+          <p:cNvPr id="125" name="TextBox 124"/>
+          <p:cNvSpPr txBox="1"/>
+          <p:nvPr/>
+        </p:nvSpPr>
+        <p:spPr>
+          <a:xfrm>
+            <a:off x="4271948" y="1493725"/>
             <a:ext cx="189257" cy="178683"/>
           </a:xfrm>
           <a:prstGeom prst="rect">

</xml_diff>

<commit_message>
update ModelClassDiagram.png for TrackingNumber enhancement
</commit_message>
<xml_diff>
--- a/docs/diagrams/ModelComponentClassDiagram.pptx
+++ b/docs/diagrams/ModelComponentClassDiagram.pptx
@@ -212,7 +212,7 @@
           <a:p>
             <a:fld id="{F5CC4B3F-88C1-4FFA-B1B6-F41C21DC6924}" type="datetimeFigureOut">
               <a:rPr lang="en-US" smtClean="0"/>
-              <a:t>10/13/2017</a:t>
+              <a:t>10/18/2017</a:t>
             </a:fld>
             <a:endParaRPr lang="en-US"/>
           </a:p>
@@ -658,7 +658,7 @@
           <a:p>
             <a:fld id="{78C97017-6FC3-485B-9764-EAC9E56C1D49}" type="datetimeFigureOut">
               <a:rPr lang="en-US" smtClean="0"/>
-              <a:t>10/13/2017</a:t>
+              <a:t>10/18/2017</a:t>
             </a:fld>
             <a:endParaRPr lang="en-US"/>
           </a:p>
@@ -826,7 +826,7 @@
           <a:p>
             <a:fld id="{78C97017-6FC3-485B-9764-EAC9E56C1D49}" type="datetimeFigureOut">
               <a:rPr lang="en-US" smtClean="0"/>
-              <a:t>10/13/2017</a:t>
+              <a:t>10/18/2017</a:t>
             </a:fld>
             <a:endParaRPr lang="en-US"/>
           </a:p>
@@ -1004,7 +1004,7 @@
           <a:p>
             <a:fld id="{78C97017-6FC3-485B-9764-EAC9E56C1D49}" type="datetimeFigureOut">
               <a:rPr lang="en-US" smtClean="0"/>
-              <a:t>10/13/2017</a:t>
+              <a:t>10/18/2017</a:t>
             </a:fld>
             <a:endParaRPr lang="en-US"/>
           </a:p>
@@ -1172,7 +1172,7 @@
           <a:p>
             <a:fld id="{78C97017-6FC3-485B-9764-EAC9E56C1D49}" type="datetimeFigureOut">
               <a:rPr lang="en-US" smtClean="0"/>
-              <a:t>10/13/2017</a:t>
+              <a:t>10/18/2017</a:t>
             </a:fld>
             <a:endParaRPr lang="en-US"/>
           </a:p>
@@ -1417,7 +1417,7 @@
           <a:p>
             <a:fld id="{78C97017-6FC3-485B-9764-EAC9E56C1D49}" type="datetimeFigureOut">
               <a:rPr lang="en-US" smtClean="0"/>
-              <a:t>10/13/2017</a:t>
+              <a:t>10/18/2017</a:t>
             </a:fld>
             <a:endParaRPr lang="en-US"/>
           </a:p>
@@ -1702,7 +1702,7 @@
           <a:p>
             <a:fld id="{78C97017-6FC3-485B-9764-EAC9E56C1D49}" type="datetimeFigureOut">
               <a:rPr lang="en-US" smtClean="0"/>
-              <a:t>10/13/2017</a:t>
+              <a:t>10/18/2017</a:t>
             </a:fld>
             <a:endParaRPr lang="en-US"/>
           </a:p>
@@ -2121,7 +2121,7 @@
           <a:p>
             <a:fld id="{78C97017-6FC3-485B-9764-EAC9E56C1D49}" type="datetimeFigureOut">
               <a:rPr lang="en-US" smtClean="0"/>
-              <a:t>10/13/2017</a:t>
+              <a:t>10/18/2017</a:t>
             </a:fld>
             <a:endParaRPr lang="en-US"/>
           </a:p>
@@ -2238,7 +2238,7 @@
           <a:p>
             <a:fld id="{78C97017-6FC3-485B-9764-EAC9E56C1D49}" type="datetimeFigureOut">
               <a:rPr lang="en-US" smtClean="0"/>
-              <a:t>10/13/2017</a:t>
+              <a:t>10/18/2017</a:t>
             </a:fld>
             <a:endParaRPr lang="en-US"/>
           </a:p>
@@ -2333,7 +2333,7 @@
           <a:p>
             <a:fld id="{78C97017-6FC3-485B-9764-EAC9E56C1D49}" type="datetimeFigureOut">
               <a:rPr lang="en-US" smtClean="0"/>
-              <a:t>10/13/2017</a:t>
+              <a:t>10/18/2017</a:t>
             </a:fld>
             <a:endParaRPr lang="en-US"/>
           </a:p>
@@ -2608,7 +2608,7 @@
           <a:p>
             <a:fld id="{78C97017-6FC3-485B-9764-EAC9E56C1D49}" type="datetimeFigureOut">
               <a:rPr lang="en-US" smtClean="0"/>
-              <a:t>10/13/2017</a:t>
+              <a:t>10/18/2017</a:t>
             </a:fld>
             <a:endParaRPr lang="en-US"/>
           </a:p>
@@ -2860,7 +2860,7 @@
           <a:p>
             <a:fld id="{78C97017-6FC3-485B-9764-EAC9E56C1D49}" type="datetimeFigureOut">
               <a:rPr lang="en-US" smtClean="0"/>
-              <a:t>10/13/2017</a:t>
+              <a:t>10/18/2017</a:t>
             </a:fld>
             <a:endParaRPr lang="en-US"/>
           </a:p>
@@ -3071,7 +3071,7 @@
           <a:p>
             <a:fld id="{78C97017-6FC3-485B-9764-EAC9E56C1D49}" type="datetimeFigureOut">
               <a:rPr lang="en-US" smtClean="0"/>
-              <a:t>10/13/2017</a:t>
+              <a:t>10/18/2017</a:t>
             </a:fld>
             <a:endParaRPr lang="en-US"/>
           </a:p>
@@ -3455,7 +3455,7 @@
         <p:spPr>
           <a:xfrm>
             <a:off x="1143000" y="1738947"/>
-            <a:ext cx="7490735" cy="2997200"/>
+            <a:ext cx="7772400" cy="2997200"/>
           </a:xfrm>
           <a:prstGeom prst="roundRect">
             <a:avLst>
@@ -4895,6 +4895,7 @@
         <p:nvCxnSpPr>
           <p:cNvPr id="79" name="Elbow Connector 78"/>
           <p:cNvCxnSpPr>
+            <a:cxnSpLocks/>
             <a:stCxn id="78" idx="3"/>
             <a:endCxn id="76" idx="1"/>
           </p:cNvCxnSpPr>
@@ -6083,6 +6084,118 @@
           </a:prstGeom>
         </p:spPr>
       </p:pic>
+      <p:sp>
+        <p:nvSpPr>
+          <p:cNvPr id="74" name="Rectangle 8">
+            <a:extLst>
+              <a:ext uri="{FF2B5EF4-FFF2-40B4-BE49-F238E27FC236}">
+                <a16:creationId xmlns:a16="http://schemas.microsoft.com/office/drawing/2014/main" id="{E6046982-0B37-4269-945C-90923FF92469}"/>
+              </a:ext>
+            </a:extLst>
+          </p:cNvPr>
+          <p:cNvSpPr/>
+          <p:nvPr/>
+        </p:nvSpPr>
+        <p:spPr>
+          <a:xfrm>
+            <a:off x="7712396" y="2238183"/>
+            <a:ext cx="1107977" cy="285783"/>
+          </a:xfrm>
+          <a:prstGeom prst="rect">
+            <a:avLst/>
+          </a:prstGeom>
+          <a:ln w="19050">
+            <a:solidFill>
+              <a:srgbClr val="7030A0"/>
+            </a:solidFill>
+          </a:ln>
+          <a:effectLst/>
+        </p:spPr>
+        <p:style>
+          <a:lnRef idx="1">
+            <a:schemeClr val="accent4"/>
+          </a:lnRef>
+          <a:fillRef idx="2">
+            <a:schemeClr val="accent4"/>
+          </a:fillRef>
+          <a:effectRef idx="1">
+            <a:schemeClr val="accent4"/>
+          </a:effectRef>
+          <a:fontRef idx="minor">
+            <a:schemeClr val="dk1"/>
+          </a:fontRef>
+        </p:style>
+        <p:txBody>
+          <a:bodyPr rtlCol="0" anchor="ctr"/>
+          <a:lstStyle/>
+          <a:p>
+            <a:pPr algn="ctr"/>
+            <a:r>
+              <a:rPr lang="en-US" sz="1050" dirty="0" err="1">
+                <a:solidFill>
+                  <a:srgbClr val="7030A0"/>
+                </a:solidFill>
+              </a:rPr>
+              <a:t>TrackingNumber</a:t>
+            </a:r>
+            <a:endParaRPr lang="en-SG" sz="1050" dirty="0">
+              <a:solidFill>
+                <a:srgbClr val="7030A0"/>
+              </a:solidFill>
+            </a:endParaRPr>
+          </a:p>
+        </p:txBody>
+      </p:sp>
+      <p:cxnSp>
+        <p:nvCxnSpPr>
+          <p:cNvPr id="88" name="Elbow Connector 78">
+            <a:extLst>
+              <a:ext uri="{FF2B5EF4-FFF2-40B4-BE49-F238E27FC236}">
+                <a16:creationId xmlns:a16="http://schemas.microsoft.com/office/drawing/2014/main" id="{4EAC088A-8D7E-4E5B-B5CF-EDEA6240BACE}"/>
+              </a:ext>
+            </a:extLst>
+          </p:cNvPr>
+          <p:cNvCxnSpPr>
+            <a:cxnSpLocks/>
+            <a:stCxn id="78" idx="3"/>
+            <a:endCxn id="74" idx="1"/>
+          </p:cNvCxnSpPr>
+          <p:nvPr/>
+        </p:nvCxnSpPr>
+        <p:spPr>
+          <a:xfrm flipV="1">
+            <a:off x="7277995" y="2381075"/>
+            <a:ext cx="434401" cy="653816"/>
+          </a:xfrm>
+          <a:prstGeom prst="bentConnector3">
+            <a:avLst>
+              <a:gd name="adj1" fmla="val 50000"/>
+            </a:avLst>
+          </a:prstGeom>
+          <a:ln w="19050">
+            <a:solidFill>
+              <a:srgbClr val="7030A0"/>
+            </a:solidFill>
+            <a:headEnd type="none" w="med" len="med"/>
+            <a:tailEnd type="arrow" w="med" len="med"/>
+          </a:ln>
+          <a:effectLst/>
+        </p:spPr>
+        <p:style>
+          <a:lnRef idx="1">
+            <a:schemeClr val="accent2"/>
+          </a:lnRef>
+          <a:fillRef idx="2">
+            <a:schemeClr val="accent2"/>
+          </a:fillRef>
+          <a:effectRef idx="1">
+            <a:schemeClr val="accent2"/>
+          </a:effectRef>
+          <a:fontRef idx="minor">
+            <a:schemeClr val="dk1"/>
+          </a:fontRef>
+        </p:style>
+      </p:cxnSp>
     </p:spTree>
     <p:extLst>
       <p:ext uri="{BB962C8B-B14F-4D97-AF65-F5344CB8AC3E}">

</xml_diff>

<commit_message>
updated modelClassDiagram and image with event class
</commit_message>
<xml_diff>
--- a/docs/diagrams/ModelComponentClassDiagram.pptx
+++ b/docs/diagrams/ModelComponentClassDiagram.pptx
@@ -212,7 +212,7 @@
           <a:p>
             <a:fld id="{F5CC4B3F-88C1-4FFA-B1B6-F41C21DC6924}" type="datetimeFigureOut">
               <a:rPr lang="en-US" smtClean="0"/>
-              <a:t>10/18/2017</a:t>
+              <a:t>10/20/2017</a:t>
             </a:fld>
             <a:endParaRPr lang="en-US"/>
           </a:p>
@@ -658,7 +658,7 @@
           <a:p>
             <a:fld id="{78C97017-6FC3-485B-9764-EAC9E56C1D49}" type="datetimeFigureOut">
               <a:rPr lang="en-US" smtClean="0"/>
-              <a:t>10/18/2017</a:t>
+              <a:t>10/20/2017</a:t>
             </a:fld>
             <a:endParaRPr lang="en-US"/>
           </a:p>
@@ -826,7 +826,7 @@
           <a:p>
             <a:fld id="{78C97017-6FC3-485B-9764-EAC9E56C1D49}" type="datetimeFigureOut">
               <a:rPr lang="en-US" smtClean="0"/>
-              <a:t>10/18/2017</a:t>
+              <a:t>10/20/2017</a:t>
             </a:fld>
             <a:endParaRPr lang="en-US"/>
           </a:p>
@@ -1004,7 +1004,7 @@
           <a:p>
             <a:fld id="{78C97017-6FC3-485B-9764-EAC9E56C1D49}" type="datetimeFigureOut">
               <a:rPr lang="en-US" smtClean="0"/>
-              <a:t>10/18/2017</a:t>
+              <a:t>10/20/2017</a:t>
             </a:fld>
             <a:endParaRPr lang="en-US"/>
           </a:p>
@@ -1172,7 +1172,7 @@
           <a:p>
             <a:fld id="{78C97017-6FC3-485B-9764-EAC9E56C1D49}" type="datetimeFigureOut">
               <a:rPr lang="en-US" smtClean="0"/>
-              <a:t>10/18/2017</a:t>
+              <a:t>10/20/2017</a:t>
             </a:fld>
             <a:endParaRPr lang="en-US"/>
           </a:p>
@@ -1417,7 +1417,7 @@
           <a:p>
             <a:fld id="{78C97017-6FC3-485B-9764-EAC9E56C1D49}" type="datetimeFigureOut">
               <a:rPr lang="en-US" smtClean="0"/>
-              <a:t>10/18/2017</a:t>
+              <a:t>10/20/2017</a:t>
             </a:fld>
             <a:endParaRPr lang="en-US"/>
           </a:p>
@@ -1702,7 +1702,7 @@
           <a:p>
             <a:fld id="{78C97017-6FC3-485B-9764-EAC9E56C1D49}" type="datetimeFigureOut">
               <a:rPr lang="en-US" smtClean="0"/>
-              <a:t>10/18/2017</a:t>
+              <a:t>10/20/2017</a:t>
             </a:fld>
             <a:endParaRPr lang="en-US"/>
           </a:p>
@@ -2121,7 +2121,7 @@
           <a:p>
             <a:fld id="{78C97017-6FC3-485B-9764-EAC9E56C1D49}" type="datetimeFigureOut">
               <a:rPr lang="en-US" smtClean="0"/>
-              <a:t>10/18/2017</a:t>
+              <a:t>10/20/2017</a:t>
             </a:fld>
             <a:endParaRPr lang="en-US"/>
           </a:p>
@@ -2238,7 +2238,7 @@
           <a:p>
             <a:fld id="{78C97017-6FC3-485B-9764-EAC9E56C1D49}" type="datetimeFigureOut">
               <a:rPr lang="en-US" smtClean="0"/>
-              <a:t>10/18/2017</a:t>
+              <a:t>10/20/2017</a:t>
             </a:fld>
             <a:endParaRPr lang="en-US"/>
           </a:p>
@@ -2333,7 +2333,7 @@
           <a:p>
             <a:fld id="{78C97017-6FC3-485B-9764-EAC9E56C1D49}" type="datetimeFigureOut">
               <a:rPr lang="en-US" smtClean="0"/>
-              <a:t>10/18/2017</a:t>
+              <a:t>10/20/2017</a:t>
             </a:fld>
             <a:endParaRPr lang="en-US"/>
           </a:p>
@@ -2608,7 +2608,7 @@
           <a:p>
             <a:fld id="{78C97017-6FC3-485B-9764-EAC9E56C1D49}" type="datetimeFigureOut">
               <a:rPr lang="en-US" smtClean="0"/>
-              <a:t>10/18/2017</a:t>
+              <a:t>10/20/2017</a:t>
             </a:fld>
             <a:endParaRPr lang="en-US"/>
           </a:p>
@@ -2860,7 +2860,7 @@
           <a:p>
             <a:fld id="{78C97017-6FC3-485B-9764-EAC9E56C1D49}" type="datetimeFigureOut">
               <a:rPr lang="en-US" smtClean="0"/>
-              <a:t>10/18/2017</a:t>
+              <a:t>10/20/2017</a:t>
             </a:fld>
             <a:endParaRPr lang="en-US"/>
           </a:p>
@@ -3071,7 +3071,7 @@
           <a:p>
             <a:fld id="{78C97017-6FC3-485B-9764-EAC9E56C1D49}" type="datetimeFigureOut">
               <a:rPr lang="en-US" smtClean="0"/>
-              <a:t>10/18/2017</a:t>
+              <a:t>10/20/2017</a:t>
             </a:fld>
             <a:endParaRPr lang="en-US"/>
           </a:p>
@@ -3454,8 +3454,8 @@
         </p:nvSpPr>
         <p:spPr>
           <a:xfrm>
-            <a:off x="457200" y="1905000"/>
-            <a:ext cx="8534400" cy="2997200"/>
+            <a:off x="456241" y="935940"/>
+            <a:ext cx="8534400" cy="4800600"/>
           </a:xfrm>
           <a:prstGeom prst="roundRect">
             <a:avLst>
@@ -3627,27 +3627,30 @@
       </p:sp>
       <p:cxnSp>
         <p:nvCxnSpPr>
-          <p:cNvPr id="53" name="Elbow Connector 63"/>
+          <p:cNvPr id="107" name="Elbow Connector 106"/>
           <p:cNvCxnSpPr>
-            <a:stCxn id="71" idx="3"/>
+            <a:stCxn id="9" idx="1"/>
           </p:cNvCxnSpPr>
           <p:nvPr/>
         </p:nvCxnSpPr>
         <p:spPr>
-          <a:xfrm flipV="1">
-            <a:off x="5814335" y="3371931"/>
-            <a:ext cx="95385" cy="416514"/>
-          </a:xfrm>
-          <a:prstGeom prst="bentConnector2">
-            <a:avLst/>
+          <a:xfrm rot="5400000" flipH="1" flipV="1">
+            <a:off x="3697400" y="1258709"/>
+            <a:ext cx="378691" cy="4637261"/>
+          </a:xfrm>
+          <a:prstGeom prst="bentConnector4">
+            <a:avLst>
+              <a:gd name="adj1" fmla="val -322365"/>
+              <a:gd name="adj2" fmla="val 99976"/>
+            </a:avLst>
           </a:prstGeom>
           <a:ln w="19050">
             <a:solidFill>
               <a:srgbClr val="7030A0"/>
             </a:solidFill>
-            <a:prstDash val="sysDot"/>
+            <a:prstDash val="solid"/>
             <a:headEnd type="none" w="med" len="med"/>
-            <a:tailEnd type="none" w="med" len="med"/>
+            <a:tailEnd type="arrow" w="med" len="med"/>
           </a:ln>
           <a:effectLst/>
         </p:spPr>
@@ -3666,30 +3669,144 @@
           </a:fontRef>
         </p:style>
       </p:cxnSp>
-      <p:cxnSp>
-        <p:nvCxnSpPr>
-          <p:cNvPr id="107" name="Elbow Connector 106"/>
-          <p:cNvCxnSpPr>
-            <a:stCxn id="9" idx="1"/>
-          </p:cNvCxnSpPr>
+      <p:sp>
+        <p:nvSpPr>
+          <p:cNvPr id="119" name="Rectangle 62"/>
+          <p:cNvSpPr/>
           <p:nvPr/>
-        </p:nvCxnSpPr>
-        <p:spPr>
-          <a:xfrm rot="5400000" flipH="1" flipV="1">
-            <a:off x="3697400" y="1258709"/>
-            <a:ext cx="378691" cy="4637261"/>
-          </a:xfrm>
-          <a:prstGeom prst="bentConnector4">
-            <a:avLst>
-              <a:gd name="adj1" fmla="val -101829"/>
-              <a:gd name="adj2" fmla="val 99976"/>
-            </a:avLst>
-          </a:prstGeom>
+        </p:nvSpPr>
+        <p:spPr>
+          <a:xfrm rot="16200000">
+            <a:off x="293537" y="3039002"/>
+            <a:ext cx="1093635" cy="346760"/>
+          </a:xfrm>
+          <a:prstGeom prst="rect">
+            <a:avLst/>
+          </a:prstGeom>
+          <a:solidFill>
+            <a:srgbClr val="7030A0"/>
+          </a:solidFill>
           <a:ln w="19050">
             <a:solidFill>
               <a:srgbClr val="7030A0"/>
             </a:solidFill>
-            <a:prstDash val="solid"/>
+          </a:ln>
+          <a:effectLst/>
+        </p:spPr>
+        <p:style>
+          <a:lnRef idx="1">
+            <a:schemeClr val="accent2"/>
+          </a:lnRef>
+          <a:fillRef idx="2">
+            <a:schemeClr val="accent2"/>
+          </a:fillRef>
+          <a:effectRef idx="1">
+            <a:schemeClr val="accent2"/>
+          </a:effectRef>
+          <a:fontRef idx="minor">
+            <a:schemeClr val="dk1"/>
+          </a:fontRef>
+        </p:style>
+        <p:txBody>
+          <a:bodyPr rtlCol="0" anchor="ctr"/>
+          <a:lstStyle/>
+          <a:p>
+            <a:pPr algn="ctr"/>
+            <a:r>
+              <a:rPr lang="en-US" sz="1050" dirty="0">
+                <a:solidFill>
+                  <a:schemeClr val="bg1"/>
+                </a:solidFill>
+              </a:rPr>
+              <a:t>&lt;&lt;interface&gt;&gt;</a:t>
+            </a:r>
+          </a:p>
+          <a:p>
+            <a:pPr algn="ctr"/>
+            <a:r>
+              <a:rPr lang="en-US" sz="1050" dirty="0">
+                <a:solidFill>
+                  <a:schemeClr val="bg1"/>
+                </a:solidFill>
+              </a:rPr>
+              <a:t>Model</a:t>
+            </a:r>
+            <a:endParaRPr lang="en-SG" sz="1050" dirty="0">
+              <a:solidFill>
+                <a:schemeClr val="bg1"/>
+              </a:solidFill>
+            </a:endParaRPr>
+          </a:p>
+        </p:txBody>
+      </p:sp>
+      <p:sp>
+        <p:nvSpPr>
+          <p:cNvPr id="120" name="Isosceles Triangle 102"/>
+          <p:cNvSpPr/>
+          <p:nvPr/>
+        </p:nvSpPr>
+        <p:spPr>
+          <a:xfrm rot="16200000">
+            <a:off x="964245" y="3130091"/>
+            <a:ext cx="270504" cy="175523"/>
+          </a:xfrm>
+          <a:prstGeom prst="triangle">
+            <a:avLst/>
+          </a:prstGeom>
+          <a:solidFill>
+            <a:srgbClr val="7030A0"/>
+          </a:solidFill>
+          <a:ln w="19050">
+            <a:solidFill>
+              <a:srgbClr val="7030A0"/>
+            </a:solidFill>
+          </a:ln>
+          <a:effectLst/>
+        </p:spPr>
+        <p:style>
+          <a:lnRef idx="1">
+            <a:schemeClr val="accent6"/>
+          </a:lnRef>
+          <a:fillRef idx="2">
+            <a:schemeClr val="accent6"/>
+          </a:fillRef>
+          <a:effectRef idx="1">
+            <a:schemeClr val="accent6"/>
+          </a:effectRef>
+          <a:fontRef idx="minor">
+            <a:schemeClr val="dk1"/>
+          </a:fontRef>
+        </p:style>
+        <p:txBody>
+          <a:bodyPr rtlCol="0" anchor="ctr"/>
+          <a:lstStyle/>
+          <a:p>
+            <a:pPr algn="ctr"/>
+            <a:endParaRPr lang="en-SG" sz="1050"/>
+          </a:p>
+        </p:txBody>
+      </p:sp>
+      <p:cxnSp>
+        <p:nvCxnSpPr>
+          <p:cNvPr id="58" name="Straight Arrow Connector 57"/>
+          <p:cNvCxnSpPr>
+            <a:stCxn id="42" idx="3"/>
+            <a:endCxn id="2" idx="1"/>
+          </p:cNvCxnSpPr>
+          <p:nvPr/>
+        </p:nvCxnSpPr>
+        <p:spPr>
+          <a:xfrm>
+            <a:off x="1993705" y="3504336"/>
+            <a:ext cx="220810" cy="5284"/>
+          </a:xfrm>
+          <a:prstGeom prst="straightConnector1">
+            <a:avLst/>
+          </a:prstGeom>
+          <a:ln w="19050">
+            <a:solidFill>
+              <a:srgbClr val="7030A0"/>
+            </a:solidFill>
             <a:headEnd type="none" w="med" len="med"/>
             <a:tailEnd type="arrow" w="med" len="med"/>
           </a:ln>
@@ -3712,171 +3829,13 @@
       </p:cxnSp>
       <p:sp>
         <p:nvSpPr>
-          <p:cNvPr id="119" name="Rectangle 62"/>
-          <p:cNvSpPr/>
-          <p:nvPr/>
-        </p:nvSpPr>
-        <p:spPr>
-          <a:xfrm rot="16200000">
-            <a:off x="293537" y="3039002"/>
-            <a:ext cx="1093635" cy="346760"/>
-          </a:xfrm>
-          <a:prstGeom prst="rect">
-            <a:avLst/>
-          </a:prstGeom>
-          <a:solidFill>
-            <a:srgbClr val="7030A0"/>
-          </a:solidFill>
-          <a:ln w="19050">
-            <a:solidFill>
-              <a:srgbClr val="7030A0"/>
-            </a:solidFill>
-          </a:ln>
-          <a:effectLst/>
-        </p:spPr>
-        <p:style>
-          <a:lnRef idx="1">
-            <a:schemeClr val="accent2"/>
-          </a:lnRef>
-          <a:fillRef idx="2">
-            <a:schemeClr val="accent2"/>
-          </a:fillRef>
-          <a:effectRef idx="1">
-            <a:schemeClr val="accent2"/>
-          </a:effectRef>
-          <a:fontRef idx="minor">
-            <a:schemeClr val="dk1"/>
-          </a:fontRef>
-        </p:style>
-        <p:txBody>
-          <a:bodyPr rtlCol="0" anchor="ctr"/>
-          <a:lstStyle/>
-          <a:p>
-            <a:pPr algn="ctr"/>
-            <a:r>
-              <a:rPr lang="en-US" sz="1050" dirty="0">
-                <a:solidFill>
-                  <a:schemeClr val="bg1"/>
-                </a:solidFill>
-              </a:rPr>
-              <a:t>&lt;&lt;interface&gt;&gt;</a:t>
-            </a:r>
-          </a:p>
-          <a:p>
-            <a:pPr algn="ctr"/>
-            <a:r>
-              <a:rPr lang="en-US" sz="1050" dirty="0">
-                <a:solidFill>
-                  <a:schemeClr val="bg1"/>
-                </a:solidFill>
-              </a:rPr>
-              <a:t>Model</a:t>
-            </a:r>
-            <a:endParaRPr lang="en-SG" sz="1050" dirty="0">
-              <a:solidFill>
-                <a:schemeClr val="bg1"/>
-              </a:solidFill>
-            </a:endParaRPr>
-          </a:p>
-        </p:txBody>
-      </p:sp>
-      <p:sp>
-        <p:nvSpPr>
-          <p:cNvPr id="120" name="Isosceles Triangle 102"/>
-          <p:cNvSpPr/>
-          <p:nvPr/>
-        </p:nvSpPr>
-        <p:spPr>
-          <a:xfrm rot="16200000">
-            <a:off x="964245" y="3130091"/>
-            <a:ext cx="270504" cy="175523"/>
-          </a:xfrm>
-          <a:prstGeom prst="triangle">
-            <a:avLst/>
-          </a:prstGeom>
-          <a:solidFill>
-            <a:srgbClr val="7030A0"/>
-          </a:solidFill>
-          <a:ln w="19050">
-            <a:solidFill>
-              <a:srgbClr val="7030A0"/>
-            </a:solidFill>
-          </a:ln>
-          <a:effectLst/>
-        </p:spPr>
-        <p:style>
-          <a:lnRef idx="1">
-            <a:schemeClr val="accent6"/>
-          </a:lnRef>
-          <a:fillRef idx="2">
-            <a:schemeClr val="accent6"/>
-          </a:fillRef>
-          <a:effectRef idx="1">
-            <a:schemeClr val="accent6"/>
-          </a:effectRef>
-          <a:fontRef idx="minor">
-            <a:schemeClr val="dk1"/>
-          </a:fontRef>
-        </p:style>
-        <p:txBody>
-          <a:bodyPr rtlCol="0" anchor="ctr"/>
-          <a:lstStyle/>
-          <a:p>
-            <a:pPr algn="ctr"/>
-            <a:endParaRPr lang="en-SG" sz="1050"/>
-          </a:p>
-        </p:txBody>
-      </p:sp>
-      <p:cxnSp>
-        <p:nvCxnSpPr>
-          <p:cNvPr id="58" name="Straight Arrow Connector 57"/>
-          <p:cNvCxnSpPr>
-            <a:stCxn id="42" idx="3"/>
-            <a:endCxn id="2" idx="1"/>
-          </p:cNvCxnSpPr>
-          <p:nvPr/>
-        </p:nvCxnSpPr>
-        <p:spPr>
-          <a:xfrm>
-            <a:off x="1993705" y="3504336"/>
-            <a:ext cx="220810" cy="5284"/>
-          </a:xfrm>
-          <a:prstGeom prst="straightConnector1">
-            <a:avLst/>
-          </a:prstGeom>
-          <a:ln w="19050">
-            <a:solidFill>
-              <a:srgbClr val="7030A0"/>
-            </a:solidFill>
-            <a:headEnd type="none" w="med" len="med"/>
-            <a:tailEnd type="arrow" w="med" len="med"/>
-          </a:ln>
-          <a:effectLst/>
-        </p:spPr>
-        <p:style>
-          <a:lnRef idx="1">
-            <a:schemeClr val="accent2"/>
-          </a:lnRef>
-          <a:fillRef idx="2">
-            <a:schemeClr val="accent2"/>
-          </a:fillRef>
-          <a:effectRef idx="1">
-            <a:schemeClr val="accent2"/>
-          </a:effectRef>
-          <a:fontRef idx="minor">
-            <a:schemeClr val="dk1"/>
-          </a:fontRef>
-        </p:style>
-      </p:cxnSp>
-      <p:sp>
-        <p:nvSpPr>
           <p:cNvPr id="71" name="Isosceles Triangle 102"/>
           <p:cNvSpPr/>
           <p:nvPr/>
         </p:nvSpPr>
         <p:spPr>
-          <a:xfrm rot="5400000" flipV="1">
-            <a:off x="5591321" y="3700683"/>
+          <a:xfrm rot="10800000" flipV="1">
+            <a:off x="6103814" y="2344259"/>
             <a:ext cx="270504" cy="175523"/>
           </a:xfrm>
           <a:prstGeom prst="triangle">
@@ -4380,7 +4339,7 @@
                   <a:srgbClr val="7030A0"/>
                 </a:solidFill>
               </a:rPr>
-              <a:t>UniqueTagList</a:t>
+              <a:t>UniqueEventList</a:t>
             </a:r>
             <a:endParaRPr lang="en-SG" sz="1050" dirty="0">
               <a:solidFill>
@@ -4577,14 +4536,14 @@
       </p:cxnSp>
       <p:sp>
         <p:nvSpPr>
-          <p:cNvPr id="67" name="Rectangle 8"/>
+          <p:cNvPr id="76" name="Rectangle 8"/>
           <p:cNvSpPr/>
           <p:nvPr/>
         </p:nvSpPr>
         <p:spPr>
           <a:xfrm>
-            <a:off x="4673440" y="1987132"/>
-            <a:ext cx="483700" cy="346760"/>
+            <a:off x="8098387" y="2589987"/>
+            <a:ext cx="708186" cy="285783"/>
           </a:xfrm>
           <a:prstGeom prst="rect">
             <a:avLst/>
@@ -4621,7 +4580,7 @@
                   <a:srgbClr val="7030A0"/>
                 </a:solidFill>
               </a:rPr>
-              <a:t>Tag</a:t>
+              <a:t>Name</a:t>
             </a:r>
             <a:endParaRPr lang="en-SG" sz="1050" dirty="0">
               <a:solidFill>
@@ -4633,19 +4592,18 @@
       </p:sp>
       <p:sp>
         <p:nvSpPr>
-          <p:cNvPr id="68" name="Flowchart: Decision 96"/>
+          <p:cNvPr id="80" name="Rectangle 8"/>
           <p:cNvSpPr/>
           <p:nvPr/>
         </p:nvSpPr>
         <p:spPr>
-          <a:xfrm rot="16200000">
-            <a:off x="4259001" y="2244340"/>
-            <a:ext cx="236048" cy="173380"/>
-          </a:xfrm>
-          <a:prstGeom prst="flowChartDecision">
+          <a:xfrm>
+            <a:off x="8098387" y="2912965"/>
+            <a:ext cx="708186" cy="285783"/>
+          </a:xfrm>
+          <a:prstGeom prst="rect">
             <a:avLst/>
           </a:prstGeom>
-          <a:noFill/>
           <a:ln w="19050">
             <a:solidFill>
               <a:srgbClr val="7030A0"/>
@@ -4655,13 +4613,13 @@
         </p:spPr>
         <p:style>
           <a:lnRef idx="1">
-            <a:schemeClr val="accent6"/>
+            <a:schemeClr val="accent4"/>
           </a:lnRef>
           <a:fillRef idx="2">
-            <a:schemeClr val="accent6"/>
+            <a:schemeClr val="accent4"/>
           </a:fillRef>
           <a:effectRef idx="1">
-            <a:schemeClr val="accent6"/>
+            <a:schemeClr val="accent4"/>
           </a:effectRef>
           <a:fontRef idx="minor">
             <a:schemeClr val="dk1"/>
@@ -4672,33 +4630,159 @@
           <a:lstStyle/>
           <a:p>
             <a:pPr algn="ctr"/>
-            <a:endParaRPr lang="en-US" sz="1050"/>
-          </a:p>
-        </p:txBody>
-      </p:sp>
-      <p:cxnSp>
-        <p:nvCxnSpPr>
-          <p:cNvPr id="69" name="Elbow Connector 68"/>
-          <p:cNvCxnSpPr>
-            <a:stCxn id="68" idx="3"/>
-            <a:endCxn id="67" idx="1"/>
-          </p:cNvCxnSpPr>
+            <a:r>
+              <a:rPr lang="en-US" sz="1050" dirty="0">
+                <a:solidFill>
+                  <a:srgbClr val="7030A0"/>
+                </a:solidFill>
+              </a:rPr>
+              <a:t>Phone</a:t>
+            </a:r>
+            <a:endParaRPr lang="en-SG" sz="1050" dirty="0">
+              <a:solidFill>
+                <a:srgbClr val="7030A0"/>
+              </a:solidFill>
+            </a:endParaRPr>
+          </a:p>
+        </p:txBody>
+      </p:sp>
+      <p:sp>
+        <p:nvSpPr>
+          <p:cNvPr id="83" name="Rectangle 8"/>
+          <p:cNvSpPr/>
           <p:nvPr/>
-        </p:nvCxnSpPr>
-        <p:spPr>
-          <a:xfrm rot="5400000" flipH="1" flipV="1">
-            <a:off x="4498985" y="2038552"/>
-            <a:ext cx="52494" cy="296415"/>
-          </a:xfrm>
-          <a:prstGeom prst="bentConnector2">
+        </p:nvSpPr>
+        <p:spPr>
+          <a:xfrm>
+            <a:off x="8098387" y="3235943"/>
+            <a:ext cx="708186" cy="285783"/>
+          </a:xfrm>
+          <a:prstGeom prst="rect">
             <a:avLst/>
           </a:prstGeom>
           <a:ln w="19050">
             <a:solidFill>
               <a:srgbClr val="7030A0"/>
             </a:solidFill>
+          </a:ln>
+          <a:effectLst/>
+        </p:spPr>
+        <p:style>
+          <a:lnRef idx="1">
+            <a:schemeClr val="accent4"/>
+          </a:lnRef>
+          <a:fillRef idx="2">
+            <a:schemeClr val="accent4"/>
+          </a:fillRef>
+          <a:effectRef idx="1">
+            <a:schemeClr val="accent4"/>
+          </a:effectRef>
+          <a:fontRef idx="minor">
+            <a:schemeClr val="dk1"/>
+          </a:fontRef>
+        </p:style>
+        <p:txBody>
+          <a:bodyPr rtlCol="0" anchor="ctr"/>
+          <a:lstStyle/>
+          <a:p>
+            <a:pPr algn="ctr"/>
+            <a:r>
+              <a:rPr lang="en-US" sz="1050" dirty="0">
+                <a:solidFill>
+                  <a:srgbClr val="7030A0"/>
+                </a:solidFill>
+              </a:rPr>
+              <a:t>Email</a:t>
+            </a:r>
+            <a:endParaRPr lang="en-SG" sz="1050" dirty="0">
+              <a:solidFill>
+                <a:srgbClr val="7030A0"/>
+              </a:solidFill>
+            </a:endParaRPr>
+          </a:p>
+        </p:txBody>
+      </p:sp>
+      <p:sp>
+        <p:nvSpPr>
+          <p:cNvPr id="85" name="Rectangle 8"/>
+          <p:cNvSpPr/>
+          <p:nvPr/>
+        </p:nvSpPr>
+        <p:spPr>
+          <a:xfrm>
+            <a:off x="8098387" y="3558920"/>
+            <a:ext cx="708186" cy="285783"/>
+          </a:xfrm>
+          <a:prstGeom prst="rect">
+            <a:avLst/>
+          </a:prstGeom>
+          <a:ln w="19050">
+            <a:solidFill>
+              <a:srgbClr val="7030A0"/>
+            </a:solidFill>
+          </a:ln>
+          <a:effectLst/>
+        </p:spPr>
+        <p:style>
+          <a:lnRef idx="1">
+            <a:schemeClr val="accent4"/>
+          </a:lnRef>
+          <a:fillRef idx="2">
+            <a:schemeClr val="accent4"/>
+          </a:fillRef>
+          <a:effectRef idx="1">
+            <a:schemeClr val="accent4"/>
+          </a:effectRef>
+          <a:fontRef idx="minor">
+            <a:schemeClr val="dk1"/>
+          </a:fontRef>
+        </p:style>
+        <p:txBody>
+          <a:bodyPr rtlCol="0" anchor="ctr"/>
+          <a:lstStyle/>
+          <a:p>
+            <a:pPr algn="ctr"/>
+            <a:r>
+              <a:rPr lang="en-US" sz="1050" dirty="0">
+                <a:solidFill>
+                  <a:srgbClr val="7030A0"/>
+                </a:solidFill>
+              </a:rPr>
+              <a:t>Address</a:t>
+            </a:r>
+            <a:endParaRPr lang="en-SG" sz="1050" dirty="0">
+              <a:solidFill>
+                <a:srgbClr val="7030A0"/>
+              </a:solidFill>
+            </a:endParaRPr>
+          </a:p>
+        </p:txBody>
+      </p:sp>
+      <p:cxnSp>
+        <p:nvCxnSpPr>
+          <p:cNvPr id="97" name="Elbow Connector 63"/>
+          <p:cNvCxnSpPr>
+            <a:stCxn id="99" idx="3"/>
+          </p:cNvCxnSpPr>
+          <p:nvPr/>
+        </p:nvCxnSpPr>
+        <p:spPr>
+          <a:xfrm rot="16200000" flipH="1">
+            <a:off x="2616656" y="2663231"/>
+            <a:ext cx="293825" cy="1"/>
+          </a:xfrm>
+          <a:prstGeom prst="bentConnector3">
+            <a:avLst>
+              <a:gd name="adj1" fmla="val 50000"/>
+            </a:avLst>
+          </a:prstGeom>
+          <a:ln w="19050">
+            <a:solidFill>
+              <a:srgbClr val="7030A0"/>
+            </a:solidFill>
+            <a:prstDash val="sysDot"/>
             <a:headEnd type="none" w="med" len="med"/>
-            <a:tailEnd type="arrow" w="med" len="med"/>
+            <a:tailEnd type="none" w="med" len="med"/>
           </a:ln>
           <a:effectLst/>
         </p:spPr>
@@ -4719,14 +4803,62 @@
       </p:cxnSp>
       <p:sp>
         <p:nvSpPr>
-          <p:cNvPr id="72" name="Rectangle 8"/>
+          <p:cNvPr id="99" name="Isosceles Triangle 102"/>
           <p:cNvSpPr/>
           <p:nvPr/>
         </p:nvSpPr>
         <p:spPr>
+          <a:xfrm rot="10800000" flipV="1">
+            <a:off x="2628316" y="2340797"/>
+            <a:ext cx="270504" cy="175523"/>
+          </a:xfrm>
+          <a:prstGeom prst="triangle">
+            <a:avLst/>
+          </a:prstGeom>
+          <a:ln w="19050">
+            <a:solidFill>
+              <a:srgbClr val="7030A0"/>
+            </a:solidFill>
+          </a:ln>
+          <a:effectLst/>
+        </p:spPr>
+        <p:style>
+          <a:lnRef idx="1">
+            <a:schemeClr val="accent4"/>
+          </a:lnRef>
+          <a:fillRef idx="2">
+            <a:schemeClr val="accent4"/>
+          </a:fillRef>
+          <a:effectRef idx="1">
+            <a:schemeClr val="accent4"/>
+          </a:effectRef>
+          <a:fontRef idx="minor">
+            <a:schemeClr val="dk1"/>
+          </a:fontRef>
+        </p:style>
+        <p:txBody>
+          <a:bodyPr rtlCol="0" anchor="ctr"/>
+          <a:lstStyle/>
+          <a:p>
+            <a:pPr algn="ctr"/>
+            <a:endParaRPr lang="en-SG" sz="1050" b="1">
+              <a:solidFill>
+                <a:srgbClr val="92D050"/>
+              </a:solidFill>
+            </a:endParaRPr>
+          </a:p>
+        </p:txBody>
+      </p:sp>
+      <p:sp>
+        <p:nvSpPr>
+          <p:cNvPr id="100" name="Rectangle 8"/>
+          <p:cNvSpPr/>
+          <p:nvPr/>
+        </p:nvSpPr>
+        <p:spPr>
           <a:xfrm>
-            <a:off x="4465592" y="3606800"/>
-            <a:ext cx="1156969" cy="346760"/>
+            <a:off x="1997638" y="1984270"/>
+            <a:ext cx="1539926" cy="346760"/>
           </a:xfrm>
           <a:prstGeom prst="rect">
             <a:avLst/>
@@ -4778,392 +4910,6 @@
                   <a:srgbClr val="7030A0"/>
                 </a:solidFill>
               </a:rPr>
-              <a:t>ReadOnlyPerson</a:t>
-            </a:r>
-            <a:endParaRPr lang="en-SG" sz="1050" dirty="0">
-              <a:solidFill>
-                <a:srgbClr val="7030A0"/>
-              </a:solidFill>
-            </a:endParaRPr>
-          </a:p>
-        </p:txBody>
-      </p:sp>
-      <p:sp>
-        <p:nvSpPr>
-          <p:cNvPr id="76" name="Rectangle 8"/>
-          <p:cNvSpPr/>
-          <p:nvPr/>
-        </p:nvSpPr>
-        <p:spPr>
-          <a:xfrm>
-            <a:off x="8098387" y="2589987"/>
-            <a:ext cx="708186" cy="285783"/>
-          </a:xfrm>
-          <a:prstGeom prst="rect">
-            <a:avLst/>
-          </a:prstGeom>
-          <a:ln w="19050">
-            <a:solidFill>
-              <a:srgbClr val="7030A0"/>
-            </a:solidFill>
-          </a:ln>
-          <a:effectLst/>
-        </p:spPr>
-        <p:style>
-          <a:lnRef idx="1">
-            <a:schemeClr val="accent4"/>
-          </a:lnRef>
-          <a:fillRef idx="2">
-            <a:schemeClr val="accent4"/>
-          </a:fillRef>
-          <a:effectRef idx="1">
-            <a:schemeClr val="accent4"/>
-          </a:effectRef>
-          <a:fontRef idx="minor">
-            <a:schemeClr val="dk1"/>
-          </a:fontRef>
-        </p:style>
-        <p:txBody>
-          <a:bodyPr rtlCol="0" anchor="ctr"/>
-          <a:lstStyle/>
-          <a:p>
-            <a:pPr algn="ctr"/>
-            <a:r>
-              <a:rPr lang="en-US" sz="1050" dirty="0">
-                <a:solidFill>
-                  <a:srgbClr val="7030A0"/>
-                </a:solidFill>
-              </a:rPr>
-              <a:t>Name</a:t>
-            </a:r>
-            <a:endParaRPr lang="en-SG" sz="1050" dirty="0">
-              <a:solidFill>
-                <a:srgbClr val="7030A0"/>
-              </a:solidFill>
-            </a:endParaRPr>
-          </a:p>
-        </p:txBody>
-      </p:sp>
-      <p:sp>
-        <p:nvSpPr>
-          <p:cNvPr id="80" name="Rectangle 8"/>
-          <p:cNvSpPr/>
-          <p:nvPr/>
-        </p:nvSpPr>
-        <p:spPr>
-          <a:xfrm>
-            <a:off x="8098387" y="2912965"/>
-            <a:ext cx="708186" cy="285783"/>
-          </a:xfrm>
-          <a:prstGeom prst="rect">
-            <a:avLst/>
-          </a:prstGeom>
-          <a:ln w="19050">
-            <a:solidFill>
-              <a:srgbClr val="7030A0"/>
-            </a:solidFill>
-          </a:ln>
-          <a:effectLst/>
-        </p:spPr>
-        <p:style>
-          <a:lnRef idx="1">
-            <a:schemeClr val="accent4"/>
-          </a:lnRef>
-          <a:fillRef idx="2">
-            <a:schemeClr val="accent4"/>
-          </a:fillRef>
-          <a:effectRef idx="1">
-            <a:schemeClr val="accent4"/>
-          </a:effectRef>
-          <a:fontRef idx="minor">
-            <a:schemeClr val="dk1"/>
-          </a:fontRef>
-        </p:style>
-        <p:txBody>
-          <a:bodyPr rtlCol="0" anchor="ctr"/>
-          <a:lstStyle/>
-          <a:p>
-            <a:pPr algn="ctr"/>
-            <a:r>
-              <a:rPr lang="en-US" sz="1050" dirty="0">
-                <a:solidFill>
-                  <a:srgbClr val="7030A0"/>
-                </a:solidFill>
-              </a:rPr>
-              <a:t>Phone</a:t>
-            </a:r>
-            <a:endParaRPr lang="en-SG" sz="1050" dirty="0">
-              <a:solidFill>
-                <a:srgbClr val="7030A0"/>
-              </a:solidFill>
-            </a:endParaRPr>
-          </a:p>
-        </p:txBody>
-      </p:sp>
-      <p:sp>
-        <p:nvSpPr>
-          <p:cNvPr id="83" name="Rectangle 8"/>
-          <p:cNvSpPr/>
-          <p:nvPr/>
-        </p:nvSpPr>
-        <p:spPr>
-          <a:xfrm>
-            <a:off x="8098387" y="3235943"/>
-            <a:ext cx="708186" cy="285783"/>
-          </a:xfrm>
-          <a:prstGeom prst="rect">
-            <a:avLst/>
-          </a:prstGeom>
-          <a:ln w="19050">
-            <a:solidFill>
-              <a:srgbClr val="7030A0"/>
-            </a:solidFill>
-          </a:ln>
-          <a:effectLst/>
-        </p:spPr>
-        <p:style>
-          <a:lnRef idx="1">
-            <a:schemeClr val="accent4"/>
-          </a:lnRef>
-          <a:fillRef idx="2">
-            <a:schemeClr val="accent4"/>
-          </a:fillRef>
-          <a:effectRef idx="1">
-            <a:schemeClr val="accent4"/>
-          </a:effectRef>
-          <a:fontRef idx="minor">
-            <a:schemeClr val="dk1"/>
-          </a:fontRef>
-        </p:style>
-        <p:txBody>
-          <a:bodyPr rtlCol="0" anchor="ctr"/>
-          <a:lstStyle/>
-          <a:p>
-            <a:pPr algn="ctr"/>
-            <a:r>
-              <a:rPr lang="en-US" sz="1050" dirty="0">
-                <a:solidFill>
-                  <a:srgbClr val="7030A0"/>
-                </a:solidFill>
-              </a:rPr>
-              <a:t>Email</a:t>
-            </a:r>
-            <a:endParaRPr lang="en-SG" sz="1050" dirty="0">
-              <a:solidFill>
-                <a:srgbClr val="7030A0"/>
-              </a:solidFill>
-            </a:endParaRPr>
-          </a:p>
-        </p:txBody>
-      </p:sp>
-      <p:sp>
-        <p:nvSpPr>
-          <p:cNvPr id="85" name="Rectangle 8"/>
-          <p:cNvSpPr/>
-          <p:nvPr/>
-        </p:nvSpPr>
-        <p:spPr>
-          <a:xfrm>
-            <a:off x="8098387" y="3558920"/>
-            <a:ext cx="708186" cy="285783"/>
-          </a:xfrm>
-          <a:prstGeom prst="rect">
-            <a:avLst/>
-          </a:prstGeom>
-          <a:ln w="19050">
-            <a:solidFill>
-              <a:srgbClr val="7030A0"/>
-            </a:solidFill>
-          </a:ln>
-          <a:effectLst/>
-        </p:spPr>
-        <p:style>
-          <a:lnRef idx="1">
-            <a:schemeClr val="accent4"/>
-          </a:lnRef>
-          <a:fillRef idx="2">
-            <a:schemeClr val="accent4"/>
-          </a:fillRef>
-          <a:effectRef idx="1">
-            <a:schemeClr val="accent4"/>
-          </a:effectRef>
-          <a:fontRef idx="minor">
-            <a:schemeClr val="dk1"/>
-          </a:fontRef>
-        </p:style>
-        <p:txBody>
-          <a:bodyPr rtlCol="0" anchor="ctr"/>
-          <a:lstStyle/>
-          <a:p>
-            <a:pPr algn="ctr"/>
-            <a:r>
-              <a:rPr lang="en-US" sz="1050" dirty="0">
-                <a:solidFill>
-                  <a:srgbClr val="7030A0"/>
-                </a:solidFill>
-              </a:rPr>
-              <a:t>Address</a:t>
-            </a:r>
-            <a:endParaRPr lang="en-SG" sz="1050" dirty="0">
-              <a:solidFill>
-                <a:srgbClr val="7030A0"/>
-              </a:solidFill>
-            </a:endParaRPr>
-          </a:p>
-        </p:txBody>
-      </p:sp>
-      <p:cxnSp>
-        <p:nvCxnSpPr>
-          <p:cNvPr id="97" name="Elbow Connector 63"/>
-          <p:cNvCxnSpPr>
-            <a:stCxn id="99" idx="3"/>
-          </p:cNvCxnSpPr>
-          <p:nvPr/>
-        </p:nvCxnSpPr>
-        <p:spPr>
-          <a:xfrm rot="16200000" flipH="1">
-            <a:off x="2616656" y="2663231"/>
-            <a:ext cx="293825" cy="1"/>
-          </a:xfrm>
-          <a:prstGeom prst="bentConnector3">
-            <a:avLst>
-              <a:gd name="adj1" fmla="val 50000"/>
-            </a:avLst>
-          </a:prstGeom>
-          <a:ln w="19050">
-            <a:solidFill>
-              <a:srgbClr val="7030A0"/>
-            </a:solidFill>
-            <a:prstDash val="sysDot"/>
-            <a:headEnd type="none" w="med" len="med"/>
-            <a:tailEnd type="none" w="med" len="med"/>
-          </a:ln>
-          <a:effectLst/>
-        </p:spPr>
-        <p:style>
-          <a:lnRef idx="1">
-            <a:schemeClr val="accent2"/>
-          </a:lnRef>
-          <a:fillRef idx="2">
-            <a:schemeClr val="accent2"/>
-          </a:fillRef>
-          <a:effectRef idx="1">
-            <a:schemeClr val="accent2"/>
-          </a:effectRef>
-          <a:fontRef idx="minor">
-            <a:schemeClr val="dk1"/>
-          </a:fontRef>
-        </p:style>
-      </p:cxnSp>
-      <p:sp>
-        <p:nvSpPr>
-          <p:cNvPr id="99" name="Isosceles Triangle 102"/>
-          <p:cNvSpPr/>
-          <p:nvPr/>
-        </p:nvSpPr>
-        <p:spPr>
-          <a:xfrm rot="10800000" flipV="1">
-            <a:off x="2628316" y="2340797"/>
-            <a:ext cx="270504" cy="175523"/>
-          </a:xfrm>
-          <a:prstGeom prst="triangle">
-            <a:avLst/>
-          </a:prstGeom>
-          <a:ln w="19050">
-            <a:solidFill>
-              <a:srgbClr val="7030A0"/>
-            </a:solidFill>
-          </a:ln>
-          <a:effectLst/>
-        </p:spPr>
-        <p:style>
-          <a:lnRef idx="1">
-            <a:schemeClr val="accent4"/>
-          </a:lnRef>
-          <a:fillRef idx="2">
-            <a:schemeClr val="accent4"/>
-          </a:fillRef>
-          <a:effectRef idx="1">
-            <a:schemeClr val="accent4"/>
-          </a:effectRef>
-          <a:fontRef idx="minor">
-            <a:schemeClr val="dk1"/>
-          </a:fontRef>
-        </p:style>
-        <p:txBody>
-          <a:bodyPr rtlCol="0" anchor="ctr"/>
-          <a:lstStyle/>
-          <a:p>
-            <a:pPr algn="ctr"/>
-            <a:endParaRPr lang="en-SG" sz="1050" b="1">
-              <a:solidFill>
-                <a:srgbClr val="92D050"/>
-              </a:solidFill>
-            </a:endParaRPr>
-          </a:p>
-        </p:txBody>
-      </p:sp>
-      <p:sp>
-        <p:nvSpPr>
-          <p:cNvPr id="100" name="Rectangle 8"/>
-          <p:cNvSpPr/>
-          <p:nvPr/>
-        </p:nvSpPr>
-        <p:spPr>
-          <a:xfrm>
-            <a:off x="1997638" y="1984270"/>
-            <a:ext cx="1539926" cy="346760"/>
-          </a:xfrm>
-          <a:prstGeom prst="rect">
-            <a:avLst/>
-          </a:prstGeom>
-          <a:ln w="19050">
-            <a:solidFill>
-              <a:srgbClr val="7030A0"/>
-            </a:solidFill>
-          </a:ln>
-          <a:effectLst/>
-        </p:spPr>
-        <p:style>
-          <a:lnRef idx="1">
-            <a:schemeClr val="accent4"/>
-          </a:lnRef>
-          <a:fillRef idx="2">
-            <a:schemeClr val="accent4"/>
-          </a:fillRef>
-          <a:effectRef idx="1">
-            <a:schemeClr val="accent4"/>
-          </a:effectRef>
-          <a:fontRef idx="minor">
-            <a:schemeClr val="dk1"/>
-          </a:fontRef>
-        </p:style>
-        <p:txBody>
-          <a:bodyPr rtlCol="0" anchor="ctr"/>
-          <a:lstStyle/>
-          <a:p>
-            <a:pPr algn="ctr"/>
-            <a:r>
-              <a:rPr lang="en-US" sz="1050" dirty="0">
-                <a:solidFill>
-                  <a:srgbClr val="7030A0"/>
-                </a:solidFill>
-              </a:rPr>
-              <a:t>&lt;&lt;interface&gt;&gt;</a:t>
-            </a:r>
-            <a:br>
-              <a:rPr lang="en-US" sz="1050" dirty="0">
-                <a:solidFill>
-                  <a:srgbClr val="7030A0"/>
-                </a:solidFill>
-              </a:rPr>
-            </a:br>
-            <a:r>
-              <a:rPr lang="en-US" sz="1050" dirty="0" err="1">
-                <a:solidFill>
-                  <a:srgbClr val="7030A0"/>
-                </a:solidFill>
-              </a:rPr>
               <a:t>ReadOnlyAddressBook</a:t>
             </a:r>
             <a:endParaRPr lang="en-SG" sz="1050" dirty="0">
@@ -5221,7 +4967,7 @@
         </p:nvSpPr>
         <p:spPr>
           <a:xfrm>
-            <a:off x="1394736" y="4417291"/>
+            <a:off x="1403364" y="5133456"/>
             <a:ext cx="1066800" cy="346760"/>
           </a:xfrm>
           <a:prstGeom prst="rect">
@@ -5288,6 +5034,7 @@
         <p:nvCxnSpPr>
           <p:cNvPr id="124" name="Elbow Connector 122"/>
           <p:cNvCxnSpPr>
+            <a:cxnSpLocks/>
             <a:stCxn id="119" idx="1"/>
             <a:endCxn id="122" idx="1"/>
           </p:cNvCxnSpPr>
@@ -5295,8 +5042,8 @@
         </p:nvCxnSpPr>
         <p:spPr>
           <a:xfrm rot="16200000" flipH="1">
-            <a:off x="701810" y="3897744"/>
-            <a:ext cx="831471" cy="554381"/>
+            <a:off x="348041" y="4251513"/>
+            <a:ext cx="1547636" cy="563009"/>
           </a:xfrm>
           <a:prstGeom prst="bentConnector2">
             <a:avLst/>
@@ -5486,45 +5233,6 @@
       </p:sp>
       <p:sp>
         <p:nvSpPr>
-          <p:cNvPr id="60" name="TextBox 59"/>
-          <p:cNvSpPr txBox="1"/>
-          <p:nvPr/>
-        </p:nvSpPr>
-        <p:spPr>
-          <a:xfrm>
-            <a:off x="4500507" y="1956719"/>
-            <a:ext cx="189257" cy="178683"/>
-          </a:xfrm>
-          <a:prstGeom prst="rect">
-            <a:avLst/>
-          </a:prstGeom>
-          <a:noFill/>
-        </p:spPr>
-        <p:txBody>
-          <a:bodyPr wrap="square" lIns="0" tIns="0" rIns="0" bIns="0" rtlCol="0">
-            <a:noAutofit/>
-          </a:bodyPr>
-          <a:lstStyle/>
-          <a:p>
-            <a:pPr algn="ctr"/>
-            <a:r>
-              <a:rPr lang="en-US" sz="1100" dirty="0">
-                <a:solidFill>
-                  <a:srgbClr val="7030A0"/>
-                </a:solidFill>
-              </a:rPr>
-              <a:t>*</a:t>
-            </a:r>
-            <a:endParaRPr lang="en-SG" sz="1100" dirty="0">
-              <a:solidFill>
-                <a:srgbClr val="7030A0"/>
-              </a:solidFill>
-            </a:endParaRPr>
-          </a:p>
-        </p:txBody>
-      </p:sp>
-      <p:sp>
-        <p:nvSpPr>
           <p:cNvPr id="61" name="TextBox 60"/>
           <p:cNvSpPr txBox="1"/>
           <p:nvPr/>
@@ -6191,7 +5899,7 @@
         </p:nvSpPr>
         <p:spPr>
           <a:xfrm>
-            <a:off x="6753623" y="4024438"/>
+            <a:off x="6757153" y="3961355"/>
             <a:ext cx="708186" cy="336065"/>
           </a:xfrm>
           <a:prstGeom prst="rect">
@@ -6261,7 +5969,7 @@
         </p:nvSpPr>
         <p:spPr>
           <a:xfrm rot="16200000">
-            <a:off x="6989692" y="3399813"/>
+            <a:off x="6993222" y="3441119"/>
             <a:ext cx="236048" cy="173380"/>
           </a:xfrm>
           <a:prstGeom prst="flowChartDecision">
@@ -6294,7 +6002,7 @@
           <a:lstStyle/>
           <a:p>
             <a:pPr algn="ctr"/>
-            <a:endParaRPr lang="en-US" sz="1050"/>
+            <a:endParaRPr lang="en-US" sz="1050" dirty="0"/>
           </a:p>
         </p:txBody>
       </p:sp>
@@ -6315,8 +6023,8 @@
         </p:nvCxnSpPr>
         <p:spPr>
           <a:xfrm>
-            <a:off x="7107716" y="3604527"/>
-            <a:ext cx="0" cy="419911"/>
+            <a:off x="7111246" y="3645833"/>
+            <a:ext cx="0" cy="315522"/>
           </a:xfrm>
           <a:prstGeom prst="line">
             <a:avLst/>
@@ -6340,10 +6048,55 @@
       </p:cxnSp>
       <p:sp>
         <p:nvSpPr>
-          <p:cNvPr id="78" name="Rectangle 8">
+          <p:cNvPr id="84" name="TextBox 59">
             <a:extLst>
               <a:ext uri="{FF2B5EF4-FFF2-40B4-BE49-F238E27FC236}">
-                <a16:creationId xmlns:a16="http://schemas.microsoft.com/office/drawing/2014/main" id="{26AE7FB5-3125-41EA-B001-F89E7DA010F6}"/>
+                <a16:creationId xmlns:a16="http://schemas.microsoft.com/office/drawing/2014/main" id="{D9CE2D35-8FB8-414B-A938-8DDF4ABE43A2}"/>
+              </a:ext>
+            </a:extLst>
+          </p:cNvPr>
+          <p:cNvSpPr txBox="1"/>
+          <p:nvPr/>
+        </p:nvSpPr>
+        <p:spPr>
+          <a:xfrm>
+            <a:off x="6626371" y="3052941"/>
+            <a:ext cx="135224" cy="220704"/>
+          </a:xfrm>
+          <a:prstGeom prst="rect">
+            <a:avLst/>
+          </a:prstGeom>
+          <a:noFill/>
+        </p:spPr>
+        <p:txBody>
+          <a:bodyPr wrap="square" lIns="0" tIns="0" rIns="0" bIns="0" rtlCol="0">
+            <a:noAutofit/>
+          </a:bodyPr>
+          <a:lstStyle/>
+          <a:p>
+            <a:pPr algn="ctr"/>
+            <a:r>
+              <a:rPr lang="en-US" sz="1100" dirty="0">
+                <a:solidFill>
+                  <a:srgbClr val="7030A0"/>
+                </a:solidFill>
+              </a:rPr>
+              <a:t>*</a:t>
+            </a:r>
+            <a:endParaRPr lang="en-SG" sz="1100" dirty="0">
+              <a:solidFill>
+                <a:srgbClr val="7030A0"/>
+              </a:solidFill>
+            </a:endParaRPr>
+          </a:p>
+        </p:txBody>
+      </p:sp>
+      <p:sp>
+        <p:nvSpPr>
+          <p:cNvPr id="86" name="Rectangle 8">
+            <a:extLst>
+              <a:ext uri="{FF2B5EF4-FFF2-40B4-BE49-F238E27FC236}">
+                <a16:creationId xmlns:a16="http://schemas.microsoft.com/office/drawing/2014/main" id="{855F7892-0078-4D48-897F-FBEDCB561107}"/>
               </a:ext>
             </a:extLst>
           </p:cNvPr>
@@ -6352,8 +6105,8 @@
         </p:nvSpPr>
         <p:spPr>
           <a:xfrm>
-            <a:off x="5710666" y="1989617"/>
-            <a:ext cx="708186" cy="336065"/>
+            <a:off x="3824352" y="3508596"/>
+            <a:ext cx="1156969" cy="346760"/>
           </a:xfrm>
           <a:prstGeom prst="rect">
             <a:avLst/>
@@ -6390,15 +6143,7 @@
                   <a:srgbClr val="7030A0"/>
                 </a:solidFill>
               </a:rPr>
-              <a:t>T</a:t>
-            </a:r>
-            <a:r>
-              <a:rPr lang="en-US" altLang="zh-CN" sz="1050" dirty="0" err="1">
-                <a:solidFill>
-                  <a:srgbClr val="7030A0"/>
-                </a:solidFill>
-              </a:rPr>
-              <a:t>agColorManager</a:t>
+              <a:t>UniqueTagList</a:t>
             </a:r>
             <a:endParaRPr lang="en-SG" sz="1050" dirty="0">
               <a:solidFill>
@@ -6408,12 +6153,104 @@
           </a:p>
         </p:txBody>
       </p:sp>
-      <p:sp>
-        <p:nvSpPr>
-          <p:cNvPr id="79" name="Flowchart: Decision 96">
+      <p:cxnSp>
+        <p:nvCxnSpPr>
+          <p:cNvPr id="93" name="Elbow Connector 29">
             <a:extLst>
               <a:ext uri="{FF2B5EF4-FFF2-40B4-BE49-F238E27FC236}">
-                <a16:creationId xmlns:a16="http://schemas.microsoft.com/office/drawing/2014/main" id="{1A5813BD-3B02-44E9-833A-F62E57DE17A3}"/>
+                <a16:creationId xmlns:a16="http://schemas.microsoft.com/office/drawing/2014/main" id="{3FCE8DCC-4D58-41EC-954B-5A7EDF213C9B}"/>
+              </a:ext>
+            </a:extLst>
+          </p:cNvPr>
+          <p:cNvCxnSpPr>
+            <a:cxnSpLocks/>
+            <a:endCxn id="86" idx="1"/>
+          </p:cNvCxnSpPr>
+          <p:nvPr/>
+        </p:nvCxnSpPr>
+        <p:spPr>
+          <a:xfrm rot="16200000" flipH="1">
+            <a:off x="3518509" y="3376133"/>
+            <a:ext cx="473508" cy="138178"/>
+          </a:xfrm>
+          <a:prstGeom prst="bentConnector2">
+            <a:avLst/>
+          </a:prstGeom>
+          <a:ln w="19050">
+            <a:solidFill>
+              <a:srgbClr val="7030A0"/>
+            </a:solidFill>
+            <a:headEnd type="none" w="med" len="med"/>
+            <a:tailEnd type="arrow" w="med" len="med"/>
+          </a:ln>
+          <a:effectLst/>
+        </p:spPr>
+        <p:style>
+          <a:lnRef idx="1">
+            <a:schemeClr val="accent2"/>
+          </a:lnRef>
+          <a:fillRef idx="2">
+            <a:schemeClr val="accent2"/>
+          </a:fillRef>
+          <a:effectRef idx="1">
+            <a:schemeClr val="accent2"/>
+          </a:effectRef>
+          <a:fontRef idx="minor">
+            <a:schemeClr val="dk1"/>
+          </a:fontRef>
+        </p:style>
+      </p:cxnSp>
+      <p:sp>
+        <p:nvSpPr>
+          <p:cNvPr id="94" name="TextBox 93">
+            <a:extLst>
+              <a:ext uri="{FF2B5EF4-FFF2-40B4-BE49-F238E27FC236}">
+                <a16:creationId xmlns:a16="http://schemas.microsoft.com/office/drawing/2014/main" id="{A08C5494-9D2E-4D6C-A406-AF63FA254CBF}"/>
+              </a:ext>
+            </a:extLst>
+          </p:cNvPr>
+          <p:cNvSpPr txBox="1"/>
+          <p:nvPr/>
+        </p:nvSpPr>
+        <p:spPr>
+          <a:xfrm>
+            <a:off x="3638155" y="3729098"/>
+            <a:ext cx="189257" cy="178683"/>
+          </a:xfrm>
+          <a:prstGeom prst="rect">
+            <a:avLst/>
+          </a:prstGeom>
+          <a:noFill/>
+        </p:spPr>
+        <p:txBody>
+          <a:bodyPr wrap="square" lIns="0" tIns="0" rIns="0" bIns="0" rtlCol="0">
+            <a:noAutofit/>
+          </a:bodyPr>
+          <a:lstStyle/>
+          <a:p>
+            <a:pPr algn="ctr"/>
+            <a:r>
+              <a:rPr lang="en-US" sz="1100" dirty="0">
+                <a:solidFill>
+                  <a:srgbClr val="7030A0"/>
+                </a:solidFill>
+              </a:rPr>
+              <a:t>1</a:t>
+            </a:r>
+            <a:endParaRPr lang="en-SG" sz="1100" dirty="0">
+              <a:solidFill>
+                <a:srgbClr val="7030A0"/>
+              </a:solidFill>
+            </a:endParaRPr>
+          </a:p>
+        </p:txBody>
+      </p:sp>
+      <p:sp>
+        <p:nvSpPr>
+          <p:cNvPr id="95" name="Rectangle 8">
+            <a:extLst>
+              <a:ext uri="{FF2B5EF4-FFF2-40B4-BE49-F238E27FC236}">
+                <a16:creationId xmlns:a16="http://schemas.microsoft.com/office/drawing/2014/main" id="{3C1A0134-7BA3-490D-8415-2852E9A0FA80}"/>
               </a:ext>
             </a:extLst>
           </p:cNvPr>
@@ -6421,8 +6258,70 @@
           <p:nvPr/>
         </p:nvSpPr>
         <p:spPr>
+          <a:xfrm>
+            <a:off x="4019422" y="4332316"/>
+            <a:ext cx="483700" cy="346760"/>
+          </a:xfrm>
+          <a:prstGeom prst="rect">
+            <a:avLst/>
+          </a:prstGeom>
+          <a:ln w="19050">
+            <a:solidFill>
+              <a:srgbClr val="7030A0"/>
+            </a:solidFill>
+          </a:ln>
+          <a:effectLst/>
+        </p:spPr>
+        <p:style>
+          <a:lnRef idx="1">
+            <a:schemeClr val="accent4"/>
+          </a:lnRef>
+          <a:fillRef idx="2">
+            <a:schemeClr val="accent4"/>
+          </a:fillRef>
+          <a:effectRef idx="1">
+            <a:schemeClr val="accent4"/>
+          </a:effectRef>
+          <a:fontRef idx="minor">
+            <a:schemeClr val="dk1"/>
+          </a:fontRef>
+        </p:style>
+        <p:txBody>
+          <a:bodyPr rtlCol="0" anchor="ctr"/>
+          <a:lstStyle/>
+          <a:p>
+            <a:pPr algn="ctr"/>
+            <a:r>
+              <a:rPr lang="en-US" sz="1050" dirty="0">
+                <a:solidFill>
+                  <a:srgbClr val="7030A0"/>
+                </a:solidFill>
+              </a:rPr>
+              <a:t>Tag</a:t>
+            </a:r>
+            <a:endParaRPr lang="en-SG" sz="1050" dirty="0">
+              <a:solidFill>
+                <a:srgbClr val="7030A0"/>
+              </a:solidFill>
+            </a:endParaRPr>
+          </a:p>
+        </p:txBody>
+      </p:sp>
+      <p:sp>
+        <p:nvSpPr>
+          <p:cNvPr id="96" name="Flowchart: Decision 96">
+            <a:extLst>
+              <a:ext uri="{FF2B5EF4-FFF2-40B4-BE49-F238E27FC236}">
+                <a16:creationId xmlns:a16="http://schemas.microsoft.com/office/drawing/2014/main" id="{C1C10B16-A2E5-4088-B086-599DF65104F9}"/>
+              </a:ext>
+            </a:extLst>
+          </p:cNvPr>
+          <p:cNvSpPr/>
+          <p:nvPr/>
+        </p:nvSpPr>
+        <p:spPr>
           <a:xfrm rot="16200000">
-            <a:off x="5130495" y="2073393"/>
+            <a:off x="4144961" y="3889268"/>
             <a:ext cx="236048" cy="173380"/>
           </a:xfrm>
           <a:prstGeom prst="flowChartDecision">
@@ -6459,25 +6358,190 @@
           </a:p>
         </p:txBody>
       </p:sp>
+      <p:sp>
+        <p:nvSpPr>
+          <p:cNvPr id="101" name="TextBox 100">
+            <a:extLst>
+              <a:ext uri="{FF2B5EF4-FFF2-40B4-BE49-F238E27FC236}">
+                <a16:creationId xmlns:a16="http://schemas.microsoft.com/office/drawing/2014/main" id="{B55AB74B-3124-4264-B08A-727BA836E4E7}"/>
+              </a:ext>
+            </a:extLst>
+          </p:cNvPr>
+          <p:cNvSpPr txBox="1"/>
+          <p:nvPr/>
+        </p:nvSpPr>
+        <p:spPr>
+          <a:xfrm>
+            <a:off x="4283422" y="4214893"/>
+            <a:ext cx="189257" cy="178683"/>
+          </a:xfrm>
+          <a:prstGeom prst="rect">
+            <a:avLst/>
+          </a:prstGeom>
+          <a:noFill/>
+        </p:spPr>
+        <p:txBody>
+          <a:bodyPr wrap="square" lIns="0" tIns="0" rIns="0" bIns="0" rtlCol="0">
+            <a:noAutofit/>
+          </a:bodyPr>
+          <a:lstStyle/>
+          <a:p>
+            <a:pPr algn="ctr"/>
+            <a:r>
+              <a:rPr lang="en-US" sz="1100" dirty="0">
+                <a:solidFill>
+                  <a:srgbClr val="7030A0"/>
+                </a:solidFill>
+              </a:rPr>
+              <a:t>*</a:t>
+            </a:r>
+            <a:endParaRPr lang="en-SG" sz="1100" dirty="0">
+              <a:solidFill>
+                <a:srgbClr val="7030A0"/>
+              </a:solidFill>
+            </a:endParaRPr>
+          </a:p>
+        </p:txBody>
+      </p:sp>
+      <p:sp>
+        <p:nvSpPr>
+          <p:cNvPr id="102" name="Rectangle 8">
+            <a:extLst>
+              <a:ext uri="{FF2B5EF4-FFF2-40B4-BE49-F238E27FC236}">
+                <a16:creationId xmlns:a16="http://schemas.microsoft.com/office/drawing/2014/main" id="{AD1CA492-CF19-431D-8651-642135824A88}"/>
+              </a:ext>
+            </a:extLst>
+          </p:cNvPr>
+          <p:cNvSpPr/>
+          <p:nvPr/>
+        </p:nvSpPr>
+        <p:spPr>
+          <a:xfrm>
+            <a:off x="5056648" y="4343331"/>
+            <a:ext cx="708186" cy="336065"/>
+          </a:xfrm>
+          <a:prstGeom prst="rect">
+            <a:avLst/>
+          </a:prstGeom>
+          <a:ln w="19050">
+            <a:solidFill>
+              <a:srgbClr val="7030A0"/>
+            </a:solidFill>
+          </a:ln>
+          <a:effectLst/>
+        </p:spPr>
+        <p:style>
+          <a:lnRef idx="1">
+            <a:schemeClr val="accent4"/>
+          </a:lnRef>
+          <a:fillRef idx="2">
+            <a:schemeClr val="accent4"/>
+          </a:fillRef>
+          <a:effectRef idx="1">
+            <a:schemeClr val="accent4"/>
+          </a:effectRef>
+          <a:fontRef idx="minor">
+            <a:schemeClr val="dk1"/>
+          </a:fontRef>
+        </p:style>
+        <p:txBody>
+          <a:bodyPr rtlCol="0" anchor="ctr"/>
+          <a:lstStyle/>
+          <a:p>
+            <a:pPr algn="ctr"/>
+            <a:r>
+              <a:rPr lang="en-US" sz="1050" dirty="0" err="1">
+                <a:solidFill>
+                  <a:srgbClr val="7030A0"/>
+                </a:solidFill>
+              </a:rPr>
+              <a:t>T</a:t>
+            </a:r>
+            <a:r>
+              <a:rPr lang="en-US" altLang="zh-CN" sz="1050" dirty="0" err="1">
+                <a:solidFill>
+                  <a:srgbClr val="7030A0"/>
+                </a:solidFill>
+              </a:rPr>
+              <a:t>agColorManager</a:t>
+            </a:r>
+            <a:endParaRPr lang="en-SG" sz="1050" dirty="0">
+              <a:solidFill>
+                <a:srgbClr val="7030A0"/>
+              </a:solidFill>
+            </a:endParaRPr>
+          </a:p>
+        </p:txBody>
+      </p:sp>
+      <p:sp>
+        <p:nvSpPr>
+          <p:cNvPr id="103" name="Flowchart: Decision 96">
+            <a:extLst>
+              <a:ext uri="{FF2B5EF4-FFF2-40B4-BE49-F238E27FC236}">
+                <a16:creationId xmlns:a16="http://schemas.microsoft.com/office/drawing/2014/main" id="{C9A92B91-923F-4361-8489-54572FDBF7F3}"/>
+              </a:ext>
+            </a:extLst>
+          </p:cNvPr>
+          <p:cNvSpPr/>
+          <p:nvPr/>
+        </p:nvSpPr>
+        <p:spPr>
+          <a:xfrm rot="16200000">
+            <a:off x="4476477" y="4418577"/>
+            <a:ext cx="236048" cy="173380"/>
+          </a:xfrm>
+          <a:prstGeom prst="flowChartDecision">
+            <a:avLst/>
+          </a:prstGeom>
+          <a:noFill/>
+          <a:ln w="19050">
+            <a:solidFill>
+              <a:srgbClr val="7030A0"/>
+            </a:solidFill>
+          </a:ln>
+          <a:effectLst/>
+        </p:spPr>
+        <p:style>
+          <a:lnRef idx="1">
+            <a:schemeClr val="accent6"/>
+          </a:lnRef>
+          <a:fillRef idx="2">
+            <a:schemeClr val="accent6"/>
+          </a:fillRef>
+          <a:effectRef idx="1">
+            <a:schemeClr val="accent6"/>
+          </a:effectRef>
+          <a:fontRef idx="minor">
+            <a:schemeClr val="dk1"/>
+          </a:fontRef>
+        </p:style>
+        <p:txBody>
+          <a:bodyPr rtlCol="0" anchor="ctr"/>
+          <a:lstStyle/>
+          <a:p>
+            <a:pPr algn="ctr"/>
+            <a:endParaRPr lang="en-US" sz="1050"/>
+          </a:p>
+        </p:txBody>
+      </p:sp>
       <p:cxnSp>
         <p:nvCxnSpPr>
-          <p:cNvPr id="81" name="直接连接符 80">
+          <p:cNvPr id="104" name="直接连接符 80">
             <a:extLst>
               <a:ext uri="{FF2B5EF4-FFF2-40B4-BE49-F238E27FC236}">
-                <a16:creationId xmlns:a16="http://schemas.microsoft.com/office/drawing/2014/main" id="{CD05FF19-FAE9-418C-A350-381963543E00}"/>
+                <a16:creationId xmlns:a16="http://schemas.microsoft.com/office/drawing/2014/main" id="{70D2C2DD-01A5-4956-999A-5B4A2EA3232D}"/>
               </a:ext>
             </a:extLst>
           </p:cNvPr>
           <p:cNvCxnSpPr>
             <a:cxnSpLocks/>
-            <a:stCxn id="79" idx="2"/>
-            <a:endCxn id="78" idx="1"/>
+            <a:stCxn id="103" idx="2"/>
           </p:cNvCxnSpPr>
           <p:nvPr/>
         </p:nvCxnSpPr>
         <p:spPr>
           <a:xfrm flipV="1">
-            <a:off x="5335209" y="2157650"/>
+            <a:off x="4681191" y="4502834"/>
             <a:ext cx="375457" cy="2433"/>
           </a:xfrm>
           <a:prstGeom prst="line">
@@ -6500,12 +6564,247 @@
           </a:fontRef>
         </p:style>
       </p:cxnSp>
-      <p:sp>
-        <p:nvSpPr>
-          <p:cNvPr id="84" name="TextBox 59">
+      <p:cxnSp>
+        <p:nvCxnSpPr>
+          <p:cNvPr id="105" name="Straight Arrow Connector 104">
             <a:extLst>
               <a:ext uri="{FF2B5EF4-FFF2-40B4-BE49-F238E27FC236}">
-                <a16:creationId xmlns:a16="http://schemas.microsoft.com/office/drawing/2014/main" id="{D9CE2D35-8FB8-414B-A938-8DDF4ABE43A2}"/>
+                <a16:creationId xmlns:a16="http://schemas.microsoft.com/office/drawing/2014/main" id="{49F0C629-EC05-406F-AB92-B470A38D5A53}"/>
+              </a:ext>
+            </a:extLst>
+          </p:cNvPr>
+          <p:cNvCxnSpPr>
+            <a:cxnSpLocks/>
+            <a:stCxn id="96" idx="1"/>
+            <a:endCxn id="95" idx="0"/>
+          </p:cNvCxnSpPr>
+          <p:nvPr/>
+        </p:nvCxnSpPr>
+        <p:spPr>
+          <a:xfrm flipH="1">
+            <a:off x="4261272" y="4093982"/>
+            <a:ext cx="1713" cy="238334"/>
+          </a:xfrm>
+          <a:prstGeom prst="straightConnector1">
+            <a:avLst/>
+          </a:prstGeom>
+          <a:ln w="19050">
+            <a:solidFill>
+              <a:srgbClr val="7030A0"/>
+            </a:solidFill>
+            <a:headEnd type="none" w="med" len="med"/>
+            <a:tailEnd type="arrow" w="med" len="med"/>
+          </a:ln>
+          <a:effectLst/>
+        </p:spPr>
+        <p:style>
+          <a:lnRef idx="1">
+            <a:schemeClr val="accent2"/>
+          </a:lnRef>
+          <a:fillRef idx="2">
+            <a:schemeClr val="accent2"/>
+          </a:fillRef>
+          <a:effectRef idx="1">
+            <a:schemeClr val="accent2"/>
+          </a:effectRef>
+          <a:fontRef idx="minor">
+            <a:schemeClr val="dk1"/>
+          </a:fontRef>
+        </p:style>
+      </p:cxnSp>
+      <p:sp>
+        <p:nvSpPr>
+          <p:cNvPr id="109" name="Rectangle 8">
+            <a:extLst>
+              <a:ext uri="{FF2B5EF4-FFF2-40B4-BE49-F238E27FC236}">
+                <a16:creationId xmlns:a16="http://schemas.microsoft.com/office/drawing/2014/main" id="{019C8741-A148-4658-B3B3-AAD621269553}"/>
+              </a:ext>
+            </a:extLst>
+          </p:cNvPr>
+          <p:cNvSpPr/>
+          <p:nvPr/>
+        </p:nvSpPr>
+        <p:spPr>
+          <a:xfrm>
+            <a:off x="5664534" y="1983210"/>
+            <a:ext cx="1098761" cy="346760"/>
+          </a:xfrm>
+          <a:prstGeom prst="rect">
+            <a:avLst/>
+          </a:prstGeom>
+          <a:ln w="19050">
+            <a:solidFill>
+              <a:srgbClr val="7030A0"/>
+            </a:solidFill>
+          </a:ln>
+          <a:effectLst/>
+        </p:spPr>
+        <p:style>
+          <a:lnRef idx="1">
+            <a:schemeClr val="accent4"/>
+          </a:lnRef>
+          <a:fillRef idx="2">
+            <a:schemeClr val="accent4"/>
+          </a:fillRef>
+          <a:effectRef idx="1">
+            <a:schemeClr val="accent4"/>
+          </a:effectRef>
+          <a:fontRef idx="minor">
+            <a:schemeClr val="dk1"/>
+          </a:fontRef>
+        </p:style>
+        <p:txBody>
+          <a:bodyPr rtlCol="0" anchor="ctr"/>
+          <a:lstStyle/>
+          <a:p>
+            <a:pPr algn="ctr"/>
+            <a:r>
+              <a:rPr lang="en-US" sz="1050" dirty="0">
+                <a:solidFill>
+                  <a:srgbClr val="7030A0"/>
+                </a:solidFill>
+              </a:rPr>
+              <a:t>&lt;&lt;interface&gt;&gt;</a:t>
+            </a:r>
+            <a:br>
+              <a:rPr lang="en-US" sz="1050" dirty="0">
+                <a:solidFill>
+                  <a:srgbClr val="7030A0"/>
+                </a:solidFill>
+              </a:rPr>
+            </a:br>
+            <a:r>
+              <a:rPr lang="en-US" sz="1050" dirty="0" err="1">
+                <a:solidFill>
+                  <a:srgbClr val="7030A0"/>
+                </a:solidFill>
+              </a:rPr>
+              <a:t>ReadOnlyPerson</a:t>
+            </a:r>
+            <a:endParaRPr lang="en-SG" sz="1050" dirty="0">
+              <a:solidFill>
+                <a:srgbClr val="7030A0"/>
+              </a:solidFill>
+            </a:endParaRPr>
+          </a:p>
+        </p:txBody>
+      </p:sp>
+      <p:sp>
+        <p:nvSpPr>
+          <p:cNvPr id="110" name="Rectangle 8">
+            <a:extLst>
+              <a:ext uri="{FF2B5EF4-FFF2-40B4-BE49-F238E27FC236}">
+                <a16:creationId xmlns:a16="http://schemas.microsoft.com/office/drawing/2014/main" id="{8F80D623-BE78-4478-BF30-41F5F5E36801}"/>
+              </a:ext>
+            </a:extLst>
+          </p:cNvPr>
+          <p:cNvSpPr/>
+          <p:nvPr/>
+        </p:nvSpPr>
+        <p:spPr>
+          <a:xfrm>
+            <a:off x="4045818" y="1599997"/>
+            <a:ext cx="708186" cy="346760"/>
+          </a:xfrm>
+          <a:prstGeom prst="rect">
+            <a:avLst/>
+          </a:prstGeom>
+          <a:ln w="19050">
+            <a:solidFill>
+              <a:srgbClr val="7030A0"/>
+            </a:solidFill>
+          </a:ln>
+          <a:effectLst/>
+        </p:spPr>
+        <p:style>
+          <a:lnRef idx="1">
+            <a:schemeClr val="accent4"/>
+          </a:lnRef>
+          <a:fillRef idx="2">
+            <a:schemeClr val="accent4"/>
+          </a:fillRef>
+          <a:effectRef idx="1">
+            <a:schemeClr val="accent4"/>
+          </a:effectRef>
+          <a:fontRef idx="minor">
+            <a:schemeClr val="dk1"/>
+          </a:fontRef>
+        </p:style>
+        <p:txBody>
+          <a:bodyPr rtlCol="0" anchor="ctr"/>
+          <a:lstStyle/>
+          <a:p>
+            <a:pPr algn="ctr"/>
+            <a:r>
+              <a:rPr lang="en-US" sz="1050" dirty="0">
+                <a:solidFill>
+                  <a:srgbClr val="7030A0"/>
+                </a:solidFill>
+              </a:rPr>
+              <a:t>Event</a:t>
+            </a:r>
+            <a:endParaRPr lang="en-SG" sz="1050" dirty="0">
+              <a:solidFill>
+                <a:srgbClr val="7030A0"/>
+              </a:solidFill>
+            </a:endParaRPr>
+          </a:p>
+        </p:txBody>
+      </p:sp>
+      <p:cxnSp>
+        <p:nvCxnSpPr>
+          <p:cNvPr id="112" name="Straight Arrow Connector 111">
+            <a:extLst>
+              <a:ext uri="{FF2B5EF4-FFF2-40B4-BE49-F238E27FC236}">
+                <a16:creationId xmlns:a16="http://schemas.microsoft.com/office/drawing/2014/main" id="{D31A423F-0B8F-48AC-B4A7-45DD34C810EF}"/>
+              </a:ext>
+            </a:extLst>
+          </p:cNvPr>
+          <p:cNvCxnSpPr>
+            <a:cxnSpLocks/>
+            <a:stCxn id="110" idx="2"/>
+            <a:endCxn id="57" idx="0"/>
+          </p:cNvCxnSpPr>
+          <p:nvPr/>
+        </p:nvCxnSpPr>
+        <p:spPr>
+          <a:xfrm flipH="1">
+            <a:off x="4393148" y="1946757"/>
+            <a:ext cx="6763" cy="511612"/>
+          </a:xfrm>
+          <a:prstGeom prst="straightConnector1">
+            <a:avLst/>
+          </a:prstGeom>
+          <a:ln w="19050">
+            <a:solidFill>
+              <a:srgbClr val="7030A0"/>
+            </a:solidFill>
+            <a:headEnd type="none" w="med" len="med"/>
+            <a:tailEnd type="arrow" w="med" len="med"/>
+          </a:ln>
+          <a:effectLst/>
+        </p:spPr>
+        <p:style>
+          <a:lnRef idx="1">
+            <a:schemeClr val="accent2"/>
+          </a:lnRef>
+          <a:fillRef idx="2">
+            <a:schemeClr val="accent2"/>
+          </a:fillRef>
+          <a:effectRef idx="1">
+            <a:schemeClr val="accent2"/>
+          </a:effectRef>
+          <a:fontRef idx="minor">
+            <a:schemeClr val="dk1"/>
+          </a:fontRef>
+        </p:style>
+      </p:cxnSp>
+      <p:sp>
+        <p:nvSpPr>
+          <p:cNvPr id="113" name="TextBox 112">
+            <a:extLst>
+              <a:ext uri="{FF2B5EF4-FFF2-40B4-BE49-F238E27FC236}">
+                <a16:creationId xmlns:a16="http://schemas.microsoft.com/office/drawing/2014/main" id="{242930EE-43B8-447C-812B-692019FA5C21}"/>
               </a:ext>
             </a:extLst>
           </p:cNvPr>
@@ -6514,7 +6813,339 @@
         </p:nvSpPr>
         <p:spPr>
           <a:xfrm>
-            <a:off x="6626371" y="3052941"/>
+            <a:off x="4425794" y="2285836"/>
+            <a:ext cx="189257" cy="178683"/>
+          </a:xfrm>
+          <a:prstGeom prst="rect">
+            <a:avLst/>
+          </a:prstGeom>
+          <a:noFill/>
+        </p:spPr>
+        <p:txBody>
+          <a:bodyPr wrap="square" lIns="0" tIns="0" rIns="0" bIns="0" rtlCol="0">
+            <a:noAutofit/>
+          </a:bodyPr>
+          <a:lstStyle/>
+          <a:p>
+            <a:pPr algn="ctr"/>
+            <a:r>
+              <a:rPr lang="en-US" sz="1100" dirty="0">
+                <a:solidFill>
+                  <a:srgbClr val="7030A0"/>
+                </a:solidFill>
+              </a:rPr>
+              <a:t>1</a:t>
+            </a:r>
+            <a:endParaRPr lang="en-SG" sz="1100" dirty="0">
+              <a:solidFill>
+                <a:srgbClr val="7030A0"/>
+              </a:solidFill>
+            </a:endParaRPr>
+          </a:p>
+        </p:txBody>
+      </p:sp>
+      <p:sp>
+        <p:nvSpPr>
+          <p:cNvPr id="117" name="Rectangle 8">
+            <a:extLst>
+              <a:ext uri="{FF2B5EF4-FFF2-40B4-BE49-F238E27FC236}">
+                <a16:creationId xmlns:a16="http://schemas.microsoft.com/office/drawing/2014/main" id="{F1AD6CE3-3A5D-40B8-87A7-8322C7DF698B}"/>
+              </a:ext>
+            </a:extLst>
+          </p:cNvPr>
+          <p:cNvSpPr/>
+          <p:nvPr/>
+        </p:nvSpPr>
+        <p:spPr>
+          <a:xfrm>
+            <a:off x="5664535" y="1341095"/>
+            <a:ext cx="1098761" cy="346760"/>
+          </a:xfrm>
+          <a:prstGeom prst="rect">
+            <a:avLst/>
+          </a:prstGeom>
+          <a:ln w="19050">
+            <a:solidFill>
+              <a:srgbClr val="7030A0"/>
+            </a:solidFill>
+          </a:ln>
+          <a:effectLst/>
+        </p:spPr>
+        <p:style>
+          <a:lnRef idx="1">
+            <a:schemeClr val="accent4"/>
+          </a:lnRef>
+          <a:fillRef idx="2">
+            <a:schemeClr val="accent4"/>
+          </a:fillRef>
+          <a:effectRef idx="1">
+            <a:schemeClr val="accent4"/>
+          </a:effectRef>
+          <a:fontRef idx="minor">
+            <a:schemeClr val="dk1"/>
+          </a:fontRef>
+        </p:style>
+        <p:txBody>
+          <a:bodyPr rtlCol="0" anchor="ctr"/>
+          <a:lstStyle/>
+          <a:p>
+            <a:pPr algn="ctr"/>
+            <a:r>
+              <a:rPr lang="en-US" sz="1050" dirty="0">
+                <a:solidFill>
+                  <a:srgbClr val="7030A0"/>
+                </a:solidFill>
+              </a:rPr>
+              <a:t>&lt;&lt;interface&gt;&gt;</a:t>
+            </a:r>
+            <a:br>
+              <a:rPr lang="en-US" sz="1050" dirty="0">
+                <a:solidFill>
+                  <a:srgbClr val="7030A0"/>
+                </a:solidFill>
+              </a:rPr>
+            </a:br>
+            <a:r>
+              <a:rPr lang="en-US" sz="1050" dirty="0" err="1">
+                <a:solidFill>
+                  <a:srgbClr val="7030A0"/>
+                </a:solidFill>
+              </a:rPr>
+              <a:t>ReadOnlyEvent</a:t>
+            </a:r>
+            <a:endParaRPr lang="en-SG" sz="1050" dirty="0">
+              <a:solidFill>
+                <a:srgbClr val="7030A0"/>
+              </a:solidFill>
+            </a:endParaRPr>
+          </a:p>
+        </p:txBody>
+      </p:sp>
+      <p:sp>
+        <p:nvSpPr>
+          <p:cNvPr id="123" name="Isosceles Triangle 102">
+            <a:extLst>
+              <a:ext uri="{FF2B5EF4-FFF2-40B4-BE49-F238E27FC236}">
+                <a16:creationId xmlns:a16="http://schemas.microsoft.com/office/drawing/2014/main" id="{4E9E0BCB-9093-4A69-AAFB-83328158C604}"/>
+              </a:ext>
+            </a:extLst>
+          </p:cNvPr>
+          <p:cNvSpPr/>
+          <p:nvPr/>
+        </p:nvSpPr>
+        <p:spPr>
+          <a:xfrm rot="16200000" flipV="1">
+            <a:off x="5439221" y="1426713"/>
+            <a:ext cx="270504" cy="175523"/>
+          </a:xfrm>
+          <a:prstGeom prst="triangle">
+            <a:avLst/>
+          </a:prstGeom>
+          <a:solidFill>
+            <a:srgbClr val="7030A0"/>
+          </a:solidFill>
+          <a:ln w="19050">
+            <a:solidFill>
+              <a:srgbClr val="7030A0"/>
+            </a:solidFill>
+          </a:ln>
+          <a:effectLst/>
+        </p:spPr>
+        <p:style>
+          <a:lnRef idx="1">
+            <a:schemeClr val="accent4"/>
+          </a:lnRef>
+          <a:fillRef idx="2">
+            <a:schemeClr val="accent4"/>
+          </a:fillRef>
+          <a:effectRef idx="1">
+            <a:schemeClr val="accent4"/>
+          </a:effectRef>
+          <a:fontRef idx="minor">
+            <a:schemeClr val="dk1"/>
+          </a:fontRef>
+        </p:style>
+        <p:txBody>
+          <a:bodyPr rtlCol="0" anchor="ctr"/>
+          <a:lstStyle/>
+          <a:p>
+            <a:pPr algn="ctr"/>
+            <a:endParaRPr lang="en-SG" sz="1050" b="1">
+              <a:solidFill>
+                <a:srgbClr val="92D050"/>
+              </a:solidFill>
+            </a:endParaRPr>
+          </a:p>
+        </p:txBody>
+      </p:sp>
+      <p:cxnSp>
+        <p:nvCxnSpPr>
+          <p:cNvPr id="127" name="Elbow Connector 106">
+            <a:extLst>
+              <a:ext uri="{FF2B5EF4-FFF2-40B4-BE49-F238E27FC236}">
+                <a16:creationId xmlns:a16="http://schemas.microsoft.com/office/drawing/2014/main" id="{A7C4B37B-0960-4BBC-B1BF-04E4BDC41E0D}"/>
+              </a:ext>
+            </a:extLst>
+          </p:cNvPr>
+          <p:cNvCxnSpPr>
+            <a:cxnSpLocks/>
+            <a:stCxn id="9" idx="3"/>
+            <a:endCxn id="110" idx="1"/>
+          </p:cNvCxnSpPr>
+          <p:nvPr/>
+        </p:nvCxnSpPr>
+        <p:spPr>
+          <a:xfrm rot="5400000" flipH="1" flipV="1">
+            <a:off x="2357130" y="984363"/>
+            <a:ext cx="899673" cy="2477703"/>
+          </a:xfrm>
+          <a:prstGeom prst="bentConnector2">
+            <a:avLst/>
+          </a:prstGeom>
+          <a:ln w="19050">
+            <a:solidFill>
+              <a:srgbClr val="7030A0"/>
+            </a:solidFill>
+            <a:prstDash val="solid"/>
+            <a:headEnd type="none" w="med" len="med"/>
+            <a:tailEnd type="arrow" w="med" len="med"/>
+          </a:ln>
+          <a:effectLst/>
+        </p:spPr>
+        <p:style>
+          <a:lnRef idx="1">
+            <a:schemeClr val="accent2"/>
+          </a:lnRef>
+          <a:fillRef idx="2">
+            <a:schemeClr val="accent2"/>
+          </a:fillRef>
+          <a:effectRef idx="1">
+            <a:schemeClr val="accent2"/>
+          </a:effectRef>
+          <a:fontRef idx="minor">
+            <a:schemeClr val="dk1"/>
+          </a:fontRef>
+        </p:style>
+      </p:cxnSp>
+      <p:cxnSp>
+        <p:nvCxnSpPr>
+          <p:cNvPr id="131" name="Elbow Connector 63">
+            <a:extLst>
+              <a:ext uri="{FF2B5EF4-FFF2-40B4-BE49-F238E27FC236}">
+                <a16:creationId xmlns:a16="http://schemas.microsoft.com/office/drawing/2014/main" id="{0680E410-E82F-45C3-B761-79A5FCCB7797}"/>
+              </a:ext>
+            </a:extLst>
+          </p:cNvPr>
+          <p:cNvCxnSpPr>
+            <a:cxnSpLocks/>
+            <a:stCxn id="123" idx="3"/>
+            <a:endCxn id="110" idx="3"/>
+          </p:cNvCxnSpPr>
+          <p:nvPr/>
+        </p:nvCxnSpPr>
+        <p:spPr>
+          <a:xfrm rot="10800000" flipV="1">
+            <a:off x="4754004" y="1514475"/>
+            <a:ext cx="732708" cy="258902"/>
+          </a:xfrm>
+          <a:prstGeom prst="bentConnector3">
+            <a:avLst>
+              <a:gd name="adj1" fmla="val 50000"/>
+            </a:avLst>
+          </a:prstGeom>
+          <a:ln w="19050">
+            <a:solidFill>
+              <a:srgbClr val="7030A0"/>
+            </a:solidFill>
+            <a:prstDash val="sysDot"/>
+            <a:headEnd type="none" w="med" len="med"/>
+            <a:tailEnd type="none" w="med" len="med"/>
+          </a:ln>
+          <a:effectLst/>
+        </p:spPr>
+        <p:style>
+          <a:lnRef idx="1">
+            <a:schemeClr val="accent2"/>
+          </a:lnRef>
+          <a:fillRef idx="2">
+            <a:schemeClr val="accent2"/>
+          </a:fillRef>
+          <a:effectRef idx="1">
+            <a:schemeClr val="accent2"/>
+          </a:effectRef>
+          <a:fontRef idx="minor">
+            <a:schemeClr val="dk1"/>
+          </a:fontRef>
+        </p:style>
+      </p:cxnSp>
+      <p:sp>
+        <p:nvSpPr>
+          <p:cNvPr id="138" name="Flowchart: Decision 96">
+            <a:extLst>
+              <a:ext uri="{FF2B5EF4-FFF2-40B4-BE49-F238E27FC236}">
+                <a16:creationId xmlns:a16="http://schemas.microsoft.com/office/drawing/2014/main" id="{70E7B395-E4C2-4E77-A4CA-F364C92F4CE9}"/>
+              </a:ext>
+            </a:extLst>
+          </p:cNvPr>
+          <p:cNvSpPr/>
+          <p:nvPr/>
+        </p:nvSpPr>
+        <p:spPr>
+          <a:xfrm rot="5400000">
+            <a:off x="4297007" y="1379955"/>
+            <a:ext cx="236048" cy="173380"/>
+          </a:xfrm>
+          <a:prstGeom prst="flowChartDecision">
+            <a:avLst/>
+          </a:prstGeom>
+          <a:solidFill>
+            <a:srgbClr val="7030A0"/>
+          </a:solidFill>
+          <a:ln w="19050">
+            <a:solidFill>
+              <a:srgbClr val="7030A0"/>
+            </a:solidFill>
+          </a:ln>
+          <a:effectLst/>
+        </p:spPr>
+        <p:style>
+          <a:lnRef idx="1">
+            <a:schemeClr val="accent6"/>
+          </a:lnRef>
+          <a:fillRef idx="2">
+            <a:schemeClr val="accent6"/>
+          </a:fillRef>
+          <a:effectRef idx="1">
+            <a:schemeClr val="accent6"/>
+          </a:effectRef>
+          <a:fontRef idx="minor">
+            <a:schemeClr val="dk1"/>
+          </a:fontRef>
+        </p:style>
+        <p:txBody>
+          <a:bodyPr rtlCol="0" anchor="ctr"/>
+          <a:lstStyle/>
+          <a:p>
+            <a:pPr algn="ctr"/>
+            <a:endParaRPr lang="en-US" sz="1050"/>
+          </a:p>
+        </p:txBody>
+      </p:sp>
+      <p:sp>
+        <p:nvSpPr>
+          <p:cNvPr id="139" name="TextBox 59">
+            <a:extLst>
+              <a:ext uri="{FF2B5EF4-FFF2-40B4-BE49-F238E27FC236}">
+                <a16:creationId xmlns:a16="http://schemas.microsoft.com/office/drawing/2014/main" id="{2527339D-705B-4F16-B081-614F925EA2B1}"/>
+              </a:ext>
+            </a:extLst>
+          </p:cNvPr>
+          <p:cNvSpPr txBox="1"/>
+          <p:nvPr/>
+        </p:nvSpPr>
+        <p:spPr>
+          <a:xfrm>
+            <a:off x="6951376" y="2903496"/>
             <a:ext cx="135224" cy="220704"/>
           </a:xfrm>
           <a:prstGeom prst="rect">
@@ -6536,6 +7167,196 @@
                 </a:solidFill>
               </a:rPr>
               <a:t>*</a:t>
+            </a:r>
+            <a:endParaRPr lang="en-SG" sz="1100" dirty="0">
+              <a:solidFill>
+                <a:srgbClr val="7030A0"/>
+              </a:solidFill>
+            </a:endParaRPr>
+          </a:p>
+        </p:txBody>
+      </p:sp>
+      <p:cxnSp>
+        <p:nvCxnSpPr>
+          <p:cNvPr id="140" name="Elbow Connector 63">
+            <a:extLst>
+              <a:ext uri="{FF2B5EF4-FFF2-40B4-BE49-F238E27FC236}">
+                <a16:creationId xmlns:a16="http://schemas.microsoft.com/office/drawing/2014/main" id="{C94EC49C-F446-4DC6-B324-666E74566975}"/>
+              </a:ext>
+            </a:extLst>
+          </p:cNvPr>
+          <p:cNvCxnSpPr>
+            <a:cxnSpLocks/>
+            <a:stCxn id="138" idx="1"/>
+            <a:endCxn id="74" idx="0"/>
+          </p:cNvCxnSpPr>
+          <p:nvPr/>
+        </p:nvCxnSpPr>
+        <p:spPr>
+          <a:xfrm rot="16200000" flipH="1">
+            <a:off x="4913512" y="850139"/>
+            <a:ext cx="1699251" cy="2696215"/>
+          </a:xfrm>
+          <a:prstGeom prst="bentConnector3">
+            <a:avLst>
+              <a:gd name="adj1" fmla="val -11609"/>
+            </a:avLst>
+          </a:prstGeom>
+          <a:ln w="19050">
+            <a:solidFill>
+              <a:srgbClr val="7030A0"/>
+            </a:solidFill>
+            <a:headEnd type="none" w="med" len="med"/>
+            <a:tailEnd type="arrow" w="med" len="med"/>
+          </a:ln>
+          <a:effectLst/>
+        </p:spPr>
+        <p:style>
+          <a:lnRef idx="1">
+            <a:schemeClr val="accent2"/>
+          </a:lnRef>
+          <a:fillRef idx="2">
+            <a:schemeClr val="accent2"/>
+          </a:fillRef>
+          <a:effectRef idx="1">
+            <a:schemeClr val="accent2"/>
+          </a:effectRef>
+          <a:fontRef idx="minor">
+            <a:schemeClr val="dk1"/>
+          </a:fontRef>
+        </p:style>
+      </p:cxnSp>
+      <p:cxnSp>
+        <p:nvCxnSpPr>
+          <p:cNvPr id="155" name="Elbow Connector 63">
+            <a:extLst>
+              <a:ext uri="{FF2B5EF4-FFF2-40B4-BE49-F238E27FC236}">
+                <a16:creationId xmlns:a16="http://schemas.microsoft.com/office/drawing/2014/main" id="{D9FD19B6-EC99-4D60-AFC2-B6AEE7016AE8}"/>
+              </a:ext>
+            </a:extLst>
+          </p:cNvPr>
+          <p:cNvCxnSpPr>
+            <a:cxnSpLocks/>
+            <a:stCxn id="71" idx="3"/>
+          </p:cNvCxnSpPr>
+          <p:nvPr/>
+        </p:nvCxnSpPr>
+        <p:spPr>
+          <a:xfrm rot="16200000" flipH="1">
+            <a:off x="5981111" y="2777736"/>
+            <a:ext cx="515910" cy="1"/>
+          </a:xfrm>
+          <a:prstGeom prst="bentConnector3">
+            <a:avLst>
+              <a:gd name="adj1" fmla="val 50000"/>
+            </a:avLst>
+          </a:prstGeom>
+          <a:ln w="19050">
+            <a:solidFill>
+              <a:srgbClr val="7030A0"/>
+            </a:solidFill>
+            <a:prstDash val="sysDot"/>
+            <a:headEnd type="none" w="med" len="med"/>
+            <a:tailEnd type="none" w="med" len="med"/>
+          </a:ln>
+          <a:effectLst/>
+        </p:spPr>
+        <p:style>
+          <a:lnRef idx="1">
+            <a:schemeClr val="accent2"/>
+          </a:lnRef>
+          <a:fillRef idx="2">
+            <a:schemeClr val="accent2"/>
+          </a:fillRef>
+          <a:effectRef idx="1">
+            <a:schemeClr val="accent2"/>
+          </a:effectRef>
+          <a:fontRef idx="minor">
+            <a:schemeClr val="dk1"/>
+          </a:fontRef>
+        </p:style>
+      </p:cxnSp>
+      <p:sp>
+        <p:nvSpPr>
+          <p:cNvPr id="158" name="TextBox 157">
+            <a:extLst>
+              <a:ext uri="{FF2B5EF4-FFF2-40B4-BE49-F238E27FC236}">
+                <a16:creationId xmlns:a16="http://schemas.microsoft.com/office/drawing/2014/main" id="{0BC9DB05-6048-4E9B-8AEA-8191A9B3D020}"/>
+              </a:ext>
+            </a:extLst>
+          </p:cNvPr>
+          <p:cNvSpPr txBox="1"/>
+          <p:nvPr/>
+        </p:nvSpPr>
+        <p:spPr>
+          <a:xfrm>
+            <a:off x="3167952" y="1755695"/>
+            <a:ext cx="881018" cy="261610"/>
+          </a:xfrm>
+          <a:prstGeom prst="rect">
+            <a:avLst/>
+          </a:prstGeom>
+          <a:noFill/>
+        </p:spPr>
+        <p:txBody>
+          <a:bodyPr wrap="square" rtlCol="0">
+            <a:spAutoFit/>
+          </a:bodyPr>
+          <a:lstStyle/>
+          <a:p>
+            <a:pPr algn="r"/>
+            <a:r>
+              <a:rPr lang="en-US" sz="1100" dirty="0">
+                <a:solidFill>
+                  <a:srgbClr val="7030A0"/>
+                </a:solidFill>
+              </a:rPr>
+              <a:t>filtered list</a:t>
+            </a:r>
+            <a:endParaRPr lang="en-SG" sz="1100" dirty="0">
+              <a:solidFill>
+                <a:srgbClr val="7030A0"/>
+              </a:solidFill>
+            </a:endParaRPr>
+          </a:p>
+        </p:txBody>
+      </p:sp>
+      <p:sp>
+        <p:nvSpPr>
+          <p:cNvPr id="159" name="TextBox 158">
+            <a:extLst>
+              <a:ext uri="{FF2B5EF4-FFF2-40B4-BE49-F238E27FC236}">
+                <a16:creationId xmlns:a16="http://schemas.microsoft.com/office/drawing/2014/main" id="{A87E0965-08FD-4C15-8E20-D089B3450CA7}"/>
+              </a:ext>
+            </a:extLst>
+          </p:cNvPr>
+          <p:cNvSpPr txBox="1"/>
+          <p:nvPr/>
+        </p:nvSpPr>
+        <p:spPr>
+          <a:xfrm>
+            <a:off x="3823989" y="1559235"/>
+            <a:ext cx="189257" cy="178683"/>
+          </a:xfrm>
+          <a:prstGeom prst="rect">
+            <a:avLst/>
+          </a:prstGeom>
+          <a:noFill/>
+        </p:spPr>
+        <p:txBody>
+          <a:bodyPr wrap="square" lIns="0" tIns="0" rIns="0" bIns="0" rtlCol="0">
+            <a:noAutofit/>
+          </a:bodyPr>
+          <a:lstStyle/>
+          <a:p>
+            <a:pPr algn="ctr"/>
+            <a:r>
+              <a:rPr lang="en-US" sz="1100" dirty="0">
+                <a:solidFill>
+                  <a:srgbClr val="7030A0"/>
+                </a:solidFill>
+              </a:rPr>
+              <a:t>1</a:t>
             </a:r>
             <a:endParaRPr lang="en-SG" sz="1100" dirty="0">
               <a:solidFill>

</xml_diff>

<commit_message>
Updated Model diagram for Model component
</commit_message>
<xml_diff>
--- a/docs/diagrams/ModelComponentClassDiagram.pptx
+++ b/docs/diagrams/ModelComponentClassDiagram.pptx
@@ -126,6 +126,331 @@
 </p:presentation>
 </file>
 
+<file path=ppt/changesInfos/changesInfo1.xml><?xml version="1.0" encoding="utf-8"?>
+<pc:chgInfo xmlns:a="http://schemas.openxmlformats.org/drawingml/2006/main" xmlns:r="http://schemas.openxmlformats.org/officeDocument/2006/relationships" xmlns:ac="http://schemas.microsoft.com/office/drawing/2013/main/command" xmlns:pc="http://schemas.microsoft.com/office/powerpoint/2013/main/command">
+  <pc:docChgLst>
+    <pc:chgData name="Melvin Leo" userId="fc11bf49cac66023" providerId="LiveId" clId="{505792C7-C5B7-45E5-ABE2-B08240655EC8}"/>
+    <pc:docChg chg="undo modSld">
+      <pc:chgData name="Melvin Leo" userId="fc11bf49cac66023" providerId="LiveId" clId="{505792C7-C5B7-45E5-ABE2-B08240655EC8}" dt="2017-10-20T05:38:48.457" v="319" actId="14100"/>
+      <pc:docMkLst>
+        <pc:docMk/>
+      </pc:docMkLst>
+      <pc:sldChg chg="addSp delSp modSp">
+        <pc:chgData name="Melvin Leo" userId="fc11bf49cac66023" providerId="LiveId" clId="{505792C7-C5B7-45E5-ABE2-B08240655EC8}" dt="2017-10-20T05:38:48.457" v="319" actId="14100"/>
+        <pc:sldMkLst>
+          <pc:docMk/>
+          <pc:sldMk cId="2396968029" sldId="263"/>
+        </pc:sldMkLst>
+        <pc:spChg chg="mod">
+          <ac:chgData name="Melvin Leo" userId="fc11bf49cac66023" providerId="LiveId" clId="{505792C7-C5B7-45E5-ABE2-B08240655EC8}" dt="2017-10-20T05:16:19.489" v="19" actId="1076"/>
+          <ac:spMkLst>
+            <pc:docMk/>
+            <pc:sldMk cId="2396968029" sldId="263"/>
+            <ac:spMk id="62" creationId="{00000000-0000-0000-0000-000000000000}"/>
+          </ac:spMkLst>
+        </pc:spChg>
+        <pc:spChg chg="add del mod">
+          <ac:chgData name="Melvin Leo" userId="fc11bf49cac66023" providerId="LiveId" clId="{505792C7-C5B7-45E5-ABE2-B08240655EC8}" dt="2017-10-20T05:23:59.828" v="126"/>
+          <ac:spMkLst>
+            <pc:docMk/>
+            <pc:sldMk cId="2396968029" sldId="263"/>
+            <ac:spMk id="88" creationId="{24E81AB5-0400-4662-A813-C18D85B27596}"/>
+          </ac:spMkLst>
+        </pc:spChg>
+        <pc:spChg chg="add mod">
+          <ac:chgData name="Melvin Leo" userId="fc11bf49cac66023" providerId="LiveId" clId="{505792C7-C5B7-45E5-ABE2-B08240655EC8}" dt="2017-10-20T05:21:05.903" v="94" actId="14100"/>
+          <ac:spMkLst>
+            <pc:docMk/>
+            <pc:sldMk cId="2396968029" sldId="263"/>
+            <ac:spMk id="91" creationId="{8E8BBD44-D630-4B89-9386-988758B086FF}"/>
+          </ac:spMkLst>
+        </pc:spChg>
+        <pc:spChg chg="add mod">
+          <ac:chgData name="Melvin Leo" userId="fc11bf49cac66023" providerId="LiveId" clId="{505792C7-C5B7-45E5-ABE2-B08240655EC8}" dt="2017-10-20T05:21:46.585" v="99" actId="1076"/>
+          <ac:spMkLst>
+            <pc:docMk/>
+            <pc:sldMk cId="2396968029" sldId="263"/>
+            <ac:spMk id="95" creationId="{0725ED48-A486-40C9-AA29-2E0F7CC1CFBC}"/>
+          </ac:spMkLst>
+        </pc:spChg>
+        <pc:spChg chg="add mod">
+          <ac:chgData name="Melvin Leo" userId="fc11bf49cac66023" providerId="LiveId" clId="{505792C7-C5B7-45E5-ABE2-B08240655EC8}" dt="2017-10-20T05:22:01.301" v="101" actId="1076"/>
+          <ac:spMkLst>
+            <pc:docMk/>
+            <pc:sldMk cId="2396968029" sldId="263"/>
+            <ac:spMk id="96" creationId="{440FA1D1-2A5E-40BC-8A1F-43B994C212DB}"/>
+          </ac:spMkLst>
+        </pc:spChg>
+        <pc:spChg chg="add mod">
+          <ac:chgData name="Melvin Leo" userId="fc11bf49cac66023" providerId="LiveId" clId="{505792C7-C5B7-45E5-ABE2-B08240655EC8}" dt="2017-10-20T05:32:18.921" v="300" actId="20577"/>
+          <ac:spMkLst>
+            <pc:docMk/>
+            <pc:sldMk cId="2396968029" sldId="263"/>
+            <ac:spMk id="98" creationId="{DE9DE798-5701-4726-AFE1-672B85B5B669}"/>
+          </ac:spMkLst>
+        </pc:spChg>
+        <pc:spChg chg="add mod">
+          <ac:chgData name="Melvin Leo" userId="fc11bf49cac66023" providerId="LiveId" clId="{505792C7-C5B7-45E5-ABE2-B08240655EC8}" dt="2017-10-20T05:25:09.099" v="137" actId="1076"/>
+          <ac:spMkLst>
+            <pc:docMk/>
+            <pc:sldMk cId="2396968029" sldId="263"/>
+            <ac:spMk id="108" creationId="{91C7E54C-076C-47C8-A06D-D7551CD98C4C}"/>
+          </ac:spMkLst>
+        </pc:spChg>
+        <pc:spChg chg="add mod">
+          <ac:chgData name="Melvin Leo" userId="fc11bf49cac66023" providerId="LiveId" clId="{505792C7-C5B7-45E5-ABE2-B08240655EC8}" dt="2017-10-20T05:25:36.331" v="144" actId="1076"/>
+          <ac:spMkLst>
+            <pc:docMk/>
+            <pc:sldMk cId="2396968029" sldId="263"/>
+            <ac:spMk id="113" creationId="{9DBEF0FA-7035-4CEA-9010-9C0D944AB29F}"/>
+          </ac:spMkLst>
+        </pc:spChg>
+        <pc:spChg chg="mod">
+          <ac:chgData name="Melvin Leo" userId="fc11bf49cac66023" providerId="LiveId" clId="{505792C7-C5B7-45E5-ABE2-B08240655EC8}" dt="2017-10-20T05:20:11.028" v="73" actId="1076"/>
+          <ac:spMkLst>
+            <pc:docMk/>
+            <pc:sldMk cId="2396968029" sldId="263"/>
+            <ac:spMk id="114" creationId="{00000000-0000-0000-0000-000000000000}"/>
+          </ac:spMkLst>
+        </pc:spChg>
+        <pc:spChg chg="add mod">
+          <ac:chgData name="Melvin Leo" userId="fc11bf49cac66023" providerId="LiveId" clId="{505792C7-C5B7-45E5-ABE2-B08240655EC8}" dt="2017-10-20T05:28:09.310" v="205" actId="1076"/>
+          <ac:spMkLst>
+            <pc:docMk/>
+            <pc:sldMk cId="2396968029" sldId="263"/>
+            <ac:spMk id="116" creationId="{A3B05D50-4A89-4061-AADE-4282DA61A1D2}"/>
+          </ac:spMkLst>
+        </pc:spChg>
+        <pc:spChg chg="add mod">
+          <ac:chgData name="Melvin Leo" userId="fc11bf49cac66023" providerId="LiveId" clId="{505792C7-C5B7-45E5-ABE2-B08240655EC8}" dt="2017-10-20T05:28:01.773" v="204" actId="14100"/>
+          <ac:spMkLst>
+            <pc:docMk/>
+            <pc:sldMk cId="2396968029" sldId="263"/>
+            <ac:spMk id="117" creationId="{754F5F24-91FD-4C23-A264-99C637719A3A}"/>
+          </ac:spMkLst>
+        </pc:spChg>
+        <pc:spChg chg="mod">
+          <ac:chgData name="Melvin Leo" userId="fc11bf49cac66023" providerId="LiveId" clId="{505792C7-C5B7-45E5-ABE2-B08240655EC8}" dt="2017-10-20T05:38:48.457" v="319" actId="14100"/>
+          <ac:spMkLst>
+            <pc:docMk/>
+            <pc:sldMk cId="2396968029" sldId="263"/>
+            <ac:spMk id="118" creationId="{00000000-0000-0000-0000-000000000000}"/>
+          </ac:spMkLst>
+        </pc:spChg>
+        <pc:spChg chg="add mod">
+          <ac:chgData name="Melvin Leo" userId="fc11bf49cac66023" providerId="LiveId" clId="{505792C7-C5B7-45E5-ABE2-B08240655EC8}" dt="2017-10-20T05:27:58.112" v="203" actId="14100"/>
+          <ac:spMkLst>
+            <pc:docMk/>
+            <pc:sldMk cId="2396968029" sldId="263"/>
+            <ac:spMk id="121" creationId="{C12F9FE8-8E97-44EE-8A9B-3ED95F0C436E}"/>
+          </ac:spMkLst>
+        </pc:spChg>
+        <pc:spChg chg="mod">
+          <ac:chgData name="Melvin Leo" userId="fc11bf49cac66023" providerId="LiveId" clId="{505792C7-C5B7-45E5-ABE2-B08240655EC8}" dt="2017-10-20T05:33:14.263" v="308" actId="1076"/>
+          <ac:spMkLst>
+            <pc:docMk/>
+            <pc:sldMk cId="2396968029" sldId="263"/>
+            <ac:spMk id="122" creationId="{00000000-0000-0000-0000-000000000000}"/>
+          </ac:spMkLst>
+        </pc:spChg>
+        <pc:spChg chg="add mod">
+          <ac:chgData name="Melvin Leo" userId="fc11bf49cac66023" providerId="LiveId" clId="{505792C7-C5B7-45E5-ABE2-B08240655EC8}" dt="2017-10-20T05:28:31.210" v="220" actId="20577"/>
+          <ac:spMkLst>
+            <pc:docMk/>
+            <pc:sldMk cId="2396968029" sldId="263"/>
+            <ac:spMk id="123" creationId="{5F54B025-1BD2-4E17-85C3-AF4C278DD3AE}"/>
+          </ac:spMkLst>
+        </pc:spChg>
+        <pc:spChg chg="add mod">
+          <ac:chgData name="Melvin Leo" userId="fc11bf49cac66023" providerId="LiveId" clId="{505792C7-C5B7-45E5-ABE2-B08240655EC8}" dt="2017-10-20T05:28:52.223" v="242" actId="20577"/>
+          <ac:spMkLst>
+            <pc:docMk/>
+            <pc:sldMk cId="2396968029" sldId="263"/>
+            <ac:spMk id="125" creationId="{D850182C-099D-49D0-B3B7-AFD33A543BF0}"/>
+          </ac:spMkLst>
+        </pc:spChg>
+        <pc:spChg chg="add mod">
+          <ac:chgData name="Melvin Leo" userId="fc11bf49cac66023" providerId="LiveId" clId="{505792C7-C5B7-45E5-ABE2-B08240655EC8}" dt="2017-10-20T05:30:47.351" v="276" actId="14100"/>
+          <ac:spMkLst>
+            <pc:docMk/>
+            <pc:sldMk cId="2396968029" sldId="263"/>
+            <ac:spMk id="134" creationId="{F9D1F24C-D0C0-4157-80A2-1E3CDF6E2665}"/>
+          </ac:spMkLst>
+        </pc:spChg>
+        <pc:spChg chg="add mod">
+          <ac:chgData name="Melvin Leo" userId="fc11bf49cac66023" providerId="LiveId" clId="{505792C7-C5B7-45E5-ABE2-B08240655EC8}" dt="2017-10-20T05:31:18.515" v="280" actId="1076"/>
+          <ac:spMkLst>
+            <pc:docMk/>
+            <pc:sldMk cId="2396968029" sldId="263"/>
+            <ac:spMk id="135" creationId="{4E7C603F-5F84-4CF4-99E4-8E13C4DC02F4}"/>
+          </ac:spMkLst>
+        </pc:spChg>
+        <pc:spChg chg="add mod">
+          <ac:chgData name="Melvin Leo" userId="fc11bf49cac66023" providerId="LiveId" clId="{505792C7-C5B7-45E5-ABE2-B08240655EC8}" dt="2017-10-20T05:32:13.098" v="287" actId="1076"/>
+          <ac:spMkLst>
+            <pc:docMk/>
+            <pc:sldMk cId="2396968029" sldId="263"/>
+            <ac:spMk id="139" creationId="{900AC911-64D7-4429-AF20-F50615C592FB}"/>
+          </ac:spMkLst>
+        </pc:spChg>
+        <pc:spChg chg="add mod">
+          <ac:chgData name="Melvin Leo" userId="fc11bf49cac66023" providerId="LiveId" clId="{505792C7-C5B7-45E5-ABE2-B08240655EC8}" dt="2017-10-20T05:33:02.591" v="307" actId="1076"/>
+          <ac:spMkLst>
+            <pc:docMk/>
+            <pc:sldMk cId="2396968029" sldId="263"/>
+            <ac:spMk id="143" creationId="{16458549-5108-46D1-BE05-4DB64D1FADEF}"/>
+          </ac:spMkLst>
+        </pc:spChg>
+        <pc:cxnChg chg="mod">
+          <ac:chgData name="Melvin Leo" userId="fc11bf49cac66023" providerId="LiveId" clId="{505792C7-C5B7-45E5-ABE2-B08240655EC8}" dt="2017-10-20T05:16:19.489" v="19" actId="1076"/>
+          <ac:cxnSpMkLst>
+            <pc:docMk/>
+            <pc:sldMk cId="2396968029" sldId="263"/>
+            <ac:cxnSpMk id="50" creationId="{00000000-0000-0000-0000-000000000000}"/>
+          </ac:cxnSpMkLst>
+        </pc:cxnChg>
+        <pc:cxnChg chg="mod">
+          <ac:chgData name="Melvin Leo" userId="fc11bf49cac66023" providerId="LiveId" clId="{505792C7-C5B7-45E5-ABE2-B08240655EC8}" dt="2017-10-20T05:16:19.489" v="19" actId="1076"/>
+          <ac:cxnSpMkLst>
+            <pc:docMk/>
+            <pc:sldMk cId="2396968029" sldId="263"/>
+            <ac:cxnSpMk id="64" creationId="{00000000-0000-0000-0000-000000000000}"/>
+          </ac:cxnSpMkLst>
+        </pc:cxnChg>
+        <pc:cxnChg chg="mod">
+          <ac:chgData name="Melvin Leo" userId="fc11bf49cac66023" providerId="LiveId" clId="{505792C7-C5B7-45E5-ABE2-B08240655EC8}" dt="2017-10-20T05:38:17.505" v="315" actId="14100"/>
+          <ac:cxnSpMkLst>
+            <pc:docMk/>
+            <pc:sldMk cId="2396968029" sldId="263"/>
+            <ac:cxnSpMk id="75" creationId="{00000000-0000-0000-0000-000000000000}"/>
+          </ac:cxnSpMkLst>
+        </pc:cxnChg>
+        <pc:cxnChg chg="mod">
+          <ac:chgData name="Melvin Leo" userId="fc11bf49cac66023" providerId="LiveId" clId="{505792C7-C5B7-45E5-ABE2-B08240655EC8}" dt="2017-10-20T05:25:20.189" v="140" actId="1076"/>
+          <ac:cxnSpMkLst>
+            <pc:docMk/>
+            <pc:sldMk cId="2396968029" sldId="263"/>
+            <ac:cxnSpMk id="86" creationId="{00000000-0000-0000-0000-000000000000}"/>
+          </ac:cxnSpMkLst>
+        </pc:cxnChg>
+        <pc:cxnChg chg="add mod">
+          <ac:chgData name="Melvin Leo" userId="fc11bf49cac66023" providerId="LiveId" clId="{505792C7-C5B7-45E5-ABE2-B08240655EC8}" dt="2017-10-20T05:21:30.044" v="97" actId="14100"/>
+          <ac:cxnSpMkLst>
+            <pc:docMk/>
+            <pc:sldMk cId="2396968029" sldId="263"/>
+            <ac:cxnSpMk id="92" creationId="{EA4BC819-D628-483A-81C9-31A78D172342}"/>
+          </ac:cxnSpMkLst>
+        </pc:cxnChg>
+        <pc:cxnChg chg="add mod">
+          <ac:chgData name="Melvin Leo" userId="fc11bf49cac66023" providerId="LiveId" clId="{505792C7-C5B7-45E5-ABE2-B08240655EC8}" dt="2017-10-20T05:25:02.434" v="136" actId="14100"/>
+          <ac:cxnSpMkLst>
+            <pc:docMk/>
+            <pc:sldMk cId="2396968029" sldId="263"/>
+            <ac:cxnSpMk id="101" creationId="{A2131113-E39E-4B88-8BAB-DCE55150974E}"/>
+          </ac:cxnSpMkLst>
+        </pc:cxnChg>
+        <pc:cxnChg chg="add del">
+          <ac:chgData name="Melvin Leo" userId="fc11bf49cac66023" providerId="LiveId" clId="{505792C7-C5B7-45E5-ABE2-B08240655EC8}" dt="2017-10-20T05:23:05.845" v="110"/>
+          <ac:cxnSpMkLst>
+            <pc:docMk/>
+            <pc:sldMk cId="2396968029" sldId="263"/>
+            <ac:cxnSpMk id="102" creationId="{E7FE29B4-2049-4184-B089-16EEF4381807}"/>
+          </ac:cxnSpMkLst>
+        </pc:cxnChg>
+        <pc:cxnChg chg="add del mod">
+          <ac:chgData name="Melvin Leo" userId="fc11bf49cac66023" providerId="LiveId" clId="{505792C7-C5B7-45E5-ABE2-B08240655EC8}" dt="2017-10-20T05:23:22.025" v="118"/>
+          <ac:cxnSpMkLst>
+            <pc:docMk/>
+            <pc:sldMk cId="2396968029" sldId="263"/>
+            <ac:cxnSpMk id="103" creationId="{9451C24D-2A94-46F3-89ED-9C18B14BC739}"/>
+          </ac:cxnSpMkLst>
+        </pc:cxnChg>
+        <pc:cxnChg chg="add del">
+          <ac:chgData name="Melvin Leo" userId="fc11bf49cac66023" providerId="LiveId" clId="{505792C7-C5B7-45E5-ABE2-B08240655EC8}" dt="2017-10-20T05:23:35.159" v="120"/>
+          <ac:cxnSpMkLst>
+            <pc:docMk/>
+            <pc:sldMk cId="2396968029" sldId="263"/>
+            <ac:cxnSpMk id="106" creationId="{72022C2A-569B-4DEB-915A-269A4BF8B1F3}"/>
+          </ac:cxnSpMkLst>
+        </pc:cxnChg>
+        <pc:cxnChg chg="mod">
+          <ac:chgData name="Melvin Leo" userId="fc11bf49cac66023" providerId="LiveId" clId="{505792C7-C5B7-45E5-ABE2-B08240655EC8}" dt="2017-10-20T05:38:34.563" v="317" actId="14100"/>
+          <ac:cxnSpMkLst>
+            <pc:docMk/>
+            <pc:sldMk cId="2396968029" sldId="263"/>
+            <ac:cxnSpMk id="107" creationId="{00000000-0000-0000-0000-000000000000}"/>
+          </ac:cxnSpMkLst>
+        </pc:cxnChg>
+        <pc:cxnChg chg="add mod">
+          <ac:chgData name="Melvin Leo" userId="fc11bf49cac66023" providerId="LiveId" clId="{505792C7-C5B7-45E5-ABE2-B08240655EC8}" dt="2017-10-20T05:26:05.684" v="149" actId="14100"/>
+          <ac:cxnSpMkLst>
+            <pc:docMk/>
+            <pc:sldMk cId="2396968029" sldId="263"/>
+            <ac:cxnSpMk id="115" creationId="{CAE772E5-00FC-4716-8B6F-CB9E69140202}"/>
+          </ac:cxnSpMkLst>
+        </pc:cxnChg>
+        <pc:cxnChg chg="mod">
+          <ac:chgData name="Melvin Leo" userId="fc11bf49cac66023" providerId="LiveId" clId="{505792C7-C5B7-45E5-ABE2-B08240655EC8}" dt="2017-10-20T05:33:14.263" v="308" actId="1076"/>
+          <ac:cxnSpMkLst>
+            <pc:docMk/>
+            <pc:sldMk cId="2396968029" sldId="263"/>
+            <ac:cxnSpMk id="124" creationId="{00000000-0000-0000-0000-000000000000}"/>
+          </ac:cxnSpMkLst>
+        </pc:cxnChg>
+        <pc:cxnChg chg="add mod">
+          <ac:chgData name="Melvin Leo" userId="fc11bf49cac66023" providerId="LiveId" clId="{505792C7-C5B7-45E5-ABE2-B08240655EC8}" dt="2017-10-20T05:29:13.452" v="245" actId="14100"/>
+          <ac:cxnSpMkLst>
+            <pc:docMk/>
+            <pc:sldMk cId="2396968029" sldId="263"/>
+            <ac:cxnSpMk id="126" creationId="{513004CB-069E-4122-87FA-DF3261FF5B7F}"/>
+          </ac:cxnSpMkLst>
+        </pc:cxnChg>
+        <pc:cxnChg chg="add mod">
+          <ac:chgData name="Melvin Leo" userId="fc11bf49cac66023" providerId="LiveId" clId="{505792C7-C5B7-45E5-ABE2-B08240655EC8}" dt="2017-10-20T05:29:35.687" v="249" actId="14100"/>
+          <ac:cxnSpMkLst>
+            <pc:docMk/>
+            <pc:sldMk cId="2396968029" sldId="263"/>
+            <ac:cxnSpMk id="127" creationId="{FE01AEFC-675E-4652-980A-4359218253E4}"/>
+          </ac:cxnSpMkLst>
+        </pc:cxnChg>
+        <pc:cxnChg chg="add mod">
+          <ac:chgData name="Melvin Leo" userId="fc11bf49cac66023" providerId="LiveId" clId="{505792C7-C5B7-45E5-ABE2-B08240655EC8}" dt="2017-10-20T05:29:53.873" v="253" actId="14100"/>
+          <ac:cxnSpMkLst>
+            <pc:docMk/>
+            <pc:sldMk cId="2396968029" sldId="263"/>
+            <ac:cxnSpMk id="128" creationId="{6F80AC56-CD49-4A6C-B8A8-A247BFA1F5BA}"/>
+          </ac:cxnSpMkLst>
+        </pc:cxnChg>
+        <pc:cxnChg chg="add mod">
+          <ac:chgData name="Melvin Leo" userId="fc11bf49cac66023" providerId="LiveId" clId="{505792C7-C5B7-45E5-ABE2-B08240655EC8}" dt="2017-10-20T05:30:19.502" v="260" actId="14100"/>
+          <ac:cxnSpMkLst>
+            <pc:docMk/>
+            <pc:sldMk cId="2396968029" sldId="263"/>
+            <ac:cxnSpMk id="129" creationId="{79B1219F-FEFB-4CDB-A31E-951C5B5EC278}"/>
+          </ac:cxnSpMkLst>
+        </pc:cxnChg>
+        <pc:cxnChg chg="add mod">
+          <ac:chgData name="Melvin Leo" userId="fc11bf49cac66023" providerId="LiveId" clId="{505792C7-C5B7-45E5-ABE2-B08240655EC8}" dt="2017-10-20T05:31:46.444" v="284" actId="14100"/>
+          <ac:cxnSpMkLst>
+            <pc:docMk/>
+            <pc:sldMk cId="2396968029" sldId="263"/>
+            <ac:cxnSpMk id="136" creationId="{C8993BF3-B9CB-4299-8399-FA7A484AD012}"/>
+          </ac:cxnSpMkLst>
+        </pc:cxnChg>
+        <pc:cxnChg chg="add mod">
+          <ac:chgData name="Melvin Leo" userId="fc11bf49cac66023" providerId="LiveId" clId="{505792C7-C5B7-45E5-ABE2-B08240655EC8}" dt="2017-10-20T05:32:42.124" v="304" actId="14100"/>
+          <ac:cxnSpMkLst>
+            <pc:docMk/>
+            <pc:sldMk cId="2396968029" sldId="263"/>
+            <ac:cxnSpMk id="140" creationId="{EA7F2861-1555-4CF4-B21F-17B122CB7A46}"/>
+          </ac:cxnSpMkLst>
+        </pc:cxnChg>
+      </pc:sldChg>
+    </pc:docChg>
+  </pc:docChgLst>
+</pc:chgInfo>
+</file>
+
 <file path=ppt/notesMasters/notesMaster1.xml><?xml version="1.0" encoding="utf-8"?>
 <p:notesMaster xmlns:a="http://schemas.openxmlformats.org/drawingml/2006/main" xmlns:r="http://schemas.openxmlformats.org/officeDocument/2006/relationships" xmlns:p="http://schemas.openxmlformats.org/presentationml/2006/main">
   <p:cSld>
@@ -208,7 +533,7 @@
           <a:p>
             <a:fld id="{F5CC4B3F-88C1-4FFA-B1B6-F41C21DC6924}" type="datetimeFigureOut">
               <a:rPr lang="en-US" smtClean="0"/>
-              <a:t>9/4/17</a:t>
+              <a:t>10/20/2017</a:t>
             </a:fld>
             <a:endParaRPr lang="en-US"/>
           </a:p>
@@ -272,38 +597,37 @@
           <a:p>
             <a:pPr lvl="0"/>
             <a:r>
-              <a:rPr lang="en-US" smtClean="0"/>
+              <a:rPr lang="en-US"/>
               <a:t>Click to edit Master text styles</a:t>
             </a:r>
           </a:p>
           <a:p>
             <a:pPr lvl="1"/>
             <a:r>
-              <a:rPr lang="en-US" smtClean="0"/>
+              <a:rPr lang="en-US"/>
               <a:t>Second level</a:t>
             </a:r>
           </a:p>
           <a:p>
             <a:pPr lvl="2"/>
             <a:r>
-              <a:rPr lang="en-US" smtClean="0"/>
+              <a:rPr lang="en-US"/>
               <a:t>Third level</a:t>
             </a:r>
           </a:p>
           <a:p>
             <a:pPr lvl="3"/>
             <a:r>
-              <a:rPr lang="en-US" smtClean="0"/>
+              <a:rPr lang="en-US"/>
               <a:t>Fourth level</a:t>
             </a:r>
           </a:p>
           <a:p>
             <a:pPr lvl="4"/>
             <a:r>
-              <a:rPr lang="en-US" smtClean="0"/>
+              <a:rPr lang="en-US"/>
               <a:t>Fifth level</a:t>
             </a:r>
-            <a:endParaRPr lang="en-US"/>
           </a:p>
         </p:txBody>
       </p:sp>
@@ -514,10 +838,9 @@
           <a:lstStyle/>
           <a:p>
             <a:r>
-              <a:rPr lang="en-US" smtClean="0"/>
+              <a:rPr lang="en-US"/>
               <a:t>Click to edit Master title style</a:t>
             </a:r>
-            <a:endParaRPr lang="en-US"/>
           </a:p>
         </p:txBody>
       </p:sp>
@@ -633,10 +956,9 @@
           </a:lstStyle>
           <a:p>
             <a:r>
-              <a:rPr lang="en-US" smtClean="0"/>
+              <a:rPr lang="en-US"/>
               <a:t>Click to edit Master subtitle style</a:t>
             </a:r>
-            <a:endParaRPr lang="en-US"/>
           </a:p>
         </p:txBody>
       </p:sp>
@@ -657,7 +979,7 @@
           <a:p>
             <a:fld id="{78C97017-6FC3-485B-9764-EAC9E56C1D49}" type="datetimeFigureOut">
               <a:rPr lang="en-US" smtClean="0"/>
-              <a:t>9/4/17</a:t>
+              <a:t>10/20/2017</a:t>
             </a:fld>
             <a:endParaRPr lang="en-US"/>
           </a:p>
@@ -751,10 +1073,9 @@
           <a:lstStyle/>
           <a:p>
             <a:r>
-              <a:rPr lang="en-US" smtClean="0"/>
+              <a:rPr lang="en-US"/>
               <a:t>Click to edit Master title style</a:t>
             </a:r>
-            <a:endParaRPr lang="en-US"/>
           </a:p>
         </p:txBody>
       </p:sp>
@@ -775,38 +1096,37 @@
           <a:p>
             <a:pPr lvl="0"/>
             <a:r>
-              <a:rPr lang="en-US" smtClean="0"/>
+              <a:rPr lang="en-US"/>
               <a:t>Click to edit Master text styles</a:t>
             </a:r>
           </a:p>
           <a:p>
             <a:pPr lvl="1"/>
             <a:r>
-              <a:rPr lang="en-US" smtClean="0"/>
+              <a:rPr lang="en-US"/>
               <a:t>Second level</a:t>
             </a:r>
           </a:p>
           <a:p>
             <a:pPr lvl="2"/>
             <a:r>
-              <a:rPr lang="en-US" smtClean="0"/>
+              <a:rPr lang="en-US"/>
               <a:t>Third level</a:t>
             </a:r>
           </a:p>
           <a:p>
             <a:pPr lvl="3"/>
             <a:r>
-              <a:rPr lang="en-US" smtClean="0"/>
+              <a:rPr lang="en-US"/>
               <a:t>Fourth level</a:t>
             </a:r>
           </a:p>
           <a:p>
             <a:pPr lvl="4"/>
             <a:r>
-              <a:rPr lang="en-US" smtClean="0"/>
+              <a:rPr lang="en-US"/>
               <a:t>Fifth level</a:t>
             </a:r>
-            <a:endParaRPr lang="en-US"/>
           </a:p>
         </p:txBody>
       </p:sp>
@@ -827,7 +1147,7 @@
           <a:p>
             <a:fld id="{78C97017-6FC3-485B-9764-EAC9E56C1D49}" type="datetimeFigureOut">
               <a:rPr lang="en-US" smtClean="0"/>
-              <a:t>9/4/17</a:t>
+              <a:t>10/20/2017</a:t>
             </a:fld>
             <a:endParaRPr lang="en-US"/>
           </a:p>
@@ -926,10 +1246,9 @@
           <a:lstStyle/>
           <a:p>
             <a:r>
-              <a:rPr lang="en-US" smtClean="0"/>
+              <a:rPr lang="en-US"/>
               <a:t>Click to edit Master title style</a:t>
             </a:r>
-            <a:endParaRPr lang="en-US"/>
           </a:p>
         </p:txBody>
       </p:sp>
@@ -955,38 +1274,37 @@
           <a:p>
             <a:pPr lvl="0"/>
             <a:r>
-              <a:rPr lang="en-US" smtClean="0"/>
+              <a:rPr lang="en-US"/>
               <a:t>Click to edit Master text styles</a:t>
             </a:r>
           </a:p>
           <a:p>
             <a:pPr lvl="1"/>
             <a:r>
-              <a:rPr lang="en-US" smtClean="0"/>
+              <a:rPr lang="en-US"/>
               <a:t>Second level</a:t>
             </a:r>
           </a:p>
           <a:p>
             <a:pPr lvl="2"/>
             <a:r>
-              <a:rPr lang="en-US" smtClean="0"/>
+              <a:rPr lang="en-US"/>
               <a:t>Third level</a:t>
             </a:r>
           </a:p>
           <a:p>
             <a:pPr lvl="3"/>
             <a:r>
-              <a:rPr lang="en-US" smtClean="0"/>
+              <a:rPr lang="en-US"/>
               <a:t>Fourth level</a:t>
             </a:r>
           </a:p>
           <a:p>
             <a:pPr lvl="4"/>
             <a:r>
-              <a:rPr lang="en-US" smtClean="0"/>
+              <a:rPr lang="en-US"/>
               <a:t>Fifth level</a:t>
             </a:r>
-            <a:endParaRPr lang="en-US"/>
           </a:p>
         </p:txBody>
       </p:sp>
@@ -1007,7 +1325,7 @@
           <a:p>
             <a:fld id="{78C97017-6FC3-485B-9764-EAC9E56C1D49}" type="datetimeFigureOut">
               <a:rPr lang="en-US" smtClean="0"/>
-              <a:t>9/4/17</a:t>
+              <a:t>10/20/2017</a:t>
             </a:fld>
             <a:endParaRPr lang="en-US"/>
           </a:p>
@@ -1101,10 +1419,9 @@
           <a:lstStyle/>
           <a:p>
             <a:r>
-              <a:rPr lang="en-US" smtClean="0"/>
+              <a:rPr lang="en-US"/>
               <a:t>Click to edit Master title style</a:t>
             </a:r>
-            <a:endParaRPr lang="en-US"/>
           </a:p>
         </p:txBody>
       </p:sp>
@@ -1125,38 +1442,37 @@
           <a:p>
             <a:pPr lvl="0"/>
             <a:r>
-              <a:rPr lang="en-US" smtClean="0"/>
+              <a:rPr lang="en-US"/>
               <a:t>Click to edit Master text styles</a:t>
             </a:r>
           </a:p>
           <a:p>
             <a:pPr lvl="1"/>
             <a:r>
-              <a:rPr lang="en-US" smtClean="0"/>
+              <a:rPr lang="en-US"/>
               <a:t>Second level</a:t>
             </a:r>
           </a:p>
           <a:p>
             <a:pPr lvl="2"/>
             <a:r>
-              <a:rPr lang="en-US" smtClean="0"/>
+              <a:rPr lang="en-US"/>
               <a:t>Third level</a:t>
             </a:r>
           </a:p>
           <a:p>
             <a:pPr lvl="3"/>
             <a:r>
-              <a:rPr lang="en-US" smtClean="0"/>
+              <a:rPr lang="en-US"/>
               <a:t>Fourth level</a:t>
             </a:r>
           </a:p>
           <a:p>
             <a:pPr lvl="4"/>
             <a:r>
-              <a:rPr lang="en-US" smtClean="0"/>
+              <a:rPr lang="en-US"/>
               <a:t>Fifth level</a:t>
             </a:r>
-            <a:endParaRPr lang="en-US"/>
           </a:p>
         </p:txBody>
       </p:sp>
@@ -1177,7 +1493,7 @@
           <a:p>
             <a:fld id="{78C97017-6FC3-485B-9764-EAC9E56C1D49}" type="datetimeFigureOut">
               <a:rPr lang="en-US" smtClean="0"/>
-              <a:t>9/4/17</a:t>
+              <a:t>10/20/2017</a:t>
             </a:fld>
             <a:endParaRPr lang="en-US"/>
           </a:p>
@@ -1280,10 +1596,9 @@
           </a:lstStyle>
           <a:p>
             <a:r>
-              <a:rPr lang="en-US" smtClean="0"/>
+              <a:rPr lang="en-US"/>
               <a:t>Click to edit Master title style</a:t>
             </a:r>
-            <a:endParaRPr lang="en-US"/>
           </a:p>
         </p:txBody>
       </p:sp>
@@ -1400,7 +1715,7 @@
           <a:p>
             <a:pPr lvl="0"/>
             <a:r>
-              <a:rPr lang="en-US" smtClean="0"/>
+              <a:rPr lang="en-US"/>
               <a:t>Click to edit Master text styles</a:t>
             </a:r>
           </a:p>
@@ -1423,7 +1738,7 @@
           <a:p>
             <a:fld id="{78C97017-6FC3-485B-9764-EAC9E56C1D49}" type="datetimeFigureOut">
               <a:rPr lang="en-US" smtClean="0"/>
-              <a:t>9/4/17</a:t>
+              <a:t>10/20/2017</a:t>
             </a:fld>
             <a:endParaRPr lang="en-US"/>
           </a:p>
@@ -1517,10 +1832,9 @@
           <a:lstStyle/>
           <a:p>
             <a:r>
-              <a:rPr lang="en-US" smtClean="0"/>
+              <a:rPr lang="en-US"/>
               <a:t>Click to edit Master title style</a:t>
             </a:r>
-            <a:endParaRPr lang="en-US"/>
           </a:p>
         </p:txBody>
       </p:sp>
@@ -1574,38 +1888,37 @@
           <a:p>
             <a:pPr lvl="0"/>
             <a:r>
-              <a:rPr lang="en-US" smtClean="0"/>
+              <a:rPr lang="en-US"/>
               <a:t>Click to edit Master text styles</a:t>
             </a:r>
           </a:p>
           <a:p>
             <a:pPr lvl="1"/>
             <a:r>
-              <a:rPr lang="en-US" smtClean="0"/>
+              <a:rPr lang="en-US"/>
               <a:t>Second level</a:t>
             </a:r>
           </a:p>
           <a:p>
             <a:pPr lvl="2"/>
             <a:r>
-              <a:rPr lang="en-US" smtClean="0"/>
+              <a:rPr lang="en-US"/>
               <a:t>Third level</a:t>
             </a:r>
           </a:p>
           <a:p>
             <a:pPr lvl="3"/>
             <a:r>
-              <a:rPr lang="en-US" smtClean="0"/>
+              <a:rPr lang="en-US"/>
               <a:t>Fourth level</a:t>
             </a:r>
           </a:p>
           <a:p>
             <a:pPr lvl="4"/>
             <a:r>
-              <a:rPr lang="en-US" smtClean="0"/>
+              <a:rPr lang="en-US"/>
               <a:t>Fifth level</a:t>
             </a:r>
-            <a:endParaRPr lang="en-US"/>
           </a:p>
         </p:txBody>
       </p:sp>
@@ -1659,38 +1972,37 @@
           <a:p>
             <a:pPr lvl="0"/>
             <a:r>
-              <a:rPr lang="en-US" smtClean="0"/>
+              <a:rPr lang="en-US"/>
               <a:t>Click to edit Master text styles</a:t>
             </a:r>
           </a:p>
           <a:p>
             <a:pPr lvl="1"/>
             <a:r>
-              <a:rPr lang="en-US" smtClean="0"/>
+              <a:rPr lang="en-US"/>
               <a:t>Second level</a:t>
             </a:r>
           </a:p>
           <a:p>
             <a:pPr lvl="2"/>
             <a:r>
-              <a:rPr lang="en-US" smtClean="0"/>
+              <a:rPr lang="en-US"/>
               <a:t>Third level</a:t>
             </a:r>
           </a:p>
           <a:p>
             <a:pPr lvl="3"/>
             <a:r>
-              <a:rPr lang="en-US" smtClean="0"/>
+              <a:rPr lang="en-US"/>
               <a:t>Fourth level</a:t>
             </a:r>
           </a:p>
           <a:p>
             <a:pPr lvl="4"/>
             <a:r>
-              <a:rPr lang="en-US" smtClean="0"/>
+              <a:rPr lang="en-US"/>
               <a:t>Fifth level</a:t>
             </a:r>
-            <a:endParaRPr lang="en-US"/>
           </a:p>
         </p:txBody>
       </p:sp>
@@ -1711,7 +2023,7 @@
           <a:p>
             <a:fld id="{78C97017-6FC3-485B-9764-EAC9E56C1D49}" type="datetimeFigureOut">
               <a:rPr lang="en-US" smtClean="0"/>
-              <a:t>9/4/17</a:t>
+              <a:t>10/20/2017</a:t>
             </a:fld>
             <a:endParaRPr lang="en-US"/>
           </a:p>
@@ -1809,10 +2121,9 @@
           </a:lstStyle>
           <a:p>
             <a:r>
-              <a:rPr lang="en-US" smtClean="0"/>
+              <a:rPr lang="en-US"/>
               <a:t>Click to edit Master title style</a:t>
             </a:r>
-            <a:endParaRPr lang="en-US"/>
           </a:p>
         </p:txBody>
       </p:sp>
@@ -1875,7 +2186,7 @@
           <a:p>
             <a:pPr lvl="0"/>
             <a:r>
-              <a:rPr lang="en-US" smtClean="0"/>
+              <a:rPr lang="en-US"/>
               <a:t>Click to edit Master text styles</a:t>
             </a:r>
           </a:p>
@@ -1931,38 +2242,37 @@
           <a:p>
             <a:pPr lvl="0"/>
             <a:r>
-              <a:rPr lang="en-US" smtClean="0"/>
+              <a:rPr lang="en-US"/>
               <a:t>Click to edit Master text styles</a:t>
             </a:r>
           </a:p>
           <a:p>
             <a:pPr lvl="1"/>
             <a:r>
-              <a:rPr lang="en-US" smtClean="0"/>
+              <a:rPr lang="en-US"/>
               <a:t>Second level</a:t>
             </a:r>
           </a:p>
           <a:p>
             <a:pPr lvl="2"/>
             <a:r>
-              <a:rPr lang="en-US" smtClean="0"/>
+              <a:rPr lang="en-US"/>
               <a:t>Third level</a:t>
             </a:r>
           </a:p>
           <a:p>
             <a:pPr lvl="3"/>
             <a:r>
-              <a:rPr lang="en-US" smtClean="0"/>
+              <a:rPr lang="en-US"/>
               <a:t>Fourth level</a:t>
             </a:r>
           </a:p>
           <a:p>
             <a:pPr lvl="4"/>
             <a:r>
-              <a:rPr lang="en-US" smtClean="0"/>
+              <a:rPr lang="en-US"/>
               <a:t>Fifth level</a:t>
             </a:r>
-            <a:endParaRPr lang="en-US"/>
           </a:p>
         </p:txBody>
       </p:sp>
@@ -2025,7 +2335,7 @@
           <a:p>
             <a:pPr lvl="0"/>
             <a:r>
-              <a:rPr lang="en-US" smtClean="0"/>
+              <a:rPr lang="en-US"/>
               <a:t>Click to edit Master text styles</a:t>
             </a:r>
           </a:p>
@@ -2081,38 +2391,37 @@
           <a:p>
             <a:pPr lvl="0"/>
             <a:r>
-              <a:rPr lang="en-US" smtClean="0"/>
+              <a:rPr lang="en-US"/>
               <a:t>Click to edit Master text styles</a:t>
             </a:r>
           </a:p>
           <a:p>
             <a:pPr lvl="1"/>
             <a:r>
-              <a:rPr lang="en-US" smtClean="0"/>
+              <a:rPr lang="en-US"/>
               <a:t>Second level</a:t>
             </a:r>
           </a:p>
           <a:p>
             <a:pPr lvl="2"/>
             <a:r>
-              <a:rPr lang="en-US" smtClean="0"/>
+              <a:rPr lang="en-US"/>
               <a:t>Third level</a:t>
             </a:r>
           </a:p>
           <a:p>
             <a:pPr lvl="3"/>
             <a:r>
-              <a:rPr lang="en-US" smtClean="0"/>
+              <a:rPr lang="en-US"/>
               <a:t>Fourth level</a:t>
             </a:r>
           </a:p>
           <a:p>
             <a:pPr lvl="4"/>
             <a:r>
-              <a:rPr lang="en-US" smtClean="0"/>
+              <a:rPr lang="en-US"/>
               <a:t>Fifth level</a:t>
             </a:r>
-            <a:endParaRPr lang="en-US"/>
           </a:p>
         </p:txBody>
       </p:sp>
@@ -2133,7 +2442,7 @@
           <a:p>
             <a:fld id="{78C97017-6FC3-485B-9764-EAC9E56C1D49}" type="datetimeFigureOut">
               <a:rPr lang="en-US" smtClean="0"/>
-              <a:t>9/4/17</a:t>
+              <a:t>10/20/2017</a:t>
             </a:fld>
             <a:endParaRPr lang="en-US"/>
           </a:p>
@@ -2227,10 +2536,9 @@
           <a:lstStyle/>
           <a:p>
             <a:r>
-              <a:rPr lang="en-US" smtClean="0"/>
+              <a:rPr lang="en-US"/>
               <a:t>Click to edit Master title style</a:t>
             </a:r>
-            <a:endParaRPr lang="en-US"/>
           </a:p>
         </p:txBody>
       </p:sp>
@@ -2251,7 +2559,7 @@
           <a:p>
             <a:fld id="{78C97017-6FC3-485B-9764-EAC9E56C1D49}" type="datetimeFigureOut">
               <a:rPr lang="en-US" smtClean="0"/>
-              <a:t>9/4/17</a:t>
+              <a:t>10/20/2017</a:t>
             </a:fld>
             <a:endParaRPr lang="en-US"/>
           </a:p>
@@ -2346,7 +2654,7 @@
           <a:p>
             <a:fld id="{78C97017-6FC3-485B-9764-EAC9E56C1D49}" type="datetimeFigureOut">
               <a:rPr lang="en-US" smtClean="0"/>
-              <a:t>9/4/17</a:t>
+              <a:t>10/20/2017</a:t>
             </a:fld>
             <a:endParaRPr lang="en-US"/>
           </a:p>
@@ -2449,10 +2757,9 @@
           </a:lstStyle>
           <a:p>
             <a:r>
-              <a:rPr lang="en-US" smtClean="0"/>
+              <a:rPr lang="en-US"/>
               <a:t>Click to edit Master title style</a:t>
             </a:r>
-            <a:endParaRPr lang="en-US"/>
           </a:p>
         </p:txBody>
       </p:sp>
@@ -2506,38 +2813,37 @@
           <a:p>
             <a:pPr lvl="0"/>
             <a:r>
-              <a:rPr lang="en-US" smtClean="0"/>
+              <a:rPr lang="en-US"/>
               <a:t>Click to edit Master text styles</a:t>
             </a:r>
           </a:p>
           <a:p>
             <a:pPr lvl="1"/>
             <a:r>
-              <a:rPr lang="en-US" smtClean="0"/>
+              <a:rPr lang="en-US"/>
               <a:t>Second level</a:t>
             </a:r>
           </a:p>
           <a:p>
             <a:pPr lvl="2"/>
             <a:r>
-              <a:rPr lang="en-US" smtClean="0"/>
+              <a:rPr lang="en-US"/>
               <a:t>Third level</a:t>
             </a:r>
           </a:p>
           <a:p>
             <a:pPr lvl="3"/>
             <a:r>
-              <a:rPr lang="en-US" smtClean="0"/>
+              <a:rPr lang="en-US"/>
               <a:t>Fourth level</a:t>
             </a:r>
           </a:p>
           <a:p>
             <a:pPr lvl="4"/>
             <a:r>
-              <a:rPr lang="en-US" smtClean="0"/>
+              <a:rPr lang="en-US"/>
               <a:t>Fifth level</a:t>
             </a:r>
-            <a:endParaRPr lang="en-US"/>
           </a:p>
         </p:txBody>
       </p:sp>
@@ -2600,7 +2906,7 @@
           <a:p>
             <a:pPr lvl="0"/>
             <a:r>
-              <a:rPr lang="en-US" smtClean="0"/>
+              <a:rPr lang="en-US"/>
               <a:t>Click to edit Master text styles</a:t>
             </a:r>
           </a:p>
@@ -2623,7 +2929,7 @@
           <a:p>
             <a:fld id="{78C97017-6FC3-485B-9764-EAC9E56C1D49}" type="datetimeFigureOut">
               <a:rPr lang="en-US" smtClean="0"/>
-              <a:t>9/4/17</a:t>
+              <a:t>10/20/2017</a:t>
             </a:fld>
             <a:endParaRPr lang="en-US"/>
           </a:p>
@@ -2726,10 +3032,9 @@
           </a:lstStyle>
           <a:p>
             <a:r>
-              <a:rPr lang="en-US" smtClean="0"/>
+              <a:rPr lang="en-US"/>
               <a:t>Click to edit Master title style</a:t>
             </a:r>
-            <a:endParaRPr lang="en-US"/>
           </a:p>
         </p:txBody>
       </p:sp>
@@ -2853,7 +3158,7 @@
           <a:p>
             <a:pPr lvl="0"/>
             <a:r>
-              <a:rPr lang="en-US" smtClean="0"/>
+              <a:rPr lang="en-US"/>
               <a:t>Click to edit Master text styles</a:t>
             </a:r>
           </a:p>
@@ -2876,7 +3181,7 @@
           <a:p>
             <a:fld id="{78C97017-6FC3-485B-9764-EAC9E56C1D49}" type="datetimeFigureOut">
               <a:rPr lang="en-US" smtClean="0"/>
-              <a:t>9/4/17</a:t>
+              <a:t>10/20/2017</a:t>
             </a:fld>
             <a:endParaRPr lang="en-US"/>
           </a:p>
@@ -2985,10 +3290,9 @@
           <a:lstStyle/>
           <a:p>
             <a:r>
-              <a:rPr lang="en-US" smtClean="0"/>
+              <a:rPr lang="en-US"/>
               <a:t>Click to edit Master title style</a:t>
             </a:r>
-            <a:endParaRPr lang="en-US"/>
           </a:p>
         </p:txBody>
       </p:sp>
@@ -3019,38 +3323,37 @@
           <a:p>
             <a:pPr lvl="0"/>
             <a:r>
-              <a:rPr lang="en-US" smtClean="0"/>
+              <a:rPr lang="en-US"/>
               <a:t>Click to edit Master text styles</a:t>
             </a:r>
           </a:p>
           <a:p>
             <a:pPr lvl="1"/>
             <a:r>
-              <a:rPr lang="en-US" smtClean="0"/>
+              <a:rPr lang="en-US"/>
               <a:t>Second level</a:t>
             </a:r>
           </a:p>
           <a:p>
             <a:pPr lvl="2"/>
             <a:r>
-              <a:rPr lang="en-US" smtClean="0"/>
+              <a:rPr lang="en-US"/>
               <a:t>Third level</a:t>
             </a:r>
           </a:p>
           <a:p>
             <a:pPr lvl="3"/>
             <a:r>
-              <a:rPr lang="en-US" smtClean="0"/>
+              <a:rPr lang="en-US"/>
               <a:t>Fourth level</a:t>
             </a:r>
           </a:p>
           <a:p>
             <a:pPr lvl="4"/>
             <a:r>
-              <a:rPr lang="en-US" smtClean="0"/>
+              <a:rPr lang="en-US"/>
               <a:t>Fifth level</a:t>
             </a:r>
-            <a:endParaRPr lang="en-US"/>
           </a:p>
         </p:txBody>
       </p:sp>
@@ -3089,7 +3392,7 @@
           <a:p>
             <a:fld id="{78C97017-6FC3-485B-9764-EAC9E56C1D49}" type="datetimeFigureOut">
               <a:rPr lang="en-US" smtClean="0"/>
-              <a:t>9/4/17</a:t>
+              <a:t>10/20/2017</a:t>
             </a:fld>
             <a:endParaRPr lang="en-US"/>
           </a:p>
@@ -3472,8 +3775,8 @@
         </p:nvSpPr>
         <p:spPr>
           <a:xfrm>
-            <a:off x="1119865" y="1727200"/>
-            <a:ext cx="7490735" cy="2997200"/>
+            <a:off x="1143000" y="1371600"/>
+            <a:ext cx="7338335" cy="4572000"/>
           </a:xfrm>
           <a:prstGeom prst="roundRect">
             <a:avLst>
@@ -3510,7 +3813,7 @@
           <a:lstStyle/>
           <a:p>
             <a:r>
-              <a:rPr lang="en-US" sz="1200" b="1" dirty="0" smtClean="0">
+              <a:rPr lang="en-US" sz="1200" b="1" dirty="0">
                 <a:solidFill>
                   <a:srgbClr val="7030A0"/>
                 </a:solidFill>
@@ -3569,7 +3872,7 @@
           <a:p>
             <a:pPr algn="ctr"/>
             <a:r>
-              <a:rPr lang="en-US" sz="1050" dirty="0" err="1" smtClean="0">
+              <a:rPr lang="en-US" sz="1050" dirty="0" err="1">
                 <a:solidFill>
                   <a:schemeClr val="bg1"/>
                 </a:solidFill>
@@ -3628,7 +3931,7 @@
           <a:p>
             <a:pPr algn="ctr"/>
             <a:r>
-              <a:rPr lang="en-US" sz="1050" dirty="0" err="1" smtClean="0">
+              <a:rPr lang="en-US" sz="1050" dirty="0" err="1">
                 <a:solidFill>
                   <a:schemeClr val="bg1"/>
                 </a:solidFill>
@@ -3688,19 +3991,20 @@
         <p:nvCxnSpPr>
           <p:cNvPr id="107" name="Elbow Connector 106"/>
           <p:cNvCxnSpPr>
-            <a:stCxn id="9" idx="1"/>
+            <a:cxnSpLocks/>
+            <a:stCxn id="9" idx="3"/>
           </p:cNvCxnSpPr>
           <p:nvPr/>
         </p:nvCxnSpPr>
         <p:spPr>
-          <a:xfrm rot="5400000" flipH="1" flipV="1">
-            <a:off x="4360065" y="1080909"/>
-            <a:ext cx="378691" cy="4637261"/>
+          <a:xfrm rot="16200000" flipH="1">
+            <a:off x="4408890" y="317140"/>
+            <a:ext cx="381023" cy="4737242"/>
           </a:xfrm>
           <a:prstGeom prst="bentConnector4">
             <a:avLst>
-              <a:gd name="adj1" fmla="val -101829"/>
-              <a:gd name="adj2" fmla="val 99976"/>
+              <a:gd name="adj1" fmla="val -219169"/>
+              <a:gd name="adj2" fmla="val 99891"/>
             </a:avLst>
           </a:prstGeom>
           <a:ln w="19050">
@@ -3783,7 +4087,7 @@
           <a:p>
             <a:pPr algn="ctr"/>
             <a:r>
-              <a:rPr lang="en-US" sz="1050" dirty="0" smtClean="0">
+              <a:rPr lang="en-US" sz="1050" dirty="0">
                 <a:solidFill>
                   <a:schemeClr val="bg1"/>
                 </a:solidFill>
@@ -3940,7 +4244,9 @@
       <p:cxnSp>
         <p:nvCxnSpPr>
           <p:cNvPr id="75" name="Elbow Connector 122"/>
-          <p:cNvCxnSpPr/>
+          <p:cNvCxnSpPr>
+            <a:cxnSpLocks/>
+          </p:cNvCxnSpPr>
           <p:nvPr/>
         </p:nvCxnSpPr>
         <p:spPr>
@@ -4107,7 +4413,7 @@
           <a:p>
             <a:pPr algn="ctr"/>
             <a:r>
-              <a:rPr lang="en-US" sz="1050" dirty="0" err="1" smtClean="0">
+              <a:rPr lang="en-US" sz="1050" dirty="0" err="1">
                 <a:solidFill>
                   <a:srgbClr val="7030A0"/>
                 </a:solidFill>
@@ -4249,7 +4555,7 @@
           <a:p>
             <a:pPr algn="ctr"/>
             <a:r>
-              <a:rPr lang="en-US" sz="1050" dirty="0" err="1" smtClean="0">
+              <a:rPr lang="en-US" sz="1050" dirty="0" err="1">
                 <a:solidFill>
                   <a:srgbClr val="7030A0"/>
                 </a:solidFill>
@@ -4393,7 +4699,7 @@
           <a:p>
             <a:pPr algn="ctr"/>
             <a:r>
-              <a:rPr lang="en-US" sz="1050" dirty="0" err="1" smtClean="0">
+              <a:rPr lang="en-US" sz="1050" dirty="0" err="1">
                 <a:solidFill>
                   <a:srgbClr val="7030A0"/>
                 </a:solidFill>
@@ -4492,7 +4798,7 @@
           <a:p>
             <a:pPr algn="ctr"/>
             <a:r>
-              <a:rPr lang="en-US" sz="1050" dirty="0" smtClean="0">
+              <a:rPr lang="en-US" sz="1050" dirty="0">
                 <a:solidFill>
                   <a:srgbClr val="7030A0"/>
                 </a:solidFill>
@@ -4634,7 +4940,7 @@
           <a:p>
             <a:pPr algn="ctr"/>
             <a:r>
-              <a:rPr lang="en-US" sz="1050" dirty="0" smtClean="0">
+              <a:rPr lang="en-US" sz="1050" dirty="0">
                 <a:solidFill>
                   <a:srgbClr val="7030A0"/>
                 </a:solidFill>
@@ -4776,7 +5082,7 @@
           <a:p>
             <a:pPr algn="ctr"/>
             <a:r>
-              <a:rPr lang="en-US" sz="1050" dirty="0" smtClean="0">
+              <a:rPr lang="en-US" sz="1050" dirty="0">
                 <a:solidFill>
                   <a:srgbClr val="7030A0"/>
                 </a:solidFill>
@@ -4784,14 +5090,14 @@
               <a:t>&lt;&lt;interface&gt;&gt;</a:t>
             </a:r>
             <a:br>
-              <a:rPr lang="en-US" sz="1050" dirty="0" smtClean="0">
+              <a:rPr lang="en-US" sz="1050" dirty="0">
                 <a:solidFill>
                   <a:srgbClr val="7030A0"/>
                 </a:solidFill>
               </a:rPr>
             </a:br>
             <a:r>
-              <a:rPr lang="en-US" sz="1050" dirty="0" err="1" smtClean="0">
+              <a:rPr lang="en-US" sz="1050" dirty="0" err="1">
                 <a:solidFill>
                   <a:srgbClr val="7030A0"/>
                 </a:solidFill>
@@ -4847,7 +5153,7 @@
           <a:p>
             <a:pPr algn="ctr"/>
             <a:r>
-              <a:rPr lang="en-US" sz="1050" dirty="0" smtClean="0">
+              <a:rPr lang="en-US" sz="1050" dirty="0">
                 <a:solidFill>
                   <a:srgbClr val="7030A0"/>
                 </a:solidFill>
@@ -4991,7 +5297,7 @@
           <a:p>
             <a:pPr algn="ctr"/>
             <a:r>
-              <a:rPr lang="en-US" sz="1050" dirty="0" smtClean="0">
+              <a:rPr lang="en-US" sz="1050" dirty="0">
                 <a:solidFill>
                   <a:srgbClr val="7030A0"/>
                 </a:solidFill>
@@ -5088,7 +5394,7 @@
           <a:p>
             <a:pPr algn="ctr"/>
             <a:r>
-              <a:rPr lang="en-US" sz="1050" dirty="0" smtClean="0">
+              <a:rPr lang="en-US" sz="1050" dirty="0">
                 <a:solidFill>
                   <a:srgbClr val="7030A0"/>
                 </a:solidFill>
@@ -5185,7 +5491,7 @@
           <a:p>
             <a:pPr algn="ctr"/>
             <a:r>
-              <a:rPr lang="en-US" sz="1050" dirty="0" smtClean="0">
+              <a:rPr lang="en-US" sz="1050" dirty="0">
                 <a:solidFill>
                   <a:srgbClr val="7030A0"/>
                 </a:solidFill>
@@ -5204,6 +5510,7 @@
         <p:nvCxnSpPr>
           <p:cNvPr id="86" name="Elbow Connector 85"/>
           <p:cNvCxnSpPr>
+            <a:cxnSpLocks/>
             <a:stCxn id="78" idx="3"/>
             <a:endCxn id="85" idx="1"/>
           </p:cNvCxnSpPr>
@@ -5373,7 +5680,7 @@
           <a:p>
             <a:pPr algn="ctr"/>
             <a:r>
-              <a:rPr lang="en-US" sz="1050" dirty="0" smtClean="0">
+              <a:rPr lang="en-US" sz="1050" dirty="0">
                 <a:solidFill>
                   <a:srgbClr val="7030A0"/>
                 </a:solidFill>
@@ -5381,14 +5688,14 @@
               <a:t>&lt;&lt;interface&gt;&gt;</a:t>
             </a:r>
             <a:br>
-              <a:rPr lang="en-US" sz="1050" dirty="0" smtClean="0">
+              <a:rPr lang="en-US" sz="1050" dirty="0">
                 <a:solidFill>
                   <a:srgbClr val="7030A0"/>
                 </a:solidFill>
               </a:rPr>
             </a:br>
             <a:r>
-              <a:rPr lang="en-US" sz="1050" dirty="0" err="1" smtClean="0">
+              <a:rPr lang="en-US" sz="1050" dirty="0" err="1">
                 <a:solidFill>
                   <a:srgbClr val="7030A0"/>
                 </a:solidFill>
@@ -5411,7 +5718,7 @@
         </p:nvSpPr>
         <p:spPr>
           <a:xfrm rot="16200000">
-            <a:off x="6527512" y="3586305"/>
+            <a:off x="6704213" y="2289554"/>
             <a:ext cx="881018" cy="261610"/>
           </a:xfrm>
           <a:prstGeom prst="rect">
@@ -5427,7 +5734,7 @@
           <a:p>
             <a:pPr algn="r"/>
             <a:r>
-              <a:rPr lang="en-US" sz="1100" dirty="0" smtClean="0">
+              <a:rPr lang="en-US" sz="1100" dirty="0">
                 <a:solidFill>
                   <a:srgbClr val="7030A0"/>
                 </a:solidFill>
@@ -5450,7 +5757,7 @@
         </p:nvSpPr>
         <p:spPr>
           <a:xfrm>
-            <a:off x="2057401" y="4239491"/>
+            <a:off x="1831937" y="5193793"/>
             <a:ext cx="1066800" cy="346760"/>
           </a:xfrm>
           <a:prstGeom prst="rect">
@@ -5483,30 +5790,22 @@
           <a:p>
             <a:pPr algn="ctr"/>
             <a:r>
-              <a:rPr lang="en-US" sz="1050" dirty="0" smtClean="0">
+              <a:rPr lang="en-US" sz="1050" dirty="0">
                 <a:solidFill>
                   <a:srgbClr val="7030A0"/>
                 </a:solidFill>
               </a:rPr>
               <a:t>&lt;&lt;interface&gt;&gt;</a:t>
             </a:r>
-            <a:r>
-              <a:rPr lang="en-US" sz="1050">
-                <a:solidFill>
-                  <a:srgbClr val="7030A0"/>
-                </a:solidFill>
-              </a:rPr>
-              <a:t/>
-            </a:r>
             <a:br>
-              <a:rPr lang="en-US" sz="1050">
+              <a:rPr lang="en-US" sz="1050" dirty="0">
                 <a:solidFill>
                   <a:srgbClr val="7030A0"/>
                 </a:solidFill>
               </a:rPr>
             </a:br>
             <a:r>
-              <a:rPr lang="en-US" sz="1050" dirty="0" err="1" smtClean="0">
+              <a:rPr lang="en-US" sz="1050" dirty="0" err="1">
                 <a:solidFill>
                   <a:srgbClr val="7030A0"/>
                 </a:solidFill>
@@ -5532,8 +5831,8 @@
         </p:nvCxnSpPr>
         <p:spPr>
           <a:xfrm rot="16200000" flipH="1">
-            <a:off x="1364475" y="3719944"/>
-            <a:ext cx="831471" cy="554381"/>
+            <a:off x="774592" y="4309827"/>
+            <a:ext cx="1785773" cy="328917"/>
           </a:xfrm>
           <a:prstGeom prst="bentConnector2">
             <a:avLst/>
@@ -5628,7 +5927,7 @@
           <a:p>
             <a:pPr algn="ctr"/>
             <a:r>
-              <a:rPr lang="en-US" sz="1100" dirty="0" smtClean="0">
+              <a:rPr lang="en-US" sz="1100" dirty="0">
                 <a:solidFill>
                   <a:srgbClr val="7030A0"/>
                 </a:solidFill>
@@ -5667,7 +5966,7 @@
           <a:p>
             <a:pPr algn="ctr"/>
             <a:r>
-              <a:rPr lang="en-US" sz="1100" dirty="0" smtClean="0">
+              <a:rPr lang="en-US" sz="1100" dirty="0">
                 <a:solidFill>
                   <a:srgbClr val="7030A0"/>
                 </a:solidFill>
@@ -5706,7 +6005,7 @@
           <a:p>
             <a:pPr algn="ctr"/>
             <a:r>
-              <a:rPr lang="en-US" sz="1100" dirty="0" smtClean="0">
+              <a:rPr lang="en-US" sz="1100" dirty="0">
                 <a:solidFill>
                   <a:srgbClr val="7030A0"/>
                 </a:solidFill>
@@ -5745,7 +6044,7 @@
           <a:p>
             <a:pPr algn="ctr"/>
             <a:r>
-              <a:rPr lang="en-US" sz="1100" dirty="0" smtClean="0">
+              <a:rPr lang="en-US" sz="1100" dirty="0">
                 <a:solidFill>
                   <a:srgbClr val="7030A0"/>
                 </a:solidFill>
@@ -5784,7 +6083,7 @@
           <a:p>
             <a:pPr algn="ctr"/>
             <a:r>
-              <a:rPr lang="en-US" sz="1100" dirty="0" smtClean="0">
+              <a:rPr lang="en-US" sz="1100" dirty="0">
                 <a:solidFill>
                   <a:srgbClr val="7030A0"/>
                 </a:solidFill>
@@ -5823,7 +6122,7 @@
           <a:p>
             <a:pPr algn="ctr"/>
             <a:r>
-              <a:rPr lang="en-US" sz="1100" dirty="0" smtClean="0">
+              <a:rPr lang="en-US" sz="1100" dirty="0">
                 <a:solidFill>
                   <a:srgbClr val="7030A0"/>
                 </a:solidFill>
@@ -5862,7 +6161,7 @@
           <a:p>
             <a:pPr algn="ctr"/>
             <a:r>
-              <a:rPr lang="en-US" sz="1100" dirty="0" smtClean="0">
+              <a:rPr lang="en-US" sz="1100" dirty="0">
                 <a:solidFill>
                   <a:srgbClr val="7030A0"/>
                 </a:solidFill>
@@ -5901,12 +6200,1294 @@
           <a:p>
             <a:pPr algn="ctr"/>
             <a:r>
-              <a:rPr lang="en-US" sz="1100" dirty="0" smtClean="0">
+              <a:rPr lang="en-US" sz="1100" dirty="0">
                 <a:solidFill>
                   <a:srgbClr val="7030A0"/>
                 </a:solidFill>
               </a:rPr>
               <a:t>1</a:t>
+            </a:r>
+            <a:endParaRPr lang="en-SG" sz="1100" dirty="0">
+              <a:solidFill>
+                <a:srgbClr val="7030A0"/>
+              </a:solidFill>
+            </a:endParaRPr>
+          </a:p>
+        </p:txBody>
+      </p:sp>
+      <p:sp>
+        <p:nvSpPr>
+          <p:cNvPr id="91" name="Rectangle 8">
+            <a:extLst>
+              <a:ext uri="{FF2B5EF4-FFF2-40B4-BE49-F238E27FC236}">
+                <a16:creationId xmlns:a16="http://schemas.microsoft.com/office/drawing/2014/main" id="{8E8BBD44-D630-4B89-9386-988758B086FF}"/>
+              </a:ext>
+            </a:extLst>
+          </p:cNvPr>
+          <p:cNvSpPr/>
+          <p:nvPr/>
+        </p:nvSpPr>
+        <p:spPr>
+          <a:xfrm>
+            <a:off x="4487670" y="4073918"/>
+            <a:ext cx="1332135" cy="346760"/>
+          </a:xfrm>
+          <a:prstGeom prst="rect">
+            <a:avLst/>
+          </a:prstGeom>
+          <a:ln w="19050">
+            <a:solidFill>
+              <a:srgbClr val="7030A0"/>
+            </a:solidFill>
+          </a:ln>
+          <a:effectLst/>
+        </p:spPr>
+        <p:style>
+          <a:lnRef idx="1">
+            <a:schemeClr val="accent4"/>
+          </a:lnRef>
+          <a:fillRef idx="2">
+            <a:schemeClr val="accent4"/>
+          </a:fillRef>
+          <a:effectRef idx="1">
+            <a:schemeClr val="accent4"/>
+          </a:effectRef>
+          <a:fontRef idx="minor">
+            <a:schemeClr val="dk1"/>
+          </a:fontRef>
+        </p:style>
+        <p:txBody>
+          <a:bodyPr rtlCol="0" anchor="ctr"/>
+          <a:lstStyle/>
+          <a:p>
+            <a:pPr algn="ctr"/>
+            <a:r>
+              <a:rPr lang="en-US" sz="1050" dirty="0" err="1">
+                <a:solidFill>
+                  <a:srgbClr val="7030A0"/>
+                </a:solidFill>
+              </a:rPr>
+              <a:t>UniqueMeetingList</a:t>
+            </a:r>
+            <a:endParaRPr lang="en-SG" sz="1050" dirty="0">
+              <a:solidFill>
+                <a:srgbClr val="7030A0"/>
+              </a:solidFill>
+            </a:endParaRPr>
+          </a:p>
+        </p:txBody>
+      </p:sp>
+      <p:cxnSp>
+        <p:nvCxnSpPr>
+          <p:cNvPr id="92" name="Elbow Connector 29">
+            <a:extLst>
+              <a:ext uri="{FF2B5EF4-FFF2-40B4-BE49-F238E27FC236}">
+                <a16:creationId xmlns:a16="http://schemas.microsoft.com/office/drawing/2014/main" id="{EA4BC819-D628-483A-81C9-31A78D172342}"/>
+              </a:ext>
+            </a:extLst>
+          </p:cNvPr>
+          <p:cNvCxnSpPr>
+            <a:cxnSpLocks/>
+            <a:endCxn id="91" idx="1"/>
+          </p:cNvCxnSpPr>
+          <p:nvPr/>
+        </p:nvCxnSpPr>
+        <p:spPr>
+          <a:xfrm rot="16200000" flipH="1">
+            <a:off x="3797826" y="3557454"/>
+            <a:ext cx="1226548" cy="153139"/>
+          </a:xfrm>
+          <a:prstGeom prst="bentConnector2">
+            <a:avLst/>
+          </a:prstGeom>
+          <a:ln w="19050">
+            <a:solidFill>
+              <a:srgbClr val="7030A0"/>
+            </a:solidFill>
+            <a:headEnd type="none" w="med" len="med"/>
+            <a:tailEnd type="arrow" w="med" len="med"/>
+          </a:ln>
+          <a:effectLst/>
+        </p:spPr>
+        <p:style>
+          <a:lnRef idx="1">
+            <a:schemeClr val="accent2"/>
+          </a:lnRef>
+          <a:fillRef idx="2">
+            <a:schemeClr val="accent2"/>
+          </a:fillRef>
+          <a:effectRef idx="1">
+            <a:schemeClr val="accent2"/>
+          </a:effectRef>
+          <a:fontRef idx="minor">
+            <a:schemeClr val="dk1"/>
+          </a:fontRef>
+        </p:style>
+      </p:cxnSp>
+      <p:sp>
+        <p:nvSpPr>
+          <p:cNvPr id="95" name="TextBox 94">
+            <a:extLst>
+              <a:ext uri="{FF2B5EF4-FFF2-40B4-BE49-F238E27FC236}">
+                <a16:creationId xmlns:a16="http://schemas.microsoft.com/office/drawing/2014/main" id="{0725ED48-A486-40C9-AA29-2E0F7CC1CFBC}"/>
+              </a:ext>
+            </a:extLst>
+          </p:cNvPr>
+          <p:cNvSpPr txBox="1"/>
+          <p:nvPr/>
+        </p:nvSpPr>
+        <p:spPr>
+          <a:xfrm>
+            <a:off x="4320140" y="4041381"/>
+            <a:ext cx="189257" cy="178683"/>
+          </a:xfrm>
+          <a:prstGeom prst="rect">
+            <a:avLst/>
+          </a:prstGeom>
+          <a:noFill/>
+        </p:spPr>
+        <p:txBody>
+          <a:bodyPr wrap="square" lIns="0" tIns="0" rIns="0" bIns="0" rtlCol="0">
+            <a:noAutofit/>
+          </a:bodyPr>
+          <a:lstStyle/>
+          <a:p>
+            <a:pPr algn="ctr"/>
+            <a:r>
+              <a:rPr lang="en-US" sz="1100" dirty="0">
+                <a:solidFill>
+                  <a:srgbClr val="7030A0"/>
+                </a:solidFill>
+              </a:rPr>
+              <a:t>1</a:t>
+            </a:r>
+            <a:endParaRPr lang="en-SG" sz="1100" dirty="0">
+              <a:solidFill>
+                <a:srgbClr val="7030A0"/>
+              </a:solidFill>
+            </a:endParaRPr>
+          </a:p>
+        </p:txBody>
+      </p:sp>
+      <p:sp>
+        <p:nvSpPr>
+          <p:cNvPr id="96" name="Flowchart: Decision 96">
+            <a:extLst>
+              <a:ext uri="{FF2B5EF4-FFF2-40B4-BE49-F238E27FC236}">
+                <a16:creationId xmlns:a16="http://schemas.microsoft.com/office/drawing/2014/main" id="{440FA1D1-2A5E-40BC-8A1F-43B994C212DB}"/>
+              </a:ext>
+            </a:extLst>
+          </p:cNvPr>
+          <p:cNvSpPr/>
+          <p:nvPr/>
+        </p:nvSpPr>
+        <p:spPr>
+          <a:xfrm>
+            <a:off x="5819805" y="4160608"/>
+            <a:ext cx="236048" cy="173380"/>
+          </a:xfrm>
+          <a:prstGeom prst="flowChartDecision">
+            <a:avLst/>
+          </a:prstGeom>
+          <a:noFill/>
+          <a:ln w="19050">
+            <a:solidFill>
+              <a:srgbClr val="7030A0"/>
+            </a:solidFill>
+          </a:ln>
+          <a:effectLst/>
+        </p:spPr>
+        <p:style>
+          <a:lnRef idx="1">
+            <a:schemeClr val="accent6"/>
+          </a:lnRef>
+          <a:fillRef idx="2">
+            <a:schemeClr val="accent6"/>
+          </a:fillRef>
+          <a:effectRef idx="1">
+            <a:schemeClr val="accent6"/>
+          </a:effectRef>
+          <a:fontRef idx="minor">
+            <a:schemeClr val="dk1"/>
+          </a:fontRef>
+        </p:style>
+        <p:txBody>
+          <a:bodyPr rtlCol="0" anchor="ctr"/>
+          <a:lstStyle/>
+          <a:p>
+            <a:pPr algn="ctr"/>
+            <a:endParaRPr lang="en-US" sz="1050"/>
+          </a:p>
+        </p:txBody>
+      </p:sp>
+      <p:sp>
+        <p:nvSpPr>
+          <p:cNvPr id="98" name="Rectangle 8">
+            <a:extLst>
+              <a:ext uri="{FF2B5EF4-FFF2-40B4-BE49-F238E27FC236}">
+                <a16:creationId xmlns:a16="http://schemas.microsoft.com/office/drawing/2014/main" id="{DE9DE798-5701-4726-AFE1-672B85B5B669}"/>
+              </a:ext>
+            </a:extLst>
+          </p:cNvPr>
+          <p:cNvSpPr/>
+          <p:nvPr/>
+        </p:nvSpPr>
+        <p:spPr>
+          <a:xfrm>
+            <a:off x="5447020" y="4812515"/>
+            <a:ext cx="708186" cy="346760"/>
+          </a:xfrm>
+          <a:prstGeom prst="rect">
+            <a:avLst/>
+          </a:prstGeom>
+          <a:ln w="19050">
+            <a:solidFill>
+              <a:srgbClr val="7030A0"/>
+            </a:solidFill>
+          </a:ln>
+          <a:effectLst/>
+        </p:spPr>
+        <p:style>
+          <a:lnRef idx="1">
+            <a:schemeClr val="accent4"/>
+          </a:lnRef>
+          <a:fillRef idx="2">
+            <a:schemeClr val="accent4"/>
+          </a:fillRef>
+          <a:effectRef idx="1">
+            <a:schemeClr val="accent4"/>
+          </a:effectRef>
+          <a:fontRef idx="minor">
+            <a:schemeClr val="dk1"/>
+          </a:fontRef>
+        </p:style>
+        <p:txBody>
+          <a:bodyPr rtlCol="0" anchor="ctr"/>
+          <a:lstStyle/>
+          <a:p>
+            <a:pPr algn="ctr"/>
+            <a:r>
+              <a:rPr lang="en-US" sz="1050" dirty="0">
+                <a:solidFill>
+                  <a:srgbClr val="7030A0"/>
+                </a:solidFill>
+              </a:rPr>
+              <a:t>Meeting</a:t>
+            </a:r>
+            <a:endParaRPr lang="en-SG" sz="1050" dirty="0">
+              <a:solidFill>
+                <a:srgbClr val="7030A0"/>
+              </a:solidFill>
+            </a:endParaRPr>
+          </a:p>
+        </p:txBody>
+      </p:sp>
+      <p:cxnSp>
+        <p:nvCxnSpPr>
+          <p:cNvPr id="101" name="Elbow Connector 63">
+            <a:extLst>
+              <a:ext uri="{FF2B5EF4-FFF2-40B4-BE49-F238E27FC236}">
+                <a16:creationId xmlns:a16="http://schemas.microsoft.com/office/drawing/2014/main" id="{A2131113-E39E-4B88-8BAB-DCE55150974E}"/>
+              </a:ext>
+            </a:extLst>
+          </p:cNvPr>
+          <p:cNvCxnSpPr>
+            <a:cxnSpLocks/>
+            <a:stCxn id="96" idx="3"/>
+            <a:endCxn id="98" idx="0"/>
+          </p:cNvCxnSpPr>
+          <p:nvPr/>
+        </p:nvCxnSpPr>
+        <p:spPr>
+          <a:xfrm flipH="1">
+            <a:off x="5801113" y="4247298"/>
+            <a:ext cx="254740" cy="565217"/>
+          </a:xfrm>
+          <a:prstGeom prst="bentConnector4">
+            <a:avLst>
+              <a:gd name="adj1" fmla="val -89739"/>
+              <a:gd name="adj2" fmla="val 57669"/>
+            </a:avLst>
+          </a:prstGeom>
+          <a:ln w="19050">
+            <a:solidFill>
+              <a:srgbClr val="7030A0"/>
+            </a:solidFill>
+            <a:headEnd type="none" w="med" len="med"/>
+            <a:tailEnd type="arrow" w="med" len="med"/>
+          </a:ln>
+          <a:effectLst/>
+        </p:spPr>
+        <p:style>
+          <a:lnRef idx="1">
+            <a:schemeClr val="accent2"/>
+          </a:lnRef>
+          <a:fillRef idx="2">
+            <a:schemeClr val="accent2"/>
+          </a:fillRef>
+          <a:effectRef idx="1">
+            <a:schemeClr val="accent2"/>
+          </a:effectRef>
+          <a:fontRef idx="minor">
+            <a:schemeClr val="dk1"/>
+          </a:fontRef>
+        </p:style>
+      </p:cxnSp>
+      <p:sp>
+        <p:nvSpPr>
+          <p:cNvPr id="108" name="TextBox 107">
+            <a:extLst>
+              <a:ext uri="{FF2B5EF4-FFF2-40B4-BE49-F238E27FC236}">
+                <a16:creationId xmlns:a16="http://schemas.microsoft.com/office/drawing/2014/main" id="{91C7E54C-076C-47C8-A06D-D7551CD98C4C}"/>
+              </a:ext>
+            </a:extLst>
+          </p:cNvPr>
+          <p:cNvSpPr txBox="1"/>
+          <p:nvPr/>
+        </p:nvSpPr>
+        <p:spPr>
+          <a:xfrm>
+            <a:off x="5801113" y="4693229"/>
+            <a:ext cx="189257" cy="178683"/>
+          </a:xfrm>
+          <a:prstGeom prst="rect">
+            <a:avLst/>
+          </a:prstGeom>
+          <a:noFill/>
+        </p:spPr>
+        <p:txBody>
+          <a:bodyPr wrap="square" lIns="0" tIns="0" rIns="0" bIns="0" rtlCol="0">
+            <a:noAutofit/>
+          </a:bodyPr>
+          <a:lstStyle/>
+          <a:p>
+            <a:pPr algn="ctr"/>
+            <a:r>
+              <a:rPr lang="en-US" sz="1100" dirty="0">
+                <a:solidFill>
+                  <a:srgbClr val="7030A0"/>
+                </a:solidFill>
+              </a:rPr>
+              <a:t>*</a:t>
+            </a:r>
+            <a:endParaRPr lang="en-SG" sz="1100" dirty="0">
+              <a:solidFill>
+                <a:srgbClr val="7030A0"/>
+              </a:solidFill>
+            </a:endParaRPr>
+          </a:p>
+        </p:txBody>
+      </p:sp>
+      <p:sp>
+        <p:nvSpPr>
+          <p:cNvPr id="113" name="Flowchart: Decision 96">
+            <a:extLst>
+              <a:ext uri="{FF2B5EF4-FFF2-40B4-BE49-F238E27FC236}">
+                <a16:creationId xmlns:a16="http://schemas.microsoft.com/office/drawing/2014/main" id="{9DBEF0FA-7035-4CEA-9010-9C0D944AB29F}"/>
+              </a:ext>
+            </a:extLst>
+          </p:cNvPr>
+          <p:cNvSpPr/>
+          <p:nvPr/>
+        </p:nvSpPr>
+        <p:spPr>
+          <a:xfrm>
+            <a:off x="6167202" y="4898794"/>
+            <a:ext cx="236048" cy="173380"/>
+          </a:xfrm>
+          <a:prstGeom prst="flowChartDecision">
+            <a:avLst/>
+          </a:prstGeom>
+          <a:solidFill>
+            <a:srgbClr val="7030A0"/>
+          </a:solidFill>
+          <a:ln w="19050">
+            <a:solidFill>
+              <a:srgbClr val="7030A0"/>
+            </a:solidFill>
+          </a:ln>
+          <a:effectLst/>
+        </p:spPr>
+        <p:style>
+          <a:lnRef idx="1">
+            <a:schemeClr val="accent6"/>
+          </a:lnRef>
+          <a:fillRef idx="2">
+            <a:schemeClr val="accent6"/>
+          </a:fillRef>
+          <a:effectRef idx="1">
+            <a:schemeClr val="accent6"/>
+          </a:effectRef>
+          <a:fontRef idx="minor">
+            <a:schemeClr val="dk1"/>
+          </a:fontRef>
+        </p:style>
+        <p:txBody>
+          <a:bodyPr rtlCol="0" anchor="ctr"/>
+          <a:lstStyle/>
+          <a:p>
+            <a:pPr algn="ctr"/>
+            <a:endParaRPr lang="en-US" sz="1050"/>
+          </a:p>
+        </p:txBody>
+      </p:sp>
+      <p:cxnSp>
+        <p:nvCxnSpPr>
+          <p:cNvPr id="115" name="Elbow Connector 80">
+            <a:extLst>
+              <a:ext uri="{FF2B5EF4-FFF2-40B4-BE49-F238E27FC236}">
+                <a16:creationId xmlns:a16="http://schemas.microsoft.com/office/drawing/2014/main" id="{CAE772E5-00FC-4716-8B6F-CB9E69140202}"/>
+              </a:ext>
+            </a:extLst>
+          </p:cNvPr>
+          <p:cNvCxnSpPr>
+            <a:cxnSpLocks/>
+          </p:cNvCxnSpPr>
+          <p:nvPr/>
+        </p:nvCxnSpPr>
+        <p:spPr>
+          <a:xfrm flipV="1">
+            <a:off x="6389238" y="4985484"/>
+            <a:ext cx="587809" cy="10303"/>
+          </a:xfrm>
+          <a:prstGeom prst="bentConnector3">
+            <a:avLst/>
+          </a:prstGeom>
+          <a:ln w="19050">
+            <a:solidFill>
+              <a:srgbClr val="7030A0"/>
+            </a:solidFill>
+            <a:headEnd type="none" w="med" len="med"/>
+            <a:tailEnd type="arrow" w="med" len="med"/>
+          </a:ln>
+          <a:effectLst/>
+        </p:spPr>
+        <p:style>
+          <a:lnRef idx="1">
+            <a:schemeClr val="accent2"/>
+          </a:lnRef>
+          <a:fillRef idx="2">
+            <a:schemeClr val="accent2"/>
+          </a:fillRef>
+          <a:effectRef idx="1">
+            <a:schemeClr val="accent2"/>
+          </a:effectRef>
+          <a:fontRef idx="minor">
+            <a:schemeClr val="dk1"/>
+          </a:fontRef>
+        </p:style>
+      </p:cxnSp>
+      <p:sp>
+        <p:nvSpPr>
+          <p:cNvPr id="116" name="Rectangle 8">
+            <a:extLst>
+              <a:ext uri="{FF2B5EF4-FFF2-40B4-BE49-F238E27FC236}">
+                <a16:creationId xmlns:a16="http://schemas.microsoft.com/office/drawing/2014/main" id="{A3B05D50-4A89-4061-AADE-4282DA61A1D2}"/>
+              </a:ext>
+            </a:extLst>
+          </p:cNvPr>
+          <p:cNvSpPr/>
+          <p:nvPr/>
+        </p:nvSpPr>
+        <p:spPr>
+          <a:xfrm>
+            <a:off x="6968022" y="4475968"/>
+            <a:ext cx="1023767" cy="330907"/>
+          </a:xfrm>
+          <a:prstGeom prst="rect">
+            <a:avLst/>
+          </a:prstGeom>
+          <a:ln w="19050">
+            <a:solidFill>
+              <a:srgbClr val="7030A0"/>
+            </a:solidFill>
+          </a:ln>
+          <a:effectLst/>
+        </p:spPr>
+        <p:style>
+          <a:lnRef idx="1">
+            <a:schemeClr val="accent4"/>
+          </a:lnRef>
+          <a:fillRef idx="2">
+            <a:schemeClr val="accent4"/>
+          </a:fillRef>
+          <a:effectRef idx="1">
+            <a:schemeClr val="accent4"/>
+          </a:effectRef>
+          <a:fontRef idx="minor">
+            <a:schemeClr val="dk1"/>
+          </a:fontRef>
+        </p:style>
+        <p:txBody>
+          <a:bodyPr rtlCol="0" anchor="ctr"/>
+          <a:lstStyle/>
+          <a:p>
+            <a:pPr algn="ctr"/>
+            <a:r>
+              <a:rPr lang="en-US" sz="1050" dirty="0" err="1">
+                <a:solidFill>
+                  <a:srgbClr val="7030A0"/>
+                </a:solidFill>
+              </a:rPr>
+              <a:t>NameMeeting</a:t>
+            </a:r>
+            <a:endParaRPr lang="en-SG" sz="1050" dirty="0">
+              <a:solidFill>
+                <a:srgbClr val="7030A0"/>
+              </a:solidFill>
+            </a:endParaRPr>
+          </a:p>
+        </p:txBody>
+      </p:sp>
+      <p:sp>
+        <p:nvSpPr>
+          <p:cNvPr id="117" name="Rectangle 8">
+            <a:extLst>
+              <a:ext uri="{FF2B5EF4-FFF2-40B4-BE49-F238E27FC236}">
+                <a16:creationId xmlns:a16="http://schemas.microsoft.com/office/drawing/2014/main" id="{754F5F24-91FD-4C23-A264-99C637719A3A}"/>
+              </a:ext>
+            </a:extLst>
+          </p:cNvPr>
+          <p:cNvSpPr/>
+          <p:nvPr/>
+        </p:nvSpPr>
+        <p:spPr>
+          <a:xfrm>
+            <a:off x="6968108" y="4871912"/>
+            <a:ext cx="1023681" cy="256463"/>
+          </a:xfrm>
+          <a:prstGeom prst="rect">
+            <a:avLst/>
+          </a:prstGeom>
+          <a:ln w="19050">
+            <a:solidFill>
+              <a:srgbClr val="7030A0"/>
+            </a:solidFill>
+          </a:ln>
+          <a:effectLst/>
+        </p:spPr>
+        <p:style>
+          <a:lnRef idx="1">
+            <a:schemeClr val="accent4"/>
+          </a:lnRef>
+          <a:fillRef idx="2">
+            <a:schemeClr val="accent4"/>
+          </a:fillRef>
+          <a:effectRef idx="1">
+            <a:schemeClr val="accent4"/>
+          </a:effectRef>
+          <a:fontRef idx="minor">
+            <a:schemeClr val="dk1"/>
+          </a:fontRef>
+        </p:style>
+        <p:txBody>
+          <a:bodyPr rtlCol="0" anchor="ctr"/>
+          <a:lstStyle/>
+          <a:p>
+            <a:pPr algn="ctr"/>
+            <a:r>
+              <a:rPr lang="en-US" sz="1050" dirty="0" err="1">
+                <a:solidFill>
+                  <a:srgbClr val="7030A0"/>
+                </a:solidFill>
+              </a:rPr>
+              <a:t>DateTime</a:t>
+            </a:r>
+            <a:endParaRPr lang="en-SG" sz="1050" dirty="0">
+              <a:solidFill>
+                <a:srgbClr val="7030A0"/>
+              </a:solidFill>
+            </a:endParaRPr>
+          </a:p>
+        </p:txBody>
+      </p:sp>
+      <p:sp>
+        <p:nvSpPr>
+          <p:cNvPr id="121" name="Rectangle 8">
+            <a:extLst>
+              <a:ext uri="{FF2B5EF4-FFF2-40B4-BE49-F238E27FC236}">
+                <a16:creationId xmlns:a16="http://schemas.microsoft.com/office/drawing/2014/main" id="{C12F9FE8-8E97-44EE-8A9B-3ED95F0C436E}"/>
+              </a:ext>
+            </a:extLst>
+          </p:cNvPr>
+          <p:cNvSpPr/>
+          <p:nvPr/>
+        </p:nvSpPr>
+        <p:spPr>
+          <a:xfrm>
+            <a:off x="6968022" y="5193793"/>
+            <a:ext cx="1023768" cy="291911"/>
+          </a:xfrm>
+          <a:prstGeom prst="rect">
+            <a:avLst/>
+          </a:prstGeom>
+          <a:ln w="19050">
+            <a:solidFill>
+              <a:srgbClr val="7030A0"/>
+            </a:solidFill>
+          </a:ln>
+          <a:effectLst/>
+        </p:spPr>
+        <p:style>
+          <a:lnRef idx="1">
+            <a:schemeClr val="accent4"/>
+          </a:lnRef>
+          <a:fillRef idx="2">
+            <a:schemeClr val="accent4"/>
+          </a:fillRef>
+          <a:effectRef idx="1">
+            <a:schemeClr val="accent4"/>
+          </a:effectRef>
+          <a:fontRef idx="minor">
+            <a:schemeClr val="dk1"/>
+          </a:fontRef>
+        </p:style>
+        <p:txBody>
+          <a:bodyPr rtlCol="0" anchor="ctr"/>
+          <a:lstStyle/>
+          <a:p>
+            <a:pPr algn="ctr"/>
+            <a:r>
+              <a:rPr lang="en-US" sz="1050" dirty="0" err="1">
+                <a:solidFill>
+                  <a:srgbClr val="7030A0"/>
+                </a:solidFill>
+              </a:rPr>
+              <a:t>PersonToMeet</a:t>
+            </a:r>
+            <a:endParaRPr lang="en-SG" sz="1050" dirty="0">
+              <a:solidFill>
+                <a:srgbClr val="7030A0"/>
+              </a:solidFill>
+            </a:endParaRPr>
+          </a:p>
+        </p:txBody>
+      </p:sp>
+      <p:sp>
+        <p:nvSpPr>
+          <p:cNvPr id="123" name="Rectangle 8">
+            <a:extLst>
+              <a:ext uri="{FF2B5EF4-FFF2-40B4-BE49-F238E27FC236}">
+                <a16:creationId xmlns:a16="http://schemas.microsoft.com/office/drawing/2014/main" id="{5F54B025-1BD2-4E17-85C3-AF4C278DD3AE}"/>
+              </a:ext>
+            </a:extLst>
+          </p:cNvPr>
+          <p:cNvSpPr/>
+          <p:nvPr/>
+        </p:nvSpPr>
+        <p:spPr>
+          <a:xfrm>
+            <a:off x="6968021" y="5551123"/>
+            <a:ext cx="1023767" cy="264026"/>
+          </a:xfrm>
+          <a:prstGeom prst="rect">
+            <a:avLst/>
+          </a:prstGeom>
+          <a:ln w="19050">
+            <a:solidFill>
+              <a:srgbClr val="7030A0"/>
+            </a:solidFill>
+          </a:ln>
+          <a:effectLst/>
+        </p:spPr>
+        <p:style>
+          <a:lnRef idx="1">
+            <a:schemeClr val="accent4"/>
+          </a:lnRef>
+          <a:fillRef idx="2">
+            <a:schemeClr val="accent4"/>
+          </a:fillRef>
+          <a:effectRef idx="1">
+            <a:schemeClr val="accent4"/>
+          </a:effectRef>
+          <a:fontRef idx="minor">
+            <a:schemeClr val="dk1"/>
+          </a:fontRef>
+        </p:style>
+        <p:txBody>
+          <a:bodyPr rtlCol="0" anchor="ctr"/>
+          <a:lstStyle/>
+          <a:p>
+            <a:pPr algn="ctr"/>
+            <a:r>
+              <a:rPr lang="en-US" sz="1050" dirty="0" err="1">
+                <a:solidFill>
+                  <a:srgbClr val="7030A0"/>
+                </a:solidFill>
+              </a:rPr>
+              <a:t>PhoneNum</a:t>
+            </a:r>
+            <a:endParaRPr lang="en-SG" sz="1050" dirty="0">
+              <a:solidFill>
+                <a:srgbClr val="7030A0"/>
+              </a:solidFill>
+            </a:endParaRPr>
+          </a:p>
+        </p:txBody>
+      </p:sp>
+      <p:sp>
+        <p:nvSpPr>
+          <p:cNvPr id="125" name="Rectangle 8">
+            <a:extLst>
+              <a:ext uri="{FF2B5EF4-FFF2-40B4-BE49-F238E27FC236}">
+                <a16:creationId xmlns:a16="http://schemas.microsoft.com/office/drawing/2014/main" id="{D850182C-099D-49D0-B3B7-AFD33A543BF0}"/>
+              </a:ext>
+            </a:extLst>
+          </p:cNvPr>
+          <p:cNvSpPr/>
+          <p:nvPr/>
+        </p:nvSpPr>
+        <p:spPr>
+          <a:xfrm>
+            <a:off x="6968020" y="4132010"/>
+            <a:ext cx="1023767" cy="277696"/>
+          </a:xfrm>
+          <a:prstGeom prst="rect">
+            <a:avLst/>
+          </a:prstGeom>
+          <a:ln w="19050">
+            <a:solidFill>
+              <a:srgbClr val="7030A0"/>
+            </a:solidFill>
+          </a:ln>
+          <a:effectLst/>
+        </p:spPr>
+        <p:style>
+          <a:lnRef idx="1">
+            <a:schemeClr val="accent4"/>
+          </a:lnRef>
+          <a:fillRef idx="2">
+            <a:schemeClr val="accent4"/>
+          </a:fillRef>
+          <a:effectRef idx="1">
+            <a:schemeClr val="accent4"/>
+          </a:effectRef>
+          <a:fontRef idx="minor">
+            <a:schemeClr val="dk1"/>
+          </a:fontRef>
+        </p:style>
+        <p:txBody>
+          <a:bodyPr rtlCol="0" anchor="ctr"/>
+          <a:lstStyle/>
+          <a:p>
+            <a:pPr algn="ctr"/>
+            <a:r>
+              <a:rPr lang="en-US" sz="1050" dirty="0">
+                <a:solidFill>
+                  <a:srgbClr val="7030A0"/>
+                </a:solidFill>
+              </a:rPr>
+              <a:t>Place</a:t>
+            </a:r>
+            <a:endParaRPr lang="en-SG" sz="1050" dirty="0">
+              <a:solidFill>
+                <a:srgbClr val="7030A0"/>
+              </a:solidFill>
+            </a:endParaRPr>
+          </a:p>
+        </p:txBody>
+      </p:sp>
+      <p:cxnSp>
+        <p:nvCxnSpPr>
+          <p:cNvPr id="126" name="Elbow Connector 78">
+            <a:extLst>
+              <a:ext uri="{FF2B5EF4-FFF2-40B4-BE49-F238E27FC236}">
+                <a16:creationId xmlns:a16="http://schemas.microsoft.com/office/drawing/2014/main" id="{513004CB-069E-4122-87FA-DF3261FF5B7F}"/>
+              </a:ext>
+            </a:extLst>
+          </p:cNvPr>
+          <p:cNvCxnSpPr>
+            <a:cxnSpLocks/>
+            <a:endCxn id="116" idx="1"/>
+          </p:cNvCxnSpPr>
+          <p:nvPr/>
+        </p:nvCxnSpPr>
+        <p:spPr>
+          <a:xfrm flipV="1">
+            <a:off x="6460090" y="4641422"/>
+            <a:ext cx="507932" cy="355302"/>
+          </a:xfrm>
+          <a:prstGeom prst="bentConnector3">
+            <a:avLst/>
+          </a:prstGeom>
+          <a:ln w="19050">
+            <a:solidFill>
+              <a:srgbClr val="7030A0"/>
+            </a:solidFill>
+            <a:headEnd type="none" w="med" len="med"/>
+            <a:tailEnd type="arrow" w="med" len="med"/>
+          </a:ln>
+          <a:effectLst/>
+        </p:spPr>
+        <p:style>
+          <a:lnRef idx="1">
+            <a:schemeClr val="accent2"/>
+          </a:lnRef>
+          <a:fillRef idx="2">
+            <a:schemeClr val="accent2"/>
+          </a:fillRef>
+          <a:effectRef idx="1">
+            <a:schemeClr val="accent2"/>
+          </a:effectRef>
+          <a:fontRef idx="minor">
+            <a:schemeClr val="dk1"/>
+          </a:fontRef>
+        </p:style>
+      </p:cxnSp>
+      <p:cxnSp>
+        <p:nvCxnSpPr>
+          <p:cNvPr id="127" name="Elbow Connector 78">
+            <a:extLst>
+              <a:ext uri="{FF2B5EF4-FFF2-40B4-BE49-F238E27FC236}">
+                <a16:creationId xmlns:a16="http://schemas.microsoft.com/office/drawing/2014/main" id="{FE01AEFC-675E-4652-980A-4359218253E4}"/>
+              </a:ext>
+            </a:extLst>
+          </p:cNvPr>
+          <p:cNvCxnSpPr>
+            <a:cxnSpLocks/>
+            <a:endCxn id="125" idx="1"/>
+          </p:cNvCxnSpPr>
+          <p:nvPr/>
+        </p:nvCxnSpPr>
+        <p:spPr>
+          <a:xfrm rot="5400000" flipH="1" flipV="1">
+            <a:off x="6491454" y="4487539"/>
+            <a:ext cx="693247" cy="259886"/>
+          </a:xfrm>
+          <a:prstGeom prst="bentConnector2">
+            <a:avLst/>
+          </a:prstGeom>
+          <a:ln w="19050">
+            <a:solidFill>
+              <a:srgbClr val="7030A0"/>
+            </a:solidFill>
+            <a:headEnd type="none" w="med" len="med"/>
+            <a:tailEnd type="arrow" w="med" len="med"/>
+          </a:ln>
+          <a:effectLst/>
+        </p:spPr>
+        <p:style>
+          <a:lnRef idx="1">
+            <a:schemeClr val="accent2"/>
+          </a:lnRef>
+          <a:fillRef idx="2">
+            <a:schemeClr val="accent2"/>
+          </a:fillRef>
+          <a:effectRef idx="1">
+            <a:schemeClr val="accent2"/>
+          </a:effectRef>
+          <a:fontRef idx="minor">
+            <a:schemeClr val="dk1"/>
+          </a:fontRef>
+        </p:style>
+      </p:cxnSp>
+      <p:cxnSp>
+        <p:nvCxnSpPr>
+          <p:cNvPr id="128" name="Elbow Connector 78">
+            <a:extLst>
+              <a:ext uri="{FF2B5EF4-FFF2-40B4-BE49-F238E27FC236}">
+                <a16:creationId xmlns:a16="http://schemas.microsoft.com/office/drawing/2014/main" id="{6F80AC56-CD49-4A6C-B8A8-A247BFA1F5BA}"/>
+              </a:ext>
+            </a:extLst>
+          </p:cNvPr>
+          <p:cNvCxnSpPr>
+            <a:cxnSpLocks/>
+            <a:endCxn id="121" idx="1"/>
+          </p:cNvCxnSpPr>
+          <p:nvPr/>
+        </p:nvCxnSpPr>
+        <p:spPr>
+          <a:xfrm>
+            <a:off x="6460090" y="5002688"/>
+            <a:ext cx="507932" cy="337061"/>
+          </a:xfrm>
+          <a:prstGeom prst="bentConnector3">
+            <a:avLst/>
+          </a:prstGeom>
+          <a:ln w="19050">
+            <a:solidFill>
+              <a:srgbClr val="7030A0"/>
+            </a:solidFill>
+            <a:headEnd type="none" w="med" len="med"/>
+            <a:tailEnd type="arrow" w="med" len="med"/>
+          </a:ln>
+          <a:effectLst/>
+        </p:spPr>
+        <p:style>
+          <a:lnRef idx="1">
+            <a:schemeClr val="accent2"/>
+          </a:lnRef>
+          <a:fillRef idx="2">
+            <a:schemeClr val="accent2"/>
+          </a:fillRef>
+          <a:effectRef idx="1">
+            <a:schemeClr val="accent2"/>
+          </a:effectRef>
+          <a:fontRef idx="minor">
+            <a:schemeClr val="dk1"/>
+          </a:fontRef>
+        </p:style>
+      </p:cxnSp>
+      <p:cxnSp>
+        <p:nvCxnSpPr>
+          <p:cNvPr id="129" name="Elbow Connector 78">
+            <a:extLst>
+              <a:ext uri="{FF2B5EF4-FFF2-40B4-BE49-F238E27FC236}">
+                <a16:creationId xmlns:a16="http://schemas.microsoft.com/office/drawing/2014/main" id="{79B1219F-FEFB-4CDB-A31E-951C5B5EC278}"/>
+              </a:ext>
+            </a:extLst>
+          </p:cNvPr>
+          <p:cNvCxnSpPr>
+            <a:cxnSpLocks/>
+            <a:endCxn id="123" idx="1"/>
+          </p:cNvCxnSpPr>
+          <p:nvPr/>
+        </p:nvCxnSpPr>
+        <p:spPr>
+          <a:xfrm rot="16200000" flipH="1">
+            <a:off x="6494403" y="5209517"/>
+            <a:ext cx="687349" cy="259887"/>
+          </a:xfrm>
+          <a:prstGeom prst="bentConnector2">
+            <a:avLst/>
+          </a:prstGeom>
+          <a:ln w="19050">
+            <a:solidFill>
+              <a:srgbClr val="7030A0"/>
+            </a:solidFill>
+            <a:headEnd type="none" w="med" len="med"/>
+            <a:tailEnd type="arrow" w="med" len="med"/>
+          </a:ln>
+          <a:effectLst/>
+        </p:spPr>
+        <p:style>
+          <a:lnRef idx="1">
+            <a:schemeClr val="accent2"/>
+          </a:lnRef>
+          <a:fillRef idx="2">
+            <a:schemeClr val="accent2"/>
+          </a:fillRef>
+          <a:effectRef idx="1">
+            <a:schemeClr val="accent2"/>
+          </a:effectRef>
+          <a:fontRef idx="minor">
+            <a:schemeClr val="dk1"/>
+          </a:fontRef>
+        </p:style>
+      </p:cxnSp>
+      <p:sp>
+        <p:nvSpPr>
+          <p:cNvPr id="134" name="Rectangle 8">
+            <a:extLst>
+              <a:ext uri="{FF2B5EF4-FFF2-40B4-BE49-F238E27FC236}">
+                <a16:creationId xmlns:a16="http://schemas.microsoft.com/office/drawing/2014/main" id="{F9D1F24C-D0C0-4157-80A2-1E3CDF6E2665}"/>
+              </a:ext>
+            </a:extLst>
+          </p:cNvPr>
+          <p:cNvSpPr/>
+          <p:nvPr/>
+        </p:nvSpPr>
+        <p:spPr>
+          <a:xfrm>
+            <a:off x="3882720" y="5339749"/>
+            <a:ext cx="1243660" cy="384754"/>
+          </a:xfrm>
+          <a:prstGeom prst="rect">
+            <a:avLst/>
+          </a:prstGeom>
+          <a:ln w="19050">
+            <a:solidFill>
+              <a:srgbClr val="7030A0"/>
+            </a:solidFill>
+          </a:ln>
+          <a:effectLst/>
+        </p:spPr>
+        <p:style>
+          <a:lnRef idx="1">
+            <a:schemeClr val="accent4"/>
+          </a:lnRef>
+          <a:fillRef idx="2">
+            <a:schemeClr val="accent4"/>
+          </a:fillRef>
+          <a:effectRef idx="1">
+            <a:schemeClr val="accent4"/>
+          </a:effectRef>
+          <a:fontRef idx="minor">
+            <a:schemeClr val="dk1"/>
+          </a:fontRef>
+        </p:style>
+        <p:txBody>
+          <a:bodyPr rtlCol="0" anchor="ctr"/>
+          <a:lstStyle/>
+          <a:p>
+            <a:pPr algn="ctr"/>
+            <a:r>
+              <a:rPr lang="en-US" sz="1050" dirty="0">
+                <a:solidFill>
+                  <a:srgbClr val="7030A0"/>
+                </a:solidFill>
+              </a:rPr>
+              <a:t>&lt;&lt;interface&gt;&gt;</a:t>
+            </a:r>
+            <a:br>
+              <a:rPr lang="en-US" sz="1050" dirty="0">
+                <a:solidFill>
+                  <a:srgbClr val="7030A0"/>
+                </a:solidFill>
+              </a:rPr>
+            </a:br>
+            <a:r>
+              <a:rPr lang="en-US" sz="1050" dirty="0" err="1">
+                <a:solidFill>
+                  <a:srgbClr val="7030A0"/>
+                </a:solidFill>
+              </a:rPr>
+              <a:t>ReadOnlyMeeting</a:t>
+            </a:r>
+            <a:endParaRPr lang="en-SG" sz="1050" dirty="0">
+              <a:solidFill>
+                <a:srgbClr val="7030A0"/>
+              </a:solidFill>
+            </a:endParaRPr>
+          </a:p>
+        </p:txBody>
+      </p:sp>
+      <p:sp>
+        <p:nvSpPr>
+          <p:cNvPr id="135" name="Isosceles Triangle 102">
+            <a:extLst>
+              <a:ext uri="{FF2B5EF4-FFF2-40B4-BE49-F238E27FC236}">
+                <a16:creationId xmlns:a16="http://schemas.microsoft.com/office/drawing/2014/main" id="{4E7C603F-5F84-4CF4-99E4-8E13C4DC02F4}"/>
+              </a:ext>
+            </a:extLst>
+          </p:cNvPr>
+          <p:cNvSpPr/>
+          <p:nvPr/>
+        </p:nvSpPr>
+        <p:spPr>
+          <a:xfrm rot="5400000" flipV="1">
+            <a:off x="5078890" y="5444365"/>
+            <a:ext cx="270504" cy="175523"/>
+          </a:xfrm>
+          <a:prstGeom prst="triangle">
+            <a:avLst/>
+          </a:prstGeom>
+          <a:solidFill>
+            <a:srgbClr val="7030A0"/>
+          </a:solidFill>
+          <a:ln w="19050">
+            <a:solidFill>
+              <a:srgbClr val="7030A0"/>
+            </a:solidFill>
+          </a:ln>
+          <a:effectLst/>
+        </p:spPr>
+        <p:style>
+          <a:lnRef idx="1">
+            <a:schemeClr val="accent4"/>
+          </a:lnRef>
+          <a:fillRef idx="2">
+            <a:schemeClr val="accent4"/>
+          </a:fillRef>
+          <a:effectRef idx="1">
+            <a:schemeClr val="accent4"/>
+          </a:effectRef>
+          <a:fontRef idx="minor">
+            <a:schemeClr val="dk1"/>
+          </a:fontRef>
+        </p:style>
+        <p:txBody>
+          <a:bodyPr rtlCol="0" anchor="ctr"/>
+          <a:lstStyle/>
+          <a:p>
+            <a:pPr algn="ctr"/>
+            <a:endParaRPr lang="en-SG" sz="1050" b="1">
+              <a:solidFill>
+                <a:srgbClr val="92D050"/>
+              </a:solidFill>
+            </a:endParaRPr>
+          </a:p>
+        </p:txBody>
+      </p:sp>
+      <p:cxnSp>
+        <p:nvCxnSpPr>
+          <p:cNvPr id="136" name="Elbow Connector 63">
+            <a:extLst>
+              <a:ext uri="{FF2B5EF4-FFF2-40B4-BE49-F238E27FC236}">
+                <a16:creationId xmlns:a16="http://schemas.microsoft.com/office/drawing/2014/main" id="{C8993BF3-B9CB-4299-8399-FA7A484AD012}"/>
+              </a:ext>
+            </a:extLst>
+          </p:cNvPr>
+          <p:cNvCxnSpPr>
+            <a:cxnSpLocks/>
+          </p:cNvCxnSpPr>
+          <p:nvPr/>
+        </p:nvCxnSpPr>
+        <p:spPr>
+          <a:xfrm flipV="1">
+            <a:off x="5301904" y="5159275"/>
+            <a:ext cx="794572" cy="326430"/>
+          </a:xfrm>
+          <a:prstGeom prst="bentConnector3">
+            <a:avLst>
+              <a:gd name="adj1" fmla="val 50000"/>
+            </a:avLst>
+          </a:prstGeom>
+          <a:ln w="19050">
+            <a:solidFill>
+              <a:srgbClr val="7030A0"/>
+            </a:solidFill>
+            <a:prstDash val="sysDot"/>
+            <a:headEnd type="none" w="med" len="med"/>
+            <a:tailEnd type="none" w="med" len="med"/>
+          </a:ln>
+          <a:effectLst/>
+        </p:spPr>
+        <p:style>
+          <a:lnRef idx="1">
+            <a:schemeClr val="accent2"/>
+          </a:lnRef>
+          <a:fillRef idx="2">
+            <a:schemeClr val="accent2"/>
+          </a:fillRef>
+          <a:effectRef idx="1">
+            <a:schemeClr val="accent2"/>
+          </a:effectRef>
+          <a:fontRef idx="minor">
+            <a:schemeClr val="dk1"/>
+          </a:fontRef>
+        </p:style>
+      </p:cxnSp>
+      <p:sp>
+        <p:nvSpPr>
+          <p:cNvPr id="139" name="TextBox 138">
+            <a:extLst>
+              <a:ext uri="{FF2B5EF4-FFF2-40B4-BE49-F238E27FC236}">
+                <a16:creationId xmlns:a16="http://schemas.microsoft.com/office/drawing/2014/main" id="{900AC911-64D7-4429-AF20-F50615C592FB}"/>
+              </a:ext>
+            </a:extLst>
+          </p:cNvPr>
+          <p:cNvSpPr txBox="1"/>
+          <p:nvPr/>
+        </p:nvSpPr>
+        <p:spPr>
+          <a:xfrm>
+            <a:off x="5781288" y="5139313"/>
+            <a:ext cx="189257" cy="178683"/>
+          </a:xfrm>
+          <a:prstGeom prst="rect">
+            <a:avLst/>
+          </a:prstGeom>
+          <a:noFill/>
+        </p:spPr>
+        <p:txBody>
+          <a:bodyPr wrap="square" lIns="0" tIns="0" rIns="0" bIns="0" rtlCol="0">
+            <a:noAutofit/>
+          </a:bodyPr>
+          <a:lstStyle/>
+          <a:p>
+            <a:pPr algn="ctr"/>
+            <a:r>
+              <a:rPr lang="en-US" sz="1100" dirty="0">
+                <a:solidFill>
+                  <a:srgbClr val="7030A0"/>
+                </a:solidFill>
+              </a:rPr>
+              <a:t>1</a:t>
+            </a:r>
+            <a:endParaRPr lang="en-SG" sz="1100" dirty="0">
+              <a:solidFill>
+                <a:srgbClr val="7030A0"/>
+              </a:solidFill>
+            </a:endParaRPr>
+          </a:p>
+        </p:txBody>
+      </p:sp>
+      <p:cxnSp>
+        <p:nvCxnSpPr>
+          <p:cNvPr id="140" name="Elbow Connector 106">
+            <a:extLst>
+              <a:ext uri="{FF2B5EF4-FFF2-40B4-BE49-F238E27FC236}">
+                <a16:creationId xmlns:a16="http://schemas.microsoft.com/office/drawing/2014/main" id="{EA7F2861-1555-4CF4-B21F-17B122CB7A46}"/>
+              </a:ext>
+            </a:extLst>
+          </p:cNvPr>
+          <p:cNvCxnSpPr>
+            <a:cxnSpLocks/>
+            <a:stCxn id="9" idx="1"/>
+            <a:endCxn id="98" idx="1"/>
+          </p:cNvCxnSpPr>
+          <p:nvPr/>
+        </p:nvCxnSpPr>
+        <p:spPr>
+          <a:xfrm rot="16200000" flipH="1">
+            <a:off x="3140395" y="2679270"/>
+            <a:ext cx="1397010" cy="3216239"/>
+          </a:xfrm>
+          <a:prstGeom prst="bentConnector2">
+            <a:avLst/>
+          </a:prstGeom>
+          <a:ln w="19050">
+            <a:solidFill>
+              <a:srgbClr val="7030A0"/>
+            </a:solidFill>
+            <a:prstDash val="solid"/>
+            <a:headEnd type="none" w="med" len="med"/>
+            <a:tailEnd type="arrow" w="med" len="med"/>
+          </a:ln>
+          <a:effectLst/>
+        </p:spPr>
+        <p:style>
+          <a:lnRef idx="1">
+            <a:schemeClr val="accent2"/>
+          </a:lnRef>
+          <a:fillRef idx="2">
+            <a:schemeClr val="accent2"/>
+          </a:fillRef>
+          <a:effectRef idx="1">
+            <a:schemeClr val="accent2"/>
+          </a:effectRef>
+          <a:fontRef idx="minor">
+            <a:schemeClr val="dk1"/>
+          </a:fontRef>
+        </p:style>
+      </p:cxnSp>
+      <p:sp>
+        <p:nvSpPr>
+          <p:cNvPr id="143" name="TextBox 142">
+            <a:extLst>
+              <a:ext uri="{FF2B5EF4-FFF2-40B4-BE49-F238E27FC236}">
+                <a16:creationId xmlns:a16="http://schemas.microsoft.com/office/drawing/2014/main" id="{16458549-5108-46D1-BE05-4DB64D1FADEF}"/>
+              </a:ext>
+            </a:extLst>
+          </p:cNvPr>
+          <p:cNvSpPr txBox="1"/>
+          <p:nvPr/>
+        </p:nvSpPr>
+        <p:spPr>
+          <a:xfrm>
+            <a:off x="4440071" y="4972893"/>
+            <a:ext cx="881018" cy="261610"/>
+          </a:xfrm>
+          <a:prstGeom prst="rect">
+            <a:avLst/>
+          </a:prstGeom>
+          <a:noFill/>
+        </p:spPr>
+        <p:txBody>
+          <a:bodyPr wrap="square" rtlCol="0">
+            <a:spAutoFit/>
+          </a:bodyPr>
+          <a:lstStyle/>
+          <a:p>
+            <a:pPr algn="r"/>
+            <a:r>
+              <a:rPr lang="en-US" sz="1100" dirty="0">
+                <a:solidFill>
+                  <a:srgbClr val="7030A0"/>
+                </a:solidFill>
+              </a:rPr>
+              <a:t>filtered list</a:t>
             </a:r>
             <a:endParaRPr lang="en-SG" sz="1100" dirty="0">
               <a:solidFill>
@@ -5926,13 +7507,6 @@
   <p:clrMapOvr>
     <a:masterClrMapping/>
   </p:clrMapOvr>
-  <p:timing>
-    <p:tnLst>
-      <p:par>
-        <p:cTn id="1" dur="indefinite" restart="never" nodeType="tmRoot"/>
-      </p:par>
-    </p:tnLst>
-  </p:timing>
 </p:sld>
 </file>
 

</xml_diff>

<commit_message>
Small changes in ModelClassDiagram
</commit_message>
<xml_diff>
--- a/docs/diagrams/ModelComponentClassDiagram.pptx
+++ b/docs/diagrams/ModelComponentClassDiagram.pptx
@@ -212,7 +212,7 @@
           <a:p>
             <a:fld id="{F5CC4B3F-88C1-4FFA-B1B6-F41C21DC6924}" type="datetimeFigureOut">
               <a:rPr lang="en-US" smtClean="0"/>
-              <a:t>10/20/2017</a:t>
+              <a:t>10/21/2017</a:t>
             </a:fld>
             <a:endParaRPr lang="en-US"/>
           </a:p>
@@ -658,7 +658,7 @@
           <a:p>
             <a:fld id="{78C97017-6FC3-485B-9764-EAC9E56C1D49}" type="datetimeFigureOut">
               <a:rPr lang="en-US" smtClean="0"/>
-              <a:t>10/20/2017</a:t>
+              <a:t>10/21/2017</a:t>
             </a:fld>
             <a:endParaRPr lang="en-US"/>
           </a:p>
@@ -826,7 +826,7 @@
           <a:p>
             <a:fld id="{78C97017-6FC3-485B-9764-EAC9E56C1D49}" type="datetimeFigureOut">
               <a:rPr lang="en-US" smtClean="0"/>
-              <a:t>10/20/2017</a:t>
+              <a:t>10/21/2017</a:t>
             </a:fld>
             <a:endParaRPr lang="en-US"/>
           </a:p>
@@ -1004,7 +1004,7 @@
           <a:p>
             <a:fld id="{78C97017-6FC3-485B-9764-EAC9E56C1D49}" type="datetimeFigureOut">
               <a:rPr lang="en-US" smtClean="0"/>
-              <a:t>10/20/2017</a:t>
+              <a:t>10/21/2017</a:t>
             </a:fld>
             <a:endParaRPr lang="en-US"/>
           </a:p>
@@ -1172,7 +1172,7 @@
           <a:p>
             <a:fld id="{78C97017-6FC3-485B-9764-EAC9E56C1D49}" type="datetimeFigureOut">
               <a:rPr lang="en-US" smtClean="0"/>
-              <a:t>10/20/2017</a:t>
+              <a:t>10/21/2017</a:t>
             </a:fld>
             <a:endParaRPr lang="en-US"/>
           </a:p>
@@ -1417,7 +1417,7 @@
           <a:p>
             <a:fld id="{78C97017-6FC3-485B-9764-EAC9E56C1D49}" type="datetimeFigureOut">
               <a:rPr lang="en-US" smtClean="0"/>
-              <a:t>10/20/2017</a:t>
+              <a:t>10/21/2017</a:t>
             </a:fld>
             <a:endParaRPr lang="en-US"/>
           </a:p>
@@ -1702,7 +1702,7 @@
           <a:p>
             <a:fld id="{78C97017-6FC3-485B-9764-EAC9E56C1D49}" type="datetimeFigureOut">
               <a:rPr lang="en-US" smtClean="0"/>
-              <a:t>10/20/2017</a:t>
+              <a:t>10/21/2017</a:t>
             </a:fld>
             <a:endParaRPr lang="en-US"/>
           </a:p>
@@ -2121,7 +2121,7 @@
           <a:p>
             <a:fld id="{78C97017-6FC3-485B-9764-EAC9E56C1D49}" type="datetimeFigureOut">
               <a:rPr lang="en-US" smtClean="0"/>
-              <a:t>10/20/2017</a:t>
+              <a:t>10/21/2017</a:t>
             </a:fld>
             <a:endParaRPr lang="en-US"/>
           </a:p>
@@ -2238,7 +2238,7 @@
           <a:p>
             <a:fld id="{78C97017-6FC3-485B-9764-EAC9E56C1D49}" type="datetimeFigureOut">
               <a:rPr lang="en-US" smtClean="0"/>
-              <a:t>10/20/2017</a:t>
+              <a:t>10/21/2017</a:t>
             </a:fld>
             <a:endParaRPr lang="en-US"/>
           </a:p>
@@ -2333,7 +2333,7 @@
           <a:p>
             <a:fld id="{78C97017-6FC3-485B-9764-EAC9E56C1D49}" type="datetimeFigureOut">
               <a:rPr lang="en-US" smtClean="0"/>
-              <a:t>10/20/2017</a:t>
+              <a:t>10/21/2017</a:t>
             </a:fld>
             <a:endParaRPr lang="en-US"/>
           </a:p>
@@ -2608,7 +2608,7 @@
           <a:p>
             <a:fld id="{78C97017-6FC3-485B-9764-EAC9E56C1D49}" type="datetimeFigureOut">
               <a:rPr lang="en-US" smtClean="0"/>
-              <a:t>10/20/2017</a:t>
+              <a:t>10/21/2017</a:t>
             </a:fld>
             <a:endParaRPr lang="en-US"/>
           </a:p>
@@ -2860,7 +2860,7 @@
           <a:p>
             <a:fld id="{78C97017-6FC3-485B-9764-EAC9E56C1D49}" type="datetimeFigureOut">
               <a:rPr lang="en-US" smtClean="0"/>
-              <a:t>10/20/2017</a:t>
+              <a:t>10/21/2017</a:t>
             </a:fld>
             <a:endParaRPr lang="en-US"/>
           </a:p>
@@ -3071,7 +3071,7 @@
           <a:p>
             <a:fld id="{78C97017-6FC3-485B-9764-EAC9E56C1D49}" type="datetimeFigureOut">
               <a:rPr lang="en-US" smtClean="0"/>
-              <a:t>10/20/2017</a:t>
+              <a:t>10/21/2017</a:t>
             </a:fld>
             <a:endParaRPr lang="en-US"/>
           </a:p>
@@ -6751,99 +6751,6 @@
           </a:p>
         </p:txBody>
       </p:sp>
-      <p:cxnSp>
-        <p:nvCxnSpPr>
-          <p:cNvPr id="112" name="Straight Arrow Connector 111">
-            <a:extLst>
-              <a:ext uri="{FF2B5EF4-FFF2-40B4-BE49-F238E27FC236}">
-                <a16:creationId xmlns:a16="http://schemas.microsoft.com/office/drawing/2014/main" id="{D31A423F-0B8F-48AC-B4A7-45DD34C810EF}"/>
-              </a:ext>
-            </a:extLst>
-          </p:cNvPr>
-          <p:cNvCxnSpPr>
-            <a:cxnSpLocks/>
-            <a:stCxn id="110" idx="2"/>
-            <a:endCxn id="57" idx="0"/>
-          </p:cNvCxnSpPr>
-          <p:nvPr/>
-        </p:nvCxnSpPr>
-        <p:spPr>
-          <a:xfrm flipH="1">
-            <a:off x="4393148" y="1946757"/>
-            <a:ext cx="6763" cy="511612"/>
-          </a:xfrm>
-          <a:prstGeom prst="straightConnector1">
-            <a:avLst/>
-          </a:prstGeom>
-          <a:ln w="19050">
-            <a:solidFill>
-              <a:srgbClr val="7030A0"/>
-            </a:solidFill>
-            <a:headEnd type="none" w="med" len="med"/>
-            <a:tailEnd type="arrow" w="med" len="med"/>
-          </a:ln>
-          <a:effectLst/>
-        </p:spPr>
-        <p:style>
-          <a:lnRef idx="1">
-            <a:schemeClr val="accent2"/>
-          </a:lnRef>
-          <a:fillRef idx="2">
-            <a:schemeClr val="accent2"/>
-          </a:fillRef>
-          <a:effectRef idx="1">
-            <a:schemeClr val="accent2"/>
-          </a:effectRef>
-          <a:fontRef idx="minor">
-            <a:schemeClr val="dk1"/>
-          </a:fontRef>
-        </p:style>
-      </p:cxnSp>
-      <p:sp>
-        <p:nvSpPr>
-          <p:cNvPr id="113" name="TextBox 112">
-            <a:extLst>
-              <a:ext uri="{FF2B5EF4-FFF2-40B4-BE49-F238E27FC236}">
-                <a16:creationId xmlns:a16="http://schemas.microsoft.com/office/drawing/2014/main" id="{242930EE-43B8-447C-812B-692019FA5C21}"/>
-              </a:ext>
-            </a:extLst>
-          </p:cNvPr>
-          <p:cNvSpPr txBox="1"/>
-          <p:nvPr/>
-        </p:nvSpPr>
-        <p:spPr>
-          <a:xfrm>
-            <a:off x="4425794" y="2285836"/>
-            <a:ext cx="189257" cy="178683"/>
-          </a:xfrm>
-          <a:prstGeom prst="rect">
-            <a:avLst/>
-          </a:prstGeom>
-          <a:noFill/>
-        </p:spPr>
-        <p:txBody>
-          <a:bodyPr wrap="square" lIns="0" tIns="0" rIns="0" bIns="0" rtlCol="0">
-            <a:noAutofit/>
-          </a:bodyPr>
-          <a:lstStyle/>
-          <a:p>
-            <a:pPr algn="ctr"/>
-            <a:r>
-              <a:rPr lang="en-US" sz="1100" dirty="0">
-                <a:solidFill>
-                  <a:srgbClr val="7030A0"/>
-                </a:solidFill>
-              </a:rPr>
-              <a:t>1</a:t>
-            </a:r>
-            <a:endParaRPr lang="en-SG" sz="1100" dirty="0">
-              <a:solidFill>
-                <a:srgbClr val="7030A0"/>
-              </a:solidFill>
-            </a:endParaRPr>
-          </a:p>
-        </p:txBody>
-      </p:sp>
       <p:sp>
         <p:nvSpPr>
           <p:cNvPr id="117" name="Rectangle 8">
@@ -7357,6 +7264,152 @@
                 </a:solidFill>
               </a:rPr>
               <a:t>1</a:t>
+            </a:r>
+            <a:endParaRPr lang="en-SG" sz="1100" dirty="0">
+              <a:solidFill>
+                <a:srgbClr val="7030A0"/>
+              </a:solidFill>
+            </a:endParaRPr>
+          </a:p>
+        </p:txBody>
+      </p:sp>
+      <p:sp>
+        <p:nvSpPr>
+          <p:cNvPr id="81" name="Flowchart: Decision 96">
+            <a:extLst>
+              <a:ext uri="{FF2B5EF4-FFF2-40B4-BE49-F238E27FC236}">
+                <a16:creationId xmlns:a16="http://schemas.microsoft.com/office/drawing/2014/main" id="{B885A3C2-5B72-4DF0-A1B5-11015341022A}"/>
+              </a:ext>
+            </a:extLst>
+          </p:cNvPr>
+          <p:cNvSpPr/>
+          <p:nvPr/>
+        </p:nvSpPr>
+        <p:spPr>
+          <a:xfrm>
+            <a:off x="4280944" y="2271547"/>
+            <a:ext cx="236048" cy="173380"/>
+          </a:xfrm>
+          <a:prstGeom prst="flowChartDecision">
+            <a:avLst/>
+          </a:prstGeom>
+          <a:noFill/>
+          <a:ln w="19050">
+            <a:solidFill>
+              <a:srgbClr val="7030A0"/>
+            </a:solidFill>
+          </a:ln>
+          <a:effectLst/>
+        </p:spPr>
+        <p:style>
+          <a:lnRef idx="1">
+            <a:schemeClr val="accent6"/>
+          </a:lnRef>
+          <a:fillRef idx="2">
+            <a:schemeClr val="accent6"/>
+          </a:fillRef>
+          <a:effectRef idx="1">
+            <a:schemeClr val="accent6"/>
+          </a:effectRef>
+          <a:fontRef idx="minor">
+            <a:schemeClr val="dk1"/>
+          </a:fontRef>
+        </p:style>
+        <p:txBody>
+          <a:bodyPr rtlCol="0" anchor="ctr"/>
+          <a:lstStyle/>
+          <a:p>
+            <a:pPr algn="ctr"/>
+            <a:endParaRPr lang="en-US" sz="1050"/>
+          </a:p>
+        </p:txBody>
+      </p:sp>
+      <p:cxnSp>
+        <p:nvCxnSpPr>
+          <p:cNvPr id="98" name="Elbow Connector 63">
+            <a:extLst>
+              <a:ext uri="{FF2B5EF4-FFF2-40B4-BE49-F238E27FC236}">
+                <a16:creationId xmlns:a16="http://schemas.microsoft.com/office/drawing/2014/main" id="{AAA66104-5AE9-44A6-9370-F09351025C33}"/>
+              </a:ext>
+            </a:extLst>
+          </p:cNvPr>
+          <p:cNvCxnSpPr>
+            <a:cxnSpLocks/>
+            <a:stCxn id="81" idx="0"/>
+            <a:endCxn id="110" idx="2"/>
+          </p:cNvCxnSpPr>
+          <p:nvPr/>
+        </p:nvCxnSpPr>
+        <p:spPr>
+          <a:xfrm rot="5400000" flipH="1" flipV="1">
+            <a:off x="4237044" y="2108681"/>
+            <a:ext cx="324790" cy="943"/>
+          </a:xfrm>
+          <a:prstGeom prst="bentConnector3">
+            <a:avLst>
+              <a:gd name="adj1" fmla="val 50000"/>
+            </a:avLst>
+          </a:prstGeom>
+          <a:ln w="19050">
+            <a:solidFill>
+              <a:srgbClr val="7030A0"/>
+            </a:solidFill>
+            <a:headEnd type="none" w="med" len="med"/>
+            <a:tailEnd type="arrow" w="med" len="med"/>
+          </a:ln>
+          <a:effectLst/>
+        </p:spPr>
+        <p:style>
+          <a:lnRef idx="1">
+            <a:schemeClr val="accent2"/>
+          </a:lnRef>
+          <a:fillRef idx="2">
+            <a:schemeClr val="accent2"/>
+          </a:fillRef>
+          <a:effectRef idx="1">
+            <a:schemeClr val="accent2"/>
+          </a:effectRef>
+          <a:fontRef idx="minor">
+            <a:schemeClr val="dk1"/>
+          </a:fontRef>
+        </p:style>
+      </p:cxnSp>
+      <p:sp>
+        <p:nvSpPr>
+          <p:cNvPr id="108" name="TextBox 60">
+            <a:extLst>
+              <a:ext uri="{FF2B5EF4-FFF2-40B4-BE49-F238E27FC236}">
+                <a16:creationId xmlns:a16="http://schemas.microsoft.com/office/drawing/2014/main" id="{7CF11080-C54F-4BC5-9958-33D0B45409A0}"/>
+              </a:ext>
+            </a:extLst>
+          </p:cNvPr>
+          <p:cNvSpPr txBox="1"/>
+          <p:nvPr/>
+        </p:nvSpPr>
+        <p:spPr>
+          <a:xfrm>
+            <a:off x="4422363" y="1953782"/>
+            <a:ext cx="189257" cy="178683"/>
+          </a:xfrm>
+          <a:prstGeom prst="rect">
+            <a:avLst/>
+          </a:prstGeom>
+          <a:noFill/>
+        </p:spPr>
+        <p:txBody>
+          <a:bodyPr wrap="square" lIns="0" tIns="0" rIns="0" bIns="0" rtlCol="0">
+            <a:noAutofit/>
+          </a:bodyPr>
+          <a:lstStyle/>
+          <a:p>
+            <a:pPr algn="ctr"/>
+            <a:r>
+              <a:rPr lang="en-US" sz="1100" dirty="0">
+                <a:solidFill>
+                  <a:srgbClr val="7030A0"/>
+                </a:solidFill>
+              </a:rPr>
+              <a:t>*</a:t>
             </a:r>
             <a:endParaRPr lang="en-SG" sz="1100" dirty="0">
               <a:solidFill>

</xml_diff>

<commit_message>
add Status to ModelComponentClassDiagram
</commit_message>
<xml_diff>
--- a/docs/diagrams/ModelComponentClassDiagram.pptx
+++ b/docs/diagrams/ModelComponentClassDiagram.pptx
@@ -212,7 +212,7 @@
           <a:p>
             <a:fld id="{F5CC4B3F-88C1-4FFA-B1B6-F41C21DC6924}" type="datetimeFigureOut">
               <a:rPr lang="en-US" smtClean="0"/>
-              <a:t>10/18/2017</a:t>
+              <a:t>10/22/2017</a:t>
             </a:fld>
             <a:endParaRPr lang="en-US"/>
           </a:p>
@@ -658,7 +658,7 @@
           <a:p>
             <a:fld id="{78C97017-6FC3-485B-9764-EAC9E56C1D49}" type="datetimeFigureOut">
               <a:rPr lang="en-US" smtClean="0"/>
-              <a:t>10/18/2017</a:t>
+              <a:t>10/22/2017</a:t>
             </a:fld>
             <a:endParaRPr lang="en-US"/>
           </a:p>
@@ -826,7 +826,7 @@
           <a:p>
             <a:fld id="{78C97017-6FC3-485B-9764-EAC9E56C1D49}" type="datetimeFigureOut">
               <a:rPr lang="en-US" smtClean="0"/>
-              <a:t>10/18/2017</a:t>
+              <a:t>10/22/2017</a:t>
             </a:fld>
             <a:endParaRPr lang="en-US"/>
           </a:p>
@@ -1004,7 +1004,7 @@
           <a:p>
             <a:fld id="{78C97017-6FC3-485B-9764-EAC9E56C1D49}" type="datetimeFigureOut">
               <a:rPr lang="en-US" smtClean="0"/>
-              <a:t>10/18/2017</a:t>
+              <a:t>10/22/2017</a:t>
             </a:fld>
             <a:endParaRPr lang="en-US"/>
           </a:p>
@@ -1172,7 +1172,7 @@
           <a:p>
             <a:fld id="{78C97017-6FC3-485B-9764-EAC9E56C1D49}" type="datetimeFigureOut">
               <a:rPr lang="en-US" smtClean="0"/>
-              <a:t>10/18/2017</a:t>
+              <a:t>10/22/2017</a:t>
             </a:fld>
             <a:endParaRPr lang="en-US"/>
           </a:p>
@@ -1417,7 +1417,7 @@
           <a:p>
             <a:fld id="{78C97017-6FC3-485B-9764-EAC9E56C1D49}" type="datetimeFigureOut">
               <a:rPr lang="en-US" smtClean="0"/>
-              <a:t>10/18/2017</a:t>
+              <a:t>10/22/2017</a:t>
             </a:fld>
             <a:endParaRPr lang="en-US"/>
           </a:p>
@@ -1702,7 +1702,7 @@
           <a:p>
             <a:fld id="{78C97017-6FC3-485B-9764-EAC9E56C1D49}" type="datetimeFigureOut">
               <a:rPr lang="en-US" smtClean="0"/>
-              <a:t>10/18/2017</a:t>
+              <a:t>10/22/2017</a:t>
             </a:fld>
             <a:endParaRPr lang="en-US"/>
           </a:p>
@@ -2121,7 +2121,7 @@
           <a:p>
             <a:fld id="{78C97017-6FC3-485B-9764-EAC9E56C1D49}" type="datetimeFigureOut">
               <a:rPr lang="en-US" smtClean="0"/>
-              <a:t>10/18/2017</a:t>
+              <a:t>10/22/2017</a:t>
             </a:fld>
             <a:endParaRPr lang="en-US"/>
           </a:p>
@@ -2238,7 +2238,7 @@
           <a:p>
             <a:fld id="{78C97017-6FC3-485B-9764-EAC9E56C1D49}" type="datetimeFigureOut">
               <a:rPr lang="en-US" smtClean="0"/>
-              <a:t>10/18/2017</a:t>
+              <a:t>10/22/2017</a:t>
             </a:fld>
             <a:endParaRPr lang="en-US"/>
           </a:p>
@@ -2333,7 +2333,7 @@
           <a:p>
             <a:fld id="{78C97017-6FC3-485B-9764-EAC9E56C1D49}" type="datetimeFigureOut">
               <a:rPr lang="en-US" smtClean="0"/>
-              <a:t>10/18/2017</a:t>
+              <a:t>10/22/2017</a:t>
             </a:fld>
             <a:endParaRPr lang="en-US"/>
           </a:p>
@@ -2608,7 +2608,7 @@
           <a:p>
             <a:fld id="{78C97017-6FC3-485B-9764-EAC9E56C1D49}" type="datetimeFigureOut">
               <a:rPr lang="en-US" smtClean="0"/>
-              <a:t>10/18/2017</a:t>
+              <a:t>10/22/2017</a:t>
             </a:fld>
             <a:endParaRPr lang="en-US"/>
           </a:p>
@@ -2860,7 +2860,7 @@
           <a:p>
             <a:fld id="{78C97017-6FC3-485B-9764-EAC9E56C1D49}" type="datetimeFigureOut">
               <a:rPr lang="en-US" smtClean="0"/>
-              <a:t>10/18/2017</a:t>
+              <a:t>10/22/2017</a:t>
             </a:fld>
             <a:endParaRPr lang="en-US"/>
           </a:p>
@@ -3071,7 +3071,7 @@
           <a:p>
             <a:fld id="{78C97017-6FC3-485B-9764-EAC9E56C1D49}" type="datetimeFigureOut">
               <a:rPr lang="en-US" smtClean="0"/>
-              <a:t>10/18/2017</a:t>
+              <a:t>10/22/2017</a:t>
             </a:fld>
             <a:endParaRPr lang="en-US"/>
           </a:p>
@@ -6196,6 +6196,140 @@
           </a:fontRef>
         </p:style>
       </p:cxnSp>
+      <p:cxnSp>
+        <p:nvCxnSpPr>
+          <p:cNvPr id="87" name="Elbow Connector 78">
+            <a:extLst>
+              <a:ext uri="{FF2B5EF4-FFF2-40B4-BE49-F238E27FC236}">
+                <a16:creationId xmlns:a16="http://schemas.microsoft.com/office/drawing/2014/main" id="{2BA8F670-E5CF-4A08-A995-824670C7F434}"/>
+              </a:ext>
+            </a:extLst>
+          </p:cNvPr>
+          <p:cNvCxnSpPr>
+            <a:cxnSpLocks/>
+            <a:stCxn id="78" idx="3"/>
+            <a:endCxn id="89" idx="1"/>
+          </p:cNvCxnSpPr>
+          <p:nvPr/>
+        </p:nvCxnSpPr>
+        <p:spPr>
+          <a:xfrm flipV="1">
+            <a:off x="7277995" y="1996196"/>
+            <a:ext cx="416322" cy="1038695"/>
+          </a:xfrm>
+          <a:prstGeom prst="bentConnector3">
+            <a:avLst>
+              <a:gd name="adj1" fmla="val 50000"/>
+            </a:avLst>
+          </a:prstGeom>
+          <a:ln w="19050">
+            <a:solidFill>
+              <a:srgbClr val="7030A0"/>
+            </a:solidFill>
+            <a:headEnd type="none" w="med" len="med"/>
+            <a:tailEnd type="arrow" w="med" len="med"/>
+          </a:ln>
+          <a:effectLst/>
+        </p:spPr>
+        <p:style>
+          <a:lnRef idx="1">
+            <a:schemeClr val="accent2"/>
+          </a:lnRef>
+          <a:fillRef idx="2">
+            <a:schemeClr val="accent2"/>
+          </a:fillRef>
+          <a:effectRef idx="1">
+            <a:schemeClr val="accent2"/>
+          </a:effectRef>
+          <a:fontRef idx="minor">
+            <a:schemeClr val="dk1"/>
+          </a:fontRef>
+        </p:style>
+      </p:cxnSp>
+      <p:sp>
+        <p:nvSpPr>
+          <p:cNvPr id="89" name="Rectangle 8">
+            <a:extLst>
+              <a:ext uri="{FF2B5EF4-FFF2-40B4-BE49-F238E27FC236}">
+                <a16:creationId xmlns:a16="http://schemas.microsoft.com/office/drawing/2014/main" id="{0EADAC7F-803C-45EA-9860-527489099655}"/>
+              </a:ext>
+            </a:extLst>
+          </p:cNvPr>
+          <p:cNvSpPr/>
+          <p:nvPr/>
+        </p:nvSpPr>
+        <p:spPr>
+          <a:xfrm>
+            <a:off x="7694317" y="1806470"/>
+            <a:ext cx="778813" cy="379451"/>
+          </a:xfrm>
+          <a:prstGeom prst="rect">
+            <a:avLst/>
+          </a:prstGeom>
+          <a:ln w="19050">
+            <a:solidFill>
+              <a:srgbClr val="7030A0"/>
+            </a:solidFill>
+          </a:ln>
+          <a:effectLst/>
+        </p:spPr>
+        <p:style>
+          <a:lnRef idx="1">
+            <a:schemeClr val="accent4"/>
+          </a:lnRef>
+          <a:fillRef idx="2">
+            <a:schemeClr val="accent4"/>
+          </a:fillRef>
+          <a:effectRef idx="1">
+            <a:schemeClr val="accent4"/>
+          </a:effectRef>
+          <a:fontRef idx="minor">
+            <a:schemeClr val="dk1"/>
+          </a:fontRef>
+        </p:style>
+        <p:txBody>
+          <a:bodyPr rtlCol="0" anchor="ctr"/>
+          <a:lstStyle/>
+          <a:p>
+            <a:pPr algn="ctr"/>
+            <a:r>
+              <a:rPr lang="en-SG" sz="1050" dirty="0">
+                <a:solidFill>
+                  <a:srgbClr val="7030A0"/>
+                </a:solidFill>
+              </a:rPr>
+              <a:t>&lt;&lt;</a:t>
+            </a:r>
+            <a:r>
+              <a:rPr lang="en-SG" sz="1050" dirty="0" err="1">
+                <a:solidFill>
+                  <a:srgbClr val="7030A0"/>
+                </a:solidFill>
+              </a:rPr>
+              <a:t>enum</a:t>
+            </a:r>
+            <a:r>
+              <a:rPr lang="en-SG" sz="1050" dirty="0">
+                <a:solidFill>
+                  <a:srgbClr val="7030A0"/>
+                </a:solidFill>
+              </a:rPr>
+              <a:t>&gt;&gt;</a:t>
+            </a:r>
+          </a:p>
+          <a:p>
+            <a:pPr algn="ctr"/>
+            <a:r>
+              <a:rPr lang="en-SG" sz="1050" dirty="0">
+                <a:solidFill>
+                  <a:srgbClr val="7030A0"/>
+                </a:solidFill>
+              </a:rPr>
+              <a:t>Status</a:t>
+            </a:r>
+          </a:p>
+        </p:txBody>
+      </p:sp>
     </p:spTree>
     <p:extLst>
       <p:ext uri="{BB962C8B-B14F-4D97-AF65-F5344CB8AC3E}">

</xml_diff>

<commit_message>
Update ModelClassDiagram to include Note class
</commit_message>
<xml_diff>
--- a/docs/diagrams/ModelComponentClassDiagram.pptx
+++ b/docs/diagrams/ModelComponentClassDiagram.pptx
@@ -109,7 +109,7 @@
   </p:defaultTextStyle>
   <p:extLst>
     <p:ext uri="{EFAFB233-063F-42B5-8137-9DF3F51BA10A}">
-      <p15:sldGuideLst xmlns:p15="http://schemas.microsoft.com/office/powerpoint/2012/main">
+      <p15:sldGuideLst xmlns:p15="http://schemas.microsoft.com/office/powerpoint/2012/main" xmlns="">
         <p15:guide id="1" orient="horz" pos="1488">
           <p15:clr>
             <a:srgbClr val="A4A3A4"/>
@@ -208,7 +208,8 @@
           <a:p>
             <a:fld id="{F5CC4B3F-88C1-4FFA-B1B6-F41C21DC6924}" type="datetimeFigureOut">
               <a:rPr lang="en-US" smtClean="0"/>
-              <a:t>9/4/17</a:t>
+              <a:pPr/>
+              <a:t>10/22/2017</a:t>
             </a:fld>
             <a:endParaRPr lang="en-US"/>
           </a:p>
@@ -367,6 +368,7 @@
           <a:p>
             <a:fld id="{5A7AB025-77E3-4BD1-A2FD-B3183DBA47A3}" type="slidenum">
               <a:rPr lang="en-US" smtClean="0"/>
+              <a:pPr/>
               <a:t>‹#›</a:t>
             </a:fld>
             <a:endParaRPr lang="en-US"/>
@@ -376,7 +378,7 @@
     </p:spTree>
     <p:extLst>
       <p:ext uri="{BB962C8B-B14F-4D97-AF65-F5344CB8AC3E}">
-        <p14:creationId xmlns:p14="http://schemas.microsoft.com/office/powerpoint/2010/main" val="2023976206"/>
+        <p14:creationId xmlns:p14="http://schemas.microsoft.com/office/powerpoint/2010/main" xmlns="" val="2023976206"/>
       </p:ext>
     </p:extLst>
   </p:cSld>
@@ -657,7 +659,8 @@
           <a:p>
             <a:fld id="{78C97017-6FC3-485B-9764-EAC9E56C1D49}" type="datetimeFigureOut">
               <a:rPr lang="en-US" smtClean="0"/>
-              <a:t>9/4/17</a:t>
+              <a:pPr/>
+              <a:t>10/22/2017</a:t>
             </a:fld>
             <a:endParaRPr lang="en-US"/>
           </a:p>
@@ -699,6 +702,7 @@
           <a:p>
             <a:fld id="{FB34683C-161B-4520-BF45-B179E228CF2A}" type="slidenum">
               <a:rPr lang="en-US" smtClean="0"/>
+              <a:pPr/>
               <a:t>‹#›</a:t>
             </a:fld>
             <a:endParaRPr lang="en-US"/>
@@ -708,7 +712,7 @@
     </p:spTree>
     <p:extLst>
       <p:ext uri="{BB962C8B-B14F-4D97-AF65-F5344CB8AC3E}">
-        <p14:creationId xmlns:p14="http://schemas.microsoft.com/office/powerpoint/2010/main" val="3246593157"/>
+        <p14:creationId xmlns:p14="http://schemas.microsoft.com/office/powerpoint/2010/main" xmlns="" val="3246593157"/>
       </p:ext>
     </p:extLst>
   </p:cSld>
@@ -827,7 +831,8 @@
           <a:p>
             <a:fld id="{78C97017-6FC3-485B-9764-EAC9E56C1D49}" type="datetimeFigureOut">
               <a:rPr lang="en-US" smtClean="0"/>
-              <a:t>9/4/17</a:t>
+              <a:pPr/>
+              <a:t>10/22/2017</a:t>
             </a:fld>
             <a:endParaRPr lang="en-US"/>
           </a:p>
@@ -869,6 +874,7 @@
           <a:p>
             <a:fld id="{FB34683C-161B-4520-BF45-B179E228CF2A}" type="slidenum">
               <a:rPr lang="en-US" smtClean="0"/>
+              <a:pPr/>
               <a:t>‹#›</a:t>
             </a:fld>
             <a:endParaRPr lang="en-US"/>
@@ -878,7 +884,7 @@
     </p:spTree>
     <p:extLst>
       <p:ext uri="{BB962C8B-B14F-4D97-AF65-F5344CB8AC3E}">
-        <p14:creationId xmlns:p14="http://schemas.microsoft.com/office/powerpoint/2010/main" val="2707025021"/>
+        <p14:creationId xmlns:p14="http://schemas.microsoft.com/office/powerpoint/2010/main" xmlns="" val="2707025021"/>
       </p:ext>
     </p:extLst>
   </p:cSld>
@@ -1007,7 +1013,8 @@
           <a:p>
             <a:fld id="{78C97017-6FC3-485B-9764-EAC9E56C1D49}" type="datetimeFigureOut">
               <a:rPr lang="en-US" smtClean="0"/>
-              <a:t>9/4/17</a:t>
+              <a:pPr/>
+              <a:t>10/22/2017</a:t>
             </a:fld>
             <a:endParaRPr lang="en-US"/>
           </a:p>
@@ -1049,6 +1056,7 @@
           <a:p>
             <a:fld id="{FB34683C-161B-4520-BF45-B179E228CF2A}" type="slidenum">
               <a:rPr lang="en-US" smtClean="0"/>
+              <a:pPr/>
               <a:t>‹#›</a:t>
             </a:fld>
             <a:endParaRPr lang="en-US"/>
@@ -1058,7 +1066,7 @@
     </p:spTree>
     <p:extLst>
       <p:ext uri="{BB962C8B-B14F-4D97-AF65-F5344CB8AC3E}">
-        <p14:creationId xmlns:p14="http://schemas.microsoft.com/office/powerpoint/2010/main" val="568378986"/>
+        <p14:creationId xmlns:p14="http://schemas.microsoft.com/office/powerpoint/2010/main" xmlns="" val="568378986"/>
       </p:ext>
     </p:extLst>
   </p:cSld>
@@ -1177,7 +1185,8 @@
           <a:p>
             <a:fld id="{78C97017-6FC3-485B-9764-EAC9E56C1D49}" type="datetimeFigureOut">
               <a:rPr lang="en-US" smtClean="0"/>
-              <a:t>9/4/17</a:t>
+              <a:pPr/>
+              <a:t>10/22/2017</a:t>
             </a:fld>
             <a:endParaRPr lang="en-US"/>
           </a:p>
@@ -1219,6 +1228,7 @@
           <a:p>
             <a:fld id="{FB34683C-161B-4520-BF45-B179E228CF2A}" type="slidenum">
               <a:rPr lang="en-US" smtClean="0"/>
+              <a:pPr/>
               <a:t>‹#›</a:t>
             </a:fld>
             <a:endParaRPr lang="en-US"/>
@@ -1228,7 +1238,7 @@
     </p:spTree>
     <p:extLst>
       <p:ext uri="{BB962C8B-B14F-4D97-AF65-F5344CB8AC3E}">
-        <p14:creationId xmlns:p14="http://schemas.microsoft.com/office/powerpoint/2010/main" val="266658052"/>
+        <p14:creationId xmlns:p14="http://schemas.microsoft.com/office/powerpoint/2010/main" xmlns="" val="266658052"/>
       </p:ext>
     </p:extLst>
   </p:cSld>
@@ -1423,7 +1433,8 @@
           <a:p>
             <a:fld id="{78C97017-6FC3-485B-9764-EAC9E56C1D49}" type="datetimeFigureOut">
               <a:rPr lang="en-US" smtClean="0"/>
-              <a:t>9/4/17</a:t>
+              <a:pPr/>
+              <a:t>10/22/2017</a:t>
             </a:fld>
             <a:endParaRPr lang="en-US"/>
           </a:p>
@@ -1465,6 +1476,7 @@
           <a:p>
             <a:fld id="{FB34683C-161B-4520-BF45-B179E228CF2A}" type="slidenum">
               <a:rPr lang="en-US" smtClean="0"/>
+              <a:pPr/>
               <a:t>‹#›</a:t>
             </a:fld>
             <a:endParaRPr lang="en-US"/>
@@ -1474,7 +1486,7 @@
     </p:spTree>
     <p:extLst>
       <p:ext uri="{BB962C8B-B14F-4D97-AF65-F5344CB8AC3E}">
-        <p14:creationId xmlns:p14="http://schemas.microsoft.com/office/powerpoint/2010/main" val="474686344"/>
+        <p14:creationId xmlns:p14="http://schemas.microsoft.com/office/powerpoint/2010/main" xmlns="" val="474686344"/>
       </p:ext>
     </p:extLst>
   </p:cSld>
@@ -1711,7 +1723,8 @@
           <a:p>
             <a:fld id="{78C97017-6FC3-485B-9764-EAC9E56C1D49}" type="datetimeFigureOut">
               <a:rPr lang="en-US" smtClean="0"/>
-              <a:t>9/4/17</a:t>
+              <a:pPr/>
+              <a:t>10/22/2017</a:t>
             </a:fld>
             <a:endParaRPr lang="en-US"/>
           </a:p>
@@ -1753,6 +1766,7 @@
           <a:p>
             <a:fld id="{FB34683C-161B-4520-BF45-B179E228CF2A}" type="slidenum">
               <a:rPr lang="en-US" smtClean="0"/>
+              <a:pPr/>
               <a:t>‹#›</a:t>
             </a:fld>
             <a:endParaRPr lang="en-US"/>
@@ -1762,7 +1776,7 @@
     </p:spTree>
     <p:extLst>
       <p:ext uri="{BB962C8B-B14F-4D97-AF65-F5344CB8AC3E}">
-        <p14:creationId xmlns:p14="http://schemas.microsoft.com/office/powerpoint/2010/main" val="562293251"/>
+        <p14:creationId xmlns:p14="http://schemas.microsoft.com/office/powerpoint/2010/main" xmlns="" val="562293251"/>
       </p:ext>
     </p:extLst>
   </p:cSld>
@@ -2133,7 +2147,8 @@
           <a:p>
             <a:fld id="{78C97017-6FC3-485B-9764-EAC9E56C1D49}" type="datetimeFigureOut">
               <a:rPr lang="en-US" smtClean="0"/>
-              <a:t>9/4/17</a:t>
+              <a:pPr/>
+              <a:t>10/22/2017</a:t>
             </a:fld>
             <a:endParaRPr lang="en-US"/>
           </a:p>
@@ -2175,6 +2190,7 @@
           <a:p>
             <a:fld id="{FB34683C-161B-4520-BF45-B179E228CF2A}" type="slidenum">
               <a:rPr lang="en-US" smtClean="0"/>
+              <a:pPr/>
               <a:t>‹#›</a:t>
             </a:fld>
             <a:endParaRPr lang="en-US"/>
@@ -2184,7 +2200,7 @@
     </p:spTree>
     <p:extLst>
       <p:ext uri="{BB962C8B-B14F-4D97-AF65-F5344CB8AC3E}">
-        <p14:creationId xmlns:p14="http://schemas.microsoft.com/office/powerpoint/2010/main" val="1126424250"/>
+        <p14:creationId xmlns:p14="http://schemas.microsoft.com/office/powerpoint/2010/main" xmlns="" val="1126424250"/>
       </p:ext>
     </p:extLst>
   </p:cSld>
@@ -2251,7 +2267,8 @@
           <a:p>
             <a:fld id="{78C97017-6FC3-485B-9764-EAC9E56C1D49}" type="datetimeFigureOut">
               <a:rPr lang="en-US" smtClean="0"/>
-              <a:t>9/4/17</a:t>
+              <a:pPr/>
+              <a:t>10/22/2017</a:t>
             </a:fld>
             <a:endParaRPr lang="en-US"/>
           </a:p>
@@ -2293,6 +2310,7 @@
           <a:p>
             <a:fld id="{FB34683C-161B-4520-BF45-B179E228CF2A}" type="slidenum">
               <a:rPr lang="en-US" smtClean="0"/>
+              <a:pPr/>
               <a:t>‹#›</a:t>
             </a:fld>
             <a:endParaRPr lang="en-US"/>
@@ -2302,7 +2320,7 @@
     </p:spTree>
     <p:extLst>
       <p:ext uri="{BB962C8B-B14F-4D97-AF65-F5344CB8AC3E}">
-        <p14:creationId xmlns:p14="http://schemas.microsoft.com/office/powerpoint/2010/main" val="4159724230"/>
+        <p14:creationId xmlns:p14="http://schemas.microsoft.com/office/powerpoint/2010/main" xmlns="" val="4159724230"/>
       </p:ext>
     </p:extLst>
   </p:cSld>
@@ -2346,7 +2364,8 @@
           <a:p>
             <a:fld id="{78C97017-6FC3-485B-9764-EAC9E56C1D49}" type="datetimeFigureOut">
               <a:rPr lang="en-US" smtClean="0"/>
-              <a:t>9/4/17</a:t>
+              <a:pPr/>
+              <a:t>10/22/2017</a:t>
             </a:fld>
             <a:endParaRPr lang="en-US"/>
           </a:p>
@@ -2388,6 +2407,7 @@
           <a:p>
             <a:fld id="{FB34683C-161B-4520-BF45-B179E228CF2A}" type="slidenum">
               <a:rPr lang="en-US" smtClean="0"/>
+              <a:pPr/>
               <a:t>‹#›</a:t>
             </a:fld>
             <a:endParaRPr lang="en-US"/>
@@ -2397,7 +2417,7 @@
     </p:spTree>
     <p:extLst>
       <p:ext uri="{BB962C8B-B14F-4D97-AF65-F5344CB8AC3E}">
-        <p14:creationId xmlns:p14="http://schemas.microsoft.com/office/powerpoint/2010/main" val="1793928710"/>
+        <p14:creationId xmlns:p14="http://schemas.microsoft.com/office/powerpoint/2010/main" xmlns="" val="1793928710"/>
       </p:ext>
     </p:extLst>
   </p:cSld>
@@ -2623,7 +2643,8 @@
           <a:p>
             <a:fld id="{78C97017-6FC3-485B-9764-EAC9E56C1D49}" type="datetimeFigureOut">
               <a:rPr lang="en-US" smtClean="0"/>
-              <a:t>9/4/17</a:t>
+              <a:pPr/>
+              <a:t>10/22/2017</a:t>
             </a:fld>
             <a:endParaRPr lang="en-US"/>
           </a:p>
@@ -2665,6 +2686,7 @@
           <a:p>
             <a:fld id="{FB34683C-161B-4520-BF45-B179E228CF2A}" type="slidenum">
               <a:rPr lang="en-US" smtClean="0"/>
+              <a:pPr/>
               <a:t>‹#›</a:t>
             </a:fld>
             <a:endParaRPr lang="en-US"/>
@@ -2674,7 +2696,7 @@
     </p:spTree>
     <p:extLst>
       <p:ext uri="{BB962C8B-B14F-4D97-AF65-F5344CB8AC3E}">
-        <p14:creationId xmlns:p14="http://schemas.microsoft.com/office/powerpoint/2010/main" val="2076802089"/>
+        <p14:creationId xmlns:p14="http://schemas.microsoft.com/office/powerpoint/2010/main" xmlns="" val="2076802089"/>
       </p:ext>
     </p:extLst>
   </p:cSld>
@@ -2876,7 +2898,8 @@
           <a:p>
             <a:fld id="{78C97017-6FC3-485B-9764-EAC9E56C1D49}" type="datetimeFigureOut">
               <a:rPr lang="en-US" smtClean="0"/>
-              <a:t>9/4/17</a:t>
+              <a:pPr/>
+              <a:t>10/22/2017</a:t>
             </a:fld>
             <a:endParaRPr lang="en-US"/>
           </a:p>
@@ -2918,6 +2941,7 @@
           <a:p>
             <a:fld id="{FB34683C-161B-4520-BF45-B179E228CF2A}" type="slidenum">
               <a:rPr lang="en-US" smtClean="0"/>
+              <a:pPr/>
               <a:t>‹#›</a:t>
             </a:fld>
             <a:endParaRPr lang="en-US"/>
@@ -2927,7 +2951,7 @@
     </p:spTree>
     <p:extLst>
       <p:ext uri="{BB962C8B-B14F-4D97-AF65-F5344CB8AC3E}">
-        <p14:creationId xmlns:p14="http://schemas.microsoft.com/office/powerpoint/2010/main" val="201835938"/>
+        <p14:creationId xmlns:p14="http://schemas.microsoft.com/office/powerpoint/2010/main" xmlns="" val="201835938"/>
       </p:ext>
     </p:extLst>
   </p:cSld>
@@ -3089,7 +3113,8 @@
           <a:p>
             <a:fld id="{78C97017-6FC3-485B-9764-EAC9E56C1D49}" type="datetimeFigureOut">
               <a:rPr lang="en-US" smtClean="0"/>
-              <a:t>9/4/17</a:t>
+              <a:pPr/>
+              <a:t>10/22/2017</a:t>
             </a:fld>
             <a:endParaRPr lang="en-US"/>
           </a:p>
@@ -3167,6 +3192,7 @@
           <a:p>
             <a:fld id="{FB34683C-161B-4520-BF45-B179E228CF2A}" type="slidenum">
               <a:rPr lang="en-US" smtClean="0"/>
+              <a:pPr/>
               <a:t>‹#›</a:t>
             </a:fld>
             <a:endParaRPr lang="en-US"/>
@@ -3176,7 +3202,7 @@
     </p:spTree>
     <p:extLst>
       <p:ext uri="{BB962C8B-B14F-4D97-AF65-F5344CB8AC3E}">
-        <p14:creationId xmlns:p14="http://schemas.microsoft.com/office/powerpoint/2010/main" val="2341400630"/>
+        <p14:creationId xmlns:p14="http://schemas.microsoft.com/office/powerpoint/2010/main" xmlns="" val="2341400630"/>
       </p:ext>
     </p:extLst>
   </p:cSld>
@@ -5916,10 +5942,104 @@
           </a:p>
         </p:txBody>
       </p:sp>
+      <p:sp>
+        <p:nvSpPr>
+          <p:cNvPr id="55" name="Rectangle 8"/>
+          <p:cNvSpPr/>
+          <p:nvPr/>
+        </p:nvSpPr>
+        <p:spPr>
+          <a:xfrm>
+            <a:off x="7391400" y="1952625"/>
+            <a:ext cx="708186" cy="285783"/>
+          </a:xfrm>
+          <a:prstGeom prst="rect">
+            <a:avLst/>
+          </a:prstGeom>
+          <a:ln w="19050">
+            <a:solidFill>
+              <a:srgbClr val="7030A0"/>
+            </a:solidFill>
+          </a:ln>
+          <a:effectLst/>
+        </p:spPr>
+        <p:style>
+          <a:lnRef idx="1">
+            <a:schemeClr val="accent4"/>
+          </a:lnRef>
+          <a:fillRef idx="2">
+            <a:schemeClr val="accent4"/>
+          </a:fillRef>
+          <a:effectRef idx="1">
+            <a:schemeClr val="accent4"/>
+          </a:effectRef>
+          <a:fontRef idx="minor">
+            <a:schemeClr val="dk1"/>
+          </a:fontRef>
+        </p:style>
+        <p:txBody>
+          <a:bodyPr rtlCol="0" anchor="ctr"/>
+          <a:lstStyle/>
+          <a:p>
+            <a:pPr algn="ctr"/>
+            <a:r>
+              <a:rPr lang="en-US" sz="1050" dirty="0" smtClean="0">
+                <a:solidFill>
+                  <a:srgbClr val="7030A0"/>
+                </a:solidFill>
+              </a:rPr>
+              <a:t>Note</a:t>
+            </a:r>
+            <a:endParaRPr lang="en-SG" sz="1050" dirty="0">
+              <a:solidFill>
+                <a:srgbClr val="7030A0"/>
+              </a:solidFill>
+            </a:endParaRPr>
+          </a:p>
+        </p:txBody>
+      </p:sp>
+      <p:cxnSp>
+        <p:nvCxnSpPr>
+          <p:cNvPr id="73" name="Elbow Connector 49"/>
+          <p:cNvCxnSpPr/>
+          <p:nvPr/>
+        </p:nvCxnSpPr>
+        <p:spPr>
+          <a:xfrm rot="5400000" flipH="1" flipV="1">
+            <a:off x="6738946" y="2214571"/>
+            <a:ext cx="771508" cy="533400"/>
+          </a:xfrm>
+          <a:prstGeom prst="bentConnector2">
+            <a:avLst/>
+          </a:prstGeom>
+          <a:ln w="19050">
+            <a:solidFill>
+              <a:srgbClr val="7030A0"/>
+            </a:solidFill>
+            <a:headEnd type="none" w="med" len="med"/>
+            <a:tailEnd type="arrow" w="med" len="med"/>
+          </a:ln>
+          <a:effectLst/>
+        </p:spPr>
+        <p:style>
+          <a:lnRef idx="1">
+            <a:schemeClr val="accent2"/>
+          </a:lnRef>
+          <a:fillRef idx="2">
+            <a:schemeClr val="accent2"/>
+          </a:fillRef>
+          <a:effectRef idx="1">
+            <a:schemeClr val="accent2"/>
+          </a:effectRef>
+          <a:fontRef idx="minor">
+            <a:schemeClr val="dk1"/>
+          </a:fontRef>
+        </p:style>
+      </p:cxnSp>
     </p:spTree>
     <p:extLst>
       <p:ext uri="{BB962C8B-B14F-4D97-AF65-F5344CB8AC3E}">
-        <p14:creationId xmlns:p14="http://schemas.microsoft.com/office/powerpoint/2010/main" val="2396968029"/>
+        <p14:creationId xmlns:p14="http://schemas.microsoft.com/office/powerpoint/2010/main" xmlns="" val="2396968029"/>
       </p:ext>
     </p:extLst>
   </p:cSld>

</xml_diff>

<commit_message>
Made changes to Model class diagram
</commit_message>
<xml_diff>
--- a/docs/diagrams/ModelComponentClassDiagram.pptx
+++ b/docs/diagrams/ModelComponentClassDiagram.pptx
@@ -212,7 +212,7 @@
           <a:p>
             <a:fld id="{F5CC4B3F-88C1-4FFA-B1B6-F41C21DC6924}" type="datetimeFigureOut">
               <a:rPr lang="en-US" smtClean="0"/>
-              <a:t>10/22/2017</a:t>
+              <a:t>10/24/2017</a:t>
             </a:fld>
             <a:endParaRPr lang="en-US"/>
           </a:p>
@@ -658,7 +658,7 @@
           <a:p>
             <a:fld id="{78C97017-6FC3-485B-9764-EAC9E56C1D49}" type="datetimeFigureOut">
               <a:rPr lang="en-US" smtClean="0"/>
-              <a:t>10/22/2017</a:t>
+              <a:t>10/24/2017</a:t>
             </a:fld>
             <a:endParaRPr lang="en-US"/>
           </a:p>
@@ -826,7 +826,7 @@
           <a:p>
             <a:fld id="{78C97017-6FC3-485B-9764-EAC9E56C1D49}" type="datetimeFigureOut">
               <a:rPr lang="en-US" smtClean="0"/>
-              <a:t>10/22/2017</a:t>
+              <a:t>10/24/2017</a:t>
             </a:fld>
             <a:endParaRPr lang="en-US"/>
           </a:p>
@@ -1004,7 +1004,7 @@
           <a:p>
             <a:fld id="{78C97017-6FC3-485B-9764-EAC9E56C1D49}" type="datetimeFigureOut">
               <a:rPr lang="en-US" smtClean="0"/>
-              <a:t>10/22/2017</a:t>
+              <a:t>10/24/2017</a:t>
             </a:fld>
             <a:endParaRPr lang="en-US"/>
           </a:p>
@@ -1172,7 +1172,7 @@
           <a:p>
             <a:fld id="{78C97017-6FC3-485B-9764-EAC9E56C1D49}" type="datetimeFigureOut">
               <a:rPr lang="en-US" smtClean="0"/>
-              <a:t>10/22/2017</a:t>
+              <a:t>10/24/2017</a:t>
             </a:fld>
             <a:endParaRPr lang="en-US"/>
           </a:p>
@@ -1417,7 +1417,7 @@
           <a:p>
             <a:fld id="{78C97017-6FC3-485B-9764-EAC9E56C1D49}" type="datetimeFigureOut">
               <a:rPr lang="en-US" smtClean="0"/>
-              <a:t>10/22/2017</a:t>
+              <a:t>10/24/2017</a:t>
             </a:fld>
             <a:endParaRPr lang="en-US"/>
           </a:p>
@@ -1702,7 +1702,7 @@
           <a:p>
             <a:fld id="{78C97017-6FC3-485B-9764-EAC9E56C1D49}" type="datetimeFigureOut">
               <a:rPr lang="en-US" smtClean="0"/>
-              <a:t>10/22/2017</a:t>
+              <a:t>10/24/2017</a:t>
             </a:fld>
             <a:endParaRPr lang="en-US"/>
           </a:p>
@@ -2121,7 +2121,7 @@
           <a:p>
             <a:fld id="{78C97017-6FC3-485B-9764-EAC9E56C1D49}" type="datetimeFigureOut">
               <a:rPr lang="en-US" smtClean="0"/>
-              <a:t>10/22/2017</a:t>
+              <a:t>10/24/2017</a:t>
             </a:fld>
             <a:endParaRPr lang="en-US"/>
           </a:p>
@@ -2238,7 +2238,7 @@
           <a:p>
             <a:fld id="{78C97017-6FC3-485B-9764-EAC9E56C1D49}" type="datetimeFigureOut">
               <a:rPr lang="en-US" smtClean="0"/>
-              <a:t>10/22/2017</a:t>
+              <a:t>10/24/2017</a:t>
             </a:fld>
             <a:endParaRPr lang="en-US"/>
           </a:p>
@@ -2333,7 +2333,7 @@
           <a:p>
             <a:fld id="{78C97017-6FC3-485B-9764-EAC9E56C1D49}" type="datetimeFigureOut">
               <a:rPr lang="en-US" smtClean="0"/>
-              <a:t>10/22/2017</a:t>
+              <a:t>10/24/2017</a:t>
             </a:fld>
             <a:endParaRPr lang="en-US"/>
           </a:p>
@@ -2608,7 +2608,7 @@
           <a:p>
             <a:fld id="{78C97017-6FC3-485B-9764-EAC9E56C1D49}" type="datetimeFigureOut">
               <a:rPr lang="en-US" smtClean="0"/>
-              <a:t>10/22/2017</a:t>
+              <a:t>10/24/2017</a:t>
             </a:fld>
             <a:endParaRPr lang="en-US"/>
           </a:p>
@@ -2860,7 +2860,7 @@
           <a:p>
             <a:fld id="{78C97017-6FC3-485B-9764-EAC9E56C1D49}" type="datetimeFigureOut">
               <a:rPr lang="en-US" smtClean="0"/>
-              <a:t>10/22/2017</a:t>
+              <a:t>10/24/2017</a:t>
             </a:fld>
             <a:endParaRPr lang="en-US"/>
           </a:p>
@@ -3071,7 +3071,7 @@
           <a:p>
             <a:fld id="{78C97017-6FC3-485B-9764-EAC9E56C1D49}" type="datetimeFigureOut">
               <a:rPr lang="en-US" smtClean="0"/>
-              <a:t>10/22/2017</a:t>
+              <a:t>10/24/2017</a:t>
             </a:fld>
             <a:endParaRPr lang="en-US"/>
           </a:p>
@@ -3454,8 +3454,8 @@
         </p:nvSpPr>
         <p:spPr>
           <a:xfrm>
-            <a:off x="1143000" y="1738947"/>
-            <a:ext cx="7772400" cy="2997200"/>
+            <a:off x="1153489" y="1783394"/>
+            <a:ext cx="7772400" cy="3398206"/>
           </a:xfrm>
           <a:prstGeom prst="roundRect">
             <a:avLst>
@@ -5135,7 +5135,7 @@
         </p:nvSpPr>
         <p:spPr>
           <a:xfrm>
-            <a:off x="7712397" y="3533171"/>
+            <a:off x="7717357" y="3854242"/>
             <a:ext cx="708186" cy="285783"/>
           </a:xfrm>
           <a:prstGeom prst="rect">
@@ -5195,7 +5195,7 @@
         <p:spPr>
           <a:xfrm>
             <a:off x="7277995" y="3034891"/>
-            <a:ext cx="434402" cy="641172"/>
+            <a:ext cx="439362" cy="962243"/>
           </a:xfrm>
           <a:prstGeom prst="bentConnector3">
             <a:avLst/>
@@ -5905,7 +5905,7 @@
         </p:nvSpPr>
         <p:spPr>
           <a:xfrm rot="5400000">
-            <a:off x="7948466" y="3850288"/>
+            <a:off x="7969666" y="4184046"/>
             <a:ext cx="236048" cy="173380"/>
           </a:xfrm>
           <a:prstGeom prst="flowChartDecision">
@@ -5955,18 +5955,17 @@
           </p:cNvPr>
           <p:cNvCxnSpPr>
             <a:cxnSpLocks/>
+            <a:stCxn id="55" idx="3"/>
           </p:cNvCxnSpPr>
           <p:nvPr/>
         </p:nvCxnSpPr>
         <p:spPr>
-          <a:xfrm rot="5400000">
-            <a:off x="7913586" y="4101596"/>
-            <a:ext cx="318508" cy="12700"/>
-          </a:xfrm>
-          <a:prstGeom prst="bentConnector3">
-            <a:avLst>
-              <a:gd name="adj1" fmla="val 16873"/>
-            </a:avLst>
+          <a:xfrm>
+            <a:off x="8087690" y="4388760"/>
+            <a:ext cx="0" cy="335640"/>
+          </a:xfrm>
+          <a:prstGeom prst="straightConnector1">
+            <a:avLst/>
           </a:prstGeom>
           <a:ln w="19050">
             <a:solidFill>
@@ -6006,7 +6005,7 @@
         </p:nvSpPr>
         <p:spPr>
           <a:xfrm>
-            <a:off x="7672548" y="4267200"/>
+            <a:off x="7680416" y="4714018"/>
             <a:ext cx="800583" cy="285783"/>
           </a:xfrm>
           <a:prstGeom prst="rect">
@@ -6207,14 +6206,12 @@
           </p:cNvPr>
           <p:cNvCxnSpPr>
             <a:cxnSpLocks/>
-            <a:stCxn id="78" idx="3"/>
-            <a:endCxn id="89" idx="1"/>
           </p:cNvCxnSpPr>
           <p:nvPr/>
         </p:nvCxnSpPr>
         <p:spPr>
           <a:xfrm flipV="1">
-            <a:off x="7277995" y="1996196"/>
+            <a:off x="7290523" y="1996195"/>
             <a:ext cx="416322" cy="1038695"/>
           </a:xfrm>
           <a:prstGeom prst="bentConnector3">
@@ -6260,7 +6257,7 @@
         </p:nvSpPr>
         <p:spPr>
           <a:xfrm>
-            <a:off x="7694317" y="1806470"/>
+            <a:off x="7706536" y="1806468"/>
             <a:ext cx="778813" cy="379451"/>
           </a:xfrm>
           <a:prstGeom prst="rect">
@@ -6330,6 +6327,114 @@
           </a:p>
         </p:txBody>
       </p:sp>
+      <p:sp>
+        <p:nvSpPr>
+          <p:cNvPr id="96" name="Rectangle 8">
+            <a:extLst>
+              <a:ext uri="{FF2B5EF4-FFF2-40B4-BE49-F238E27FC236}">
+                <a16:creationId xmlns:a16="http://schemas.microsoft.com/office/drawing/2014/main" id="{DFDCFFCA-81F5-4E8C-A11D-936401751F30}"/>
+              </a:ext>
+            </a:extLst>
+          </p:cNvPr>
+          <p:cNvSpPr/>
+          <p:nvPr/>
+        </p:nvSpPr>
+        <p:spPr>
+          <a:xfrm>
+            <a:off x="7716330" y="3530921"/>
+            <a:ext cx="1104043" cy="285783"/>
+          </a:xfrm>
+          <a:prstGeom prst="rect">
+            <a:avLst/>
+          </a:prstGeom>
+          <a:ln w="19050">
+            <a:solidFill>
+              <a:srgbClr val="7030A0"/>
+            </a:solidFill>
+          </a:ln>
+          <a:effectLst/>
+        </p:spPr>
+        <p:style>
+          <a:lnRef idx="1">
+            <a:schemeClr val="accent4"/>
+          </a:lnRef>
+          <a:fillRef idx="2">
+            <a:schemeClr val="accent4"/>
+          </a:fillRef>
+          <a:effectRef idx="1">
+            <a:schemeClr val="accent4"/>
+          </a:effectRef>
+          <a:fontRef idx="minor">
+            <a:schemeClr val="dk1"/>
+          </a:fontRef>
+        </p:style>
+        <p:txBody>
+          <a:bodyPr rtlCol="0" anchor="ctr"/>
+          <a:lstStyle/>
+          <a:p>
+            <a:pPr algn="ctr"/>
+            <a:r>
+              <a:rPr lang="en-US" sz="1050" dirty="0" err="1">
+                <a:solidFill>
+                  <a:srgbClr val="7030A0"/>
+                </a:solidFill>
+              </a:rPr>
+              <a:t>DeliveryDate</a:t>
+            </a:r>
+            <a:endParaRPr lang="en-SG" sz="1050" dirty="0">
+              <a:solidFill>
+                <a:srgbClr val="7030A0"/>
+              </a:solidFill>
+            </a:endParaRPr>
+          </a:p>
+        </p:txBody>
+      </p:sp>
+      <p:cxnSp>
+        <p:nvCxnSpPr>
+          <p:cNvPr id="98" name="Elbow Connector 83">
+            <a:extLst>
+              <a:ext uri="{FF2B5EF4-FFF2-40B4-BE49-F238E27FC236}">
+                <a16:creationId xmlns:a16="http://schemas.microsoft.com/office/drawing/2014/main" id="{9A13F4D9-9DED-4865-8582-97016CEE4861}"/>
+              </a:ext>
+            </a:extLst>
+          </p:cNvPr>
+          <p:cNvCxnSpPr>
+            <a:cxnSpLocks/>
+          </p:cNvCxnSpPr>
+          <p:nvPr/>
+        </p:nvCxnSpPr>
+        <p:spPr>
+          <a:xfrm>
+            <a:off x="7495195" y="3675756"/>
+            <a:ext cx="217201" cy="0"/>
+          </a:xfrm>
+          <a:prstGeom prst="straightConnector1">
+            <a:avLst/>
+          </a:prstGeom>
+          <a:ln w="19050">
+            <a:solidFill>
+              <a:srgbClr val="7030A0"/>
+            </a:solidFill>
+            <a:headEnd type="none" w="med" len="med"/>
+            <a:tailEnd type="arrow" w="med" len="med"/>
+          </a:ln>
+          <a:effectLst/>
+        </p:spPr>
+        <p:style>
+          <a:lnRef idx="1">
+            <a:schemeClr val="accent2"/>
+          </a:lnRef>
+          <a:fillRef idx="2">
+            <a:schemeClr val="accent2"/>
+          </a:fillRef>
+          <a:effectRef idx="1">
+            <a:schemeClr val="accent2"/>
+          </a:effectRef>
+          <a:fontRef idx="minor">
+            <a:schemeClr val="dk1"/>
+          </a:fontRef>
+        </p:style>
+      </p:cxnSp>
     </p:spTree>
     <p:extLst>
       <p:ext uri="{BB962C8B-B14F-4D97-AF65-F5344CB8AC3E}">

</xml_diff>

<commit_message>
Added meeting field (#62)
* Added new Meeting field

* Updated model

* Updated commands

* Updated Parsers

* Updated xml

* Updated test cases

* imports

* Updated user and developer guides

* Diagram update

* White space

* newline at end of file

* Style

* Style 2

* Updated test cases
</commit_message>
<xml_diff>
--- a/docs/diagrams/ModelComponentClassDiagram.pptx
+++ b/docs/diagrams/ModelComponentClassDiagram.pptx
@@ -109,7 +109,7 @@
   </p:defaultTextStyle>
   <p:extLst>
     <p:ext uri="{EFAFB233-063F-42B5-8137-9DF3F51BA10A}">
-      <p15:sldGuideLst xmlns="" xmlns:p15="http://schemas.microsoft.com/office/powerpoint/2012/main">
+      <p15:sldGuideLst xmlns:p15="http://schemas.microsoft.com/office/powerpoint/2012/main">
         <p15:guide id="1" orient="horz" pos="1488">
           <p15:clr>
             <a:srgbClr val="A4A3A4"/>
@@ -124,6 +124,10 @@
     </p:ext>
   </p:extLst>
 </p:presentation>
+</file>
+
+<file path=ppt/revisionInfo.xml><?xml version="1.0" encoding="utf-8"?>
+<p1510:revInfo xmlns:a="http://schemas.openxmlformats.org/drawingml/2006/main" xmlns:r="http://schemas.openxmlformats.org/officeDocument/2006/relationships" xmlns:p1510="http://schemas.microsoft.com/office/powerpoint/2015/10/main"/>
 </file>
 
 <file path=ppt/notesMasters/notesMaster1.xml><?xml version="1.0" encoding="utf-8"?>
@@ -209,7 +213,7 @@
             <a:fld id="{F5CC4B3F-88C1-4FFA-B1B6-F41C21DC6924}" type="datetimeFigureOut">
               <a:rPr lang="en-US" smtClean="0"/>
               <a:pPr/>
-              <a:t>10/22/2017</a:t>
+              <a:t>10/24/2017</a:t>
             </a:fld>
             <a:endParaRPr lang="en-US"/>
           </a:p>
@@ -273,38 +277,37 @@
           <a:p>
             <a:pPr lvl="0"/>
             <a:r>
-              <a:rPr lang="en-US" smtClean="0"/>
+              <a:rPr lang="en-US"/>
               <a:t>Click to edit Master text styles</a:t>
             </a:r>
           </a:p>
           <a:p>
             <a:pPr lvl="1"/>
             <a:r>
-              <a:rPr lang="en-US" smtClean="0"/>
+              <a:rPr lang="en-US"/>
               <a:t>Second level</a:t>
             </a:r>
           </a:p>
           <a:p>
             <a:pPr lvl="2"/>
             <a:r>
-              <a:rPr lang="en-US" smtClean="0"/>
+              <a:rPr lang="en-US"/>
               <a:t>Third level</a:t>
             </a:r>
           </a:p>
           <a:p>
             <a:pPr lvl="3"/>
             <a:r>
-              <a:rPr lang="en-US" smtClean="0"/>
+              <a:rPr lang="en-US"/>
               <a:t>Fourth level</a:t>
             </a:r>
           </a:p>
           <a:p>
             <a:pPr lvl="4"/>
             <a:r>
-              <a:rPr lang="en-US" smtClean="0"/>
+              <a:rPr lang="en-US"/>
               <a:t>Fifth level</a:t>
             </a:r>
-            <a:endParaRPr lang="en-US"/>
           </a:p>
         </p:txBody>
       </p:sp>
@@ -378,7 +381,7 @@
     </p:spTree>
     <p:extLst>
       <p:ext uri="{BB962C8B-B14F-4D97-AF65-F5344CB8AC3E}">
-        <p14:creationId xmlns="" xmlns:p14="http://schemas.microsoft.com/office/powerpoint/2010/main" val="2023976206"/>
+        <p14:creationId xmlns:p14="http://schemas.microsoft.com/office/powerpoint/2010/main" val="2023976206"/>
       </p:ext>
     </p:extLst>
   </p:cSld>
@@ -516,10 +519,9 @@
           <a:lstStyle/>
           <a:p>
             <a:r>
-              <a:rPr lang="en-US" smtClean="0"/>
+              <a:rPr lang="en-US"/>
               <a:t>Click to edit Master title style</a:t>
             </a:r>
-            <a:endParaRPr lang="en-US"/>
           </a:p>
         </p:txBody>
       </p:sp>
@@ -635,10 +637,9 @@
           </a:lstStyle>
           <a:p>
             <a:r>
-              <a:rPr lang="en-US" smtClean="0"/>
+              <a:rPr lang="en-US"/>
               <a:t>Click to edit Master subtitle style</a:t>
             </a:r>
-            <a:endParaRPr lang="en-US"/>
           </a:p>
         </p:txBody>
       </p:sp>
@@ -660,7 +661,7 @@
             <a:fld id="{78C97017-6FC3-485B-9764-EAC9E56C1D49}" type="datetimeFigureOut">
               <a:rPr lang="en-US" smtClean="0"/>
               <a:pPr/>
-              <a:t>10/22/2017</a:t>
+              <a:t>10/24/2017</a:t>
             </a:fld>
             <a:endParaRPr lang="en-US"/>
           </a:p>
@@ -712,7 +713,7 @@
     </p:spTree>
     <p:extLst>
       <p:ext uri="{BB962C8B-B14F-4D97-AF65-F5344CB8AC3E}">
-        <p14:creationId xmlns="" xmlns:p14="http://schemas.microsoft.com/office/powerpoint/2010/main" val="3246593157"/>
+        <p14:creationId xmlns:p14="http://schemas.microsoft.com/office/powerpoint/2010/main" val="3246593157"/>
       </p:ext>
     </p:extLst>
   </p:cSld>
@@ -755,10 +756,9 @@
           <a:lstStyle/>
           <a:p>
             <a:r>
-              <a:rPr lang="en-US" smtClean="0"/>
+              <a:rPr lang="en-US"/>
               <a:t>Click to edit Master title style</a:t>
             </a:r>
-            <a:endParaRPr lang="en-US"/>
           </a:p>
         </p:txBody>
       </p:sp>
@@ -779,38 +779,37 @@
           <a:p>
             <a:pPr lvl="0"/>
             <a:r>
-              <a:rPr lang="en-US" smtClean="0"/>
+              <a:rPr lang="en-US"/>
               <a:t>Click to edit Master text styles</a:t>
             </a:r>
           </a:p>
           <a:p>
             <a:pPr lvl="1"/>
             <a:r>
-              <a:rPr lang="en-US" smtClean="0"/>
+              <a:rPr lang="en-US"/>
               <a:t>Second level</a:t>
             </a:r>
           </a:p>
           <a:p>
             <a:pPr lvl="2"/>
             <a:r>
-              <a:rPr lang="en-US" smtClean="0"/>
+              <a:rPr lang="en-US"/>
               <a:t>Third level</a:t>
             </a:r>
           </a:p>
           <a:p>
             <a:pPr lvl="3"/>
             <a:r>
-              <a:rPr lang="en-US" smtClean="0"/>
+              <a:rPr lang="en-US"/>
               <a:t>Fourth level</a:t>
             </a:r>
           </a:p>
           <a:p>
             <a:pPr lvl="4"/>
             <a:r>
-              <a:rPr lang="en-US" smtClean="0"/>
+              <a:rPr lang="en-US"/>
               <a:t>Fifth level</a:t>
             </a:r>
-            <a:endParaRPr lang="en-US"/>
           </a:p>
         </p:txBody>
       </p:sp>
@@ -832,7 +831,7 @@
             <a:fld id="{78C97017-6FC3-485B-9764-EAC9E56C1D49}" type="datetimeFigureOut">
               <a:rPr lang="en-US" smtClean="0"/>
               <a:pPr/>
-              <a:t>10/22/2017</a:t>
+              <a:t>10/24/2017</a:t>
             </a:fld>
             <a:endParaRPr lang="en-US"/>
           </a:p>
@@ -884,7 +883,7 @@
     </p:spTree>
     <p:extLst>
       <p:ext uri="{BB962C8B-B14F-4D97-AF65-F5344CB8AC3E}">
-        <p14:creationId xmlns="" xmlns:p14="http://schemas.microsoft.com/office/powerpoint/2010/main" val="2707025021"/>
+        <p14:creationId xmlns:p14="http://schemas.microsoft.com/office/powerpoint/2010/main" val="2707025021"/>
       </p:ext>
     </p:extLst>
   </p:cSld>
@@ -932,10 +931,9 @@
           <a:lstStyle/>
           <a:p>
             <a:r>
-              <a:rPr lang="en-US" smtClean="0"/>
+              <a:rPr lang="en-US"/>
               <a:t>Click to edit Master title style</a:t>
             </a:r>
-            <a:endParaRPr lang="en-US"/>
           </a:p>
         </p:txBody>
       </p:sp>
@@ -961,38 +959,37 @@
           <a:p>
             <a:pPr lvl="0"/>
             <a:r>
-              <a:rPr lang="en-US" smtClean="0"/>
+              <a:rPr lang="en-US"/>
               <a:t>Click to edit Master text styles</a:t>
             </a:r>
           </a:p>
           <a:p>
             <a:pPr lvl="1"/>
             <a:r>
-              <a:rPr lang="en-US" smtClean="0"/>
+              <a:rPr lang="en-US"/>
               <a:t>Second level</a:t>
             </a:r>
           </a:p>
           <a:p>
             <a:pPr lvl="2"/>
             <a:r>
-              <a:rPr lang="en-US" smtClean="0"/>
+              <a:rPr lang="en-US"/>
               <a:t>Third level</a:t>
             </a:r>
           </a:p>
           <a:p>
             <a:pPr lvl="3"/>
             <a:r>
-              <a:rPr lang="en-US" smtClean="0"/>
+              <a:rPr lang="en-US"/>
               <a:t>Fourth level</a:t>
             </a:r>
           </a:p>
           <a:p>
             <a:pPr lvl="4"/>
             <a:r>
-              <a:rPr lang="en-US" smtClean="0"/>
+              <a:rPr lang="en-US"/>
               <a:t>Fifth level</a:t>
             </a:r>
-            <a:endParaRPr lang="en-US"/>
           </a:p>
         </p:txBody>
       </p:sp>
@@ -1014,7 +1011,7 @@
             <a:fld id="{78C97017-6FC3-485B-9764-EAC9E56C1D49}" type="datetimeFigureOut">
               <a:rPr lang="en-US" smtClean="0"/>
               <a:pPr/>
-              <a:t>10/22/2017</a:t>
+              <a:t>10/24/2017</a:t>
             </a:fld>
             <a:endParaRPr lang="en-US"/>
           </a:p>
@@ -1066,7 +1063,7 @@
     </p:spTree>
     <p:extLst>
       <p:ext uri="{BB962C8B-B14F-4D97-AF65-F5344CB8AC3E}">
-        <p14:creationId xmlns="" xmlns:p14="http://schemas.microsoft.com/office/powerpoint/2010/main" val="568378986"/>
+        <p14:creationId xmlns:p14="http://schemas.microsoft.com/office/powerpoint/2010/main" val="568378986"/>
       </p:ext>
     </p:extLst>
   </p:cSld>
@@ -1109,10 +1106,9 @@
           <a:lstStyle/>
           <a:p>
             <a:r>
-              <a:rPr lang="en-US" smtClean="0"/>
+              <a:rPr lang="en-US"/>
               <a:t>Click to edit Master title style</a:t>
             </a:r>
-            <a:endParaRPr lang="en-US"/>
           </a:p>
         </p:txBody>
       </p:sp>
@@ -1133,38 +1129,37 @@
           <a:p>
             <a:pPr lvl="0"/>
             <a:r>
-              <a:rPr lang="en-US" smtClean="0"/>
+              <a:rPr lang="en-US"/>
               <a:t>Click to edit Master text styles</a:t>
             </a:r>
           </a:p>
           <a:p>
             <a:pPr lvl="1"/>
             <a:r>
-              <a:rPr lang="en-US" smtClean="0"/>
+              <a:rPr lang="en-US"/>
               <a:t>Second level</a:t>
             </a:r>
           </a:p>
           <a:p>
             <a:pPr lvl="2"/>
             <a:r>
-              <a:rPr lang="en-US" smtClean="0"/>
+              <a:rPr lang="en-US"/>
               <a:t>Third level</a:t>
             </a:r>
           </a:p>
           <a:p>
             <a:pPr lvl="3"/>
             <a:r>
-              <a:rPr lang="en-US" smtClean="0"/>
+              <a:rPr lang="en-US"/>
               <a:t>Fourth level</a:t>
             </a:r>
           </a:p>
           <a:p>
             <a:pPr lvl="4"/>
             <a:r>
-              <a:rPr lang="en-US" smtClean="0"/>
+              <a:rPr lang="en-US"/>
               <a:t>Fifth level</a:t>
             </a:r>
-            <a:endParaRPr lang="en-US"/>
           </a:p>
         </p:txBody>
       </p:sp>
@@ -1186,7 +1181,7 @@
             <a:fld id="{78C97017-6FC3-485B-9764-EAC9E56C1D49}" type="datetimeFigureOut">
               <a:rPr lang="en-US" smtClean="0"/>
               <a:pPr/>
-              <a:t>10/22/2017</a:t>
+              <a:t>10/24/2017</a:t>
             </a:fld>
             <a:endParaRPr lang="en-US"/>
           </a:p>
@@ -1238,7 +1233,7 @@
     </p:spTree>
     <p:extLst>
       <p:ext uri="{BB962C8B-B14F-4D97-AF65-F5344CB8AC3E}">
-        <p14:creationId xmlns="" xmlns:p14="http://schemas.microsoft.com/office/powerpoint/2010/main" val="266658052"/>
+        <p14:creationId xmlns:p14="http://schemas.microsoft.com/office/powerpoint/2010/main" val="266658052"/>
       </p:ext>
     </p:extLst>
   </p:cSld>
@@ -1290,10 +1285,9 @@
           </a:lstStyle>
           <a:p>
             <a:r>
-              <a:rPr lang="en-US" smtClean="0"/>
+              <a:rPr lang="en-US"/>
               <a:t>Click to edit Master title style</a:t>
             </a:r>
-            <a:endParaRPr lang="en-US"/>
           </a:p>
         </p:txBody>
       </p:sp>
@@ -1410,7 +1404,7 @@
           <a:p>
             <a:pPr lvl="0"/>
             <a:r>
-              <a:rPr lang="en-US" smtClean="0"/>
+              <a:rPr lang="en-US"/>
               <a:t>Click to edit Master text styles</a:t>
             </a:r>
           </a:p>
@@ -1434,7 +1428,7 @@
             <a:fld id="{78C97017-6FC3-485B-9764-EAC9E56C1D49}" type="datetimeFigureOut">
               <a:rPr lang="en-US" smtClean="0"/>
               <a:pPr/>
-              <a:t>10/22/2017</a:t>
+              <a:t>10/24/2017</a:t>
             </a:fld>
             <a:endParaRPr lang="en-US"/>
           </a:p>
@@ -1486,7 +1480,7 @@
     </p:spTree>
     <p:extLst>
       <p:ext uri="{BB962C8B-B14F-4D97-AF65-F5344CB8AC3E}">
-        <p14:creationId xmlns="" xmlns:p14="http://schemas.microsoft.com/office/powerpoint/2010/main" val="474686344"/>
+        <p14:creationId xmlns:p14="http://schemas.microsoft.com/office/powerpoint/2010/main" val="474686344"/>
       </p:ext>
     </p:extLst>
   </p:cSld>
@@ -1529,10 +1523,9 @@
           <a:lstStyle/>
           <a:p>
             <a:r>
-              <a:rPr lang="en-US" smtClean="0"/>
+              <a:rPr lang="en-US"/>
               <a:t>Click to edit Master title style</a:t>
             </a:r>
-            <a:endParaRPr lang="en-US"/>
           </a:p>
         </p:txBody>
       </p:sp>
@@ -1586,38 +1579,37 @@
           <a:p>
             <a:pPr lvl="0"/>
             <a:r>
-              <a:rPr lang="en-US" smtClean="0"/>
+              <a:rPr lang="en-US"/>
               <a:t>Click to edit Master text styles</a:t>
             </a:r>
           </a:p>
           <a:p>
             <a:pPr lvl="1"/>
             <a:r>
-              <a:rPr lang="en-US" smtClean="0"/>
+              <a:rPr lang="en-US"/>
               <a:t>Second level</a:t>
             </a:r>
           </a:p>
           <a:p>
             <a:pPr lvl="2"/>
             <a:r>
-              <a:rPr lang="en-US" smtClean="0"/>
+              <a:rPr lang="en-US"/>
               <a:t>Third level</a:t>
             </a:r>
           </a:p>
           <a:p>
             <a:pPr lvl="3"/>
             <a:r>
-              <a:rPr lang="en-US" smtClean="0"/>
+              <a:rPr lang="en-US"/>
               <a:t>Fourth level</a:t>
             </a:r>
           </a:p>
           <a:p>
             <a:pPr lvl="4"/>
             <a:r>
-              <a:rPr lang="en-US" smtClean="0"/>
+              <a:rPr lang="en-US"/>
               <a:t>Fifth level</a:t>
             </a:r>
-            <a:endParaRPr lang="en-US"/>
           </a:p>
         </p:txBody>
       </p:sp>
@@ -1671,38 +1663,37 @@
           <a:p>
             <a:pPr lvl="0"/>
             <a:r>
-              <a:rPr lang="en-US" smtClean="0"/>
+              <a:rPr lang="en-US"/>
               <a:t>Click to edit Master text styles</a:t>
             </a:r>
           </a:p>
           <a:p>
             <a:pPr lvl="1"/>
             <a:r>
-              <a:rPr lang="en-US" smtClean="0"/>
+              <a:rPr lang="en-US"/>
               <a:t>Second level</a:t>
             </a:r>
           </a:p>
           <a:p>
             <a:pPr lvl="2"/>
             <a:r>
-              <a:rPr lang="en-US" smtClean="0"/>
+              <a:rPr lang="en-US"/>
               <a:t>Third level</a:t>
             </a:r>
           </a:p>
           <a:p>
             <a:pPr lvl="3"/>
             <a:r>
-              <a:rPr lang="en-US" smtClean="0"/>
+              <a:rPr lang="en-US"/>
               <a:t>Fourth level</a:t>
             </a:r>
           </a:p>
           <a:p>
             <a:pPr lvl="4"/>
             <a:r>
-              <a:rPr lang="en-US" smtClean="0"/>
+              <a:rPr lang="en-US"/>
               <a:t>Fifth level</a:t>
             </a:r>
-            <a:endParaRPr lang="en-US"/>
           </a:p>
         </p:txBody>
       </p:sp>
@@ -1724,7 +1715,7 @@
             <a:fld id="{78C97017-6FC3-485B-9764-EAC9E56C1D49}" type="datetimeFigureOut">
               <a:rPr lang="en-US" smtClean="0"/>
               <a:pPr/>
-              <a:t>10/22/2017</a:t>
+              <a:t>10/24/2017</a:t>
             </a:fld>
             <a:endParaRPr lang="en-US"/>
           </a:p>
@@ -1776,7 +1767,7 @@
     </p:spTree>
     <p:extLst>
       <p:ext uri="{BB962C8B-B14F-4D97-AF65-F5344CB8AC3E}">
-        <p14:creationId xmlns="" xmlns:p14="http://schemas.microsoft.com/office/powerpoint/2010/main" val="562293251"/>
+        <p14:creationId xmlns:p14="http://schemas.microsoft.com/office/powerpoint/2010/main" val="562293251"/>
       </p:ext>
     </p:extLst>
   </p:cSld>
@@ -1823,10 +1814,9 @@
           </a:lstStyle>
           <a:p>
             <a:r>
-              <a:rPr lang="en-US" smtClean="0"/>
+              <a:rPr lang="en-US"/>
               <a:t>Click to edit Master title style</a:t>
             </a:r>
-            <a:endParaRPr lang="en-US"/>
           </a:p>
         </p:txBody>
       </p:sp>
@@ -1889,7 +1879,7 @@
           <a:p>
             <a:pPr lvl="0"/>
             <a:r>
-              <a:rPr lang="en-US" smtClean="0"/>
+              <a:rPr lang="en-US"/>
               <a:t>Click to edit Master text styles</a:t>
             </a:r>
           </a:p>
@@ -1945,38 +1935,37 @@
           <a:p>
             <a:pPr lvl="0"/>
             <a:r>
-              <a:rPr lang="en-US" smtClean="0"/>
+              <a:rPr lang="en-US"/>
               <a:t>Click to edit Master text styles</a:t>
             </a:r>
           </a:p>
           <a:p>
             <a:pPr lvl="1"/>
             <a:r>
-              <a:rPr lang="en-US" smtClean="0"/>
+              <a:rPr lang="en-US"/>
               <a:t>Second level</a:t>
             </a:r>
           </a:p>
           <a:p>
             <a:pPr lvl="2"/>
             <a:r>
-              <a:rPr lang="en-US" smtClean="0"/>
+              <a:rPr lang="en-US"/>
               <a:t>Third level</a:t>
             </a:r>
           </a:p>
           <a:p>
             <a:pPr lvl="3"/>
             <a:r>
-              <a:rPr lang="en-US" smtClean="0"/>
+              <a:rPr lang="en-US"/>
               <a:t>Fourth level</a:t>
             </a:r>
           </a:p>
           <a:p>
             <a:pPr lvl="4"/>
             <a:r>
-              <a:rPr lang="en-US" smtClean="0"/>
+              <a:rPr lang="en-US"/>
               <a:t>Fifth level</a:t>
             </a:r>
-            <a:endParaRPr lang="en-US"/>
           </a:p>
         </p:txBody>
       </p:sp>
@@ -2039,7 +2028,7 @@
           <a:p>
             <a:pPr lvl="0"/>
             <a:r>
-              <a:rPr lang="en-US" smtClean="0"/>
+              <a:rPr lang="en-US"/>
               <a:t>Click to edit Master text styles</a:t>
             </a:r>
           </a:p>
@@ -2095,38 +2084,37 @@
           <a:p>
             <a:pPr lvl="0"/>
             <a:r>
-              <a:rPr lang="en-US" smtClean="0"/>
+              <a:rPr lang="en-US"/>
               <a:t>Click to edit Master text styles</a:t>
             </a:r>
           </a:p>
           <a:p>
             <a:pPr lvl="1"/>
             <a:r>
-              <a:rPr lang="en-US" smtClean="0"/>
+              <a:rPr lang="en-US"/>
               <a:t>Second level</a:t>
             </a:r>
           </a:p>
           <a:p>
             <a:pPr lvl="2"/>
             <a:r>
-              <a:rPr lang="en-US" smtClean="0"/>
+              <a:rPr lang="en-US"/>
               <a:t>Third level</a:t>
             </a:r>
           </a:p>
           <a:p>
             <a:pPr lvl="3"/>
             <a:r>
-              <a:rPr lang="en-US" smtClean="0"/>
+              <a:rPr lang="en-US"/>
               <a:t>Fourth level</a:t>
             </a:r>
           </a:p>
           <a:p>
             <a:pPr lvl="4"/>
             <a:r>
-              <a:rPr lang="en-US" smtClean="0"/>
+              <a:rPr lang="en-US"/>
               <a:t>Fifth level</a:t>
             </a:r>
-            <a:endParaRPr lang="en-US"/>
           </a:p>
         </p:txBody>
       </p:sp>
@@ -2148,7 +2136,7 @@
             <a:fld id="{78C97017-6FC3-485B-9764-EAC9E56C1D49}" type="datetimeFigureOut">
               <a:rPr lang="en-US" smtClean="0"/>
               <a:pPr/>
-              <a:t>10/22/2017</a:t>
+              <a:t>10/24/2017</a:t>
             </a:fld>
             <a:endParaRPr lang="en-US"/>
           </a:p>
@@ -2200,7 +2188,7 @@
     </p:spTree>
     <p:extLst>
       <p:ext uri="{BB962C8B-B14F-4D97-AF65-F5344CB8AC3E}">
-        <p14:creationId xmlns="" xmlns:p14="http://schemas.microsoft.com/office/powerpoint/2010/main" val="1126424250"/>
+        <p14:creationId xmlns:p14="http://schemas.microsoft.com/office/powerpoint/2010/main" val="1126424250"/>
       </p:ext>
     </p:extLst>
   </p:cSld>
@@ -2243,10 +2231,9 @@
           <a:lstStyle/>
           <a:p>
             <a:r>
-              <a:rPr lang="en-US" smtClean="0"/>
+              <a:rPr lang="en-US"/>
               <a:t>Click to edit Master title style</a:t>
             </a:r>
-            <a:endParaRPr lang="en-US"/>
           </a:p>
         </p:txBody>
       </p:sp>
@@ -2268,7 +2255,7 @@
             <a:fld id="{78C97017-6FC3-485B-9764-EAC9E56C1D49}" type="datetimeFigureOut">
               <a:rPr lang="en-US" smtClean="0"/>
               <a:pPr/>
-              <a:t>10/22/2017</a:t>
+              <a:t>10/24/2017</a:t>
             </a:fld>
             <a:endParaRPr lang="en-US"/>
           </a:p>
@@ -2320,7 +2307,7 @@
     </p:spTree>
     <p:extLst>
       <p:ext uri="{BB962C8B-B14F-4D97-AF65-F5344CB8AC3E}">
-        <p14:creationId xmlns="" xmlns:p14="http://schemas.microsoft.com/office/powerpoint/2010/main" val="4159724230"/>
+        <p14:creationId xmlns:p14="http://schemas.microsoft.com/office/powerpoint/2010/main" val="4159724230"/>
       </p:ext>
     </p:extLst>
   </p:cSld>
@@ -2365,7 +2352,7 @@
             <a:fld id="{78C97017-6FC3-485B-9764-EAC9E56C1D49}" type="datetimeFigureOut">
               <a:rPr lang="en-US" smtClean="0"/>
               <a:pPr/>
-              <a:t>10/22/2017</a:t>
+              <a:t>10/24/2017</a:t>
             </a:fld>
             <a:endParaRPr lang="en-US"/>
           </a:p>
@@ -2417,7 +2404,7 @@
     </p:spTree>
     <p:extLst>
       <p:ext uri="{BB962C8B-B14F-4D97-AF65-F5344CB8AC3E}">
-        <p14:creationId xmlns="" xmlns:p14="http://schemas.microsoft.com/office/powerpoint/2010/main" val="1793928710"/>
+        <p14:creationId xmlns:p14="http://schemas.microsoft.com/office/powerpoint/2010/main" val="1793928710"/>
       </p:ext>
     </p:extLst>
   </p:cSld>
@@ -2469,10 +2456,9 @@
           </a:lstStyle>
           <a:p>
             <a:r>
-              <a:rPr lang="en-US" smtClean="0"/>
+              <a:rPr lang="en-US"/>
               <a:t>Click to edit Master title style</a:t>
             </a:r>
-            <a:endParaRPr lang="en-US"/>
           </a:p>
         </p:txBody>
       </p:sp>
@@ -2526,38 +2512,37 @@
           <a:p>
             <a:pPr lvl="0"/>
             <a:r>
-              <a:rPr lang="en-US" smtClean="0"/>
+              <a:rPr lang="en-US"/>
               <a:t>Click to edit Master text styles</a:t>
             </a:r>
           </a:p>
           <a:p>
             <a:pPr lvl="1"/>
             <a:r>
-              <a:rPr lang="en-US" smtClean="0"/>
+              <a:rPr lang="en-US"/>
               <a:t>Second level</a:t>
             </a:r>
           </a:p>
           <a:p>
             <a:pPr lvl="2"/>
             <a:r>
-              <a:rPr lang="en-US" smtClean="0"/>
+              <a:rPr lang="en-US"/>
               <a:t>Third level</a:t>
             </a:r>
           </a:p>
           <a:p>
             <a:pPr lvl="3"/>
             <a:r>
-              <a:rPr lang="en-US" smtClean="0"/>
+              <a:rPr lang="en-US"/>
               <a:t>Fourth level</a:t>
             </a:r>
           </a:p>
           <a:p>
             <a:pPr lvl="4"/>
             <a:r>
-              <a:rPr lang="en-US" smtClean="0"/>
+              <a:rPr lang="en-US"/>
               <a:t>Fifth level</a:t>
             </a:r>
-            <a:endParaRPr lang="en-US"/>
           </a:p>
         </p:txBody>
       </p:sp>
@@ -2620,7 +2605,7 @@
           <a:p>
             <a:pPr lvl="0"/>
             <a:r>
-              <a:rPr lang="en-US" smtClean="0"/>
+              <a:rPr lang="en-US"/>
               <a:t>Click to edit Master text styles</a:t>
             </a:r>
           </a:p>
@@ -2644,7 +2629,7 @@
             <a:fld id="{78C97017-6FC3-485B-9764-EAC9E56C1D49}" type="datetimeFigureOut">
               <a:rPr lang="en-US" smtClean="0"/>
               <a:pPr/>
-              <a:t>10/22/2017</a:t>
+              <a:t>10/24/2017</a:t>
             </a:fld>
             <a:endParaRPr lang="en-US"/>
           </a:p>
@@ -2696,7 +2681,7 @@
     </p:spTree>
     <p:extLst>
       <p:ext uri="{BB962C8B-B14F-4D97-AF65-F5344CB8AC3E}">
-        <p14:creationId xmlns="" xmlns:p14="http://schemas.microsoft.com/office/powerpoint/2010/main" val="2076802089"/>
+        <p14:creationId xmlns:p14="http://schemas.microsoft.com/office/powerpoint/2010/main" val="2076802089"/>
       </p:ext>
     </p:extLst>
   </p:cSld>
@@ -2748,10 +2733,9 @@
           </a:lstStyle>
           <a:p>
             <a:r>
-              <a:rPr lang="en-US" smtClean="0"/>
+              <a:rPr lang="en-US"/>
               <a:t>Click to edit Master title style</a:t>
             </a:r>
-            <a:endParaRPr lang="en-US"/>
           </a:p>
         </p:txBody>
       </p:sp>
@@ -2875,7 +2859,7 @@
           <a:p>
             <a:pPr lvl="0"/>
             <a:r>
-              <a:rPr lang="en-US" smtClean="0"/>
+              <a:rPr lang="en-US"/>
               <a:t>Click to edit Master text styles</a:t>
             </a:r>
           </a:p>
@@ -2899,7 +2883,7 @@
             <a:fld id="{78C97017-6FC3-485B-9764-EAC9E56C1D49}" type="datetimeFigureOut">
               <a:rPr lang="en-US" smtClean="0"/>
               <a:pPr/>
-              <a:t>10/22/2017</a:t>
+              <a:t>10/24/2017</a:t>
             </a:fld>
             <a:endParaRPr lang="en-US"/>
           </a:p>
@@ -2951,7 +2935,7 @@
     </p:spTree>
     <p:extLst>
       <p:ext uri="{BB962C8B-B14F-4D97-AF65-F5344CB8AC3E}">
-        <p14:creationId xmlns="" xmlns:p14="http://schemas.microsoft.com/office/powerpoint/2010/main" val="201835938"/>
+        <p14:creationId xmlns:p14="http://schemas.microsoft.com/office/powerpoint/2010/main" val="201835938"/>
       </p:ext>
     </p:extLst>
   </p:cSld>
@@ -3009,10 +2993,9 @@
           <a:lstStyle/>
           <a:p>
             <a:r>
-              <a:rPr lang="en-US" smtClean="0"/>
+              <a:rPr lang="en-US"/>
               <a:t>Click to edit Master title style</a:t>
             </a:r>
-            <a:endParaRPr lang="en-US"/>
           </a:p>
         </p:txBody>
       </p:sp>
@@ -3043,38 +3026,37 @@
           <a:p>
             <a:pPr lvl="0"/>
             <a:r>
-              <a:rPr lang="en-US" smtClean="0"/>
+              <a:rPr lang="en-US"/>
               <a:t>Click to edit Master text styles</a:t>
             </a:r>
           </a:p>
           <a:p>
             <a:pPr lvl="1"/>
             <a:r>
-              <a:rPr lang="en-US" smtClean="0"/>
+              <a:rPr lang="en-US"/>
               <a:t>Second level</a:t>
             </a:r>
           </a:p>
           <a:p>
             <a:pPr lvl="2"/>
             <a:r>
-              <a:rPr lang="en-US" smtClean="0"/>
+              <a:rPr lang="en-US"/>
               <a:t>Third level</a:t>
             </a:r>
           </a:p>
           <a:p>
             <a:pPr lvl="3"/>
             <a:r>
-              <a:rPr lang="en-US" smtClean="0"/>
+              <a:rPr lang="en-US"/>
               <a:t>Fourth level</a:t>
             </a:r>
           </a:p>
           <a:p>
             <a:pPr lvl="4"/>
             <a:r>
-              <a:rPr lang="en-US" smtClean="0"/>
+              <a:rPr lang="en-US"/>
               <a:t>Fifth level</a:t>
             </a:r>
-            <a:endParaRPr lang="en-US"/>
           </a:p>
         </p:txBody>
       </p:sp>
@@ -3114,7 +3096,7 @@
             <a:fld id="{78C97017-6FC3-485B-9764-EAC9E56C1D49}" type="datetimeFigureOut">
               <a:rPr lang="en-US" smtClean="0"/>
               <a:pPr/>
-              <a:t>10/22/2017</a:t>
+              <a:t>10/24/2017</a:t>
             </a:fld>
             <a:endParaRPr lang="en-US"/>
           </a:p>
@@ -3202,7 +3184,7 @@
     </p:spTree>
     <p:extLst>
       <p:ext uri="{BB962C8B-B14F-4D97-AF65-F5344CB8AC3E}">
-        <p14:creationId xmlns="" xmlns:p14="http://schemas.microsoft.com/office/powerpoint/2010/main" val="2341400630"/>
+        <p14:creationId xmlns:p14="http://schemas.microsoft.com/office/powerpoint/2010/main" val="2341400630"/>
       </p:ext>
     </p:extLst>
   </p:cSld>
@@ -3536,7 +3518,7 @@
           <a:lstStyle/>
           <a:p>
             <a:r>
-              <a:rPr lang="en-US" sz="1200" b="1" dirty="0" smtClean="0">
+              <a:rPr lang="en-US" sz="1200" b="1" dirty="0">
                 <a:solidFill>
                   <a:srgbClr val="7030A0"/>
                 </a:solidFill>
@@ -3595,7 +3577,7 @@
           <a:p>
             <a:pPr algn="ctr"/>
             <a:r>
-              <a:rPr lang="en-US" sz="1050" dirty="0" err="1" smtClean="0">
+              <a:rPr lang="en-US" sz="1050" dirty="0" err="1">
                 <a:solidFill>
                   <a:schemeClr val="bg1"/>
                 </a:solidFill>
@@ -3654,7 +3636,7 @@
           <a:p>
             <a:pPr algn="ctr"/>
             <a:r>
-              <a:rPr lang="en-US" sz="1050" dirty="0" err="1" smtClean="0">
+              <a:rPr lang="en-US" sz="1050" dirty="0" err="1">
                 <a:solidFill>
                   <a:schemeClr val="bg1"/>
                 </a:solidFill>
@@ -3669,47 +3651,6 @@
           </a:p>
         </p:txBody>
       </p:sp>
-      <p:cxnSp>
-        <p:nvCxnSpPr>
-          <p:cNvPr id="53" name="Elbow Connector 63"/>
-          <p:cNvCxnSpPr>
-            <a:stCxn id="71" idx="3"/>
-          </p:cNvCxnSpPr>
-          <p:nvPr/>
-        </p:nvCxnSpPr>
-        <p:spPr>
-          <a:xfrm flipV="1">
-            <a:off x="6477000" y="3194131"/>
-            <a:ext cx="95385" cy="416514"/>
-          </a:xfrm>
-          <a:prstGeom prst="bentConnector2">
-            <a:avLst/>
-          </a:prstGeom>
-          <a:ln w="19050">
-            <a:solidFill>
-              <a:srgbClr val="7030A0"/>
-            </a:solidFill>
-            <a:prstDash val="sysDot"/>
-            <a:headEnd type="none" w="med" len="med"/>
-            <a:tailEnd type="none" w="med" len="med"/>
-          </a:ln>
-          <a:effectLst/>
-        </p:spPr>
-        <p:style>
-          <a:lnRef idx="1">
-            <a:schemeClr val="accent2"/>
-          </a:lnRef>
-          <a:fillRef idx="2">
-            <a:schemeClr val="accent2"/>
-          </a:fillRef>
-          <a:effectRef idx="1">
-            <a:schemeClr val="accent2"/>
-          </a:effectRef>
-          <a:fontRef idx="minor">
-            <a:schemeClr val="dk1"/>
-          </a:fontRef>
-        </p:style>
-      </p:cxnSp>
       <p:cxnSp>
         <p:nvCxnSpPr>
           <p:cNvPr id="107" name="Elbow Connector 106"/>
@@ -3725,7 +3666,7 @@
           </a:xfrm>
           <a:prstGeom prst="bentConnector4">
             <a:avLst>
-              <a:gd name="adj1" fmla="val -101829"/>
+              <a:gd name="adj1" fmla="val -157020"/>
               <a:gd name="adj2" fmla="val 99976"/>
             </a:avLst>
           </a:prstGeom>
@@ -3809,7 +3750,7 @@
           <a:p>
             <a:pPr algn="ctr"/>
             <a:r>
-              <a:rPr lang="en-US" sz="1050" dirty="0" smtClean="0">
+              <a:rPr lang="en-US" sz="1050" dirty="0">
                 <a:solidFill>
                   <a:schemeClr val="bg1"/>
                 </a:solidFill>
@@ -3919,8 +3860,8 @@
           <p:nvPr/>
         </p:nvSpPr>
         <p:spPr>
-          <a:xfrm rot="5400000" flipV="1">
-            <a:off x="6253986" y="3522883"/>
+          <a:xfrm rot="10800000" flipV="1">
+            <a:off x="6756701" y="2162069"/>
             <a:ext cx="270504" cy="175523"/>
           </a:xfrm>
           <a:prstGeom prst="triangle">
@@ -4133,7 +4074,7 @@
           <a:p>
             <a:pPr algn="ctr"/>
             <a:r>
-              <a:rPr lang="en-US" sz="1050" dirty="0" err="1" smtClean="0">
+              <a:rPr lang="en-US" sz="1050" dirty="0" err="1">
                 <a:solidFill>
                   <a:srgbClr val="7030A0"/>
                 </a:solidFill>
@@ -4275,7 +4216,7 @@
           <a:p>
             <a:pPr algn="ctr"/>
             <a:r>
-              <a:rPr lang="en-US" sz="1050" dirty="0" err="1" smtClean="0">
+              <a:rPr lang="en-US" sz="1050" dirty="0" err="1">
                 <a:solidFill>
                   <a:srgbClr val="7030A0"/>
                 </a:solidFill>
@@ -4419,7 +4360,7 @@
           <a:p>
             <a:pPr algn="ctr"/>
             <a:r>
-              <a:rPr lang="en-US" sz="1050" dirty="0" err="1" smtClean="0">
+              <a:rPr lang="en-US" sz="1050" dirty="0" err="1">
                 <a:solidFill>
                   <a:srgbClr val="7030A0"/>
                 </a:solidFill>
@@ -4518,7 +4459,7 @@
           <a:p>
             <a:pPr algn="ctr"/>
             <a:r>
-              <a:rPr lang="en-US" sz="1050" dirty="0" smtClean="0">
+              <a:rPr lang="en-US" sz="1050" dirty="0">
                 <a:solidFill>
                   <a:srgbClr val="7030A0"/>
                 </a:solidFill>
@@ -4660,7 +4601,7 @@
           <a:p>
             <a:pPr algn="ctr"/>
             <a:r>
-              <a:rPr lang="en-US" sz="1050" dirty="0" smtClean="0">
+              <a:rPr lang="en-US" sz="1050" dirty="0">
                 <a:solidFill>
                   <a:srgbClr val="7030A0"/>
                 </a:solidFill>
@@ -4769,7 +4710,7 @@
         </p:nvSpPr>
         <p:spPr>
           <a:xfrm>
-            <a:off x="5128257" y="3429000"/>
+            <a:off x="6135256" y="1809332"/>
             <a:ext cx="1156969" cy="346760"/>
           </a:xfrm>
           <a:prstGeom prst="rect">
@@ -4802,7 +4743,7 @@
           <a:p>
             <a:pPr algn="ctr"/>
             <a:r>
-              <a:rPr lang="en-US" sz="1050" dirty="0" smtClean="0">
+              <a:rPr lang="en-US" sz="1050" dirty="0">
                 <a:solidFill>
                   <a:srgbClr val="7030A0"/>
                 </a:solidFill>
@@ -4810,14 +4751,14 @@
               <a:t>&lt;&lt;interface&gt;&gt;</a:t>
             </a:r>
             <a:br>
-              <a:rPr lang="en-US" sz="1050" dirty="0" smtClean="0">
+              <a:rPr lang="en-US" sz="1050" dirty="0">
                 <a:solidFill>
                   <a:srgbClr val="7030A0"/>
                 </a:solidFill>
               </a:rPr>
             </a:br>
             <a:r>
-              <a:rPr lang="en-US" sz="1050" dirty="0" err="1" smtClean="0">
+              <a:rPr lang="en-US" sz="1050" dirty="0" err="1">
                 <a:solidFill>
                   <a:srgbClr val="7030A0"/>
                 </a:solidFill>
@@ -4873,7 +4814,7 @@
           <a:p>
             <a:pPr algn="ctr"/>
             <a:r>
-              <a:rPr lang="en-US" sz="1050" dirty="0" smtClean="0">
+              <a:rPr lang="en-US" sz="1050" dirty="0">
                 <a:solidFill>
                   <a:srgbClr val="7030A0"/>
                 </a:solidFill>
@@ -5017,7 +4958,7 @@
           <a:p>
             <a:pPr algn="ctr"/>
             <a:r>
-              <a:rPr lang="en-US" sz="1050" dirty="0" smtClean="0">
+              <a:rPr lang="en-US" sz="1050" dirty="0">
                 <a:solidFill>
                   <a:srgbClr val="7030A0"/>
                 </a:solidFill>
@@ -5114,7 +5055,7 @@
           <a:p>
             <a:pPr algn="ctr"/>
             <a:r>
-              <a:rPr lang="en-US" sz="1050" dirty="0" smtClean="0">
+              <a:rPr lang="en-US" sz="1050" dirty="0">
                 <a:solidFill>
                   <a:srgbClr val="7030A0"/>
                 </a:solidFill>
@@ -5211,7 +5152,7 @@
           <a:p>
             <a:pPr algn="ctr"/>
             <a:r>
-              <a:rPr lang="en-US" sz="1050" dirty="0" smtClean="0">
+              <a:rPr lang="en-US" sz="1050" dirty="0">
                 <a:solidFill>
                   <a:srgbClr val="7030A0"/>
                 </a:solidFill>
@@ -5399,7 +5340,7 @@
           <a:p>
             <a:pPr algn="ctr"/>
             <a:r>
-              <a:rPr lang="en-US" sz="1050" dirty="0" smtClean="0">
+              <a:rPr lang="en-US" sz="1050" dirty="0">
                 <a:solidFill>
                   <a:srgbClr val="7030A0"/>
                 </a:solidFill>
@@ -5407,14 +5348,14 @@
               <a:t>&lt;&lt;interface&gt;&gt;</a:t>
             </a:r>
             <a:br>
-              <a:rPr lang="en-US" sz="1050" dirty="0" smtClean="0">
+              <a:rPr lang="en-US" sz="1050" dirty="0">
                 <a:solidFill>
                   <a:srgbClr val="7030A0"/>
                 </a:solidFill>
               </a:rPr>
             </a:br>
             <a:r>
-              <a:rPr lang="en-US" sz="1050" dirty="0" err="1" smtClean="0">
+              <a:rPr lang="en-US" sz="1050" dirty="0" err="1">
                 <a:solidFill>
                   <a:srgbClr val="7030A0"/>
                 </a:solidFill>
@@ -5453,7 +5394,7 @@
           <a:p>
             <a:pPr algn="r"/>
             <a:r>
-              <a:rPr lang="en-US" sz="1100" dirty="0" smtClean="0">
+              <a:rPr lang="en-US" sz="1100" dirty="0">
                 <a:solidFill>
                   <a:srgbClr val="7030A0"/>
                 </a:solidFill>
@@ -5509,20 +5450,12 @@
           <a:p>
             <a:pPr algn="ctr"/>
             <a:r>
-              <a:rPr lang="en-US" sz="1050" dirty="0" smtClean="0">
+              <a:rPr lang="en-US" sz="1050" dirty="0">
                 <a:solidFill>
                   <a:srgbClr val="7030A0"/>
                 </a:solidFill>
               </a:rPr>
               <a:t>&lt;&lt;interface&gt;&gt;</a:t>
-            </a:r>
-            <a:r>
-              <a:rPr lang="en-US" sz="1050">
-                <a:solidFill>
-                  <a:srgbClr val="7030A0"/>
-                </a:solidFill>
-              </a:rPr>
-              <a:t/>
             </a:r>
             <a:br>
               <a:rPr lang="en-US" sz="1050">
@@ -5532,7 +5465,7 @@
               </a:rPr>
             </a:br>
             <a:r>
-              <a:rPr lang="en-US" sz="1050" dirty="0" err="1" smtClean="0">
+              <a:rPr lang="en-US" sz="1050" dirty="0" err="1">
                 <a:solidFill>
                   <a:srgbClr val="7030A0"/>
                 </a:solidFill>
@@ -5593,6 +5526,7 @@
         <p:nvCxnSpPr>
           <p:cNvPr id="50" name="Elbow Connector 49"/>
           <p:cNvCxnSpPr>
+            <a:cxnSpLocks/>
             <a:stCxn id="62" idx="0"/>
             <a:endCxn id="57" idx="3"/>
           </p:cNvCxnSpPr>
@@ -5654,7 +5588,7 @@
           <a:p>
             <a:pPr algn="ctr"/>
             <a:r>
-              <a:rPr lang="en-US" sz="1100" dirty="0" smtClean="0">
+              <a:rPr lang="en-US" sz="1100" dirty="0">
                 <a:solidFill>
                   <a:srgbClr val="7030A0"/>
                 </a:solidFill>
@@ -5693,7 +5627,7 @@
           <a:p>
             <a:pPr algn="ctr"/>
             <a:r>
-              <a:rPr lang="en-US" sz="1100" dirty="0" smtClean="0">
+              <a:rPr lang="en-US" sz="1100" dirty="0">
                 <a:solidFill>
                   <a:srgbClr val="7030A0"/>
                 </a:solidFill>
@@ -5732,7 +5666,7 @@
           <a:p>
             <a:pPr algn="ctr"/>
             <a:r>
-              <a:rPr lang="en-US" sz="1100" dirty="0" smtClean="0">
+              <a:rPr lang="en-US" sz="1100" dirty="0">
                 <a:solidFill>
                   <a:srgbClr val="7030A0"/>
                 </a:solidFill>
@@ -5771,7 +5705,7 @@
           <a:p>
             <a:pPr algn="ctr"/>
             <a:r>
-              <a:rPr lang="en-US" sz="1100" dirty="0" smtClean="0">
+              <a:rPr lang="en-US" sz="1100" dirty="0">
                 <a:solidFill>
                   <a:srgbClr val="7030A0"/>
                 </a:solidFill>
@@ -5810,7 +5744,7 @@
           <a:p>
             <a:pPr algn="ctr"/>
             <a:r>
-              <a:rPr lang="en-US" sz="1100" dirty="0" smtClean="0">
+              <a:rPr lang="en-US" sz="1100" dirty="0">
                 <a:solidFill>
                   <a:srgbClr val="7030A0"/>
                 </a:solidFill>
@@ -5849,7 +5783,7 @@
           <a:p>
             <a:pPr algn="ctr"/>
             <a:r>
-              <a:rPr lang="en-US" sz="1100" dirty="0" smtClean="0">
+              <a:rPr lang="en-US" sz="1100" dirty="0">
                 <a:solidFill>
                   <a:srgbClr val="7030A0"/>
                 </a:solidFill>
@@ -5888,7 +5822,7 @@
           <a:p>
             <a:pPr algn="ctr"/>
             <a:r>
-              <a:rPr lang="en-US" sz="1100" dirty="0" smtClean="0">
+              <a:rPr lang="en-US" sz="1100" dirty="0">
                 <a:solidFill>
                   <a:srgbClr val="7030A0"/>
                 </a:solidFill>
@@ -5911,7 +5845,7 @@
         </p:nvSpPr>
         <p:spPr>
           <a:xfrm>
-            <a:off x="6667770" y="3210194"/>
+            <a:off x="6877210" y="3181162"/>
             <a:ext cx="189257" cy="178683"/>
           </a:xfrm>
           <a:prstGeom prst="rect">
@@ -5927,7 +5861,7 @@
           <a:p>
             <a:pPr algn="ctr"/>
             <a:r>
-              <a:rPr lang="en-US" sz="1100" dirty="0" smtClean="0">
+              <a:rPr lang="en-US" sz="1100" dirty="0">
                 <a:solidFill>
                   <a:srgbClr val="7030A0"/>
                 </a:solidFill>
@@ -5983,7 +5917,7 @@
           <a:p>
             <a:pPr algn="ctr"/>
             <a:r>
-              <a:rPr lang="en-US" sz="1050" dirty="0" smtClean="0">
+              <a:rPr lang="en-US" sz="1050" dirty="0">
                 <a:solidFill>
                   <a:srgbClr val="7030A0"/>
                 </a:solidFill>
@@ -6041,23 +5975,422 @@
           </a:fontRef>
         </p:style>
       </p:cxnSp>
+      <p:cxnSp>
+        <p:nvCxnSpPr>
+          <p:cNvPr id="10" name="Straight Connector 9">
+            <a:extLst>
+              <a:ext uri="{FF2B5EF4-FFF2-40B4-BE49-F238E27FC236}">
+                <a16:creationId xmlns:a16="http://schemas.microsoft.com/office/drawing/2014/main" id="{9E36A53B-B5B1-43DB-BC32-54A5DF97C1B6}"/>
+              </a:ext>
+            </a:extLst>
+          </p:cNvPr>
+          <p:cNvCxnSpPr>
+            <a:cxnSpLocks/>
+          </p:cNvCxnSpPr>
+          <p:nvPr/>
+        </p:nvCxnSpPr>
+        <p:spPr>
+          <a:xfrm>
+            <a:off x="6892368" y="2338777"/>
+            <a:ext cx="0" cy="519289"/>
+          </a:xfrm>
+          <a:prstGeom prst="line">
+            <a:avLst/>
+          </a:prstGeom>
+          <a:ln w="19050">
+            <a:solidFill>
+              <a:srgbClr val="7030A0"/>
+            </a:solidFill>
+            <a:headEnd type="none" w="med" len="med"/>
+            <a:tailEnd type="none" w="med" len="med"/>
+          </a:ln>
+          <a:effectLst/>
+        </p:spPr>
+        <p:style>
+          <a:lnRef idx="1">
+            <a:schemeClr val="accent2"/>
+          </a:lnRef>
+          <a:fillRef idx="2">
+            <a:schemeClr val="accent2"/>
+          </a:fillRef>
+          <a:effectRef idx="1">
+            <a:schemeClr val="accent2"/>
+          </a:effectRef>
+          <a:fontRef idx="minor">
+            <a:schemeClr val="dk1"/>
+          </a:fontRef>
+        </p:style>
+      </p:cxnSp>
+      <p:cxnSp>
+        <p:nvCxnSpPr>
+          <p:cNvPr id="77" name="Elbow Connector 49">
+            <a:extLst>
+              <a:ext uri="{FF2B5EF4-FFF2-40B4-BE49-F238E27FC236}">
+                <a16:creationId xmlns:a16="http://schemas.microsoft.com/office/drawing/2014/main" id="{B3926F5D-BFEB-432B-8C4D-AFE10B1694F8}"/>
+              </a:ext>
+            </a:extLst>
+          </p:cNvPr>
+          <p:cNvCxnSpPr>
+            <a:cxnSpLocks/>
+            <a:stCxn id="62" idx="2"/>
+          </p:cNvCxnSpPr>
+          <p:nvPr/>
+        </p:nvCxnSpPr>
+        <p:spPr>
+          <a:xfrm rot="5400000">
+            <a:off x="5971190" y="2876432"/>
+            <a:ext cx="368187" cy="1024974"/>
+          </a:xfrm>
+          <a:prstGeom prst="bentConnector2">
+            <a:avLst/>
+          </a:prstGeom>
+          <a:ln w="19050">
+            <a:solidFill>
+              <a:srgbClr val="7030A0"/>
+            </a:solidFill>
+            <a:headEnd type="none" w="med" len="med"/>
+            <a:tailEnd type="arrow" w="med" len="med"/>
+          </a:ln>
+          <a:effectLst/>
+        </p:spPr>
+        <p:style>
+          <a:lnRef idx="1">
+            <a:schemeClr val="accent2"/>
+          </a:lnRef>
+          <a:fillRef idx="2">
+            <a:schemeClr val="accent2"/>
+          </a:fillRef>
+          <a:effectRef idx="1">
+            <a:schemeClr val="accent2"/>
+          </a:effectRef>
+          <a:fontRef idx="minor">
+            <a:schemeClr val="dk1"/>
+          </a:fontRef>
+        </p:style>
+      </p:cxnSp>
+      <p:sp>
+        <p:nvSpPr>
+          <p:cNvPr id="82" name="Rectangle 8">
+            <a:extLst>
+              <a:ext uri="{FF2B5EF4-FFF2-40B4-BE49-F238E27FC236}">
+                <a16:creationId xmlns:a16="http://schemas.microsoft.com/office/drawing/2014/main" id="{0978622F-905F-46B5-B7DD-0C6ECB130AF4}"/>
+              </a:ext>
+            </a:extLst>
+          </p:cNvPr>
+          <p:cNvSpPr/>
+          <p:nvPr/>
+        </p:nvSpPr>
+        <p:spPr>
+          <a:xfrm>
+            <a:off x="4418813" y="3388936"/>
+            <a:ext cx="1223983" cy="346760"/>
+          </a:xfrm>
+          <a:prstGeom prst="rect">
+            <a:avLst/>
+          </a:prstGeom>
+          <a:ln w="19050">
+            <a:solidFill>
+              <a:srgbClr val="7030A0"/>
+            </a:solidFill>
+          </a:ln>
+          <a:effectLst/>
+        </p:spPr>
+        <p:style>
+          <a:lnRef idx="1">
+            <a:schemeClr val="accent4"/>
+          </a:lnRef>
+          <a:fillRef idx="2">
+            <a:schemeClr val="accent4"/>
+          </a:fillRef>
+          <a:effectRef idx="1">
+            <a:schemeClr val="accent4"/>
+          </a:effectRef>
+          <a:fontRef idx="minor">
+            <a:schemeClr val="dk1"/>
+          </a:fontRef>
+        </p:style>
+        <p:txBody>
+          <a:bodyPr rtlCol="0" anchor="ctr"/>
+          <a:lstStyle/>
+          <a:p>
+            <a:pPr algn="ctr"/>
+            <a:r>
+              <a:rPr lang="en-US" sz="1050" dirty="0" err="1">
+                <a:solidFill>
+                  <a:srgbClr val="7030A0"/>
+                </a:solidFill>
+              </a:rPr>
+              <a:t>UniqueMeetingList</a:t>
+            </a:r>
+            <a:endParaRPr lang="en-SG" sz="1050" dirty="0">
+              <a:solidFill>
+                <a:srgbClr val="7030A0"/>
+              </a:solidFill>
+            </a:endParaRPr>
+          </a:p>
+        </p:txBody>
+      </p:sp>
+      <p:sp>
+        <p:nvSpPr>
+          <p:cNvPr id="87" name="Flowchart: Decision 96">
+            <a:extLst>
+              <a:ext uri="{FF2B5EF4-FFF2-40B4-BE49-F238E27FC236}">
+                <a16:creationId xmlns:a16="http://schemas.microsoft.com/office/drawing/2014/main" id="{4B87CC91-C5D3-4849-81F4-076DDD9FB4C9}"/>
+              </a:ext>
+            </a:extLst>
+          </p:cNvPr>
+          <p:cNvSpPr/>
+          <p:nvPr/>
+        </p:nvSpPr>
+        <p:spPr>
+          <a:xfrm rot="21440633">
+            <a:off x="4194891" y="3460334"/>
+            <a:ext cx="236048" cy="173380"/>
+          </a:xfrm>
+          <a:prstGeom prst="flowChartDecision">
+            <a:avLst/>
+          </a:prstGeom>
+          <a:noFill/>
+          <a:ln w="19050">
+            <a:solidFill>
+              <a:srgbClr val="7030A0"/>
+            </a:solidFill>
+          </a:ln>
+          <a:effectLst/>
+        </p:spPr>
+        <p:style>
+          <a:lnRef idx="1">
+            <a:schemeClr val="accent6"/>
+          </a:lnRef>
+          <a:fillRef idx="2">
+            <a:schemeClr val="accent6"/>
+          </a:fillRef>
+          <a:effectRef idx="1">
+            <a:schemeClr val="accent6"/>
+          </a:effectRef>
+          <a:fontRef idx="minor">
+            <a:schemeClr val="dk1"/>
+          </a:fontRef>
+        </p:style>
+        <p:txBody>
+          <a:bodyPr rtlCol="0" anchor="ctr"/>
+          <a:lstStyle/>
+          <a:p>
+            <a:pPr algn="ctr"/>
+            <a:endParaRPr lang="en-US" sz="1050"/>
+          </a:p>
+        </p:txBody>
+      </p:sp>
+      <p:cxnSp>
+        <p:nvCxnSpPr>
+          <p:cNvPr id="88" name="Elbow Connector 68">
+            <a:extLst>
+              <a:ext uri="{FF2B5EF4-FFF2-40B4-BE49-F238E27FC236}">
+                <a16:creationId xmlns:a16="http://schemas.microsoft.com/office/drawing/2014/main" id="{D2201285-DBB6-458C-8C9F-CD2B3AC81551}"/>
+              </a:ext>
+            </a:extLst>
+          </p:cNvPr>
+          <p:cNvCxnSpPr>
+            <a:cxnSpLocks/>
+            <a:stCxn id="87" idx="1"/>
+            <a:endCxn id="89" idx="0"/>
+          </p:cNvCxnSpPr>
+          <p:nvPr/>
+        </p:nvCxnSpPr>
+        <p:spPr>
+          <a:xfrm rot="10800000" flipV="1">
+            <a:off x="4102328" y="3552493"/>
+            <a:ext cx="92691" cy="249224"/>
+          </a:xfrm>
+          <a:prstGeom prst="bentConnector2">
+            <a:avLst/>
+          </a:prstGeom>
+          <a:ln w="19050">
+            <a:solidFill>
+              <a:srgbClr val="7030A0"/>
+            </a:solidFill>
+            <a:headEnd type="none" w="med" len="med"/>
+            <a:tailEnd type="arrow" w="med" len="med"/>
+          </a:ln>
+          <a:effectLst/>
+        </p:spPr>
+        <p:style>
+          <a:lnRef idx="1">
+            <a:schemeClr val="accent2"/>
+          </a:lnRef>
+          <a:fillRef idx="2">
+            <a:schemeClr val="accent2"/>
+          </a:fillRef>
+          <a:effectRef idx="1">
+            <a:schemeClr val="accent2"/>
+          </a:effectRef>
+          <a:fontRef idx="minor">
+            <a:schemeClr val="dk1"/>
+          </a:fontRef>
+        </p:style>
+      </p:cxnSp>
+      <p:sp>
+        <p:nvSpPr>
+          <p:cNvPr id="89" name="Rectangle 8">
+            <a:extLst>
+              <a:ext uri="{FF2B5EF4-FFF2-40B4-BE49-F238E27FC236}">
+                <a16:creationId xmlns:a16="http://schemas.microsoft.com/office/drawing/2014/main" id="{413980D6-5BEE-4262-B01C-1A017C003AEA}"/>
+              </a:ext>
+            </a:extLst>
+          </p:cNvPr>
+          <p:cNvSpPr/>
+          <p:nvPr/>
+        </p:nvSpPr>
+        <p:spPr>
+          <a:xfrm>
+            <a:off x="3710981" y="3801717"/>
+            <a:ext cx="782692" cy="346760"/>
+          </a:xfrm>
+          <a:prstGeom prst="rect">
+            <a:avLst/>
+          </a:prstGeom>
+          <a:ln w="19050">
+            <a:solidFill>
+              <a:srgbClr val="7030A0"/>
+            </a:solidFill>
+          </a:ln>
+          <a:effectLst/>
+        </p:spPr>
+        <p:style>
+          <a:lnRef idx="1">
+            <a:schemeClr val="accent4"/>
+          </a:lnRef>
+          <a:fillRef idx="2">
+            <a:schemeClr val="accent4"/>
+          </a:fillRef>
+          <a:effectRef idx="1">
+            <a:schemeClr val="accent4"/>
+          </a:effectRef>
+          <a:fontRef idx="minor">
+            <a:schemeClr val="dk1"/>
+          </a:fontRef>
+        </p:style>
+        <p:txBody>
+          <a:bodyPr rtlCol="0" anchor="ctr"/>
+          <a:lstStyle/>
+          <a:p>
+            <a:pPr algn="ctr"/>
+            <a:r>
+              <a:rPr lang="en-US" sz="1050" dirty="0">
+                <a:solidFill>
+                  <a:srgbClr val="7030A0"/>
+                </a:solidFill>
+              </a:rPr>
+              <a:t>Meeting</a:t>
+            </a:r>
+            <a:endParaRPr lang="en-SG" sz="1050" dirty="0">
+              <a:solidFill>
+                <a:srgbClr val="7030A0"/>
+              </a:solidFill>
+            </a:endParaRPr>
+          </a:p>
+        </p:txBody>
+      </p:sp>
+      <p:sp>
+        <p:nvSpPr>
+          <p:cNvPr id="90" name="TextBox 89">
+            <a:extLst>
+              <a:ext uri="{FF2B5EF4-FFF2-40B4-BE49-F238E27FC236}">
+                <a16:creationId xmlns:a16="http://schemas.microsoft.com/office/drawing/2014/main" id="{61D250D2-99B4-4618-B7B6-A2B04E058D6B}"/>
+              </a:ext>
+            </a:extLst>
+          </p:cNvPr>
+          <p:cNvSpPr txBox="1"/>
+          <p:nvPr/>
+        </p:nvSpPr>
+        <p:spPr>
+          <a:xfrm>
+            <a:off x="3902813" y="3681323"/>
+            <a:ext cx="189257" cy="178683"/>
+          </a:xfrm>
+          <a:prstGeom prst="rect">
+            <a:avLst/>
+          </a:prstGeom>
+          <a:noFill/>
+        </p:spPr>
+        <p:txBody>
+          <a:bodyPr wrap="square" lIns="0" tIns="0" rIns="0" bIns="0" rtlCol="0">
+            <a:noAutofit/>
+          </a:bodyPr>
+          <a:lstStyle/>
+          <a:p>
+            <a:pPr algn="ctr"/>
+            <a:r>
+              <a:rPr lang="en-US" sz="1100" dirty="0">
+                <a:solidFill>
+                  <a:srgbClr val="7030A0"/>
+                </a:solidFill>
+              </a:rPr>
+              <a:t>*</a:t>
+            </a:r>
+            <a:endParaRPr lang="en-SG" sz="1100" dirty="0">
+              <a:solidFill>
+                <a:srgbClr val="7030A0"/>
+              </a:solidFill>
+            </a:endParaRPr>
+          </a:p>
+        </p:txBody>
+      </p:sp>
+      <p:sp>
+        <p:nvSpPr>
+          <p:cNvPr id="91" name="TextBox 90">
+            <a:extLst>
+              <a:ext uri="{FF2B5EF4-FFF2-40B4-BE49-F238E27FC236}">
+                <a16:creationId xmlns:a16="http://schemas.microsoft.com/office/drawing/2014/main" id="{85040E2B-0692-4AAF-BA70-C6570BB1BBBF}"/>
+              </a:ext>
+            </a:extLst>
+          </p:cNvPr>
+          <p:cNvSpPr txBox="1"/>
+          <p:nvPr/>
+        </p:nvSpPr>
+        <p:spPr>
+          <a:xfrm>
+            <a:off x="5631496" y="3620480"/>
+            <a:ext cx="189257" cy="178683"/>
+          </a:xfrm>
+          <a:prstGeom prst="rect">
+            <a:avLst/>
+          </a:prstGeom>
+          <a:noFill/>
+        </p:spPr>
+        <p:txBody>
+          <a:bodyPr wrap="square" lIns="0" tIns="0" rIns="0" bIns="0" rtlCol="0">
+            <a:noAutofit/>
+          </a:bodyPr>
+          <a:lstStyle/>
+          <a:p>
+            <a:pPr algn="ctr"/>
+            <a:r>
+              <a:rPr lang="en-US" sz="1100" dirty="0">
+                <a:solidFill>
+                  <a:srgbClr val="7030A0"/>
+                </a:solidFill>
+              </a:rPr>
+              <a:t>1</a:t>
+            </a:r>
+            <a:endParaRPr lang="en-SG" sz="1100" dirty="0">
+              <a:solidFill>
+                <a:srgbClr val="7030A0"/>
+              </a:solidFill>
+            </a:endParaRPr>
+          </a:p>
+        </p:txBody>
+      </p:sp>
     </p:spTree>
     <p:extLst>
       <p:ext uri="{BB962C8B-B14F-4D97-AF65-F5344CB8AC3E}">
-        <p14:creationId xmlns="" xmlns:p14="http://schemas.microsoft.com/office/powerpoint/2010/main" val="2396968029"/>
+        <p14:creationId xmlns:p14="http://schemas.microsoft.com/office/powerpoint/2010/main" val="2396968029"/>
       </p:ext>
     </p:extLst>
   </p:cSld>
   <p:clrMapOvr>
     <a:masterClrMapping/>
   </p:clrMapOvr>
-  <p:timing>
-    <p:tnLst>
-      <p:par>
-        <p:cTn id="1" dur="indefinite" restart="never" nodeType="tmRoot"/>
-      </p:par>
-    </p:tnLst>
-  </p:timing>
 </p:sld>
 </file>
 

</xml_diff>

<commit_message>
Updated Diagrams to include remarks
</commit_message>
<xml_diff>
--- a/docs/diagrams/ModelComponentClassDiagram.pptx
+++ b/docs/diagrams/ModelComponentClassDiagram.pptx
@@ -126,6 +126,10 @@
 </p:presentation>
 </file>
 
+<file path=ppt/revisionInfo.xml><?xml version="1.0" encoding="utf-8"?>
+<p1510:revInfo xmlns:a="http://schemas.openxmlformats.org/drawingml/2006/main" xmlns:r="http://schemas.openxmlformats.org/officeDocument/2006/relationships" xmlns:p1510="http://schemas.microsoft.com/office/powerpoint/2015/10/main"/>
+</file>
+
 <file path=ppt/notesMasters/notesMaster1.xml><?xml version="1.0" encoding="utf-8"?>
 <p:notesMaster xmlns:a="http://schemas.openxmlformats.org/drawingml/2006/main" xmlns:r="http://schemas.openxmlformats.org/officeDocument/2006/relationships" xmlns:p="http://schemas.openxmlformats.org/presentationml/2006/main">
   <p:cSld>
@@ -208,7 +212,7 @@
           <a:p>
             <a:fld id="{F5CC4B3F-88C1-4FFA-B1B6-F41C21DC6924}" type="datetimeFigureOut">
               <a:rPr lang="en-US" smtClean="0"/>
-              <a:t>9/4/17</a:t>
+              <a:t>11/1/2017</a:t>
             </a:fld>
             <a:endParaRPr lang="en-US"/>
           </a:p>
@@ -272,38 +276,37 @@
           <a:p>
             <a:pPr lvl="0"/>
             <a:r>
-              <a:rPr lang="en-US" smtClean="0"/>
+              <a:rPr lang="en-US"/>
               <a:t>Click to edit Master text styles</a:t>
             </a:r>
           </a:p>
           <a:p>
             <a:pPr lvl="1"/>
             <a:r>
-              <a:rPr lang="en-US" smtClean="0"/>
+              <a:rPr lang="en-US"/>
               <a:t>Second level</a:t>
             </a:r>
           </a:p>
           <a:p>
             <a:pPr lvl="2"/>
             <a:r>
-              <a:rPr lang="en-US" smtClean="0"/>
+              <a:rPr lang="en-US"/>
               <a:t>Third level</a:t>
             </a:r>
           </a:p>
           <a:p>
             <a:pPr lvl="3"/>
             <a:r>
-              <a:rPr lang="en-US" smtClean="0"/>
+              <a:rPr lang="en-US"/>
               <a:t>Fourth level</a:t>
             </a:r>
           </a:p>
           <a:p>
             <a:pPr lvl="4"/>
             <a:r>
-              <a:rPr lang="en-US" smtClean="0"/>
+              <a:rPr lang="en-US"/>
               <a:t>Fifth level</a:t>
             </a:r>
-            <a:endParaRPr lang="en-US"/>
           </a:p>
         </p:txBody>
       </p:sp>
@@ -514,10 +517,9 @@
           <a:lstStyle/>
           <a:p>
             <a:r>
-              <a:rPr lang="en-US" smtClean="0"/>
+              <a:rPr lang="en-US"/>
               <a:t>Click to edit Master title style</a:t>
             </a:r>
-            <a:endParaRPr lang="en-US"/>
           </a:p>
         </p:txBody>
       </p:sp>
@@ -633,10 +635,9 @@
           </a:lstStyle>
           <a:p>
             <a:r>
-              <a:rPr lang="en-US" smtClean="0"/>
+              <a:rPr lang="en-US"/>
               <a:t>Click to edit Master subtitle style</a:t>
             </a:r>
-            <a:endParaRPr lang="en-US"/>
           </a:p>
         </p:txBody>
       </p:sp>
@@ -657,7 +658,7 @@
           <a:p>
             <a:fld id="{78C97017-6FC3-485B-9764-EAC9E56C1D49}" type="datetimeFigureOut">
               <a:rPr lang="en-US" smtClean="0"/>
-              <a:t>9/4/17</a:t>
+              <a:t>11/1/2017</a:t>
             </a:fld>
             <a:endParaRPr lang="en-US"/>
           </a:p>
@@ -751,10 +752,9 @@
           <a:lstStyle/>
           <a:p>
             <a:r>
-              <a:rPr lang="en-US" smtClean="0"/>
+              <a:rPr lang="en-US"/>
               <a:t>Click to edit Master title style</a:t>
             </a:r>
-            <a:endParaRPr lang="en-US"/>
           </a:p>
         </p:txBody>
       </p:sp>
@@ -775,38 +775,37 @@
           <a:p>
             <a:pPr lvl="0"/>
             <a:r>
-              <a:rPr lang="en-US" smtClean="0"/>
+              <a:rPr lang="en-US"/>
               <a:t>Click to edit Master text styles</a:t>
             </a:r>
           </a:p>
           <a:p>
             <a:pPr lvl="1"/>
             <a:r>
-              <a:rPr lang="en-US" smtClean="0"/>
+              <a:rPr lang="en-US"/>
               <a:t>Second level</a:t>
             </a:r>
           </a:p>
           <a:p>
             <a:pPr lvl="2"/>
             <a:r>
-              <a:rPr lang="en-US" smtClean="0"/>
+              <a:rPr lang="en-US"/>
               <a:t>Third level</a:t>
             </a:r>
           </a:p>
           <a:p>
             <a:pPr lvl="3"/>
             <a:r>
-              <a:rPr lang="en-US" smtClean="0"/>
+              <a:rPr lang="en-US"/>
               <a:t>Fourth level</a:t>
             </a:r>
           </a:p>
           <a:p>
             <a:pPr lvl="4"/>
             <a:r>
-              <a:rPr lang="en-US" smtClean="0"/>
+              <a:rPr lang="en-US"/>
               <a:t>Fifth level</a:t>
             </a:r>
-            <a:endParaRPr lang="en-US"/>
           </a:p>
         </p:txBody>
       </p:sp>
@@ -827,7 +826,7 @@
           <a:p>
             <a:fld id="{78C97017-6FC3-485B-9764-EAC9E56C1D49}" type="datetimeFigureOut">
               <a:rPr lang="en-US" smtClean="0"/>
-              <a:t>9/4/17</a:t>
+              <a:t>11/1/2017</a:t>
             </a:fld>
             <a:endParaRPr lang="en-US"/>
           </a:p>
@@ -926,10 +925,9 @@
           <a:lstStyle/>
           <a:p>
             <a:r>
-              <a:rPr lang="en-US" smtClean="0"/>
+              <a:rPr lang="en-US"/>
               <a:t>Click to edit Master title style</a:t>
             </a:r>
-            <a:endParaRPr lang="en-US"/>
           </a:p>
         </p:txBody>
       </p:sp>
@@ -955,38 +953,37 @@
           <a:p>
             <a:pPr lvl="0"/>
             <a:r>
-              <a:rPr lang="en-US" smtClean="0"/>
+              <a:rPr lang="en-US"/>
               <a:t>Click to edit Master text styles</a:t>
             </a:r>
           </a:p>
           <a:p>
             <a:pPr lvl="1"/>
             <a:r>
-              <a:rPr lang="en-US" smtClean="0"/>
+              <a:rPr lang="en-US"/>
               <a:t>Second level</a:t>
             </a:r>
           </a:p>
           <a:p>
             <a:pPr lvl="2"/>
             <a:r>
-              <a:rPr lang="en-US" smtClean="0"/>
+              <a:rPr lang="en-US"/>
               <a:t>Third level</a:t>
             </a:r>
           </a:p>
           <a:p>
             <a:pPr lvl="3"/>
             <a:r>
-              <a:rPr lang="en-US" smtClean="0"/>
+              <a:rPr lang="en-US"/>
               <a:t>Fourth level</a:t>
             </a:r>
           </a:p>
           <a:p>
             <a:pPr lvl="4"/>
             <a:r>
-              <a:rPr lang="en-US" smtClean="0"/>
+              <a:rPr lang="en-US"/>
               <a:t>Fifth level</a:t>
             </a:r>
-            <a:endParaRPr lang="en-US"/>
           </a:p>
         </p:txBody>
       </p:sp>
@@ -1007,7 +1004,7 @@
           <a:p>
             <a:fld id="{78C97017-6FC3-485B-9764-EAC9E56C1D49}" type="datetimeFigureOut">
               <a:rPr lang="en-US" smtClean="0"/>
-              <a:t>9/4/17</a:t>
+              <a:t>11/1/2017</a:t>
             </a:fld>
             <a:endParaRPr lang="en-US"/>
           </a:p>
@@ -1101,10 +1098,9 @@
           <a:lstStyle/>
           <a:p>
             <a:r>
-              <a:rPr lang="en-US" smtClean="0"/>
+              <a:rPr lang="en-US"/>
               <a:t>Click to edit Master title style</a:t>
             </a:r>
-            <a:endParaRPr lang="en-US"/>
           </a:p>
         </p:txBody>
       </p:sp>
@@ -1125,38 +1121,37 @@
           <a:p>
             <a:pPr lvl="0"/>
             <a:r>
-              <a:rPr lang="en-US" smtClean="0"/>
+              <a:rPr lang="en-US"/>
               <a:t>Click to edit Master text styles</a:t>
             </a:r>
           </a:p>
           <a:p>
             <a:pPr lvl="1"/>
             <a:r>
-              <a:rPr lang="en-US" smtClean="0"/>
+              <a:rPr lang="en-US"/>
               <a:t>Second level</a:t>
             </a:r>
           </a:p>
           <a:p>
             <a:pPr lvl="2"/>
             <a:r>
-              <a:rPr lang="en-US" smtClean="0"/>
+              <a:rPr lang="en-US"/>
               <a:t>Third level</a:t>
             </a:r>
           </a:p>
           <a:p>
             <a:pPr lvl="3"/>
             <a:r>
-              <a:rPr lang="en-US" smtClean="0"/>
+              <a:rPr lang="en-US"/>
               <a:t>Fourth level</a:t>
             </a:r>
           </a:p>
           <a:p>
             <a:pPr lvl="4"/>
             <a:r>
-              <a:rPr lang="en-US" smtClean="0"/>
+              <a:rPr lang="en-US"/>
               <a:t>Fifth level</a:t>
             </a:r>
-            <a:endParaRPr lang="en-US"/>
           </a:p>
         </p:txBody>
       </p:sp>
@@ -1177,7 +1172,7 @@
           <a:p>
             <a:fld id="{78C97017-6FC3-485B-9764-EAC9E56C1D49}" type="datetimeFigureOut">
               <a:rPr lang="en-US" smtClean="0"/>
-              <a:t>9/4/17</a:t>
+              <a:t>11/1/2017</a:t>
             </a:fld>
             <a:endParaRPr lang="en-US"/>
           </a:p>
@@ -1280,10 +1275,9 @@
           </a:lstStyle>
           <a:p>
             <a:r>
-              <a:rPr lang="en-US" smtClean="0"/>
+              <a:rPr lang="en-US"/>
               <a:t>Click to edit Master title style</a:t>
             </a:r>
-            <a:endParaRPr lang="en-US"/>
           </a:p>
         </p:txBody>
       </p:sp>
@@ -1400,7 +1394,7 @@
           <a:p>
             <a:pPr lvl="0"/>
             <a:r>
-              <a:rPr lang="en-US" smtClean="0"/>
+              <a:rPr lang="en-US"/>
               <a:t>Click to edit Master text styles</a:t>
             </a:r>
           </a:p>
@@ -1423,7 +1417,7 @@
           <a:p>
             <a:fld id="{78C97017-6FC3-485B-9764-EAC9E56C1D49}" type="datetimeFigureOut">
               <a:rPr lang="en-US" smtClean="0"/>
-              <a:t>9/4/17</a:t>
+              <a:t>11/1/2017</a:t>
             </a:fld>
             <a:endParaRPr lang="en-US"/>
           </a:p>
@@ -1517,10 +1511,9 @@
           <a:lstStyle/>
           <a:p>
             <a:r>
-              <a:rPr lang="en-US" smtClean="0"/>
+              <a:rPr lang="en-US"/>
               <a:t>Click to edit Master title style</a:t>
             </a:r>
-            <a:endParaRPr lang="en-US"/>
           </a:p>
         </p:txBody>
       </p:sp>
@@ -1574,38 +1567,37 @@
           <a:p>
             <a:pPr lvl="0"/>
             <a:r>
-              <a:rPr lang="en-US" smtClean="0"/>
+              <a:rPr lang="en-US"/>
               <a:t>Click to edit Master text styles</a:t>
             </a:r>
           </a:p>
           <a:p>
             <a:pPr lvl="1"/>
             <a:r>
-              <a:rPr lang="en-US" smtClean="0"/>
+              <a:rPr lang="en-US"/>
               <a:t>Second level</a:t>
             </a:r>
           </a:p>
           <a:p>
             <a:pPr lvl="2"/>
             <a:r>
-              <a:rPr lang="en-US" smtClean="0"/>
+              <a:rPr lang="en-US"/>
               <a:t>Third level</a:t>
             </a:r>
           </a:p>
           <a:p>
             <a:pPr lvl="3"/>
             <a:r>
-              <a:rPr lang="en-US" smtClean="0"/>
+              <a:rPr lang="en-US"/>
               <a:t>Fourth level</a:t>
             </a:r>
           </a:p>
           <a:p>
             <a:pPr lvl="4"/>
             <a:r>
-              <a:rPr lang="en-US" smtClean="0"/>
+              <a:rPr lang="en-US"/>
               <a:t>Fifth level</a:t>
             </a:r>
-            <a:endParaRPr lang="en-US"/>
           </a:p>
         </p:txBody>
       </p:sp>
@@ -1659,38 +1651,37 @@
           <a:p>
             <a:pPr lvl="0"/>
             <a:r>
-              <a:rPr lang="en-US" smtClean="0"/>
+              <a:rPr lang="en-US"/>
               <a:t>Click to edit Master text styles</a:t>
             </a:r>
           </a:p>
           <a:p>
             <a:pPr lvl="1"/>
             <a:r>
-              <a:rPr lang="en-US" smtClean="0"/>
+              <a:rPr lang="en-US"/>
               <a:t>Second level</a:t>
             </a:r>
           </a:p>
           <a:p>
             <a:pPr lvl="2"/>
             <a:r>
-              <a:rPr lang="en-US" smtClean="0"/>
+              <a:rPr lang="en-US"/>
               <a:t>Third level</a:t>
             </a:r>
           </a:p>
           <a:p>
             <a:pPr lvl="3"/>
             <a:r>
-              <a:rPr lang="en-US" smtClean="0"/>
+              <a:rPr lang="en-US"/>
               <a:t>Fourth level</a:t>
             </a:r>
           </a:p>
           <a:p>
             <a:pPr lvl="4"/>
             <a:r>
-              <a:rPr lang="en-US" smtClean="0"/>
+              <a:rPr lang="en-US"/>
               <a:t>Fifth level</a:t>
             </a:r>
-            <a:endParaRPr lang="en-US"/>
           </a:p>
         </p:txBody>
       </p:sp>
@@ -1711,7 +1702,7 @@
           <a:p>
             <a:fld id="{78C97017-6FC3-485B-9764-EAC9E56C1D49}" type="datetimeFigureOut">
               <a:rPr lang="en-US" smtClean="0"/>
-              <a:t>9/4/17</a:t>
+              <a:t>11/1/2017</a:t>
             </a:fld>
             <a:endParaRPr lang="en-US"/>
           </a:p>
@@ -1809,10 +1800,9 @@
           </a:lstStyle>
           <a:p>
             <a:r>
-              <a:rPr lang="en-US" smtClean="0"/>
+              <a:rPr lang="en-US"/>
               <a:t>Click to edit Master title style</a:t>
             </a:r>
-            <a:endParaRPr lang="en-US"/>
           </a:p>
         </p:txBody>
       </p:sp>
@@ -1875,7 +1865,7 @@
           <a:p>
             <a:pPr lvl="0"/>
             <a:r>
-              <a:rPr lang="en-US" smtClean="0"/>
+              <a:rPr lang="en-US"/>
               <a:t>Click to edit Master text styles</a:t>
             </a:r>
           </a:p>
@@ -1931,38 +1921,37 @@
           <a:p>
             <a:pPr lvl="0"/>
             <a:r>
-              <a:rPr lang="en-US" smtClean="0"/>
+              <a:rPr lang="en-US"/>
               <a:t>Click to edit Master text styles</a:t>
             </a:r>
           </a:p>
           <a:p>
             <a:pPr lvl="1"/>
             <a:r>
-              <a:rPr lang="en-US" smtClean="0"/>
+              <a:rPr lang="en-US"/>
               <a:t>Second level</a:t>
             </a:r>
           </a:p>
           <a:p>
             <a:pPr lvl="2"/>
             <a:r>
-              <a:rPr lang="en-US" smtClean="0"/>
+              <a:rPr lang="en-US"/>
               <a:t>Third level</a:t>
             </a:r>
           </a:p>
           <a:p>
             <a:pPr lvl="3"/>
             <a:r>
-              <a:rPr lang="en-US" smtClean="0"/>
+              <a:rPr lang="en-US"/>
               <a:t>Fourth level</a:t>
             </a:r>
           </a:p>
           <a:p>
             <a:pPr lvl="4"/>
             <a:r>
-              <a:rPr lang="en-US" smtClean="0"/>
+              <a:rPr lang="en-US"/>
               <a:t>Fifth level</a:t>
             </a:r>
-            <a:endParaRPr lang="en-US"/>
           </a:p>
         </p:txBody>
       </p:sp>
@@ -2025,7 +2014,7 @@
           <a:p>
             <a:pPr lvl="0"/>
             <a:r>
-              <a:rPr lang="en-US" smtClean="0"/>
+              <a:rPr lang="en-US"/>
               <a:t>Click to edit Master text styles</a:t>
             </a:r>
           </a:p>
@@ -2081,38 +2070,37 @@
           <a:p>
             <a:pPr lvl="0"/>
             <a:r>
-              <a:rPr lang="en-US" smtClean="0"/>
+              <a:rPr lang="en-US"/>
               <a:t>Click to edit Master text styles</a:t>
             </a:r>
           </a:p>
           <a:p>
             <a:pPr lvl="1"/>
             <a:r>
-              <a:rPr lang="en-US" smtClean="0"/>
+              <a:rPr lang="en-US"/>
               <a:t>Second level</a:t>
             </a:r>
           </a:p>
           <a:p>
             <a:pPr lvl="2"/>
             <a:r>
-              <a:rPr lang="en-US" smtClean="0"/>
+              <a:rPr lang="en-US"/>
               <a:t>Third level</a:t>
             </a:r>
           </a:p>
           <a:p>
             <a:pPr lvl="3"/>
             <a:r>
-              <a:rPr lang="en-US" smtClean="0"/>
+              <a:rPr lang="en-US"/>
               <a:t>Fourth level</a:t>
             </a:r>
           </a:p>
           <a:p>
             <a:pPr lvl="4"/>
             <a:r>
-              <a:rPr lang="en-US" smtClean="0"/>
+              <a:rPr lang="en-US"/>
               <a:t>Fifth level</a:t>
             </a:r>
-            <a:endParaRPr lang="en-US"/>
           </a:p>
         </p:txBody>
       </p:sp>
@@ -2133,7 +2121,7 @@
           <a:p>
             <a:fld id="{78C97017-6FC3-485B-9764-EAC9E56C1D49}" type="datetimeFigureOut">
               <a:rPr lang="en-US" smtClean="0"/>
-              <a:t>9/4/17</a:t>
+              <a:t>11/1/2017</a:t>
             </a:fld>
             <a:endParaRPr lang="en-US"/>
           </a:p>
@@ -2227,10 +2215,9 @@
           <a:lstStyle/>
           <a:p>
             <a:r>
-              <a:rPr lang="en-US" smtClean="0"/>
+              <a:rPr lang="en-US"/>
               <a:t>Click to edit Master title style</a:t>
             </a:r>
-            <a:endParaRPr lang="en-US"/>
           </a:p>
         </p:txBody>
       </p:sp>
@@ -2251,7 +2238,7 @@
           <a:p>
             <a:fld id="{78C97017-6FC3-485B-9764-EAC9E56C1D49}" type="datetimeFigureOut">
               <a:rPr lang="en-US" smtClean="0"/>
-              <a:t>9/4/17</a:t>
+              <a:t>11/1/2017</a:t>
             </a:fld>
             <a:endParaRPr lang="en-US"/>
           </a:p>
@@ -2346,7 +2333,7 @@
           <a:p>
             <a:fld id="{78C97017-6FC3-485B-9764-EAC9E56C1D49}" type="datetimeFigureOut">
               <a:rPr lang="en-US" smtClean="0"/>
-              <a:t>9/4/17</a:t>
+              <a:t>11/1/2017</a:t>
             </a:fld>
             <a:endParaRPr lang="en-US"/>
           </a:p>
@@ -2449,10 +2436,9 @@
           </a:lstStyle>
           <a:p>
             <a:r>
-              <a:rPr lang="en-US" smtClean="0"/>
+              <a:rPr lang="en-US"/>
               <a:t>Click to edit Master title style</a:t>
             </a:r>
-            <a:endParaRPr lang="en-US"/>
           </a:p>
         </p:txBody>
       </p:sp>
@@ -2506,38 +2492,37 @@
           <a:p>
             <a:pPr lvl="0"/>
             <a:r>
-              <a:rPr lang="en-US" smtClean="0"/>
+              <a:rPr lang="en-US"/>
               <a:t>Click to edit Master text styles</a:t>
             </a:r>
           </a:p>
           <a:p>
             <a:pPr lvl="1"/>
             <a:r>
-              <a:rPr lang="en-US" smtClean="0"/>
+              <a:rPr lang="en-US"/>
               <a:t>Second level</a:t>
             </a:r>
           </a:p>
           <a:p>
             <a:pPr lvl="2"/>
             <a:r>
-              <a:rPr lang="en-US" smtClean="0"/>
+              <a:rPr lang="en-US"/>
               <a:t>Third level</a:t>
             </a:r>
           </a:p>
           <a:p>
             <a:pPr lvl="3"/>
             <a:r>
-              <a:rPr lang="en-US" smtClean="0"/>
+              <a:rPr lang="en-US"/>
               <a:t>Fourth level</a:t>
             </a:r>
           </a:p>
           <a:p>
             <a:pPr lvl="4"/>
             <a:r>
-              <a:rPr lang="en-US" smtClean="0"/>
+              <a:rPr lang="en-US"/>
               <a:t>Fifth level</a:t>
             </a:r>
-            <a:endParaRPr lang="en-US"/>
           </a:p>
         </p:txBody>
       </p:sp>
@@ -2600,7 +2585,7 @@
           <a:p>
             <a:pPr lvl="0"/>
             <a:r>
-              <a:rPr lang="en-US" smtClean="0"/>
+              <a:rPr lang="en-US"/>
               <a:t>Click to edit Master text styles</a:t>
             </a:r>
           </a:p>
@@ -2623,7 +2608,7 @@
           <a:p>
             <a:fld id="{78C97017-6FC3-485B-9764-EAC9E56C1D49}" type="datetimeFigureOut">
               <a:rPr lang="en-US" smtClean="0"/>
-              <a:t>9/4/17</a:t>
+              <a:t>11/1/2017</a:t>
             </a:fld>
             <a:endParaRPr lang="en-US"/>
           </a:p>
@@ -2726,10 +2711,9 @@
           </a:lstStyle>
           <a:p>
             <a:r>
-              <a:rPr lang="en-US" smtClean="0"/>
+              <a:rPr lang="en-US"/>
               <a:t>Click to edit Master title style</a:t>
             </a:r>
-            <a:endParaRPr lang="en-US"/>
           </a:p>
         </p:txBody>
       </p:sp>
@@ -2853,7 +2837,7 @@
           <a:p>
             <a:pPr lvl="0"/>
             <a:r>
-              <a:rPr lang="en-US" smtClean="0"/>
+              <a:rPr lang="en-US"/>
               <a:t>Click to edit Master text styles</a:t>
             </a:r>
           </a:p>
@@ -2876,7 +2860,7 @@
           <a:p>
             <a:fld id="{78C97017-6FC3-485B-9764-EAC9E56C1D49}" type="datetimeFigureOut">
               <a:rPr lang="en-US" smtClean="0"/>
-              <a:t>9/4/17</a:t>
+              <a:t>11/1/2017</a:t>
             </a:fld>
             <a:endParaRPr lang="en-US"/>
           </a:p>
@@ -2985,10 +2969,9 @@
           <a:lstStyle/>
           <a:p>
             <a:r>
-              <a:rPr lang="en-US" smtClean="0"/>
+              <a:rPr lang="en-US"/>
               <a:t>Click to edit Master title style</a:t>
             </a:r>
-            <a:endParaRPr lang="en-US"/>
           </a:p>
         </p:txBody>
       </p:sp>
@@ -3019,38 +3002,37 @@
           <a:p>
             <a:pPr lvl="0"/>
             <a:r>
-              <a:rPr lang="en-US" smtClean="0"/>
+              <a:rPr lang="en-US"/>
               <a:t>Click to edit Master text styles</a:t>
             </a:r>
           </a:p>
           <a:p>
             <a:pPr lvl="1"/>
             <a:r>
-              <a:rPr lang="en-US" smtClean="0"/>
+              <a:rPr lang="en-US"/>
               <a:t>Second level</a:t>
             </a:r>
           </a:p>
           <a:p>
             <a:pPr lvl="2"/>
             <a:r>
-              <a:rPr lang="en-US" smtClean="0"/>
+              <a:rPr lang="en-US"/>
               <a:t>Third level</a:t>
             </a:r>
           </a:p>
           <a:p>
             <a:pPr lvl="3"/>
             <a:r>
-              <a:rPr lang="en-US" smtClean="0"/>
+              <a:rPr lang="en-US"/>
               <a:t>Fourth level</a:t>
             </a:r>
           </a:p>
           <a:p>
             <a:pPr lvl="4"/>
             <a:r>
-              <a:rPr lang="en-US" smtClean="0"/>
+              <a:rPr lang="en-US"/>
               <a:t>Fifth level</a:t>
             </a:r>
-            <a:endParaRPr lang="en-US"/>
           </a:p>
         </p:txBody>
       </p:sp>
@@ -3089,7 +3071,7 @@
           <a:p>
             <a:fld id="{78C97017-6FC3-485B-9764-EAC9E56C1D49}" type="datetimeFigureOut">
               <a:rPr lang="en-US" smtClean="0"/>
-              <a:t>9/4/17</a:t>
+              <a:t>11/1/2017</a:t>
             </a:fld>
             <a:endParaRPr lang="en-US"/>
           </a:p>
@@ -3510,7 +3492,7 @@
           <a:lstStyle/>
           <a:p>
             <a:r>
-              <a:rPr lang="en-US" sz="1200" b="1" dirty="0" smtClean="0">
+              <a:rPr lang="en-US" sz="1200" b="1" dirty="0">
                 <a:solidFill>
                   <a:srgbClr val="7030A0"/>
                 </a:solidFill>
@@ -3569,7 +3551,7 @@
           <a:p>
             <a:pPr algn="ctr"/>
             <a:r>
-              <a:rPr lang="en-US" sz="1050" dirty="0" err="1" smtClean="0">
+              <a:rPr lang="en-US" sz="1050" dirty="0" err="1">
                 <a:solidFill>
                   <a:schemeClr val="bg1"/>
                 </a:solidFill>
@@ -3628,7 +3610,7 @@
           <a:p>
             <a:pPr algn="ctr"/>
             <a:r>
-              <a:rPr lang="en-US" sz="1050" dirty="0" err="1" smtClean="0">
+              <a:rPr lang="en-US" sz="1050" dirty="0" err="1">
                 <a:solidFill>
                   <a:schemeClr val="bg1"/>
                 </a:solidFill>
@@ -3688,6 +3670,7 @@
         <p:nvCxnSpPr>
           <p:cNvPr id="107" name="Elbow Connector 106"/>
           <p:cNvCxnSpPr>
+            <a:cxnSpLocks/>
             <a:stCxn id="9" idx="1"/>
           </p:cNvCxnSpPr>
           <p:nvPr/>
@@ -3783,7 +3766,7 @@
           <a:p>
             <a:pPr algn="ctr"/>
             <a:r>
-              <a:rPr lang="en-US" sz="1050" dirty="0" smtClean="0">
+              <a:rPr lang="en-US" sz="1050" dirty="0">
                 <a:solidFill>
                   <a:schemeClr val="bg1"/>
                 </a:solidFill>
@@ -4107,7 +4090,7 @@
           <a:p>
             <a:pPr algn="ctr"/>
             <a:r>
-              <a:rPr lang="en-US" sz="1050" dirty="0" err="1" smtClean="0">
+              <a:rPr lang="en-US" sz="1050" dirty="0" err="1">
                 <a:solidFill>
                   <a:srgbClr val="7030A0"/>
                 </a:solidFill>
@@ -4249,7 +4232,7 @@
           <a:p>
             <a:pPr algn="ctr"/>
             <a:r>
-              <a:rPr lang="en-US" sz="1050" dirty="0" err="1" smtClean="0">
+              <a:rPr lang="en-US" sz="1050" dirty="0" err="1">
                 <a:solidFill>
                   <a:srgbClr val="7030A0"/>
                 </a:solidFill>
@@ -4393,7 +4376,7 @@
           <a:p>
             <a:pPr algn="ctr"/>
             <a:r>
-              <a:rPr lang="en-US" sz="1050" dirty="0" err="1" smtClean="0">
+              <a:rPr lang="en-US" sz="1050" dirty="0" err="1">
                 <a:solidFill>
                   <a:srgbClr val="7030A0"/>
                 </a:solidFill>
@@ -4492,7 +4475,7 @@
           <a:p>
             <a:pPr algn="ctr"/>
             <a:r>
-              <a:rPr lang="en-US" sz="1050" dirty="0" smtClean="0">
+              <a:rPr lang="en-US" sz="1050" dirty="0">
                 <a:solidFill>
                   <a:srgbClr val="7030A0"/>
                 </a:solidFill>
@@ -4634,7 +4617,7 @@
           <a:p>
             <a:pPr algn="ctr"/>
             <a:r>
-              <a:rPr lang="en-US" sz="1050" dirty="0" smtClean="0">
+              <a:rPr lang="en-US" sz="1050" dirty="0">
                 <a:solidFill>
                   <a:srgbClr val="7030A0"/>
                 </a:solidFill>
@@ -4776,7 +4759,7 @@
           <a:p>
             <a:pPr algn="ctr"/>
             <a:r>
-              <a:rPr lang="en-US" sz="1050" dirty="0" smtClean="0">
+              <a:rPr lang="en-US" sz="1050" dirty="0">
                 <a:solidFill>
                   <a:srgbClr val="7030A0"/>
                 </a:solidFill>
@@ -4784,14 +4767,14 @@
               <a:t>&lt;&lt;interface&gt;&gt;</a:t>
             </a:r>
             <a:br>
-              <a:rPr lang="en-US" sz="1050" dirty="0" smtClean="0">
+              <a:rPr lang="en-US" sz="1050" dirty="0">
                 <a:solidFill>
                   <a:srgbClr val="7030A0"/>
                 </a:solidFill>
               </a:rPr>
             </a:br>
             <a:r>
-              <a:rPr lang="en-US" sz="1050" dirty="0" err="1" smtClean="0">
+              <a:rPr lang="en-US" sz="1050" dirty="0" err="1">
                 <a:solidFill>
                   <a:srgbClr val="7030A0"/>
                 </a:solidFill>
@@ -4847,7 +4830,7 @@
           <a:p>
             <a:pPr algn="ctr"/>
             <a:r>
-              <a:rPr lang="en-US" sz="1050" dirty="0" smtClean="0">
+              <a:rPr lang="en-US" sz="1050" dirty="0">
                 <a:solidFill>
                   <a:srgbClr val="7030A0"/>
                 </a:solidFill>
@@ -4991,7 +4974,7 @@
           <a:p>
             <a:pPr algn="ctr"/>
             <a:r>
-              <a:rPr lang="en-US" sz="1050" dirty="0" smtClean="0">
+              <a:rPr lang="en-US" sz="1050" dirty="0">
                 <a:solidFill>
                   <a:srgbClr val="7030A0"/>
                 </a:solidFill>
@@ -5088,7 +5071,7 @@
           <a:p>
             <a:pPr algn="ctr"/>
             <a:r>
-              <a:rPr lang="en-US" sz="1050" dirty="0" smtClean="0">
+              <a:rPr lang="en-US" sz="1050" dirty="0">
                 <a:solidFill>
                   <a:srgbClr val="7030A0"/>
                 </a:solidFill>
@@ -5152,8 +5135,8 @@
         </p:nvSpPr>
         <p:spPr>
           <a:xfrm>
-            <a:off x="7712397" y="3533171"/>
-            <a:ext cx="708186" cy="285783"/>
+            <a:off x="7712397" y="3570926"/>
+            <a:ext cx="708186" cy="315274"/>
           </a:xfrm>
           <a:prstGeom prst="rect">
             <a:avLst/>
@@ -5185,7 +5168,7 @@
           <a:p>
             <a:pPr algn="ctr"/>
             <a:r>
-              <a:rPr lang="en-US" sz="1050" dirty="0" smtClean="0">
+              <a:rPr lang="en-US" sz="1050" dirty="0">
                 <a:solidFill>
                   <a:srgbClr val="7030A0"/>
                 </a:solidFill>
@@ -5204,6 +5187,7 @@
         <p:nvCxnSpPr>
           <p:cNvPr id="86" name="Elbow Connector 85"/>
           <p:cNvCxnSpPr>
+            <a:cxnSpLocks/>
             <a:stCxn id="78" idx="3"/>
             <a:endCxn id="85" idx="1"/>
           </p:cNvCxnSpPr>
@@ -5212,7 +5196,7 @@
         <p:spPr>
           <a:xfrm>
             <a:off x="7277995" y="3034891"/>
-            <a:ext cx="434402" cy="641172"/>
+            <a:ext cx="434402" cy="693672"/>
           </a:xfrm>
           <a:prstGeom prst="bentConnector3">
             <a:avLst/>
@@ -5373,7 +5357,7 @@
           <a:p>
             <a:pPr algn="ctr"/>
             <a:r>
-              <a:rPr lang="en-US" sz="1050" dirty="0" smtClean="0">
+              <a:rPr lang="en-US" sz="1050" dirty="0">
                 <a:solidFill>
                   <a:srgbClr val="7030A0"/>
                 </a:solidFill>
@@ -5381,14 +5365,14 @@
               <a:t>&lt;&lt;interface&gt;&gt;</a:t>
             </a:r>
             <a:br>
-              <a:rPr lang="en-US" sz="1050" dirty="0" smtClean="0">
+              <a:rPr lang="en-US" sz="1050" dirty="0">
                 <a:solidFill>
                   <a:srgbClr val="7030A0"/>
                 </a:solidFill>
               </a:rPr>
             </a:br>
             <a:r>
-              <a:rPr lang="en-US" sz="1050" dirty="0" err="1" smtClean="0">
+              <a:rPr lang="en-US" sz="1050" dirty="0" err="1">
                 <a:solidFill>
                   <a:srgbClr val="7030A0"/>
                 </a:solidFill>
@@ -5427,7 +5411,7 @@
           <a:p>
             <a:pPr algn="r"/>
             <a:r>
-              <a:rPr lang="en-US" sz="1100" dirty="0" smtClean="0">
+              <a:rPr lang="en-US" sz="1100" dirty="0">
                 <a:solidFill>
                   <a:srgbClr val="7030A0"/>
                 </a:solidFill>
@@ -5483,20 +5467,12 @@
           <a:p>
             <a:pPr algn="ctr"/>
             <a:r>
-              <a:rPr lang="en-US" sz="1050" dirty="0" smtClean="0">
+              <a:rPr lang="en-US" sz="1050" dirty="0">
                 <a:solidFill>
                   <a:srgbClr val="7030A0"/>
                 </a:solidFill>
               </a:rPr>
               <a:t>&lt;&lt;interface&gt;&gt;</a:t>
-            </a:r>
-            <a:r>
-              <a:rPr lang="en-US" sz="1050">
-                <a:solidFill>
-                  <a:srgbClr val="7030A0"/>
-                </a:solidFill>
-              </a:rPr>
-              <a:t/>
             </a:r>
             <a:br>
               <a:rPr lang="en-US" sz="1050">
@@ -5506,7 +5482,7 @@
               </a:rPr>
             </a:br>
             <a:r>
-              <a:rPr lang="en-US" sz="1050" dirty="0" err="1" smtClean="0">
+              <a:rPr lang="en-US" sz="1050" dirty="0" err="1">
                 <a:solidFill>
                   <a:srgbClr val="7030A0"/>
                 </a:solidFill>
@@ -5628,7 +5604,7 @@
           <a:p>
             <a:pPr algn="ctr"/>
             <a:r>
-              <a:rPr lang="en-US" sz="1100" dirty="0" smtClean="0">
+              <a:rPr lang="en-US" sz="1100" dirty="0">
                 <a:solidFill>
                   <a:srgbClr val="7030A0"/>
                 </a:solidFill>
@@ -5667,7 +5643,7 @@
           <a:p>
             <a:pPr algn="ctr"/>
             <a:r>
-              <a:rPr lang="en-US" sz="1100" dirty="0" smtClean="0">
+              <a:rPr lang="en-US" sz="1100" dirty="0">
                 <a:solidFill>
                   <a:srgbClr val="7030A0"/>
                 </a:solidFill>
@@ -5706,7 +5682,7 @@
           <a:p>
             <a:pPr algn="ctr"/>
             <a:r>
-              <a:rPr lang="en-US" sz="1100" dirty="0" smtClean="0">
+              <a:rPr lang="en-US" sz="1100" dirty="0">
                 <a:solidFill>
                   <a:srgbClr val="7030A0"/>
                 </a:solidFill>
@@ -5745,7 +5721,7 @@
           <a:p>
             <a:pPr algn="ctr"/>
             <a:r>
-              <a:rPr lang="en-US" sz="1100" dirty="0" smtClean="0">
+              <a:rPr lang="en-US" sz="1100" dirty="0">
                 <a:solidFill>
                   <a:srgbClr val="7030A0"/>
                 </a:solidFill>
@@ -5784,7 +5760,7 @@
           <a:p>
             <a:pPr algn="ctr"/>
             <a:r>
-              <a:rPr lang="en-US" sz="1100" dirty="0" smtClean="0">
+              <a:rPr lang="en-US" sz="1100" dirty="0">
                 <a:solidFill>
                   <a:srgbClr val="7030A0"/>
                 </a:solidFill>
@@ -5823,7 +5799,7 @@
           <a:p>
             <a:pPr algn="ctr"/>
             <a:r>
-              <a:rPr lang="en-US" sz="1100" dirty="0" smtClean="0">
+              <a:rPr lang="en-US" sz="1100" dirty="0">
                 <a:solidFill>
                   <a:srgbClr val="7030A0"/>
                 </a:solidFill>
@@ -5862,7 +5838,7 @@
           <a:p>
             <a:pPr algn="ctr"/>
             <a:r>
-              <a:rPr lang="en-US" sz="1100" dirty="0" smtClean="0">
+              <a:rPr lang="en-US" sz="1100" dirty="0">
                 <a:solidFill>
                   <a:srgbClr val="7030A0"/>
                 </a:solidFill>
@@ -5901,7 +5877,7 @@
           <a:p>
             <a:pPr algn="ctr"/>
             <a:r>
-              <a:rPr lang="en-US" sz="1100" dirty="0" smtClean="0">
+              <a:rPr lang="en-US" sz="1100" dirty="0">
                 <a:solidFill>
                   <a:srgbClr val="7030A0"/>
                 </a:solidFill>
@@ -5916,6 +5892,115 @@
           </a:p>
         </p:txBody>
       </p:sp>
+      <p:sp>
+        <p:nvSpPr>
+          <p:cNvPr id="55" name="Rectangle 8">
+            <a:extLst>
+              <a:ext uri="{FF2B5EF4-FFF2-40B4-BE49-F238E27FC236}">
+                <a16:creationId xmlns:a16="http://schemas.microsoft.com/office/drawing/2014/main" id="{145C478A-7092-4A22-9C33-8DDA030A6428}"/>
+              </a:ext>
+            </a:extLst>
+          </p:cNvPr>
+          <p:cNvSpPr/>
+          <p:nvPr/>
+        </p:nvSpPr>
+        <p:spPr>
+          <a:xfrm>
+            <a:off x="7705145" y="3975580"/>
+            <a:ext cx="708186" cy="315274"/>
+          </a:xfrm>
+          <a:prstGeom prst="rect">
+            <a:avLst/>
+          </a:prstGeom>
+          <a:ln w="19050">
+            <a:solidFill>
+              <a:srgbClr val="7030A0"/>
+            </a:solidFill>
+          </a:ln>
+          <a:effectLst/>
+        </p:spPr>
+        <p:style>
+          <a:lnRef idx="1">
+            <a:schemeClr val="accent4"/>
+          </a:lnRef>
+          <a:fillRef idx="2">
+            <a:schemeClr val="accent4"/>
+          </a:fillRef>
+          <a:effectRef idx="1">
+            <a:schemeClr val="accent4"/>
+          </a:effectRef>
+          <a:fontRef idx="minor">
+            <a:schemeClr val="dk1"/>
+          </a:fontRef>
+        </p:style>
+        <p:txBody>
+          <a:bodyPr rtlCol="0" anchor="ctr"/>
+          <a:lstStyle/>
+          <a:p>
+            <a:pPr algn="ctr"/>
+            <a:r>
+              <a:rPr lang="en-US" sz="1050" dirty="0">
+                <a:solidFill>
+                  <a:srgbClr val="7030A0"/>
+                </a:solidFill>
+              </a:rPr>
+              <a:t>Remark</a:t>
+            </a:r>
+            <a:endParaRPr lang="en-SG" sz="1050" dirty="0">
+              <a:solidFill>
+                <a:srgbClr val="7030A0"/>
+              </a:solidFill>
+            </a:endParaRPr>
+          </a:p>
+        </p:txBody>
+      </p:sp>
+      <p:cxnSp>
+        <p:nvCxnSpPr>
+          <p:cNvPr id="73" name="Elbow Connector 85">
+            <a:extLst>
+              <a:ext uri="{FF2B5EF4-FFF2-40B4-BE49-F238E27FC236}">
+                <a16:creationId xmlns:a16="http://schemas.microsoft.com/office/drawing/2014/main" id="{AE7AC71B-F26B-4996-B901-60A4FAFA3398}"/>
+              </a:ext>
+            </a:extLst>
+          </p:cNvPr>
+          <p:cNvCxnSpPr>
+            <a:cxnSpLocks/>
+            <a:endCxn id="55" idx="1"/>
+          </p:cNvCxnSpPr>
+          <p:nvPr/>
+        </p:nvCxnSpPr>
+        <p:spPr>
+          <a:xfrm rot="16200000" flipH="1">
+            <a:off x="6996528" y="3424600"/>
+            <a:ext cx="1200032" cy="217201"/>
+          </a:xfrm>
+          <a:prstGeom prst="bentConnector2">
+            <a:avLst/>
+          </a:prstGeom>
+          <a:ln w="19050">
+            <a:solidFill>
+              <a:srgbClr val="7030A0"/>
+            </a:solidFill>
+            <a:headEnd type="none" w="med" len="med"/>
+            <a:tailEnd type="arrow" w="med" len="med"/>
+          </a:ln>
+          <a:effectLst/>
+        </p:spPr>
+        <p:style>
+          <a:lnRef idx="1">
+            <a:schemeClr val="accent2"/>
+          </a:lnRef>
+          <a:fillRef idx="2">
+            <a:schemeClr val="accent2"/>
+          </a:fillRef>
+          <a:effectRef idx="1">
+            <a:schemeClr val="accent2"/>
+          </a:effectRef>
+          <a:fontRef idx="minor">
+            <a:schemeClr val="dk1"/>
+          </a:fontRef>
+        </p:style>
+      </p:cxnSp>
     </p:spTree>
     <p:extLst>
       <p:ext uri="{BB962C8B-B14F-4D97-AF65-F5344CB8AC3E}">
@@ -5926,13 +6011,6 @@
   <p:clrMapOvr>
     <a:masterClrMapping/>
   </p:clrMapOvr>
-  <p:timing>
-    <p:tnLst>
-      <p:par>
-        <p:cTn id="1" dur="indefinite" restart="never" nodeType="tmRoot"/>
-      </p:par>
-    </p:tnLst>
-  </p:timing>
 </p:sld>
 </file>
 

</xml_diff>

<commit_message>
update model and ui diagrams
</commit_message>
<xml_diff>
--- a/docs/diagrams/ModelComponentClassDiagram.pptx
+++ b/docs/diagrams/ModelComponentClassDiagram.pptx
@@ -109,7 +109,7 @@
   </p:defaultTextStyle>
   <p:extLst>
     <p:ext uri="{EFAFB233-063F-42B5-8137-9DF3F51BA10A}">
-      <p15:sldGuideLst xmlns:p15="http://schemas.microsoft.com/office/powerpoint/2012/main">
+      <p15:sldGuideLst xmlns:p15="http://schemas.microsoft.com/office/powerpoint/2012/main" xmlns="">
         <p15:guide id="1" orient="horz" pos="1488">
           <p15:clr>
             <a:srgbClr val="A4A3A4"/>
@@ -208,7 +208,8 @@
           <a:p>
             <a:fld id="{F5CC4B3F-88C1-4FFA-B1B6-F41C21DC6924}" type="datetimeFigureOut">
               <a:rPr lang="en-US" smtClean="0"/>
-              <a:t>9/4/17</a:t>
+              <a:pPr/>
+              <a:t>11/1/2017</a:t>
             </a:fld>
             <a:endParaRPr lang="en-US"/>
           </a:p>
@@ -367,6 +368,7 @@
           <a:p>
             <a:fld id="{5A7AB025-77E3-4BD1-A2FD-B3183DBA47A3}" type="slidenum">
               <a:rPr lang="en-US" smtClean="0"/>
+              <a:pPr/>
               <a:t>‹#›</a:t>
             </a:fld>
             <a:endParaRPr lang="en-US"/>
@@ -376,7 +378,7 @@
     </p:spTree>
     <p:extLst>
       <p:ext uri="{BB962C8B-B14F-4D97-AF65-F5344CB8AC3E}">
-        <p14:creationId xmlns:p14="http://schemas.microsoft.com/office/powerpoint/2010/main" val="2023976206"/>
+        <p14:creationId xmlns:p14="http://schemas.microsoft.com/office/powerpoint/2010/main" xmlns="" val="2023976206"/>
       </p:ext>
     </p:extLst>
   </p:cSld>
@@ -476,6 +478,91 @@
 </p:notesMaster>
 </file>
 
+<file path=ppt/notesSlides/notesSlide1.xml><?xml version="1.0" encoding="utf-8"?>
+<p:notes xmlns:a="http://schemas.openxmlformats.org/drawingml/2006/main" xmlns:r="http://schemas.openxmlformats.org/officeDocument/2006/relationships" xmlns:p="http://schemas.openxmlformats.org/presentationml/2006/main">
+  <p:cSld>
+    <p:spTree>
+      <p:nvGrpSpPr>
+        <p:cNvPr id="1" name=""/>
+        <p:cNvGrpSpPr/>
+        <p:nvPr/>
+      </p:nvGrpSpPr>
+      <p:grpSpPr>
+        <a:xfrm>
+          <a:off x="0" y="0"/>
+          <a:ext cx="0" cy="0"/>
+          <a:chOff x="0" y="0"/>
+          <a:chExt cx="0" cy="0"/>
+        </a:xfrm>
+      </p:grpSpPr>
+      <p:sp>
+        <p:nvSpPr>
+          <p:cNvPr id="2" name="Slide Image Placeholder 1"/>
+          <p:cNvSpPr>
+            <a:spLocks noGrp="1" noRot="1" noChangeAspect="1"/>
+          </p:cNvSpPr>
+          <p:nvPr>
+            <p:ph type="sldImg"/>
+          </p:nvPr>
+        </p:nvSpPr>
+        <p:spPr/>
+      </p:sp>
+      <p:sp>
+        <p:nvSpPr>
+          <p:cNvPr id="3" name="Notes Placeholder 2"/>
+          <p:cNvSpPr>
+            <a:spLocks noGrp="1"/>
+          </p:cNvSpPr>
+          <p:nvPr>
+            <p:ph type="body" idx="1"/>
+          </p:nvPr>
+        </p:nvSpPr>
+        <p:spPr/>
+        <p:txBody>
+          <a:bodyPr/>
+          <a:lstStyle/>
+          <a:p>
+            <a:endParaRPr lang="en-US" dirty="0"/>
+          </a:p>
+        </p:txBody>
+      </p:sp>
+      <p:sp>
+        <p:nvSpPr>
+          <p:cNvPr id="4" name="Slide Number Placeholder 3"/>
+          <p:cNvSpPr>
+            <a:spLocks noGrp="1"/>
+          </p:cNvSpPr>
+          <p:nvPr>
+            <p:ph type="sldNum" sz="quarter" idx="10"/>
+          </p:nvPr>
+        </p:nvSpPr>
+        <p:spPr/>
+        <p:txBody>
+          <a:bodyPr/>
+          <a:lstStyle/>
+          <a:p>
+            <a:fld id="{5A7AB025-77E3-4BD1-A2FD-B3183DBA47A3}" type="slidenum">
+              <a:rPr lang="en-US" smtClean="0"/>
+              <a:pPr/>
+              <a:t>1</a:t>
+            </a:fld>
+            <a:endParaRPr lang="en-US"/>
+          </a:p>
+        </p:txBody>
+      </p:sp>
+    </p:spTree>
+    <p:extLst>
+      <p:ext uri="{BB962C8B-B14F-4D97-AF65-F5344CB8AC3E}">
+        <p14:creationId xmlns:p14="http://schemas.microsoft.com/office/powerpoint/2010/main" xmlns="" val="679901574"/>
+      </p:ext>
+    </p:extLst>
+  </p:cSld>
+  <p:clrMapOvr>
+    <a:masterClrMapping/>
+  </p:clrMapOvr>
+</p:notes>
+</file>
+
 <file path=ppt/slideLayouts/slideLayout1.xml><?xml version="1.0" encoding="utf-8"?>
 <p:sldLayout xmlns:a="http://schemas.openxmlformats.org/drawingml/2006/main" xmlns:r="http://schemas.openxmlformats.org/officeDocument/2006/relationships" xmlns:p="http://schemas.openxmlformats.org/presentationml/2006/main" type="title" preserve="1">
   <p:cSld name="Title Slide">
@@ -657,7 +744,8 @@
           <a:p>
             <a:fld id="{78C97017-6FC3-485B-9764-EAC9E56C1D49}" type="datetimeFigureOut">
               <a:rPr lang="en-US" smtClean="0"/>
-              <a:t>9/4/17</a:t>
+              <a:pPr/>
+              <a:t>11/1/2017</a:t>
             </a:fld>
             <a:endParaRPr lang="en-US"/>
           </a:p>
@@ -699,6 +787,7 @@
           <a:p>
             <a:fld id="{FB34683C-161B-4520-BF45-B179E228CF2A}" type="slidenum">
               <a:rPr lang="en-US" smtClean="0"/>
+              <a:pPr/>
               <a:t>‹#›</a:t>
             </a:fld>
             <a:endParaRPr lang="en-US"/>
@@ -708,7 +797,7 @@
     </p:spTree>
     <p:extLst>
       <p:ext uri="{BB962C8B-B14F-4D97-AF65-F5344CB8AC3E}">
-        <p14:creationId xmlns:p14="http://schemas.microsoft.com/office/powerpoint/2010/main" val="3246593157"/>
+        <p14:creationId xmlns:p14="http://schemas.microsoft.com/office/powerpoint/2010/main" xmlns="" val="3246593157"/>
       </p:ext>
     </p:extLst>
   </p:cSld>
@@ -827,7 +916,8 @@
           <a:p>
             <a:fld id="{78C97017-6FC3-485B-9764-EAC9E56C1D49}" type="datetimeFigureOut">
               <a:rPr lang="en-US" smtClean="0"/>
-              <a:t>9/4/17</a:t>
+              <a:pPr/>
+              <a:t>11/1/2017</a:t>
             </a:fld>
             <a:endParaRPr lang="en-US"/>
           </a:p>
@@ -869,6 +959,7 @@
           <a:p>
             <a:fld id="{FB34683C-161B-4520-BF45-B179E228CF2A}" type="slidenum">
               <a:rPr lang="en-US" smtClean="0"/>
+              <a:pPr/>
               <a:t>‹#›</a:t>
             </a:fld>
             <a:endParaRPr lang="en-US"/>
@@ -878,7 +969,7 @@
     </p:spTree>
     <p:extLst>
       <p:ext uri="{BB962C8B-B14F-4D97-AF65-F5344CB8AC3E}">
-        <p14:creationId xmlns:p14="http://schemas.microsoft.com/office/powerpoint/2010/main" val="2707025021"/>
+        <p14:creationId xmlns:p14="http://schemas.microsoft.com/office/powerpoint/2010/main" xmlns="" val="2707025021"/>
       </p:ext>
     </p:extLst>
   </p:cSld>
@@ -1007,7 +1098,8 @@
           <a:p>
             <a:fld id="{78C97017-6FC3-485B-9764-EAC9E56C1D49}" type="datetimeFigureOut">
               <a:rPr lang="en-US" smtClean="0"/>
-              <a:t>9/4/17</a:t>
+              <a:pPr/>
+              <a:t>11/1/2017</a:t>
             </a:fld>
             <a:endParaRPr lang="en-US"/>
           </a:p>
@@ -1049,6 +1141,7 @@
           <a:p>
             <a:fld id="{FB34683C-161B-4520-BF45-B179E228CF2A}" type="slidenum">
               <a:rPr lang="en-US" smtClean="0"/>
+              <a:pPr/>
               <a:t>‹#›</a:t>
             </a:fld>
             <a:endParaRPr lang="en-US"/>
@@ -1058,7 +1151,7 @@
     </p:spTree>
     <p:extLst>
       <p:ext uri="{BB962C8B-B14F-4D97-AF65-F5344CB8AC3E}">
-        <p14:creationId xmlns:p14="http://schemas.microsoft.com/office/powerpoint/2010/main" val="568378986"/>
+        <p14:creationId xmlns:p14="http://schemas.microsoft.com/office/powerpoint/2010/main" xmlns="" val="568378986"/>
       </p:ext>
     </p:extLst>
   </p:cSld>
@@ -1177,7 +1270,8 @@
           <a:p>
             <a:fld id="{78C97017-6FC3-485B-9764-EAC9E56C1D49}" type="datetimeFigureOut">
               <a:rPr lang="en-US" smtClean="0"/>
-              <a:t>9/4/17</a:t>
+              <a:pPr/>
+              <a:t>11/1/2017</a:t>
             </a:fld>
             <a:endParaRPr lang="en-US"/>
           </a:p>
@@ -1219,6 +1313,7 @@
           <a:p>
             <a:fld id="{FB34683C-161B-4520-BF45-B179E228CF2A}" type="slidenum">
               <a:rPr lang="en-US" smtClean="0"/>
+              <a:pPr/>
               <a:t>‹#›</a:t>
             </a:fld>
             <a:endParaRPr lang="en-US"/>
@@ -1228,7 +1323,7 @@
     </p:spTree>
     <p:extLst>
       <p:ext uri="{BB962C8B-B14F-4D97-AF65-F5344CB8AC3E}">
-        <p14:creationId xmlns:p14="http://schemas.microsoft.com/office/powerpoint/2010/main" val="266658052"/>
+        <p14:creationId xmlns:p14="http://schemas.microsoft.com/office/powerpoint/2010/main" xmlns="" val="266658052"/>
       </p:ext>
     </p:extLst>
   </p:cSld>
@@ -1423,7 +1518,8 @@
           <a:p>
             <a:fld id="{78C97017-6FC3-485B-9764-EAC9E56C1D49}" type="datetimeFigureOut">
               <a:rPr lang="en-US" smtClean="0"/>
-              <a:t>9/4/17</a:t>
+              <a:pPr/>
+              <a:t>11/1/2017</a:t>
             </a:fld>
             <a:endParaRPr lang="en-US"/>
           </a:p>
@@ -1465,6 +1561,7 @@
           <a:p>
             <a:fld id="{FB34683C-161B-4520-BF45-B179E228CF2A}" type="slidenum">
               <a:rPr lang="en-US" smtClean="0"/>
+              <a:pPr/>
               <a:t>‹#›</a:t>
             </a:fld>
             <a:endParaRPr lang="en-US"/>
@@ -1474,7 +1571,7 @@
     </p:spTree>
     <p:extLst>
       <p:ext uri="{BB962C8B-B14F-4D97-AF65-F5344CB8AC3E}">
-        <p14:creationId xmlns:p14="http://schemas.microsoft.com/office/powerpoint/2010/main" val="474686344"/>
+        <p14:creationId xmlns:p14="http://schemas.microsoft.com/office/powerpoint/2010/main" xmlns="" val="474686344"/>
       </p:ext>
     </p:extLst>
   </p:cSld>
@@ -1711,7 +1808,8 @@
           <a:p>
             <a:fld id="{78C97017-6FC3-485B-9764-EAC9E56C1D49}" type="datetimeFigureOut">
               <a:rPr lang="en-US" smtClean="0"/>
-              <a:t>9/4/17</a:t>
+              <a:pPr/>
+              <a:t>11/1/2017</a:t>
             </a:fld>
             <a:endParaRPr lang="en-US"/>
           </a:p>
@@ -1753,6 +1851,7 @@
           <a:p>
             <a:fld id="{FB34683C-161B-4520-BF45-B179E228CF2A}" type="slidenum">
               <a:rPr lang="en-US" smtClean="0"/>
+              <a:pPr/>
               <a:t>‹#›</a:t>
             </a:fld>
             <a:endParaRPr lang="en-US"/>
@@ -1762,7 +1861,7 @@
     </p:spTree>
     <p:extLst>
       <p:ext uri="{BB962C8B-B14F-4D97-AF65-F5344CB8AC3E}">
-        <p14:creationId xmlns:p14="http://schemas.microsoft.com/office/powerpoint/2010/main" val="562293251"/>
+        <p14:creationId xmlns:p14="http://schemas.microsoft.com/office/powerpoint/2010/main" xmlns="" val="562293251"/>
       </p:ext>
     </p:extLst>
   </p:cSld>
@@ -2133,7 +2232,8 @@
           <a:p>
             <a:fld id="{78C97017-6FC3-485B-9764-EAC9E56C1D49}" type="datetimeFigureOut">
               <a:rPr lang="en-US" smtClean="0"/>
-              <a:t>9/4/17</a:t>
+              <a:pPr/>
+              <a:t>11/1/2017</a:t>
             </a:fld>
             <a:endParaRPr lang="en-US"/>
           </a:p>
@@ -2175,6 +2275,7 @@
           <a:p>
             <a:fld id="{FB34683C-161B-4520-BF45-B179E228CF2A}" type="slidenum">
               <a:rPr lang="en-US" smtClean="0"/>
+              <a:pPr/>
               <a:t>‹#›</a:t>
             </a:fld>
             <a:endParaRPr lang="en-US"/>
@@ -2184,7 +2285,7 @@
     </p:spTree>
     <p:extLst>
       <p:ext uri="{BB962C8B-B14F-4D97-AF65-F5344CB8AC3E}">
-        <p14:creationId xmlns:p14="http://schemas.microsoft.com/office/powerpoint/2010/main" val="1126424250"/>
+        <p14:creationId xmlns:p14="http://schemas.microsoft.com/office/powerpoint/2010/main" xmlns="" val="1126424250"/>
       </p:ext>
     </p:extLst>
   </p:cSld>
@@ -2251,7 +2352,8 @@
           <a:p>
             <a:fld id="{78C97017-6FC3-485B-9764-EAC9E56C1D49}" type="datetimeFigureOut">
               <a:rPr lang="en-US" smtClean="0"/>
-              <a:t>9/4/17</a:t>
+              <a:pPr/>
+              <a:t>11/1/2017</a:t>
             </a:fld>
             <a:endParaRPr lang="en-US"/>
           </a:p>
@@ -2293,6 +2395,7 @@
           <a:p>
             <a:fld id="{FB34683C-161B-4520-BF45-B179E228CF2A}" type="slidenum">
               <a:rPr lang="en-US" smtClean="0"/>
+              <a:pPr/>
               <a:t>‹#›</a:t>
             </a:fld>
             <a:endParaRPr lang="en-US"/>
@@ -2302,7 +2405,7 @@
     </p:spTree>
     <p:extLst>
       <p:ext uri="{BB962C8B-B14F-4D97-AF65-F5344CB8AC3E}">
-        <p14:creationId xmlns:p14="http://schemas.microsoft.com/office/powerpoint/2010/main" val="4159724230"/>
+        <p14:creationId xmlns:p14="http://schemas.microsoft.com/office/powerpoint/2010/main" xmlns="" val="4159724230"/>
       </p:ext>
     </p:extLst>
   </p:cSld>
@@ -2346,7 +2449,8 @@
           <a:p>
             <a:fld id="{78C97017-6FC3-485B-9764-EAC9E56C1D49}" type="datetimeFigureOut">
               <a:rPr lang="en-US" smtClean="0"/>
-              <a:t>9/4/17</a:t>
+              <a:pPr/>
+              <a:t>11/1/2017</a:t>
             </a:fld>
             <a:endParaRPr lang="en-US"/>
           </a:p>
@@ -2388,6 +2492,7 @@
           <a:p>
             <a:fld id="{FB34683C-161B-4520-BF45-B179E228CF2A}" type="slidenum">
               <a:rPr lang="en-US" smtClean="0"/>
+              <a:pPr/>
               <a:t>‹#›</a:t>
             </a:fld>
             <a:endParaRPr lang="en-US"/>
@@ -2397,7 +2502,7 @@
     </p:spTree>
     <p:extLst>
       <p:ext uri="{BB962C8B-B14F-4D97-AF65-F5344CB8AC3E}">
-        <p14:creationId xmlns:p14="http://schemas.microsoft.com/office/powerpoint/2010/main" val="1793928710"/>
+        <p14:creationId xmlns:p14="http://schemas.microsoft.com/office/powerpoint/2010/main" xmlns="" val="1793928710"/>
       </p:ext>
     </p:extLst>
   </p:cSld>
@@ -2623,7 +2728,8 @@
           <a:p>
             <a:fld id="{78C97017-6FC3-485B-9764-EAC9E56C1D49}" type="datetimeFigureOut">
               <a:rPr lang="en-US" smtClean="0"/>
-              <a:t>9/4/17</a:t>
+              <a:pPr/>
+              <a:t>11/1/2017</a:t>
             </a:fld>
             <a:endParaRPr lang="en-US"/>
           </a:p>
@@ -2665,6 +2771,7 @@
           <a:p>
             <a:fld id="{FB34683C-161B-4520-BF45-B179E228CF2A}" type="slidenum">
               <a:rPr lang="en-US" smtClean="0"/>
+              <a:pPr/>
               <a:t>‹#›</a:t>
             </a:fld>
             <a:endParaRPr lang="en-US"/>
@@ -2674,7 +2781,7 @@
     </p:spTree>
     <p:extLst>
       <p:ext uri="{BB962C8B-B14F-4D97-AF65-F5344CB8AC3E}">
-        <p14:creationId xmlns:p14="http://schemas.microsoft.com/office/powerpoint/2010/main" val="2076802089"/>
+        <p14:creationId xmlns:p14="http://schemas.microsoft.com/office/powerpoint/2010/main" xmlns="" val="2076802089"/>
       </p:ext>
     </p:extLst>
   </p:cSld>
@@ -2876,7 +2983,8 @@
           <a:p>
             <a:fld id="{78C97017-6FC3-485B-9764-EAC9E56C1D49}" type="datetimeFigureOut">
               <a:rPr lang="en-US" smtClean="0"/>
-              <a:t>9/4/17</a:t>
+              <a:pPr/>
+              <a:t>11/1/2017</a:t>
             </a:fld>
             <a:endParaRPr lang="en-US"/>
           </a:p>
@@ -2918,6 +3026,7 @@
           <a:p>
             <a:fld id="{FB34683C-161B-4520-BF45-B179E228CF2A}" type="slidenum">
               <a:rPr lang="en-US" smtClean="0"/>
+              <a:pPr/>
               <a:t>‹#›</a:t>
             </a:fld>
             <a:endParaRPr lang="en-US"/>
@@ -2927,7 +3036,7 @@
     </p:spTree>
     <p:extLst>
       <p:ext uri="{BB962C8B-B14F-4D97-AF65-F5344CB8AC3E}">
-        <p14:creationId xmlns:p14="http://schemas.microsoft.com/office/powerpoint/2010/main" val="201835938"/>
+        <p14:creationId xmlns:p14="http://schemas.microsoft.com/office/powerpoint/2010/main" xmlns="" val="201835938"/>
       </p:ext>
     </p:extLst>
   </p:cSld>
@@ -3089,7 +3198,8 @@
           <a:p>
             <a:fld id="{78C97017-6FC3-485B-9764-EAC9E56C1D49}" type="datetimeFigureOut">
               <a:rPr lang="en-US" smtClean="0"/>
-              <a:t>9/4/17</a:t>
+              <a:pPr/>
+              <a:t>11/1/2017</a:t>
             </a:fld>
             <a:endParaRPr lang="en-US"/>
           </a:p>
@@ -3167,6 +3277,7 @@
           <a:p>
             <a:fld id="{FB34683C-161B-4520-BF45-B179E228CF2A}" type="slidenum">
               <a:rPr lang="en-US" smtClean="0"/>
+              <a:pPr/>
               <a:t>‹#›</a:t>
             </a:fld>
             <a:endParaRPr lang="en-US"/>
@@ -3176,7 +3287,7 @@
     </p:spTree>
     <p:extLst>
       <p:ext uri="{BB962C8B-B14F-4D97-AF65-F5344CB8AC3E}">
-        <p14:creationId xmlns:p14="http://schemas.microsoft.com/office/powerpoint/2010/main" val="2341400630"/>
+        <p14:creationId xmlns:p14="http://schemas.microsoft.com/office/powerpoint/2010/main" xmlns="" val="2341400630"/>
       </p:ext>
     </p:extLst>
   </p:cSld>
@@ -3472,8 +3583,8 @@
         </p:nvSpPr>
         <p:spPr>
           <a:xfrm>
-            <a:off x="1119865" y="1727200"/>
-            <a:ext cx="7490735" cy="2997200"/>
+            <a:off x="1000100" y="1643050"/>
+            <a:ext cx="7847925" cy="4000528"/>
           </a:xfrm>
           <a:prstGeom prst="roundRect">
             <a:avLst>
@@ -3648,16 +3759,19 @@
           <p:cNvPr id="53" name="Elbow Connector 63"/>
           <p:cNvCxnSpPr>
             <a:stCxn id="71" idx="3"/>
+            <a:endCxn id="62" idx="2"/>
           </p:cNvCxnSpPr>
           <p:nvPr/>
         </p:nvCxnSpPr>
         <p:spPr>
-          <a:xfrm flipV="1">
-            <a:off x="6477000" y="3194131"/>
-            <a:ext cx="95385" cy="416514"/>
-          </a:xfrm>
-          <a:prstGeom prst="bentConnector2">
-            <a:avLst/>
+          <a:xfrm rot="5400000" flipH="1" flipV="1">
+            <a:off x="6218469" y="3194711"/>
+            <a:ext cx="439186" cy="459416"/>
+          </a:xfrm>
+          <a:prstGeom prst="bentConnector3">
+            <a:avLst>
+              <a:gd name="adj1" fmla="val 50000"/>
+            </a:avLst>
           </a:prstGeom>
           <a:ln w="19050">
             <a:solidFill>
@@ -3694,13 +3808,13 @@
         </p:nvCxnSpPr>
         <p:spPr>
           <a:xfrm rot="5400000" flipH="1" flipV="1">
-            <a:off x="4360065" y="1080909"/>
-            <a:ext cx="378691" cy="4637261"/>
+            <a:off x="4359168" y="1080985"/>
+            <a:ext cx="379513" cy="4636288"/>
           </a:xfrm>
           <a:prstGeom prst="bentConnector4">
             <a:avLst>
-              <a:gd name="adj1" fmla="val -101829"/>
-              <a:gd name="adj2" fmla="val 99976"/>
+              <a:gd name="adj1" fmla="val -491922"/>
+              <a:gd name="adj2" fmla="val 99999"/>
             </a:avLst>
           </a:prstGeom>
           <a:ln w="19050">
@@ -3893,8 +4007,8 @@
           <p:nvPr/>
         </p:nvSpPr>
         <p:spPr>
-          <a:xfrm rot="5400000" flipV="1">
-            <a:off x="6253986" y="3522883"/>
+          <a:xfrm rot="17745" flipV="1">
+            <a:off x="6072649" y="3644011"/>
             <a:ext cx="270504" cy="175523"/>
           </a:xfrm>
           <a:prstGeom prst="triangle">
@@ -4743,7 +4857,7 @@
         </p:nvSpPr>
         <p:spPr>
           <a:xfrm>
-            <a:off x="5128257" y="3429000"/>
+            <a:off x="5643570" y="3868058"/>
             <a:ext cx="1156969" cy="346760"/>
           </a:xfrm>
           <a:prstGeom prst="rect">
@@ -5055,7 +5169,7 @@
         </p:nvSpPr>
         <p:spPr>
           <a:xfrm>
-            <a:off x="7712397" y="3210194"/>
+            <a:off x="7712397" y="3581400"/>
             <a:ext cx="708186" cy="285783"/>
           </a:xfrm>
           <a:prstGeom prst="rect">
@@ -5115,7 +5229,7 @@
         <p:spPr>
           <a:xfrm>
             <a:off x="7277995" y="3034891"/>
-            <a:ext cx="434402" cy="318195"/>
+            <a:ext cx="434402" cy="689401"/>
           </a:xfrm>
           <a:prstGeom prst="bentConnector3">
             <a:avLst/>
@@ -5152,7 +5266,7 @@
         </p:nvSpPr>
         <p:spPr>
           <a:xfrm>
-            <a:off x="7712397" y="3533171"/>
+            <a:off x="7712397" y="3981417"/>
             <a:ext cx="708186" cy="285783"/>
           </a:xfrm>
           <a:prstGeom prst="rect">
@@ -5212,7 +5326,7 @@
         <p:spPr>
           <a:xfrm>
             <a:off x="7277995" y="3034891"/>
-            <a:ext cx="434402" cy="641172"/>
+            <a:ext cx="434402" cy="1089418"/>
           </a:xfrm>
           <a:prstGeom prst="bentConnector3">
             <a:avLst/>
@@ -5450,7 +5564,7 @@
         </p:nvSpPr>
         <p:spPr>
           <a:xfrm>
-            <a:off x="2057401" y="4239491"/>
+            <a:off x="1076308" y="4535358"/>
             <a:ext cx="1066800" cy="346760"/>
           </a:xfrm>
           <a:prstGeom prst="rect">
@@ -5491,7 +5605,7 @@
               <a:t>&lt;&lt;interface&gt;&gt;</a:t>
             </a:r>
             <a:r>
-              <a:rPr lang="en-US" sz="1050">
+              <a:rPr lang="en-US" sz="1050" dirty="0">
                 <a:solidFill>
                   <a:srgbClr val="7030A0"/>
                 </a:solidFill>
@@ -5499,7 +5613,7 @@
               <a:t/>
             </a:r>
             <a:br>
-              <a:rPr lang="en-US" sz="1050">
+              <a:rPr lang="en-US" sz="1050" dirty="0">
                 <a:solidFill>
                   <a:srgbClr val="7030A0"/>
                 </a:solidFill>
@@ -5526,17 +5640,18 @@
           <p:cNvPr id="124" name="Elbow Connector 122"/>
           <p:cNvCxnSpPr>
             <a:stCxn id="119" idx="1"/>
-            <a:endCxn id="122" idx="1"/>
           </p:cNvCxnSpPr>
           <p:nvPr/>
         </p:nvCxnSpPr>
         <p:spPr>
-          <a:xfrm rot="16200000" flipH="1">
-            <a:off x="1364475" y="3719944"/>
-            <a:ext cx="831471" cy="554381"/>
-          </a:xfrm>
-          <a:prstGeom prst="bentConnector2">
-            <a:avLst/>
+          <a:xfrm rot="5400000">
+            <a:off x="1042008" y="4039558"/>
+            <a:ext cx="919170" cy="2854"/>
+          </a:xfrm>
+          <a:prstGeom prst="bentConnector3">
+            <a:avLst>
+              <a:gd name="adj1" fmla="val 50000"/>
+            </a:avLst>
           </a:prstGeom>
           <a:ln w="19050">
             <a:solidFill>
@@ -5916,10 +6031,1042 @@
           </a:p>
         </p:txBody>
       </p:sp>
+      <p:cxnSp>
+        <p:nvCxnSpPr>
+          <p:cNvPr id="73" name="Elbow Connector 72"/>
+          <p:cNvCxnSpPr/>
+          <p:nvPr/>
+        </p:nvCxnSpPr>
+        <p:spPr>
+          <a:xfrm flipV="1">
+            <a:off x="7495196" y="3384968"/>
+            <a:ext cx="244797" cy="4749"/>
+          </a:xfrm>
+          <a:prstGeom prst="bentConnector3">
+            <a:avLst>
+              <a:gd name="adj1" fmla="val 3308"/>
+            </a:avLst>
+          </a:prstGeom>
+          <a:ln w="19050">
+            <a:solidFill>
+              <a:srgbClr val="7030A0"/>
+            </a:solidFill>
+            <a:headEnd type="none" w="med" len="med"/>
+            <a:tailEnd type="arrow" w="med" len="med"/>
+          </a:ln>
+          <a:effectLst/>
+        </p:spPr>
+        <p:style>
+          <a:lnRef idx="1">
+            <a:schemeClr val="accent2"/>
+          </a:lnRef>
+          <a:fillRef idx="2">
+            <a:schemeClr val="accent2"/>
+          </a:fillRef>
+          <a:effectRef idx="1">
+            <a:schemeClr val="accent2"/>
+          </a:effectRef>
+          <a:fontRef idx="minor">
+            <a:schemeClr val="dk1"/>
+          </a:fontRef>
+        </p:style>
+      </p:cxnSp>
+      <p:sp>
+        <p:nvSpPr>
+          <p:cNvPr id="74" name="Rectangle 8"/>
+          <p:cNvSpPr/>
+          <p:nvPr/>
+        </p:nvSpPr>
+        <p:spPr>
+          <a:xfrm>
+            <a:off x="7712397" y="3238434"/>
+            <a:ext cx="708186" cy="285783"/>
+          </a:xfrm>
+          <a:prstGeom prst="rect">
+            <a:avLst/>
+          </a:prstGeom>
+          <a:ln w="19050">
+            <a:solidFill>
+              <a:srgbClr val="7030A0"/>
+            </a:solidFill>
+          </a:ln>
+          <a:effectLst/>
+        </p:spPr>
+        <p:style>
+          <a:lnRef idx="1">
+            <a:schemeClr val="accent4"/>
+          </a:lnRef>
+          <a:fillRef idx="2">
+            <a:schemeClr val="accent4"/>
+          </a:fillRef>
+          <a:effectRef idx="1">
+            <a:schemeClr val="accent4"/>
+          </a:effectRef>
+          <a:fontRef idx="minor">
+            <a:schemeClr val="dk1"/>
+          </a:fontRef>
+        </p:style>
+        <p:txBody>
+          <a:bodyPr rtlCol="0" anchor="ctr"/>
+          <a:lstStyle/>
+          <a:p>
+            <a:pPr algn="ctr"/>
+            <a:r>
+              <a:rPr lang="en-US" sz="1050" dirty="0" smtClean="0">
+                <a:solidFill>
+                  <a:srgbClr val="7030A0"/>
+                </a:solidFill>
+              </a:rPr>
+              <a:t>Birthday</a:t>
+            </a:r>
+            <a:endParaRPr lang="en-SG" sz="1050" dirty="0">
+              <a:solidFill>
+                <a:srgbClr val="7030A0"/>
+              </a:solidFill>
+            </a:endParaRPr>
+          </a:p>
+        </p:txBody>
+      </p:sp>
+      <p:sp>
+        <p:nvSpPr>
+          <p:cNvPr id="87" name="Rectangle 8"/>
+          <p:cNvSpPr/>
+          <p:nvPr/>
+        </p:nvSpPr>
+        <p:spPr>
+          <a:xfrm>
+            <a:off x="4500562" y="3357562"/>
+            <a:ext cx="1156969" cy="346760"/>
+          </a:xfrm>
+          <a:prstGeom prst="rect">
+            <a:avLst/>
+          </a:prstGeom>
+          <a:ln w="19050">
+            <a:solidFill>
+              <a:srgbClr val="7030A0"/>
+            </a:solidFill>
+          </a:ln>
+          <a:effectLst/>
+        </p:spPr>
+        <p:style>
+          <a:lnRef idx="1">
+            <a:schemeClr val="accent4"/>
+          </a:lnRef>
+          <a:fillRef idx="2">
+            <a:schemeClr val="accent4"/>
+          </a:fillRef>
+          <a:effectRef idx="1">
+            <a:schemeClr val="accent4"/>
+          </a:effectRef>
+          <a:fontRef idx="minor">
+            <a:schemeClr val="dk1"/>
+          </a:fontRef>
+        </p:style>
+        <p:txBody>
+          <a:bodyPr rtlCol="0" anchor="ctr"/>
+          <a:lstStyle/>
+          <a:p>
+            <a:pPr algn="ctr"/>
+            <a:r>
+              <a:rPr lang="en-US" sz="1050" dirty="0" err="1" smtClean="0">
+                <a:solidFill>
+                  <a:srgbClr val="7030A0"/>
+                </a:solidFill>
+              </a:rPr>
+              <a:t>UniqueGroupList</a:t>
+            </a:r>
+            <a:endParaRPr lang="en-SG" sz="1050" dirty="0">
+              <a:solidFill>
+                <a:srgbClr val="7030A0"/>
+              </a:solidFill>
+            </a:endParaRPr>
+          </a:p>
+        </p:txBody>
+      </p:sp>
+      <p:cxnSp>
+        <p:nvCxnSpPr>
+          <p:cNvPr id="88" name="Elbow Connector 87"/>
+          <p:cNvCxnSpPr/>
+          <p:nvPr/>
+        </p:nvCxnSpPr>
+        <p:spPr>
+          <a:xfrm rot="16200000" flipH="1">
+            <a:off x="4049056" y="3094688"/>
+            <a:ext cx="760136" cy="142876"/>
+          </a:xfrm>
+          <a:prstGeom prst="bentConnector3">
+            <a:avLst>
+              <a:gd name="adj1" fmla="val 100123"/>
+            </a:avLst>
+          </a:prstGeom>
+          <a:ln w="19050">
+            <a:solidFill>
+              <a:srgbClr val="7030A0"/>
+            </a:solidFill>
+            <a:headEnd type="none" w="med" len="med"/>
+            <a:tailEnd type="arrow" w="med" len="med"/>
+          </a:ln>
+          <a:effectLst/>
+        </p:spPr>
+        <p:style>
+          <a:lnRef idx="1">
+            <a:schemeClr val="accent2"/>
+          </a:lnRef>
+          <a:fillRef idx="2">
+            <a:schemeClr val="accent2"/>
+          </a:fillRef>
+          <a:effectRef idx="1">
+            <a:schemeClr val="accent2"/>
+          </a:effectRef>
+          <a:fontRef idx="minor">
+            <a:schemeClr val="dk1"/>
+          </a:fontRef>
+        </p:style>
+      </p:cxnSp>
+      <p:sp>
+        <p:nvSpPr>
+          <p:cNvPr id="103" name="Rectangle 8"/>
+          <p:cNvSpPr/>
+          <p:nvPr/>
+        </p:nvSpPr>
+        <p:spPr>
+          <a:xfrm>
+            <a:off x="2414899" y="4511000"/>
+            <a:ext cx="1156969" cy="346760"/>
+          </a:xfrm>
+          <a:prstGeom prst="rect">
+            <a:avLst/>
+          </a:prstGeom>
+          <a:ln w="19050">
+            <a:solidFill>
+              <a:srgbClr val="7030A0"/>
+            </a:solidFill>
+          </a:ln>
+          <a:effectLst/>
+        </p:spPr>
+        <p:style>
+          <a:lnRef idx="1">
+            <a:schemeClr val="accent4"/>
+          </a:lnRef>
+          <a:fillRef idx="2">
+            <a:schemeClr val="accent4"/>
+          </a:fillRef>
+          <a:effectRef idx="1">
+            <a:schemeClr val="accent4"/>
+          </a:effectRef>
+          <a:fontRef idx="minor">
+            <a:schemeClr val="dk1"/>
+          </a:fontRef>
+        </p:style>
+        <p:txBody>
+          <a:bodyPr rtlCol="0" anchor="ctr"/>
+          <a:lstStyle/>
+          <a:p>
+            <a:pPr algn="ctr"/>
+            <a:r>
+              <a:rPr lang="en-US" sz="1050" dirty="0" smtClean="0">
+                <a:solidFill>
+                  <a:srgbClr val="7030A0"/>
+                </a:solidFill>
+              </a:rPr>
+              <a:t>&lt;&lt;interface&gt;&gt;</a:t>
+            </a:r>
+            <a:br>
+              <a:rPr lang="en-US" sz="1050" dirty="0" smtClean="0">
+                <a:solidFill>
+                  <a:srgbClr val="7030A0"/>
+                </a:solidFill>
+              </a:rPr>
+            </a:br>
+            <a:r>
+              <a:rPr lang="en-US" sz="1050" dirty="0" err="1" smtClean="0">
+                <a:solidFill>
+                  <a:srgbClr val="7030A0"/>
+                </a:solidFill>
+              </a:rPr>
+              <a:t>ReadOnlyGroup</a:t>
+            </a:r>
+            <a:endParaRPr lang="en-SG" sz="1050" dirty="0">
+              <a:solidFill>
+                <a:srgbClr val="7030A0"/>
+              </a:solidFill>
+            </a:endParaRPr>
+          </a:p>
+        </p:txBody>
+      </p:sp>
+      <p:sp>
+        <p:nvSpPr>
+          <p:cNvPr id="105" name="Flowchart: Decision 96"/>
+          <p:cNvSpPr/>
+          <p:nvPr/>
+        </p:nvSpPr>
+        <p:spPr>
+          <a:xfrm rot="5400000">
+            <a:off x="4974094" y="3741286"/>
+            <a:ext cx="236048" cy="182980"/>
+          </a:xfrm>
+          <a:prstGeom prst="flowChartDecision">
+            <a:avLst/>
+          </a:prstGeom>
+          <a:noFill/>
+          <a:ln w="19050">
+            <a:solidFill>
+              <a:srgbClr val="7030A0"/>
+            </a:solidFill>
+          </a:ln>
+          <a:effectLst/>
+        </p:spPr>
+        <p:style>
+          <a:lnRef idx="1">
+            <a:schemeClr val="accent6"/>
+          </a:lnRef>
+          <a:fillRef idx="2">
+            <a:schemeClr val="accent6"/>
+          </a:fillRef>
+          <a:effectRef idx="1">
+            <a:schemeClr val="accent6"/>
+          </a:effectRef>
+          <a:fontRef idx="minor">
+            <a:schemeClr val="dk1"/>
+          </a:fontRef>
+        </p:style>
+        <p:txBody>
+          <a:bodyPr rtlCol="0" anchor="ctr"/>
+          <a:lstStyle/>
+          <a:p>
+            <a:pPr algn="ctr"/>
+            <a:endParaRPr lang="en-US" sz="1050"/>
+          </a:p>
+        </p:txBody>
+      </p:sp>
+      <p:sp>
+        <p:nvSpPr>
+          <p:cNvPr id="115" name="Rectangle 8"/>
+          <p:cNvSpPr/>
+          <p:nvPr/>
+        </p:nvSpPr>
+        <p:spPr>
+          <a:xfrm>
+            <a:off x="3643306" y="3929066"/>
+            <a:ext cx="1156969" cy="346760"/>
+          </a:xfrm>
+          <a:prstGeom prst="rect">
+            <a:avLst/>
+          </a:prstGeom>
+          <a:ln w="19050">
+            <a:solidFill>
+              <a:srgbClr val="7030A0"/>
+            </a:solidFill>
+          </a:ln>
+          <a:effectLst/>
+        </p:spPr>
+        <p:style>
+          <a:lnRef idx="1">
+            <a:schemeClr val="accent4"/>
+          </a:lnRef>
+          <a:fillRef idx="2">
+            <a:schemeClr val="accent4"/>
+          </a:fillRef>
+          <a:effectRef idx="1">
+            <a:schemeClr val="accent4"/>
+          </a:effectRef>
+          <a:fontRef idx="minor">
+            <a:schemeClr val="dk1"/>
+          </a:fontRef>
+        </p:style>
+        <p:txBody>
+          <a:bodyPr rtlCol="0" anchor="ctr"/>
+          <a:lstStyle/>
+          <a:p>
+            <a:pPr algn="ctr"/>
+            <a:r>
+              <a:rPr lang="en-US" sz="1050" dirty="0" smtClean="0">
+                <a:solidFill>
+                  <a:srgbClr val="7030A0"/>
+                </a:solidFill>
+              </a:rPr>
+              <a:t>Group</a:t>
+            </a:r>
+            <a:endParaRPr lang="en-SG" sz="1050" dirty="0">
+              <a:solidFill>
+                <a:srgbClr val="7030A0"/>
+              </a:solidFill>
+            </a:endParaRPr>
+          </a:p>
+        </p:txBody>
+      </p:sp>
+      <p:cxnSp>
+        <p:nvCxnSpPr>
+          <p:cNvPr id="121" name="Elbow Connector 120"/>
+          <p:cNvCxnSpPr>
+            <a:stCxn id="105" idx="3"/>
+            <a:endCxn id="115" idx="3"/>
+          </p:cNvCxnSpPr>
+          <p:nvPr/>
+        </p:nvCxnSpPr>
+        <p:spPr>
+          <a:xfrm rot="5400000">
+            <a:off x="4870374" y="3880702"/>
+            <a:ext cx="151646" cy="291843"/>
+          </a:xfrm>
+          <a:prstGeom prst="bentConnector2">
+            <a:avLst/>
+          </a:prstGeom>
+          <a:ln w="19050">
+            <a:solidFill>
+              <a:srgbClr val="7030A0"/>
+            </a:solidFill>
+            <a:headEnd type="none" w="med" len="med"/>
+            <a:tailEnd type="arrow" w="med" len="med"/>
+          </a:ln>
+          <a:effectLst/>
+        </p:spPr>
+        <p:style>
+          <a:lnRef idx="1">
+            <a:schemeClr val="accent2"/>
+          </a:lnRef>
+          <a:fillRef idx="2">
+            <a:schemeClr val="accent2"/>
+          </a:fillRef>
+          <a:effectRef idx="1">
+            <a:schemeClr val="accent2"/>
+          </a:effectRef>
+          <a:fontRef idx="minor">
+            <a:schemeClr val="dk1"/>
+          </a:fontRef>
+        </p:style>
+      </p:cxnSp>
+      <p:sp>
+        <p:nvSpPr>
+          <p:cNvPr id="129" name="TextBox 128"/>
+          <p:cNvSpPr txBox="1"/>
+          <p:nvPr/>
+        </p:nvSpPr>
+        <p:spPr>
+          <a:xfrm>
+            <a:off x="4214810" y="3536069"/>
+            <a:ext cx="189257" cy="178683"/>
+          </a:xfrm>
+          <a:prstGeom prst="rect">
+            <a:avLst/>
+          </a:prstGeom>
+          <a:noFill/>
+        </p:spPr>
+        <p:txBody>
+          <a:bodyPr wrap="square" lIns="0" tIns="0" rIns="0" bIns="0" rtlCol="0">
+            <a:noAutofit/>
+          </a:bodyPr>
+          <a:lstStyle/>
+          <a:p>
+            <a:pPr algn="ctr"/>
+            <a:r>
+              <a:rPr lang="en-US" sz="1100" dirty="0" smtClean="0">
+                <a:solidFill>
+                  <a:srgbClr val="7030A0"/>
+                </a:solidFill>
+              </a:rPr>
+              <a:t>1</a:t>
+            </a:r>
+            <a:endParaRPr lang="en-SG" sz="1100" dirty="0">
+              <a:solidFill>
+                <a:srgbClr val="7030A0"/>
+              </a:solidFill>
+            </a:endParaRPr>
+          </a:p>
+        </p:txBody>
+      </p:sp>
+      <p:sp>
+        <p:nvSpPr>
+          <p:cNvPr id="130" name="TextBox 129"/>
+          <p:cNvSpPr txBox="1"/>
+          <p:nvPr/>
+        </p:nvSpPr>
+        <p:spPr>
+          <a:xfrm>
+            <a:off x="4811371" y="3929066"/>
+            <a:ext cx="189257" cy="178683"/>
+          </a:xfrm>
+          <a:prstGeom prst="rect">
+            <a:avLst/>
+          </a:prstGeom>
+          <a:noFill/>
+        </p:spPr>
+        <p:txBody>
+          <a:bodyPr wrap="square" lIns="0" tIns="0" rIns="0" bIns="0" rtlCol="0">
+            <a:noAutofit/>
+          </a:bodyPr>
+          <a:lstStyle/>
+          <a:p>
+            <a:pPr algn="ctr"/>
+            <a:r>
+              <a:rPr lang="en-US" sz="1100" dirty="0" smtClean="0">
+                <a:solidFill>
+                  <a:srgbClr val="7030A0"/>
+                </a:solidFill>
+              </a:rPr>
+              <a:t>*</a:t>
+            </a:r>
+            <a:endParaRPr lang="en-SG" sz="1100" dirty="0">
+              <a:solidFill>
+                <a:srgbClr val="7030A0"/>
+              </a:solidFill>
+            </a:endParaRPr>
+          </a:p>
+        </p:txBody>
+      </p:sp>
+      <p:cxnSp>
+        <p:nvCxnSpPr>
+          <p:cNvPr id="131" name="Elbow Connector 63"/>
+          <p:cNvCxnSpPr>
+            <a:endCxn id="133" idx="3"/>
+          </p:cNvCxnSpPr>
+          <p:nvPr/>
+        </p:nvCxnSpPr>
+        <p:spPr>
+          <a:xfrm rot="5400000">
+            <a:off x="3591899" y="4442443"/>
+            <a:ext cx="421908" cy="109534"/>
+          </a:xfrm>
+          <a:prstGeom prst="bentConnector2">
+            <a:avLst/>
+          </a:prstGeom>
+          <a:ln w="19050">
+            <a:solidFill>
+              <a:srgbClr val="7030A0"/>
+            </a:solidFill>
+            <a:prstDash val="sysDot"/>
+            <a:headEnd type="none" w="med" len="med"/>
+            <a:tailEnd type="none" w="med" len="med"/>
+          </a:ln>
+          <a:effectLst/>
+        </p:spPr>
+        <p:style>
+          <a:lnRef idx="1">
+            <a:schemeClr val="accent2"/>
+          </a:lnRef>
+          <a:fillRef idx="2">
+            <a:schemeClr val="accent2"/>
+          </a:fillRef>
+          <a:effectRef idx="1">
+            <a:schemeClr val="accent2"/>
+          </a:effectRef>
+          <a:fontRef idx="minor">
+            <a:schemeClr val="dk1"/>
+          </a:fontRef>
+        </p:style>
+      </p:cxnSp>
+      <p:sp>
+        <p:nvSpPr>
+          <p:cNvPr id="133" name="Isosceles Triangle 102"/>
+          <p:cNvSpPr/>
+          <p:nvPr/>
+        </p:nvSpPr>
+        <p:spPr>
+          <a:xfrm rot="5417745" flipV="1">
+            <a:off x="3525074" y="4619949"/>
+            <a:ext cx="270504" cy="175523"/>
+          </a:xfrm>
+          <a:prstGeom prst="triangle">
+            <a:avLst/>
+          </a:prstGeom>
+          <a:solidFill>
+            <a:srgbClr val="7030A0"/>
+          </a:solidFill>
+          <a:ln w="19050">
+            <a:solidFill>
+              <a:srgbClr val="7030A0"/>
+            </a:solidFill>
+          </a:ln>
+          <a:effectLst/>
+        </p:spPr>
+        <p:style>
+          <a:lnRef idx="1">
+            <a:schemeClr val="accent4"/>
+          </a:lnRef>
+          <a:fillRef idx="2">
+            <a:schemeClr val="accent4"/>
+          </a:fillRef>
+          <a:effectRef idx="1">
+            <a:schemeClr val="accent4"/>
+          </a:effectRef>
+          <a:fontRef idx="minor">
+            <a:schemeClr val="dk1"/>
+          </a:fontRef>
+        </p:style>
+        <p:txBody>
+          <a:bodyPr rtlCol="0" anchor="ctr"/>
+          <a:lstStyle/>
+          <a:p>
+            <a:pPr algn="ctr"/>
+            <a:endParaRPr lang="en-SG" sz="1050" b="1">
+              <a:solidFill>
+                <a:srgbClr val="92D050"/>
+              </a:solidFill>
+            </a:endParaRPr>
+          </a:p>
+        </p:txBody>
+      </p:sp>
+      <p:cxnSp>
+        <p:nvCxnSpPr>
+          <p:cNvPr id="134" name="Elbow Connector 106"/>
+          <p:cNvCxnSpPr>
+            <a:endCxn id="115" idx="1"/>
+          </p:cNvCxnSpPr>
+          <p:nvPr/>
+        </p:nvCxnSpPr>
+        <p:spPr>
+          <a:xfrm>
+            <a:off x="2357422" y="3500438"/>
+            <a:ext cx="1285884" cy="602008"/>
+          </a:xfrm>
+          <a:prstGeom prst="bentConnector3">
+            <a:avLst>
+              <a:gd name="adj1" fmla="val -1111"/>
+            </a:avLst>
+          </a:prstGeom>
+          <a:ln w="19050">
+            <a:solidFill>
+              <a:srgbClr val="7030A0"/>
+            </a:solidFill>
+            <a:prstDash val="solid"/>
+            <a:headEnd type="none" w="med" len="med"/>
+            <a:tailEnd type="arrow" w="med" len="med"/>
+          </a:ln>
+          <a:effectLst/>
+        </p:spPr>
+        <p:style>
+          <a:lnRef idx="1">
+            <a:schemeClr val="accent2"/>
+          </a:lnRef>
+          <a:fillRef idx="2">
+            <a:schemeClr val="accent2"/>
+          </a:fillRef>
+          <a:effectRef idx="1">
+            <a:schemeClr val="accent2"/>
+          </a:effectRef>
+          <a:fontRef idx="minor">
+            <a:schemeClr val="dk1"/>
+          </a:fontRef>
+        </p:style>
+      </p:cxnSp>
+      <p:sp>
+        <p:nvSpPr>
+          <p:cNvPr id="159" name="Flowchart: Decision 96"/>
+          <p:cNvSpPr/>
+          <p:nvPr/>
+        </p:nvSpPr>
+        <p:spPr>
+          <a:xfrm rot="5603147">
+            <a:off x="4064929" y="4305999"/>
+            <a:ext cx="236048" cy="208462"/>
+          </a:xfrm>
+          <a:prstGeom prst="flowChartDecision">
+            <a:avLst/>
+          </a:prstGeom>
+          <a:solidFill>
+            <a:srgbClr val="7030A0"/>
+          </a:solidFill>
+          <a:ln w="19050">
+            <a:solidFill>
+              <a:srgbClr val="7030A0"/>
+            </a:solidFill>
+          </a:ln>
+          <a:effectLst/>
+        </p:spPr>
+        <p:style>
+          <a:lnRef idx="1">
+            <a:schemeClr val="accent6"/>
+          </a:lnRef>
+          <a:fillRef idx="2">
+            <a:schemeClr val="accent6"/>
+          </a:fillRef>
+          <a:effectRef idx="1">
+            <a:schemeClr val="accent6"/>
+          </a:effectRef>
+          <a:fontRef idx="minor">
+            <a:schemeClr val="dk1"/>
+          </a:fontRef>
+        </p:style>
+        <p:txBody>
+          <a:bodyPr rtlCol="0" anchor="ctr"/>
+          <a:lstStyle/>
+          <a:p>
+            <a:pPr algn="ctr"/>
+            <a:endParaRPr lang="en-US" sz="1050"/>
+          </a:p>
+        </p:txBody>
+      </p:sp>
+      <p:cxnSp>
+        <p:nvCxnSpPr>
+          <p:cNvPr id="167" name="Elbow Connector 166"/>
+          <p:cNvCxnSpPr>
+            <a:stCxn id="159" idx="0"/>
+            <a:endCxn id="171" idx="1"/>
+          </p:cNvCxnSpPr>
+          <p:nvPr/>
+        </p:nvCxnSpPr>
+        <p:spPr>
+          <a:xfrm>
+            <a:off x="4287002" y="4416386"/>
+            <a:ext cx="356436" cy="727111"/>
+          </a:xfrm>
+          <a:prstGeom prst="bentConnector3">
+            <a:avLst>
+              <a:gd name="adj1" fmla="val 50000"/>
+            </a:avLst>
+          </a:prstGeom>
+          <a:ln w="19050">
+            <a:solidFill>
+              <a:srgbClr val="7030A0"/>
+            </a:solidFill>
+            <a:headEnd type="none" w="med" len="med"/>
+            <a:tailEnd type="arrow" w="med" len="med"/>
+          </a:ln>
+          <a:effectLst/>
+        </p:spPr>
+        <p:style>
+          <a:lnRef idx="1">
+            <a:schemeClr val="accent2"/>
+          </a:lnRef>
+          <a:fillRef idx="2">
+            <a:schemeClr val="accent2"/>
+          </a:fillRef>
+          <a:effectRef idx="1">
+            <a:schemeClr val="accent2"/>
+          </a:effectRef>
+          <a:fontRef idx="minor">
+            <a:schemeClr val="dk1"/>
+          </a:fontRef>
+        </p:style>
+      </p:cxnSp>
+      <p:sp>
+        <p:nvSpPr>
+          <p:cNvPr id="171" name="Rectangle 8"/>
+          <p:cNvSpPr/>
+          <p:nvPr/>
+        </p:nvSpPr>
+        <p:spPr>
+          <a:xfrm>
+            <a:off x="4643438" y="5000605"/>
+            <a:ext cx="1428760" cy="285783"/>
+          </a:xfrm>
+          <a:prstGeom prst="rect">
+            <a:avLst/>
+          </a:prstGeom>
+          <a:ln w="19050">
+            <a:solidFill>
+              <a:srgbClr val="7030A0"/>
+            </a:solidFill>
+          </a:ln>
+          <a:effectLst/>
+        </p:spPr>
+        <p:style>
+          <a:lnRef idx="1">
+            <a:schemeClr val="accent4"/>
+          </a:lnRef>
+          <a:fillRef idx="2">
+            <a:schemeClr val="accent4"/>
+          </a:fillRef>
+          <a:effectRef idx="1">
+            <a:schemeClr val="accent4"/>
+          </a:effectRef>
+          <a:fontRef idx="minor">
+            <a:schemeClr val="dk1"/>
+          </a:fontRef>
+        </p:style>
+        <p:txBody>
+          <a:bodyPr rtlCol="0" anchor="ctr"/>
+          <a:lstStyle/>
+          <a:p>
+            <a:pPr algn="ctr"/>
+            <a:r>
+              <a:rPr lang="en-SG" sz="1050" dirty="0" smtClean="0">
+                <a:solidFill>
+                  <a:srgbClr val="7030A0"/>
+                </a:solidFill>
+              </a:rPr>
+              <a:t>List&lt;</a:t>
+            </a:r>
+            <a:r>
+              <a:rPr lang="en-SG" sz="1050" dirty="0" err="1" smtClean="0">
+                <a:solidFill>
+                  <a:srgbClr val="7030A0"/>
+                </a:solidFill>
+              </a:rPr>
+              <a:t>ReadOnlyPerson</a:t>
+            </a:r>
+            <a:r>
+              <a:rPr lang="en-SG" sz="1050" dirty="0" smtClean="0">
+                <a:solidFill>
+                  <a:srgbClr val="7030A0"/>
+                </a:solidFill>
+              </a:rPr>
+              <a:t>&gt;</a:t>
+            </a:r>
+          </a:p>
+        </p:txBody>
+      </p:sp>
+      <p:cxnSp>
+        <p:nvCxnSpPr>
+          <p:cNvPr id="176" name="Elbow Connector 175"/>
+          <p:cNvCxnSpPr>
+            <a:stCxn id="159" idx="0"/>
+            <a:endCxn id="179" idx="1"/>
+          </p:cNvCxnSpPr>
+          <p:nvPr/>
+        </p:nvCxnSpPr>
+        <p:spPr>
+          <a:xfrm>
+            <a:off x="4287002" y="4416386"/>
+            <a:ext cx="356436" cy="298483"/>
+          </a:xfrm>
+          <a:prstGeom prst="bentConnector3">
+            <a:avLst>
+              <a:gd name="adj1" fmla="val 50000"/>
+            </a:avLst>
+          </a:prstGeom>
+          <a:ln w="19050">
+            <a:solidFill>
+              <a:srgbClr val="7030A0"/>
+            </a:solidFill>
+            <a:headEnd type="none" w="med" len="med"/>
+            <a:tailEnd type="arrow" w="med" len="med"/>
+          </a:ln>
+          <a:effectLst/>
+        </p:spPr>
+        <p:style>
+          <a:lnRef idx="1">
+            <a:schemeClr val="accent2"/>
+          </a:lnRef>
+          <a:fillRef idx="2">
+            <a:schemeClr val="accent2"/>
+          </a:fillRef>
+          <a:effectRef idx="1">
+            <a:schemeClr val="accent2"/>
+          </a:effectRef>
+          <a:fontRef idx="minor">
+            <a:schemeClr val="dk1"/>
+          </a:fontRef>
+        </p:style>
+      </p:cxnSp>
+      <p:sp>
+        <p:nvSpPr>
+          <p:cNvPr id="179" name="Rectangle 8"/>
+          <p:cNvSpPr/>
+          <p:nvPr/>
+        </p:nvSpPr>
+        <p:spPr>
+          <a:xfrm>
+            <a:off x="4643438" y="4571977"/>
+            <a:ext cx="928694" cy="285783"/>
+          </a:xfrm>
+          <a:prstGeom prst="rect">
+            <a:avLst/>
+          </a:prstGeom>
+          <a:ln w="19050">
+            <a:solidFill>
+              <a:srgbClr val="7030A0"/>
+            </a:solidFill>
+          </a:ln>
+          <a:effectLst/>
+        </p:spPr>
+        <p:style>
+          <a:lnRef idx="1">
+            <a:schemeClr val="accent4"/>
+          </a:lnRef>
+          <a:fillRef idx="2">
+            <a:schemeClr val="accent4"/>
+          </a:fillRef>
+          <a:effectRef idx="1">
+            <a:schemeClr val="accent4"/>
+          </a:effectRef>
+          <a:fontRef idx="minor">
+            <a:schemeClr val="dk1"/>
+          </a:fontRef>
+        </p:style>
+        <p:txBody>
+          <a:bodyPr rtlCol="0" anchor="ctr"/>
+          <a:lstStyle/>
+          <a:p>
+            <a:pPr algn="ctr"/>
+            <a:r>
+              <a:rPr lang="en-US" sz="1050" dirty="0" err="1" smtClean="0">
+                <a:solidFill>
+                  <a:srgbClr val="7030A0"/>
+                </a:solidFill>
+              </a:rPr>
+              <a:t>GroupName</a:t>
+            </a:r>
+            <a:endParaRPr lang="en-SG" sz="1050" dirty="0">
+              <a:solidFill>
+                <a:srgbClr val="7030A0"/>
+              </a:solidFill>
+            </a:endParaRPr>
+          </a:p>
+        </p:txBody>
+      </p:sp>
+      <p:sp>
+        <p:nvSpPr>
+          <p:cNvPr id="182" name="TextBox 181"/>
+          <p:cNvSpPr txBox="1"/>
+          <p:nvPr/>
+        </p:nvSpPr>
+        <p:spPr>
+          <a:xfrm>
+            <a:off x="4500562" y="4500570"/>
+            <a:ext cx="189257" cy="178683"/>
+          </a:xfrm>
+          <a:prstGeom prst="rect">
+            <a:avLst/>
+          </a:prstGeom>
+          <a:noFill/>
+        </p:spPr>
+        <p:txBody>
+          <a:bodyPr wrap="square" lIns="0" tIns="0" rIns="0" bIns="0" rtlCol="0">
+            <a:noAutofit/>
+          </a:bodyPr>
+          <a:lstStyle/>
+          <a:p>
+            <a:pPr algn="ctr"/>
+            <a:r>
+              <a:rPr lang="en-US" sz="1100" dirty="0" smtClean="0">
+                <a:solidFill>
+                  <a:srgbClr val="7030A0"/>
+                </a:solidFill>
+              </a:rPr>
+              <a:t>1</a:t>
+            </a:r>
+            <a:endParaRPr lang="en-SG" sz="1100" dirty="0">
+              <a:solidFill>
+                <a:srgbClr val="7030A0"/>
+              </a:solidFill>
+            </a:endParaRPr>
+          </a:p>
+        </p:txBody>
+      </p:sp>
+      <p:sp>
+        <p:nvSpPr>
+          <p:cNvPr id="183" name="TextBox 182"/>
+          <p:cNvSpPr txBox="1"/>
+          <p:nvPr/>
+        </p:nvSpPr>
+        <p:spPr>
+          <a:xfrm>
+            <a:off x="4500562" y="4929198"/>
+            <a:ext cx="189257" cy="178683"/>
+          </a:xfrm>
+          <a:prstGeom prst="rect">
+            <a:avLst/>
+          </a:prstGeom>
+          <a:noFill/>
+        </p:spPr>
+        <p:txBody>
+          <a:bodyPr wrap="square" lIns="0" tIns="0" rIns="0" bIns="0" rtlCol="0">
+            <a:noAutofit/>
+          </a:bodyPr>
+          <a:lstStyle/>
+          <a:p>
+            <a:pPr algn="ctr"/>
+            <a:r>
+              <a:rPr lang="en-US" sz="1100" dirty="0" smtClean="0">
+                <a:solidFill>
+                  <a:srgbClr val="7030A0"/>
+                </a:solidFill>
+              </a:rPr>
+              <a:t>1</a:t>
+            </a:r>
+            <a:endParaRPr lang="en-SG" sz="1100" dirty="0">
+              <a:solidFill>
+                <a:srgbClr val="7030A0"/>
+              </a:solidFill>
+            </a:endParaRPr>
+          </a:p>
+        </p:txBody>
+      </p:sp>
+      <p:sp>
+        <p:nvSpPr>
+          <p:cNvPr id="184" name="TextBox 183"/>
+          <p:cNvSpPr txBox="1"/>
+          <p:nvPr/>
+        </p:nvSpPr>
+        <p:spPr>
+          <a:xfrm>
+            <a:off x="2643174" y="3881770"/>
+            <a:ext cx="881018" cy="261610"/>
+          </a:xfrm>
+          <a:prstGeom prst="rect">
+            <a:avLst/>
+          </a:prstGeom>
+          <a:noFill/>
+        </p:spPr>
+        <p:txBody>
+          <a:bodyPr wrap="square" rtlCol="0">
+            <a:spAutoFit/>
+          </a:bodyPr>
+          <a:lstStyle/>
+          <a:p>
+            <a:pPr algn="r"/>
+            <a:r>
+              <a:rPr lang="en-US" sz="1100" dirty="0" smtClean="0">
+                <a:solidFill>
+                  <a:srgbClr val="7030A0"/>
+                </a:solidFill>
+              </a:rPr>
+              <a:t>filtered list</a:t>
+            </a:r>
+            <a:endParaRPr lang="en-SG" sz="1100" dirty="0">
+              <a:solidFill>
+                <a:srgbClr val="7030A0"/>
+              </a:solidFill>
+            </a:endParaRPr>
+          </a:p>
+        </p:txBody>
+      </p:sp>
+      <p:cxnSp>
+        <p:nvCxnSpPr>
+          <p:cNvPr id="187" name="Elbow Connector 186"/>
+          <p:cNvCxnSpPr>
+            <a:stCxn id="171" idx="3"/>
+            <a:endCxn id="72" idx="2"/>
+          </p:cNvCxnSpPr>
+          <p:nvPr/>
+        </p:nvCxnSpPr>
+        <p:spPr>
+          <a:xfrm flipV="1">
+            <a:off x="6072198" y="4214818"/>
+            <a:ext cx="149857" cy="928679"/>
+          </a:xfrm>
+          <a:prstGeom prst="bentConnector2">
+            <a:avLst/>
+          </a:prstGeom>
+          <a:ln w="19050">
+            <a:solidFill>
+              <a:srgbClr val="7030A0"/>
+            </a:solidFill>
+            <a:headEnd type="none" w="med" len="med"/>
+            <a:tailEnd type="arrow" w="med" len="med"/>
+          </a:ln>
+          <a:effectLst/>
+        </p:spPr>
+        <p:style>
+          <a:lnRef idx="1">
+            <a:schemeClr val="accent2"/>
+          </a:lnRef>
+          <a:fillRef idx="2">
+            <a:schemeClr val="accent2"/>
+          </a:fillRef>
+          <a:effectRef idx="1">
+            <a:schemeClr val="accent2"/>
+          </a:effectRef>
+          <a:fontRef idx="minor">
+            <a:schemeClr val="dk1"/>
+          </a:fontRef>
+        </p:style>
+      </p:cxnSp>
     </p:spTree>
     <p:extLst>
       <p:ext uri="{BB962C8B-B14F-4D97-AF65-F5344CB8AC3E}">
-        <p14:creationId xmlns:p14="http://schemas.microsoft.com/office/powerpoint/2010/main" val="2396968029"/>
+        <p14:creationId xmlns:p14="http://schemas.microsoft.com/office/powerpoint/2010/main" xmlns="" val="2396968029"/>
       </p:ext>
     </p:extLst>
   </p:cSld>

</xml_diff>

<commit_message>
DeveloperGuide.adoc: Update Model Component Diagram
</commit_message>
<xml_diff>
--- a/docs/diagrams/ModelComponentClassDiagram.pptx
+++ b/docs/diagrams/ModelComponentClassDiagram.pptx
@@ -208,7 +208,7 @@
           <a:p>
             <a:fld id="{F5CC4B3F-88C1-4FFA-B1B6-F41C21DC6924}" type="datetimeFigureOut">
               <a:rPr lang="en-US" smtClean="0"/>
-              <a:t>9/4/17</a:t>
+              <a:t>11/3/17</a:t>
             </a:fld>
             <a:endParaRPr lang="en-US"/>
           </a:p>
@@ -657,7 +657,7 @@
           <a:p>
             <a:fld id="{78C97017-6FC3-485B-9764-EAC9E56C1D49}" type="datetimeFigureOut">
               <a:rPr lang="en-US" smtClean="0"/>
-              <a:t>9/4/17</a:t>
+              <a:t>11/3/17</a:t>
             </a:fld>
             <a:endParaRPr lang="en-US"/>
           </a:p>
@@ -827,7 +827,7 @@
           <a:p>
             <a:fld id="{78C97017-6FC3-485B-9764-EAC9E56C1D49}" type="datetimeFigureOut">
               <a:rPr lang="en-US" smtClean="0"/>
-              <a:t>9/4/17</a:t>
+              <a:t>11/3/17</a:t>
             </a:fld>
             <a:endParaRPr lang="en-US"/>
           </a:p>
@@ -1007,7 +1007,7 @@
           <a:p>
             <a:fld id="{78C97017-6FC3-485B-9764-EAC9E56C1D49}" type="datetimeFigureOut">
               <a:rPr lang="en-US" smtClean="0"/>
-              <a:t>9/4/17</a:t>
+              <a:t>11/3/17</a:t>
             </a:fld>
             <a:endParaRPr lang="en-US"/>
           </a:p>
@@ -1177,7 +1177,7 @@
           <a:p>
             <a:fld id="{78C97017-6FC3-485B-9764-EAC9E56C1D49}" type="datetimeFigureOut">
               <a:rPr lang="en-US" smtClean="0"/>
-              <a:t>9/4/17</a:t>
+              <a:t>11/3/17</a:t>
             </a:fld>
             <a:endParaRPr lang="en-US"/>
           </a:p>
@@ -1423,7 +1423,7 @@
           <a:p>
             <a:fld id="{78C97017-6FC3-485B-9764-EAC9E56C1D49}" type="datetimeFigureOut">
               <a:rPr lang="en-US" smtClean="0"/>
-              <a:t>9/4/17</a:t>
+              <a:t>11/3/17</a:t>
             </a:fld>
             <a:endParaRPr lang="en-US"/>
           </a:p>
@@ -1711,7 +1711,7 @@
           <a:p>
             <a:fld id="{78C97017-6FC3-485B-9764-EAC9E56C1D49}" type="datetimeFigureOut">
               <a:rPr lang="en-US" smtClean="0"/>
-              <a:t>9/4/17</a:t>
+              <a:t>11/3/17</a:t>
             </a:fld>
             <a:endParaRPr lang="en-US"/>
           </a:p>
@@ -2133,7 +2133,7 @@
           <a:p>
             <a:fld id="{78C97017-6FC3-485B-9764-EAC9E56C1D49}" type="datetimeFigureOut">
               <a:rPr lang="en-US" smtClean="0"/>
-              <a:t>9/4/17</a:t>
+              <a:t>11/3/17</a:t>
             </a:fld>
             <a:endParaRPr lang="en-US"/>
           </a:p>
@@ -2251,7 +2251,7 @@
           <a:p>
             <a:fld id="{78C97017-6FC3-485B-9764-EAC9E56C1D49}" type="datetimeFigureOut">
               <a:rPr lang="en-US" smtClean="0"/>
-              <a:t>9/4/17</a:t>
+              <a:t>11/3/17</a:t>
             </a:fld>
             <a:endParaRPr lang="en-US"/>
           </a:p>
@@ -2346,7 +2346,7 @@
           <a:p>
             <a:fld id="{78C97017-6FC3-485B-9764-EAC9E56C1D49}" type="datetimeFigureOut">
               <a:rPr lang="en-US" smtClean="0"/>
-              <a:t>9/4/17</a:t>
+              <a:t>11/3/17</a:t>
             </a:fld>
             <a:endParaRPr lang="en-US"/>
           </a:p>
@@ -2623,7 +2623,7 @@
           <a:p>
             <a:fld id="{78C97017-6FC3-485B-9764-EAC9E56C1D49}" type="datetimeFigureOut">
               <a:rPr lang="en-US" smtClean="0"/>
-              <a:t>9/4/17</a:t>
+              <a:t>11/3/17</a:t>
             </a:fld>
             <a:endParaRPr lang="en-US"/>
           </a:p>
@@ -2876,7 +2876,7 @@
           <a:p>
             <a:fld id="{78C97017-6FC3-485B-9764-EAC9E56C1D49}" type="datetimeFigureOut">
               <a:rPr lang="en-US" smtClean="0"/>
-              <a:t>9/4/17</a:t>
+              <a:t>11/3/17</a:t>
             </a:fld>
             <a:endParaRPr lang="en-US"/>
           </a:p>
@@ -3089,7 +3089,7 @@
           <a:p>
             <a:fld id="{78C97017-6FC3-485B-9764-EAC9E56C1D49}" type="datetimeFigureOut">
               <a:rPr lang="en-US" smtClean="0"/>
-              <a:t>9/4/17</a:t>
+              <a:t>11/3/17</a:t>
             </a:fld>
             <a:endParaRPr lang="en-US"/>
           </a:p>
@@ -3472,8 +3472,8 @@
         </p:nvSpPr>
         <p:spPr>
           <a:xfrm>
-            <a:off x="1119865" y="1727200"/>
-            <a:ext cx="7490735" cy="2997200"/>
+            <a:off x="1143000" y="1705835"/>
+            <a:ext cx="7490735" cy="3886277"/>
           </a:xfrm>
           <a:prstGeom prst="roundRect">
             <a:avLst>
@@ -3569,7 +3569,7 @@
           <a:p>
             <a:pPr algn="ctr"/>
             <a:r>
-              <a:rPr lang="en-US" sz="1050" dirty="0" err="1" smtClean="0">
+              <a:rPr lang="en-US" sz="1050" dirty="0" smtClean="0">
                 <a:solidFill>
                   <a:schemeClr val="bg1"/>
                 </a:solidFill>
@@ -3628,7 +3628,7 @@
           <a:p>
             <a:pPr algn="ctr"/>
             <a:r>
-              <a:rPr lang="en-US" sz="1050" dirty="0" err="1" smtClean="0">
+              <a:rPr lang="en-US" sz="1050" dirty="0" smtClean="0">
                 <a:solidFill>
                   <a:schemeClr val="bg1"/>
                 </a:solidFill>
@@ -3653,8 +3653,8 @@
         </p:nvCxnSpPr>
         <p:spPr>
           <a:xfrm flipV="1">
-            <a:off x="6477000" y="3194131"/>
-            <a:ext cx="95385" cy="416514"/>
+            <a:off x="6343535" y="3220889"/>
+            <a:ext cx="292543" cy="1490658"/>
           </a:xfrm>
           <a:prstGeom prst="bentConnector2">
             <a:avLst/>
@@ -3699,7 +3699,7 @@
           </a:xfrm>
           <a:prstGeom prst="bentConnector4">
             <a:avLst>
-              <a:gd name="adj1" fmla="val -101829"/>
+              <a:gd name="adj1" fmla="val -364520"/>
               <a:gd name="adj2" fmla="val 99976"/>
             </a:avLst>
           </a:prstGeom>
@@ -3894,7 +3894,7 @@
         </p:nvSpPr>
         <p:spPr>
           <a:xfrm rot="5400000" flipV="1">
-            <a:off x="6253986" y="3522883"/>
+            <a:off x="6120521" y="4623785"/>
             <a:ext cx="270504" cy="175523"/>
           </a:xfrm>
           <a:prstGeom prst="triangle">
@@ -4107,7 +4107,7 @@
           <a:p>
             <a:pPr algn="ctr"/>
             <a:r>
-              <a:rPr lang="en-US" sz="1050" dirty="0" err="1" smtClean="0">
+              <a:rPr lang="en-US" sz="1050" dirty="0" smtClean="0">
                 <a:solidFill>
                   <a:srgbClr val="7030A0"/>
                 </a:solidFill>
@@ -4249,7 +4249,7 @@
           <a:p>
             <a:pPr algn="ctr"/>
             <a:r>
-              <a:rPr lang="en-US" sz="1050" dirty="0" err="1" smtClean="0">
+              <a:rPr lang="en-US" sz="1050" dirty="0" smtClean="0">
                 <a:solidFill>
                   <a:srgbClr val="7030A0"/>
                 </a:solidFill>
@@ -4326,7 +4326,9 @@
             <a:ext cx="266666" cy="260070"/>
           </a:xfrm>
           <a:prstGeom prst="bentConnector3">
-            <a:avLst/>
+            <a:avLst>
+              <a:gd name="adj1" fmla="val 27391"/>
+            </a:avLst>
           </a:prstGeom>
           <a:ln w="19050">
             <a:solidFill>
@@ -4393,7 +4395,7 @@
           <a:p>
             <a:pPr algn="ctr"/>
             <a:r>
-              <a:rPr lang="en-US" sz="1050" dirty="0" err="1" smtClean="0">
+              <a:rPr lang="en-US" sz="1050" dirty="0" smtClean="0">
                 <a:solidFill>
                   <a:srgbClr val="7030A0"/>
                 </a:solidFill>
@@ -4424,7 +4426,7 @@
           </a:xfrm>
           <a:prstGeom prst="bentConnector3">
             <a:avLst>
-              <a:gd name="adj1" fmla="val 50000"/>
+              <a:gd name="adj1" fmla="val 26539"/>
             </a:avLst>
           </a:prstGeom>
           <a:ln w="19050">
@@ -4743,7 +4745,7 @@
         </p:nvSpPr>
         <p:spPr>
           <a:xfrm>
-            <a:off x="5128257" y="3429000"/>
+            <a:off x="5001656" y="4517541"/>
             <a:ext cx="1156969" cy="346760"/>
           </a:xfrm>
           <a:prstGeom prst="rect">
@@ -4791,7 +4793,7 @@
               </a:rPr>
             </a:br>
             <a:r>
-              <a:rPr lang="en-US" sz="1050" dirty="0" err="1" smtClean="0">
+              <a:rPr lang="en-US" sz="1050" dirty="0" smtClean="0">
                 <a:solidFill>
                   <a:srgbClr val="7030A0"/>
                 </a:solidFill>
@@ -4814,7 +4816,7 @@
         </p:nvSpPr>
         <p:spPr>
           <a:xfrm>
-            <a:off x="7712397" y="2564238"/>
+            <a:off x="7700189" y="1840787"/>
             <a:ext cx="708186" cy="285783"/>
           </a:xfrm>
           <a:prstGeom prst="rect">
@@ -4920,8 +4922,8 @@
         </p:nvCxnSpPr>
         <p:spPr>
           <a:xfrm flipV="1">
-            <a:off x="7277995" y="2707130"/>
-            <a:ext cx="434402" cy="327761"/>
+            <a:off x="7277995" y="1983679"/>
+            <a:ext cx="422194" cy="1051212"/>
           </a:xfrm>
           <a:prstGeom prst="bentConnector3">
             <a:avLst/>
@@ -4958,7 +4960,7 @@
         </p:nvSpPr>
         <p:spPr>
           <a:xfrm>
-            <a:off x="7712397" y="2887216"/>
+            <a:off x="7700189" y="2194053"/>
             <a:ext cx="708186" cy="285783"/>
           </a:xfrm>
           <a:prstGeom prst="rect">
@@ -5017,8 +5019,8 @@
         </p:nvCxnSpPr>
         <p:spPr>
           <a:xfrm flipV="1">
-            <a:off x="7277995" y="3030108"/>
-            <a:ext cx="434402" cy="4783"/>
+            <a:off x="7277995" y="2336945"/>
+            <a:ext cx="422194" cy="697946"/>
           </a:xfrm>
           <a:prstGeom prst="bentConnector3">
             <a:avLst/>
@@ -5055,7 +5057,7 @@
         </p:nvSpPr>
         <p:spPr>
           <a:xfrm>
-            <a:off x="7712397" y="3210194"/>
+            <a:off x="7712397" y="2526476"/>
             <a:ext cx="708186" cy="285783"/>
           </a:xfrm>
           <a:prstGeom prst="rect">
@@ -5113,9 +5115,9 @@
           <p:nvPr/>
         </p:nvCxnSpPr>
         <p:spPr>
-          <a:xfrm>
-            <a:off x="7277995" y="3034891"/>
-            <a:ext cx="434402" cy="318195"/>
+          <a:xfrm flipV="1">
+            <a:off x="7277995" y="2669368"/>
+            <a:ext cx="434402" cy="365523"/>
           </a:xfrm>
           <a:prstGeom prst="bentConnector3">
             <a:avLst/>
@@ -5152,7 +5154,7 @@
         </p:nvSpPr>
         <p:spPr>
           <a:xfrm>
-            <a:off x="7712397" y="3533171"/>
+            <a:off x="7712397" y="2839690"/>
             <a:ext cx="708186" cy="285783"/>
           </a:xfrm>
           <a:prstGeom prst="rect">
@@ -5204,15 +5206,14 @@
         <p:nvCxnSpPr>
           <p:cNvPr id="86" name="Elbow Connector 85"/>
           <p:cNvCxnSpPr>
-            <a:stCxn id="78" idx="3"/>
             <a:endCxn id="85" idx="1"/>
           </p:cNvCxnSpPr>
           <p:nvPr/>
         </p:nvCxnSpPr>
         <p:spPr>
-          <a:xfrm>
-            <a:off x="7277995" y="3034891"/>
-            <a:ext cx="434402" cy="641172"/>
+          <a:xfrm flipV="1">
+            <a:off x="7270568" y="2982582"/>
+            <a:ext cx="441829" cy="52310"/>
           </a:xfrm>
           <a:prstGeom prst="bentConnector3">
             <a:avLst/>
@@ -5388,7 +5389,7 @@
               </a:rPr>
             </a:br>
             <a:r>
-              <a:rPr lang="en-US" sz="1050" dirty="0" err="1" smtClean="0">
+              <a:rPr lang="en-US" sz="1050" dirty="0" smtClean="0">
                 <a:solidFill>
                   <a:srgbClr val="7030A0"/>
                 </a:solidFill>
@@ -5450,7 +5451,7 @@
         </p:nvSpPr>
         <p:spPr>
           <a:xfrm>
-            <a:off x="2057401" y="4239491"/>
+            <a:off x="1830339" y="5138462"/>
             <a:ext cx="1066800" cy="346760"/>
           </a:xfrm>
           <a:prstGeom prst="rect">
@@ -5491,7 +5492,7 @@
               <a:t>&lt;&lt;interface&gt;&gt;</a:t>
             </a:r>
             <a:r>
-              <a:rPr lang="en-US" sz="1050">
+              <a:rPr lang="en-US" sz="1050" dirty="0">
                 <a:solidFill>
                   <a:srgbClr val="7030A0"/>
                 </a:solidFill>
@@ -5499,14 +5500,14 @@
               <a:t/>
             </a:r>
             <a:br>
-              <a:rPr lang="en-US" sz="1050">
+              <a:rPr lang="en-US" sz="1050" dirty="0">
                 <a:solidFill>
                   <a:srgbClr val="7030A0"/>
                 </a:solidFill>
               </a:rPr>
             </a:br>
             <a:r>
-              <a:rPr lang="en-US" sz="1050" dirty="0" err="1" smtClean="0">
+              <a:rPr lang="en-US" sz="1050" dirty="0" smtClean="0">
                 <a:solidFill>
                   <a:srgbClr val="7030A0"/>
                 </a:solidFill>
@@ -5525,15 +5526,14 @@
         <p:nvCxnSpPr>
           <p:cNvPr id="124" name="Elbow Connector 122"/>
           <p:cNvCxnSpPr>
-            <a:stCxn id="119" idx="1"/>
             <a:endCxn id="122" idx="1"/>
           </p:cNvCxnSpPr>
           <p:nvPr/>
         </p:nvCxnSpPr>
         <p:spPr>
           <a:xfrm rot="16200000" flipH="1">
-            <a:off x="1364475" y="3719944"/>
-            <a:ext cx="831471" cy="554381"/>
+            <a:off x="704345" y="4185848"/>
+            <a:ext cx="1797030" cy="454957"/>
           </a:xfrm>
           <a:prstGeom prst="bentConnector2">
             <a:avLst/>
@@ -5651,7 +5651,7 @@
         </p:nvSpPr>
         <p:spPr>
           <a:xfrm>
-            <a:off x="4324972" y="3058864"/>
+            <a:off x="4302330" y="3088669"/>
             <a:ext cx="189257" cy="178683"/>
           </a:xfrm>
           <a:prstGeom prst="rect">
@@ -5907,6 +5907,703 @@
                 </a:solidFill>
               </a:rPr>
               <a:t>1</a:t>
+            </a:r>
+            <a:endParaRPr lang="en-SG" sz="1100" dirty="0">
+              <a:solidFill>
+                <a:srgbClr val="7030A0"/>
+              </a:solidFill>
+            </a:endParaRPr>
+          </a:p>
+        </p:txBody>
+      </p:sp>
+      <p:sp>
+        <p:nvSpPr>
+          <p:cNvPr id="55" name="Rectangle 8"/>
+          <p:cNvSpPr/>
+          <p:nvPr/>
+        </p:nvSpPr>
+        <p:spPr>
+          <a:xfrm>
+            <a:off x="7712397" y="3173202"/>
+            <a:ext cx="708186" cy="349805"/>
+          </a:xfrm>
+          <a:prstGeom prst="rect">
+            <a:avLst/>
+          </a:prstGeom>
+          <a:ln w="19050">
+            <a:solidFill>
+              <a:srgbClr val="7030A0"/>
+            </a:solidFill>
+          </a:ln>
+          <a:effectLst/>
+        </p:spPr>
+        <p:style>
+          <a:lnRef idx="1">
+            <a:schemeClr val="accent4"/>
+          </a:lnRef>
+          <a:fillRef idx="2">
+            <a:schemeClr val="accent4"/>
+          </a:fillRef>
+          <a:effectRef idx="1">
+            <a:schemeClr val="accent4"/>
+          </a:effectRef>
+          <a:fontRef idx="minor">
+            <a:schemeClr val="dk1"/>
+          </a:fontRef>
+        </p:style>
+        <p:txBody>
+          <a:bodyPr rtlCol="0" anchor="ctr"/>
+          <a:lstStyle/>
+          <a:p>
+            <a:pPr algn="ctr"/>
+            <a:r>
+              <a:rPr lang="en-US" sz="1050" smtClean="0">
+                <a:solidFill>
+                  <a:srgbClr val="7030A0"/>
+                </a:solidFill>
+              </a:rPr>
+              <a:t>Postal Code</a:t>
+            </a:r>
+            <a:endParaRPr lang="en-SG" sz="1050" dirty="0">
+              <a:solidFill>
+                <a:srgbClr val="7030A0"/>
+              </a:solidFill>
+            </a:endParaRPr>
+          </a:p>
+        </p:txBody>
+      </p:sp>
+      <p:sp>
+        <p:nvSpPr>
+          <p:cNvPr id="73" name="Rectangle 8"/>
+          <p:cNvSpPr/>
+          <p:nvPr/>
+        </p:nvSpPr>
+        <p:spPr>
+          <a:xfrm>
+            <a:off x="7712397" y="3577514"/>
+            <a:ext cx="708186" cy="366056"/>
+          </a:xfrm>
+          <a:prstGeom prst="rect">
+            <a:avLst/>
+          </a:prstGeom>
+          <a:ln w="19050">
+            <a:solidFill>
+              <a:srgbClr val="7030A0"/>
+            </a:solidFill>
+          </a:ln>
+          <a:effectLst/>
+        </p:spPr>
+        <p:style>
+          <a:lnRef idx="1">
+            <a:schemeClr val="accent4"/>
+          </a:lnRef>
+          <a:fillRef idx="2">
+            <a:schemeClr val="accent4"/>
+          </a:fillRef>
+          <a:effectRef idx="1">
+            <a:schemeClr val="accent4"/>
+          </a:effectRef>
+          <a:fontRef idx="minor">
+            <a:schemeClr val="dk1"/>
+          </a:fontRef>
+        </p:style>
+        <p:txBody>
+          <a:bodyPr rtlCol="0" anchor="ctr"/>
+          <a:lstStyle/>
+          <a:p>
+            <a:pPr algn="ctr"/>
+            <a:r>
+              <a:rPr lang="en-US" sz="1050" smtClean="0">
+                <a:solidFill>
+                  <a:srgbClr val="7030A0"/>
+                </a:solidFill>
+              </a:rPr>
+              <a:t>Form Class</a:t>
+            </a:r>
+            <a:endParaRPr lang="en-SG" sz="1050" dirty="0">
+              <a:solidFill>
+                <a:srgbClr val="7030A0"/>
+              </a:solidFill>
+            </a:endParaRPr>
+          </a:p>
+        </p:txBody>
+      </p:sp>
+      <p:sp>
+        <p:nvSpPr>
+          <p:cNvPr id="74" name="Rectangle 8"/>
+          <p:cNvSpPr/>
+          <p:nvPr/>
+        </p:nvSpPr>
+        <p:spPr>
+          <a:xfrm>
+            <a:off x="7721701" y="4315587"/>
+            <a:ext cx="708186" cy="285783"/>
+          </a:xfrm>
+          <a:prstGeom prst="rect">
+            <a:avLst/>
+          </a:prstGeom>
+          <a:ln w="19050">
+            <a:solidFill>
+              <a:srgbClr val="7030A0"/>
+            </a:solidFill>
+          </a:ln>
+          <a:effectLst/>
+        </p:spPr>
+        <p:style>
+          <a:lnRef idx="1">
+            <a:schemeClr val="accent4"/>
+          </a:lnRef>
+          <a:fillRef idx="2">
+            <a:schemeClr val="accent4"/>
+          </a:fillRef>
+          <a:effectRef idx="1">
+            <a:schemeClr val="accent4"/>
+          </a:effectRef>
+          <a:fontRef idx="minor">
+            <a:schemeClr val="dk1"/>
+          </a:fontRef>
+        </p:style>
+        <p:txBody>
+          <a:bodyPr rtlCol="0" anchor="ctr"/>
+          <a:lstStyle/>
+          <a:p>
+            <a:pPr algn="ctr"/>
+            <a:r>
+              <a:rPr lang="en-US" sz="1050" dirty="0" smtClean="0">
+                <a:solidFill>
+                  <a:srgbClr val="7030A0"/>
+                </a:solidFill>
+              </a:rPr>
+              <a:t>Remarks</a:t>
+            </a:r>
+            <a:endParaRPr lang="en-SG" sz="1050" dirty="0">
+              <a:solidFill>
+                <a:srgbClr val="7030A0"/>
+              </a:solidFill>
+            </a:endParaRPr>
+          </a:p>
+        </p:txBody>
+      </p:sp>
+      <p:sp>
+        <p:nvSpPr>
+          <p:cNvPr id="77" name="Rectangle 8"/>
+          <p:cNvSpPr/>
+          <p:nvPr/>
+        </p:nvSpPr>
+        <p:spPr>
+          <a:xfrm>
+            <a:off x="7721701" y="3984594"/>
+            <a:ext cx="708186" cy="285783"/>
+          </a:xfrm>
+          <a:prstGeom prst="rect">
+            <a:avLst/>
+          </a:prstGeom>
+          <a:ln w="19050">
+            <a:solidFill>
+              <a:srgbClr val="7030A0"/>
+            </a:solidFill>
+          </a:ln>
+          <a:effectLst/>
+        </p:spPr>
+        <p:style>
+          <a:lnRef idx="1">
+            <a:schemeClr val="accent4"/>
+          </a:lnRef>
+          <a:fillRef idx="2">
+            <a:schemeClr val="accent4"/>
+          </a:fillRef>
+          <a:effectRef idx="1">
+            <a:schemeClr val="accent4"/>
+          </a:effectRef>
+          <a:fontRef idx="minor">
+            <a:schemeClr val="dk1"/>
+          </a:fontRef>
+        </p:style>
+        <p:txBody>
+          <a:bodyPr rtlCol="0" anchor="ctr"/>
+          <a:lstStyle/>
+          <a:p>
+            <a:pPr algn="ctr"/>
+            <a:r>
+              <a:rPr lang="en-US" sz="1050" dirty="0" smtClean="0">
+                <a:solidFill>
+                  <a:srgbClr val="7030A0"/>
+                </a:solidFill>
+              </a:rPr>
+              <a:t>Grades</a:t>
+            </a:r>
+            <a:endParaRPr lang="en-SG" sz="1050" dirty="0">
+              <a:solidFill>
+                <a:srgbClr val="7030A0"/>
+              </a:solidFill>
+            </a:endParaRPr>
+          </a:p>
+        </p:txBody>
+      </p:sp>
+      <p:cxnSp>
+        <p:nvCxnSpPr>
+          <p:cNvPr id="82" name="Elbow Connector 81"/>
+          <p:cNvCxnSpPr>
+            <a:stCxn id="78" idx="3"/>
+          </p:cNvCxnSpPr>
+          <p:nvPr/>
+        </p:nvCxnSpPr>
+        <p:spPr>
+          <a:xfrm>
+            <a:off x="7277995" y="3034891"/>
+            <a:ext cx="455065" cy="300117"/>
+          </a:xfrm>
+          <a:prstGeom prst="bentConnector3">
+            <a:avLst>
+              <a:gd name="adj1" fmla="val 47792"/>
+            </a:avLst>
+          </a:prstGeom>
+          <a:ln w="19050">
+            <a:solidFill>
+              <a:srgbClr val="7030A0"/>
+            </a:solidFill>
+            <a:headEnd type="none" w="med" len="med"/>
+            <a:tailEnd type="arrow" w="med" len="med"/>
+          </a:ln>
+          <a:effectLst/>
+        </p:spPr>
+        <p:style>
+          <a:lnRef idx="1">
+            <a:schemeClr val="accent2"/>
+          </a:lnRef>
+          <a:fillRef idx="2">
+            <a:schemeClr val="accent2"/>
+          </a:fillRef>
+          <a:effectRef idx="1">
+            <a:schemeClr val="accent2"/>
+          </a:effectRef>
+          <a:fontRef idx="minor">
+            <a:schemeClr val="dk1"/>
+          </a:fontRef>
+        </p:style>
+      </p:cxnSp>
+      <p:cxnSp>
+        <p:nvCxnSpPr>
+          <p:cNvPr id="87" name="Elbow Connector 86"/>
+          <p:cNvCxnSpPr>
+            <a:endCxn id="73" idx="1"/>
+          </p:cNvCxnSpPr>
+          <p:nvPr/>
+        </p:nvCxnSpPr>
+        <p:spPr>
+          <a:xfrm rot="16200000" flipH="1">
+            <a:off x="7295868" y="3344013"/>
+            <a:ext cx="615858" cy="217199"/>
+          </a:xfrm>
+          <a:prstGeom prst="bentConnector2">
+            <a:avLst/>
+          </a:prstGeom>
+          <a:ln w="19050">
+            <a:solidFill>
+              <a:srgbClr val="7030A0"/>
+            </a:solidFill>
+            <a:headEnd type="none" w="med" len="med"/>
+            <a:tailEnd type="arrow" w="med" len="med"/>
+          </a:ln>
+          <a:effectLst/>
+        </p:spPr>
+        <p:style>
+          <a:lnRef idx="1">
+            <a:schemeClr val="accent2"/>
+          </a:lnRef>
+          <a:fillRef idx="2">
+            <a:schemeClr val="accent2"/>
+          </a:fillRef>
+          <a:effectRef idx="1">
+            <a:schemeClr val="accent2"/>
+          </a:effectRef>
+          <a:fontRef idx="minor">
+            <a:schemeClr val="dk1"/>
+          </a:fontRef>
+        </p:style>
+      </p:cxnSp>
+      <p:cxnSp>
+        <p:nvCxnSpPr>
+          <p:cNvPr id="88" name="Elbow Connector 87"/>
+          <p:cNvCxnSpPr/>
+          <p:nvPr/>
+        </p:nvCxnSpPr>
+        <p:spPr>
+          <a:xfrm rot="16200000" flipH="1">
+            <a:off x="7299582" y="3741347"/>
+            <a:ext cx="615858" cy="217199"/>
+          </a:xfrm>
+          <a:prstGeom prst="bentConnector2">
+            <a:avLst/>
+          </a:prstGeom>
+          <a:ln w="19050">
+            <a:solidFill>
+              <a:srgbClr val="7030A0"/>
+            </a:solidFill>
+            <a:headEnd type="none" w="med" len="med"/>
+            <a:tailEnd type="arrow" w="med" len="med"/>
+          </a:ln>
+          <a:effectLst/>
+        </p:spPr>
+        <p:style>
+          <a:lnRef idx="1">
+            <a:schemeClr val="accent2"/>
+          </a:lnRef>
+          <a:fillRef idx="2">
+            <a:schemeClr val="accent2"/>
+          </a:fillRef>
+          <a:effectRef idx="1">
+            <a:schemeClr val="accent2"/>
+          </a:effectRef>
+          <a:fontRef idx="minor">
+            <a:schemeClr val="dk1"/>
+          </a:fontRef>
+        </p:style>
+      </p:cxnSp>
+      <p:cxnSp>
+        <p:nvCxnSpPr>
+          <p:cNvPr id="89" name="Elbow Connector 88"/>
+          <p:cNvCxnSpPr/>
+          <p:nvPr/>
+        </p:nvCxnSpPr>
+        <p:spPr>
+          <a:xfrm rot="16200000" flipH="1">
+            <a:off x="7295869" y="4069069"/>
+            <a:ext cx="615858" cy="217199"/>
+          </a:xfrm>
+          <a:prstGeom prst="bentConnector2">
+            <a:avLst/>
+          </a:prstGeom>
+          <a:ln w="19050">
+            <a:solidFill>
+              <a:srgbClr val="7030A0"/>
+            </a:solidFill>
+            <a:headEnd type="none" w="med" len="med"/>
+            <a:tailEnd type="arrow" w="med" len="med"/>
+          </a:ln>
+          <a:effectLst/>
+        </p:spPr>
+        <p:style>
+          <a:lnRef idx="1">
+            <a:schemeClr val="accent2"/>
+          </a:lnRef>
+          <a:fillRef idx="2">
+            <a:schemeClr val="accent2"/>
+          </a:fillRef>
+          <a:effectRef idx="1">
+            <a:schemeClr val="accent2"/>
+          </a:effectRef>
+          <a:fontRef idx="minor">
+            <a:schemeClr val="dk1"/>
+          </a:fontRef>
+        </p:style>
+      </p:cxnSp>
+      <p:sp>
+        <p:nvSpPr>
+          <p:cNvPr id="90" name="Rectangle 8"/>
+          <p:cNvSpPr/>
+          <p:nvPr/>
+        </p:nvSpPr>
+        <p:spPr>
+          <a:xfrm>
+            <a:off x="4546091" y="3302214"/>
+            <a:ext cx="1332788" cy="346760"/>
+          </a:xfrm>
+          <a:prstGeom prst="rect">
+            <a:avLst/>
+          </a:prstGeom>
+          <a:ln w="19050">
+            <a:solidFill>
+              <a:srgbClr val="7030A0"/>
+            </a:solidFill>
+          </a:ln>
+          <a:effectLst/>
+        </p:spPr>
+        <p:style>
+          <a:lnRef idx="1">
+            <a:schemeClr val="accent4"/>
+          </a:lnRef>
+          <a:fillRef idx="2">
+            <a:schemeClr val="accent4"/>
+          </a:fillRef>
+          <a:effectRef idx="1">
+            <a:schemeClr val="accent4"/>
+          </a:effectRef>
+          <a:fontRef idx="minor">
+            <a:schemeClr val="dk1"/>
+          </a:fontRef>
+        </p:style>
+        <p:txBody>
+          <a:bodyPr rtlCol="0" anchor="ctr"/>
+          <a:lstStyle/>
+          <a:p>
+            <a:pPr algn="ctr"/>
+            <a:r>
+              <a:rPr lang="en-US" sz="1050" smtClean="0">
+                <a:solidFill>
+                  <a:srgbClr val="7030A0"/>
+                </a:solidFill>
+              </a:rPr>
+              <a:t>UniqueScheduleList</a:t>
+            </a:r>
+            <a:endParaRPr lang="en-SG" sz="1050" dirty="0">
+              <a:solidFill>
+                <a:srgbClr val="7030A0"/>
+              </a:solidFill>
+            </a:endParaRPr>
+          </a:p>
+        </p:txBody>
+      </p:sp>
+      <p:cxnSp>
+        <p:nvCxnSpPr>
+          <p:cNvPr id="91" name="Elbow Connector 90"/>
+          <p:cNvCxnSpPr>
+            <a:endCxn id="90" idx="1"/>
+          </p:cNvCxnSpPr>
+          <p:nvPr/>
+        </p:nvCxnSpPr>
+        <p:spPr>
+          <a:xfrm rot="16200000" flipH="1">
+            <a:off x="4068979" y="2998481"/>
+            <a:ext cx="713151" cy="241074"/>
+          </a:xfrm>
+          <a:prstGeom prst="bentConnector2">
+            <a:avLst/>
+          </a:prstGeom>
+          <a:ln w="19050">
+            <a:solidFill>
+              <a:srgbClr val="7030A0"/>
+            </a:solidFill>
+            <a:headEnd type="none" w="med" len="med"/>
+            <a:tailEnd type="arrow" w="med" len="med"/>
+          </a:ln>
+          <a:effectLst/>
+        </p:spPr>
+        <p:style>
+          <a:lnRef idx="1">
+            <a:schemeClr val="accent2"/>
+          </a:lnRef>
+          <a:fillRef idx="2">
+            <a:schemeClr val="accent2"/>
+          </a:fillRef>
+          <a:effectRef idx="1">
+            <a:schemeClr val="accent2"/>
+          </a:effectRef>
+          <a:fontRef idx="minor">
+            <a:schemeClr val="dk1"/>
+          </a:fontRef>
+        </p:style>
+      </p:cxnSp>
+      <p:sp>
+        <p:nvSpPr>
+          <p:cNvPr id="93" name="TextBox 92"/>
+          <p:cNvSpPr txBox="1"/>
+          <p:nvPr/>
+        </p:nvSpPr>
+        <p:spPr>
+          <a:xfrm>
+            <a:off x="4288071" y="3538308"/>
+            <a:ext cx="189257" cy="178683"/>
+          </a:xfrm>
+          <a:prstGeom prst="rect">
+            <a:avLst/>
+          </a:prstGeom>
+          <a:noFill/>
+        </p:spPr>
+        <p:txBody>
+          <a:bodyPr wrap="square" lIns="0" tIns="0" rIns="0" bIns="0" rtlCol="0">
+            <a:noAutofit/>
+          </a:bodyPr>
+          <a:lstStyle/>
+          <a:p>
+            <a:pPr algn="ctr"/>
+            <a:r>
+              <a:rPr lang="en-US" sz="1100" dirty="0" smtClean="0">
+                <a:solidFill>
+                  <a:srgbClr val="7030A0"/>
+                </a:solidFill>
+              </a:rPr>
+              <a:t>1</a:t>
+            </a:r>
+            <a:endParaRPr lang="en-SG" sz="1100" dirty="0">
+              <a:solidFill>
+                <a:srgbClr val="7030A0"/>
+              </a:solidFill>
+            </a:endParaRPr>
+          </a:p>
+        </p:txBody>
+      </p:sp>
+      <p:sp>
+        <p:nvSpPr>
+          <p:cNvPr id="108" name="Flowchart: Decision 96"/>
+          <p:cNvSpPr/>
+          <p:nvPr/>
+        </p:nvSpPr>
+        <p:spPr>
+          <a:xfrm rot="16200000">
+            <a:off x="4984885" y="3690045"/>
+            <a:ext cx="236048" cy="173380"/>
+          </a:xfrm>
+          <a:prstGeom prst="flowChartDecision">
+            <a:avLst/>
+          </a:prstGeom>
+          <a:noFill/>
+          <a:ln w="19050">
+            <a:solidFill>
+              <a:srgbClr val="7030A0"/>
+            </a:solidFill>
+          </a:ln>
+          <a:effectLst/>
+        </p:spPr>
+        <p:style>
+          <a:lnRef idx="1">
+            <a:schemeClr val="accent6"/>
+          </a:lnRef>
+          <a:fillRef idx="2">
+            <a:schemeClr val="accent6"/>
+          </a:fillRef>
+          <a:effectRef idx="1">
+            <a:schemeClr val="accent6"/>
+          </a:effectRef>
+          <a:fontRef idx="minor">
+            <a:schemeClr val="dk1"/>
+          </a:fontRef>
+        </p:style>
+        <p:txBody>
+          <a:bodyPr rtlCol="0" anchor="ctr"/>
+          <a:lstStyle/>
+          <a:p>
+            <a:pPr algn="ctr"/>
+            <a:endParaRPr lang="en-US" sz="1050"/>
+          </a:p>
+        </p:txBody>
+      </p:sp>
+      <p:sp>
+        <p:nvSpPr>
+          <p:cNvPr id="109" name="Rectangle 8"/>
+          <p:cNvSpPr/>
+          <p:nvPr/>
+        </p:nvSpPr>
+        <p:spPr>
+          <a:xfrm>
+            <a:off x="5341924" y="3943570"/>
+            <a:ext cx="754552" cy="346760"/>
+          </a:xfrm>
+          <a:prstGeom prst="rect">
+            <a:avLst/>
+          </a:prstGeom>
+          <a:ln w="19050">
+            <a:solidFill>
+              <a:srgbClr val="7030A0"/>
+            </a:solidFill>
+          </a:ln>
+          <a:effectLst/>
+        </p:spPr>
+        <p:style>
+          <a:lnRef idx="1">
+            <a:schemeClr val="accent4"/>
+          </a:lnRef>
+          <a:fillRef idx="2">
+            <a:schemeClr val="accent4"/>
+          </a:fillRef>
+          <a:effectRef idx="1">
+            <a:schemeClr val="accent4"/>
+          </a:effectRef>
+          <a:fontRef idx="minor">
+            <a:schemeClr val="dk1"/>
+          </a:fontRef>
+        </p:style>
+        <p:txBody>
+          <a:bodyPr rtlCol="0" anchor="ctr"/>
+          <a:lstStyle/>
+          <a:p>
+            <a:pPr algn="ctr"/>
+            <a:r>
+              <a:rPr lang="en-US" sz="1050" smtClean="0">
+                <a:solidFill>
+                  <a:srgbClr val="7030A0"/>
+                </a:solidFill>
+              </a:rPr>
+              <a:t>Schedule</a:t>
+            </a:r>
+            <a:endParaRPr lang="en-SG" sz="1050" dirty="0">
+              <a:solidFill>
+                <a:srgbClr val="7030A0"/>
+              </a:solidFill>
+            </a:endParaRPr>
+          </a:p>
+        </p:txBody>
+      </p:sp>
+      <p:cxnSp>
+        <p:nvCxnSpPr>
+          <p:cNvPr id="111" name="Elbow Connector 110"/>
+          <p:cNvCxnSpPr>
+            <a:stCxn id="108" idx="1"/>
+          </p:cNvCxnSpPr>
+          <p:nvPr/>
+        </p:nvCxnSpPr>
+        <p:spPr>
+          <a:xfrm rot="16200000" flipH="1">
+            <a:off x="5115506" y="3882161"/>
+            <a:ext cx="202024" cy="227219"/>
+          </a:xfrm>
+          <a:prstGeom prst="bentConnector2">
+            <a:avLst/>
+          </a:prstGeom>
+          <a:ln w="19050">
+            <a:solidFill>
+              <a:srgbClr val="7030A0"/>
+            </a:solidFill>
+            <a:headEnd type="none" w="med" len="med"/>
+            <a:tailEnd type="arrow" w="med" len="med"/>
+          </a:ln>
+          <a:effectLst/>
+        </p:spPr>
+        <p:style>
+          <a:lnRef idx="1">
+            <a:schemeClr val="accent2"/>
+          </a:lnRef>
+          <a:fillRef idx="2">
+            <a:schemeClr val="accent2"/>
+          </a:fillRef>
+          <a:effectRef idx="1">
+            <a:schemeClr val="accent2"/>
+          </a:effectRef>
+          <a:fontRef idx="minor">
+            <a:schemeClr val="dk1"/>
+          </a:fontRef>
+        </p:style>
+      </p:cxnSp>
+      <p:sp>
+        <p:nvSpPr>
+          <p:cNvPr id="113" name="TextBox 112"/>
+          <p:cNvSpPr txBox="1"/>
+          <p:nvPr/>
+        </p:nvSpPr>
+        <p:spPr>
+          <a:xfrm>
+            <a:off x="5120975" y="3915972"/>
+            <a:ext cx="189257" cy="178683"/>
+          </a:xfrm>
+          <a:prstGeom prst="rect">
+            <a:avLst/>
+          </a:prstGeom>
+          <a:noFill/>
+        </p:spPr>
+        <p:txBody>
+          <a:bodyPr wrap="square" lIns="0" tIns="0" rIns="0" bIns="0" rtlCol="0">
+            <a:noAutofit/>
+          </a:bodyPr>
+          <a:lstStyle/>
+          <a:p>
+            <a:pPr algn="ctr"/>
+            <a:r>
+              <a:rPr lang="en-US" sz="1100" dirty="0" smtClean="0">
+                <a:solidFill>
+                  <a:srgbClr val="7030A0"/>
+                </a:solidFill>
+              </a:rPr>
+              <a:t>*</a:t>
             </a:r>
             <a:endParaRPr lang="en-SG" sz="1100" dirty="0">
               <a:solidFill>

</xml_diff>

<commit_message>
update group tests add class and object diagrams for groups
</commit_message>
<xml_diff>
--- a/docs/diagrams/ModelComponentClassDiagram.pptx
+++ b/docs/diagrams/ModelComponentClassDiagram.pptx
@@ -109,7 +109,7 @@
   </p:defaultTextStyle>
   <p:extLst>
     <p:ext uri="{EFAFB233-063F-42B5-8137-9DF3F51BA10A}">
-      <p15:sldGuideLst xmlns:p15="http://schemas.microsoft.com/office/powerpoint/2012/main">
+      <p15:sldGuideLst xmlns:p15="http://schemas.microsoft.com/office/powerpoint/2012/main" xmlns="">
         <p15:guide id="1" orient="horz" pos="1488">
           <p15:clr>
             <a:srgbClr val="A4A3A4"/>
@@ -208,7 +208,7 @@
           <a:p>
             <a:fld id="{F5CC4B3F-88C1-4FFA-B1B6-F41C21DC6924}" type="datetimeFigureOut">
               <a:rPr lang="en-US" smtClean="0"/>
-              <a:t>10/25/17</a:t>
+              <a:t>11/4/2017</a:t>
             </a:fld>
             <a:endParaRPr lang="en-US"/>
           </a:p>
@@ -657,7 +657,7 @@
           <a:p>
             <a:fld id="{78C97017-6FC3-485B-9764-EAC9E56C1D49}" type="datetimeFigureOut">
               <a:rPr lang="en-US" smtClean="0"/>
-              <a:t>10/25/17</a:t>
+              <a:t>11/4/2017</a:t>
             </a:fld>
             <a:endParaRPr lang="en-US"/>
           </a:p>
@@ -827,7 +827,7 @@
           <a:p>
             <a:fld id="{78C97017-6FC3-485B-9764-EAC9E56C1D49}" type="datetimeFigureOut">
               <a:rPr lang="en-US" smtClean="0"/>
-              <a:t>10/25/17</a:t>
+              <a:t>11/4/2017</a:t>
             </a:fld>
             <a:endParaRPr lang="en-US"/>
           </a:p>
@@ -1007,7 +1007,7 @@
           <a:p>
             <a:fld id="{78C97017-6FC3-485B-9764-EAC9E56C1D49}" type="datetimeFigureOut">
               <a:rPr lang="en-US" smtClean="0"/>
-              <a:t>10/25/17</a:t>
+              <a:t>11/4/2017</a:t>
             </a:fld>
             <a:endParaRPr lang="en-US"/>
           </a:p>
@@ -1177,7 +1177,7 @@
           <a:p>
             <a:fld id="{78C97017-6FC3-485B-9764-EAC9E56C1D49}" type="datetimeFigureOut">
               <a:rPr lang="en-US" smtClean="0"/>
-              <a:t>10/25/17</a:t>
+              <a:t>11/4/2017</a:t>
             </a:fld>
             <a:endParaRPr lang="en-US"/>
           </a:p>
@@ -1423,7 +1423,7 @@
           <a:p>
             <a:fld id="{78C97017-6FC3-485B-9764-EAC9E56C1D49}" type="datetimeFigureOut">
               <a:rPr lang="en-US" smtClean="0"/>
-              <a:t>10/25/17</a:t>
+              <a:t>11/4/2017</a:t>
             </a:fld>
             <a:endParaRPr lang="en-US"/>
           </a:p>
@@ -1711,7 +1711,7 @@
           <a:p>
             <a:fld id="{78C97017-6FC3-485B-9764-EAC9E56C1D49}" type="datetimeFigureOut">
               <a:rPr lang="en-US" smtClean="0"/>
-              <a:t>10/25/17</a:t>
+              <a:t>11/4/2017</a:t>
             </a:fld>
             <a:endParaRPr lang="en-US"/>
           </a:p>
@@ -2133,7 +2133,7 @@
           <a:p>
             <a:fld id="{78C97017-6FC3-485B-9764-EAC9E56C1D49}" type="datetimeFigureOut">
               <a:rPr lang="en-US" smtClean="0"/>
-              <a:t>10/25/17</a:t>
+              <a:t>11/4/2017</a:t>
             </a:fld>
             <a:endParaRPr lang="en-US"/>
           </a:p>
@@ -2251,7 +2251,7 @@
           <a:p>
             <a:fld id="{78C97017-6FC3-485B-9764-EAC9E56C1D49}" type="datetimeFigureOut">
               <a:rPr lang="en-US" smtClean="0"/>
-              <a:t>10/25/17</a:t>
+              <a:t>11/4/2017</a:t>
             </a:fld>
             <a:endParaRPr lang="en-US"/>
           </a:p>
@@ -2346,7 +2346,7 @@
           <a:p>
             <a:fld id="{78C97017-6FC3-485B-9764-EAC9E56C1D49}" type="datetimeFigureOut">
               <a:rPr lang="en-US" smtClean="0"/>
-              <a:t>10/25/17</a:t>
+              <a:t>11/4/2017</a:t>
             </a:fld>
             <a:endParaRPr lang="en-US"/>
           </a:p>
@@ -2623,7 +2623,7 @@
           <a:p>
             <a:fld id="{78C97017-6FC3-485B-9764-EAC9E56C1D49}" type="datetimeFigureOut">
               <a:rPr lang="en-US" smtClean="0"/>
-              <a:t>10/25/17</a:t>
+              <a:t>11/4/2017</a:t>
             </a:fld>
             <a:endParaRPr lang="en-US"/>
           </a:p>
@@ -2876,7 +2876,7 @@
           <a:p>
             <a:fld id="{78C97017-6FC3-485B-9764-EAC9E56C1D49}" type="datetimeFigureOut">
               <a:rPr lang="en-US" smtClean="0"/>
-              <a:t>10/25/17</a:t>
+              <a:t>11/4/2017</a:t>
             </a:fld>
             <a:endParaRPr lang="en-US"/>
           </a:p>
@@ -3089,7 +3089,7 @@
           <a:p>
             <a:fld id="{78C97017-6FC3-485B-9764-EAC9E56C1D49}" type="datetimeFigureOut">
               <a:rPr lang="en-US" smtClean="0"/>
-              <a:t>10/25/17</a:t>
+              <a:t>11/4/2017</a:t>
             </a:fld>
             <a:endParaRPr lang="en-US"/>
           </a:p>
@@ -6417,6 +6417,102 @@
           <a:xfrm rot="16200000" flipH="1">
             <a:off x="7130123" y="3395179"/>
             <a:ext cx="941684" cy="211539"/>
+          </a:xfrm>
+          <a:prstGeom prst="bentConnector2">
+            <a:avLst/>
+          </a:prstGeom>
+          <a:ln w="19050">
+            <a:solidFill>
+              <a:srgbClr val="7030A0"/>
+            </a:solidFill>
+            <a:headEnd type="none" w="med" len="med"/>
+            <a:tailEnd type="arrow" w="med" len="med"/>
+          </a:ln>
+          <a:effectLst/>
+        </p:spPr>
+        <p:style>
+          <a:lnRef idx="1">
+            <a:schemeClr val="accent2"/>
+          </a:lnRef>
+          <a:fillRef idx="2">
+            <a:schemeClr val="accent2"/>
+          </a:fillRef>
+          <a:effectRef idx="1">
+            <a:schemeClr val="accent2"/>
+          </a:effectRef>
+          <a:fontRef idx="minor">
+            <a:schemeClr val="dk1"/>
+          </a:fontRef>
+        </p:style>
+      </p:cxnSp>
+      <p:sp>
+        <p:nvSpPr>
+          <p:cNvPr id="74" name="Rectangle 8"/>
+          <p:cNvSpPr/>
+          <p:nvPr/>
+        </p:nvSpPr>
+        <p:spPr>
+          <a:xfrm>
+            <a:off x="7600965" y="2218049"/>
+            <a:ext cx="933435" cy="285783"/>
+          </a:xfrm>
+          <a:prstGeom prst="rect">
+            <a:avLst/>
+          </a:prstGeom>
+          <a:ln w="19050">
+            <a:solidFill>
+              <a:srgbClr val="7030A0"/>
+            </a:solidFill>
+          </a:ln>
+          <a:effectLst/>
+        </p:spPr>
+        <p:style>
+          <a:lnRef idx="1">
+            <a:schemeClr val="accent4"/>
+          </a:lnRef>
+          <a:fillRef idx="2">
+            <a:schemeClr val="accent4"/>
+          </a:fillRef>
+          <a:effectRef idx="1">
+            <a:schemeClr val="accent4"/>
+          </a:effectRef>
+          <a:fontRef idx="minor">
+            <a:schemeClr val="dk1"/>
+          </a:fontRef>
+        </p:style>
+        <p:txBody>
+          <a:bodyPr rtlCol="0" anchor="ctr"/>
+          <a:lstStyle/>
+          <a:p>
+            <a:pPr algn="ctr"/>
+            <a:r>
+              <a:rPr lang="en-US" sz="1050" dirty="0" smtClean="0">
+                <a:solidFill>
+                  <a:srgbClr val="7030A0"/>
+                </a:solidFill>
+              </a:rPr>
+              <a:t>ProfilePicture</a:t>
+            </a:r>
+            <a:endParaRPr lang="en-SG" sz="1050" dirty="0">
+              <a:solidFill>
+                <a:srgbClr val="7030A0"/>
+              </a:solidFill>
+            </a:endParaRPr>
+          </a:p>
+        </p:txBody>
+      </p:sp>
+      <p:cxnSp>
+        <p:nvCxnSpPr>
+          <p:cNvPr id="77" name="Elbow Connector 76"/>
+          <p:cNvCxnSpPr>
+            <a:endCxn id="74" idx="1"/>
+          </p:cNvCxnSpPr>
+          <p:nvPr/>
+        </p:nvCxnSpPr>
+        <p:spPr>
+          <a:xfrm rot="5400000" flipH="1" flipV="1">
+            <a:off x="7198779" y="2655322"/>
+            <a:ext cx="696566" cy="107805"/>
           </a:xfrm>
           <a:prstGeom prst="bentConnector2">
             <a:avLst/>

</xml_diff>

<commit_message>
ModelClassDiagram: correct naming for DateOfBirth class
</commit_message>
<xml_diff>
--- a/docs/diagrams/ModelComponentClassDiagram.pptx
+++ b/docs/diagrams/ModelComponentClassDiagram.pptx
@@ -208,7 +208,7 @@
           <a:p>
             <a:fld id="{F5CC4B3F-88C1-4FFA-B1B6-F41C21DC6924}" type="datetimeFigureOut">
               <a:rPr lang="en-US" smtClean="0"/>
-              <a:t>11/6/17</a:t>
+              <a:t>11/7/17</a:t>
             </a:fld>
             <a:endParaRPr lang="en-US"/>
           </a:p>
@@ -657,7 +657,7 @@
           <a:p>
             <a:fld id="{78C97017-6FC3-485B-9764-EAC9E56C1D49}" type="datetimeFigureOut">
               <a:rPr lang="en-US" smtClean="0"/>
-              <a:t>11/6/17</a:t>
+              <a:t>11/7/17</a:t>
             </a:fld>
             <a:endParaRPr lang="en-US"/>
           </a:p>
@@ -827,7 +827,7 @@
           <a:p>
             <a:fld id="{78C97017-6FC3-485B-9764-EAC9E56C1D49}" type="datetimeFigureOut">
               <a:rPr lang="en-US" smtClean="0"/>
-              <a:t>11/6/17</a:t>
+              <a:t>11/7/17</a:t>
             </a:fld>
             <a:endParaRPr lang="en-US"/>
           </a:p>
@@ -1007,7 +1007,7 @@
           <a:p>
             <a:fld id="{78C97017-6FC3-485B-9764-EAC9E56C1D49}" type="datetimeFigureOut">
               <a:rPr lang="en-US" smtClean="0"/>
-              <a:t>11/6/17</a:t>
+              <a:t>11/7/17</a:t>
             </a:fld>
             <a:endParaRPr lang="en-US"/>
           </a:p>
@@ -1177,7 +1177,7 @@
           <a:p>
             <a:fld id="{78C97017-6FC3-485B-9764-EAC9E56C1D49}" type="datetimeFigureOut">
               <a:rPr lang="en-US" smtClean="0"/>
-              <a:t>11/6/17</a:t>
+              <a:t>11/7/17</a:t>
             </a:fld>
             <a:endParaRPr lang="en-US"/>
           </a:p>
@@ -1423,7 +1423,7 @@
           <a:p>
             <a:fld id="{78C97017-6FC3-485B-9764-EAC9E56C1D49}" type="datetimeFigureOut">
               <a:rPr lang="en-US" smtClean="0"/>
-              <a:t>11/6/17</a:t>
+              <a:t>11/7/17</a:t>
             </a:fld>
             <a:endParaRPr lang="en-US"/>
           </a:p>
@@ -1711,7 +1711,7 @@
           <a:p>
             <a:fld id="{78C97017-6FC3-485B-9764-EAC9E56C1D49}" type="datetimeFigureOut">
               <a:rPr lang="en-US" smtClean="0"/>
-              <a:t>11/6/17</a:t>
+              <a:t>11/7/17</a:t>
             </a:fld>
             <a:endParaRPr lang="en-US"/>
           </a:p>
@@ -2133,7 +2133,7 @@
           <a:p>
             <a:fld id="{78C97017-6FC3-485B-9764-EAC9E56C1D49}" type="datetimeFigureOut">
               <a:rPr lang="en-US" smtClean="0"/>
-              <a:t>11/6/17</a:t>
+              <a:t>11/7/17</a:t>
             </a:fld>
             <a:endParaRPr lang="en-US"/>
           </a:p>
@@ -2251,7 +2251,7 @@
           <a:p>
             <a:fld id="{78C97017-6FC3-485B-9764-EAC9E56C1D49}" type="datetimeFigureOut">
               <a:rPr lang="en-US" smtClean="0"/>
-              <a:t>11/6/17</a:t>
+              <a:t>11/7/17</a:t>
             </a:fld>
             <a:endParaRPr lang="en-US"/>
           </a:p>
@@ -2346,7 +2346,7 @@
           <a:p>
             <a:fld id="{78C97017-6FC3-485B-9764-EAC9E56C1D49}" type="datetimeFigureOut">
               <a:rPr lang="en-US" smtClean="0"/>
-              <a:t>11/6/17</a:t>
+              <a:t>11/7/17</a:t>
             </a:fld>
             <a:endParaRPr lang="en-US"/>
           </a:p>
@@ -2623,7 +2623,7 @@
           <a:p>
             <a:fld id="{78C97017-6FC3-485B-9764-EAC9E56C1D49}" type="datetimeFigureOut">
               <a:rPr lang="en-US" smtClean="0"/>
-              <a:t>11/6/17</a:t>
+              <a:t>11/7/17</a:t>
             </a:fld>
             <a:endParaRPr lang="en-US"/>
           </a:p>
@@ -2876,7 +2876,7 @@
           <a:p>
             <a:fld id="{78C97017-6FC3-485B-9764-EAC9E56C1D49}" type="datetimeFigureOut">
               <a:rPr lang="en-US" smtClean="0"/>
-              <a:t>11/6/17</a:t>
+              <a:t>11/7/17</a:t>
             </a:fld>
             <a:endParaRPr lang="en-US"/>
           </a:p>
@@ -3089,7 +3089,7 @@
           <a:p>
             <a:fld id="{78C97017-6FC3-485B-9764-EAC9E56C1D49}" type="datetimeFigureOut">
               <a:rPr lang="en-US" smtClean="0"/>
-              <a:t>11/6/17</a:t>
+              <a:t>11/7/17</a:t>
             </a:fld>
             <a:endParaRPr lang="en-US"/>
           </a:p>
@@ -5774,8 +5774,8 @@
         </p:nvSpPr>
         <p:spPr>
           <a:xfrm>
-            <a:off x="8042868" y="2969673"/>
-            <a:ext cx="708186" cy="339736"/>
+            <a:off x="7872010" y="3275049"/>
+            <a:ext cx="879044" cy="339736"/>
           </a:xfrm>
           <a:prstGeom prst="rect">
             <a:avLst/>
@@ -5807,12 +5807,12 @@
           <a:p>
             <a:pPr algn="ctr"/>
             <a:r>
-              <a:rPr lang="en-US" sz="1050" dirty="0" smtClean="0">
+              <a:rPr lang="en-US" sz="1050" dirty="0" err="1" smtClean="0">
                 <a:solidFill>
                   <a:srgbClr val="7030A0"/>
                 </a:solidFill>
               </a:rPr>
-              <a:t>Date Of Birth</a:t>
+              <a:t>DateOfBirth</a:t>
             </a:r>
             <a:endParaRPr lang="en-SG" sz="1050" dirty="0">
               <a:solidFill>
@@ -5830,7 +5830,7 @@
         </p:nvSpPr>
         <p:spPr>
           <a:xfrm>
-            <a:off x="8038804" y="3391774"/>
+            <a:off x="8033564" y="2951897"/>
             <a:ext cx="708186" cy="285783"/>
           </a:xfrm>
           <a:prstGeom prst="rect">
@@ -5933,11 +5933,11 @@
         <p:spPr>
           <a:xfrm>
             <a:off x="7038483" y="2999435"/>
-            <a:ext cx="1000321" cy="535231"/>
+            <a:ext cx="995081" cy="95354"/>
           </a:xfrm>
           <a:prstGeom prst="bentConnector3">
             <a:avLst>
-              <a:gd name="adj1" fmla="val 4295"/>
+              <a:gd name="adj1" fmla="val 5053"/>
             </a:avLst>
           </a:prstGeom>
           <a:ln w="19050">
@@ -6640,11 +6640,11 @@
         <p:spPr>
           <a:xfrm>
             <a:off x="7038483" y="2999435"/>
-            <a:ext cx="1004385" cy="140106"/>
+            <a:ext cx="833527" cy="445482"/>
           </a:xfrm>
           <a:prstGeom prst="bentConnector3">
             <a:avLst>
-              <a:gd name="adj1" fmla="val 4480"/>
+              <a:gd name="adj1" fmla="val 5881"/>
             </a:avLst>
           </a:prstGeom>
           <a:ln w="19050">

</xml_diff>

<commit_message>
Updated User Guide to have pictures for theme Updated Developer Guide for figures to be tagged Updated PPP for Jeremy Added relevant pictures.
</commit_message>
<xml_diff>
--- a/docs/diagrams/ModelComponentClassDiagram.pptx
+++ b/docs/diagrams/ModelComponentClassDiagram.pptx
@@ -212,7 +212,7 @@
           <a:p>
             <a:fld id="{F5CC4B3F-88C1-4FFA-B1B6-F41C21DC6924}" type="datetimeFigureOut">
               <a:rPr lang="en-US" smtClean="0"/>
-              <a:t>10/15/2017</a:t>
+              <a:t>07-11-2017</a:t>
             </a:fld>
             <a:endParaRPr lang="en-US"/>
           </a:p>
@@ -658,7 +658,7 @@
           <a:p>
             <a:fld id="{78C97017-6FC3-485B-9764-EAC9E56C1D49}" type="datetimeFigureOut">
               <a:rPr lang="en-US" smtClean="0"/>
-              <a:t>10/15/2017</a:t>
+              <a:t>07-11-2017</a:t>
             </a:fld>
             <a:endParaRPr lang="en-US"/>
           </a:p>
@@ -826,7 +826,7 @@
           <a:p>
             <a:fld id="{78C97017-6FC3-485B-9764-EAC9E56C1D49}" type="datetimeFigureOut">
               <a:rPr lang="en-US" smtClean="0"/>
-              <a:t>10/15/2017</a:t>
+              <a:t>07-11-2017</a:t>
             </a:fld>
             <a:endParaRPr lang="en-US"/>
           </a:p>
@@ -1004,7 +1004,7 @@
           <a:p>
             <a:fld id="{78C97017-6FC3-485B-9764-EAC9E56C1D49}" type="datetimeFigureOut">
               <a:rPr lang="en-US" smtClean="0"/>
-              <a:t>10/15/2017</a:t>
+              <a:t>07-11-2017</a:t>
             </a:fld>
             <a:endParaRPr lang="en-US"/>
           </a:p>
@@ -1172,7 +1172,7 @@
           <a:p>
             <a:fld id="{78C97017-6FC3-485B-9764-EAC9E56C1D49}" type="datetimeFigureOut">
               <a:rPr lang="en-US" smtClean="0"/>
-              <a:t>10/15/2017</a:t>
+              <a:t>07-11-2017</a:t>
             </a:fld>
             <a:endParaRPr lang="en-US"/>
           </a:p>
@@ -1417,7 +1417,7 @@
           <a:p>
             <a:fld id="{78C97017-6FC3-485B-9764-EAC9E56C1D49}" type="datetimeFigureOut">
               <a:rPr lang="en-US" smtClean="0"/>
-              <a:t>10/15/2017</a:t>
+              <a:t>07-11-2017</a:t>
             </a:fld>
             <a:endParaRPr lang="en-US"/>
           </a:p>
@@ -1702,7 +1702,7 @@
           <a:p>
             <a:fld id="{78C97017-6FC3-485B-9764-EAC9E56C1D49}" type="datetimeFigureOut">
               <a:rPr lang="en-US" smtClean="0"/>
-              <a:t>10/15/2017</a:t>
+              <a:t>07-11-2017</a:t>
             </a:fld>
             <a:endParaRPr lang="en-US"/>
           </a:p>
@@ -2121,7 +2121,7 @@
           <a:p>
             <a:fld id="{78C97017-6FC3-485B-9764-EAC9E56C1D49}" type="datetimeFigureOut">
               <a:rPr lang="en-US" smtClean="0"/>
-              <a:t>10/15/2017</a:t>
+              <a:t>07-11-2017</a:t>
             </a:fld>
             <a:endParaRPr lang="en-US"/>
           </a:p>
@@ -2238,7 +2238,7 @@
           <a:p>
             <a:fld id="{78C97017-6FC3-485B-9764-EAC9E56C1D49}" type="datetimeFigureOut">
               <a:rPr lang="en-US" smtClean="0"/>
-              <a:t>10/15/2017</a:t>
+              <a:t>07-11-2017</a:t>
             </a:fld>
             <a:endParaRPr lang="en-US"/>
           </a:p>
@@ -2333,7 +2333,7 @@
           <a:p>
             <a:fld id="{78C97017-6FC3-485B-9764-EAC9E56C1D49}" type="datetimeFigureOut">
               <a:rPr lang="en-US" smtClean="0"/>
-              <a:t>10/15/2017</a:t>
+              <a:t>07-11-2017</a:t>
             </a:fld>
             <a:endParaRPr lang="en-US"/>
           </a:p>
@@ -2608,7 +2608,7 @@
           <a:p>
             <a:fld id="{78C97017-6FC3-485B-9764-EAC9E56C1D49}" type="datetimeFigureOut">
               <a:rPr lang="en-US" smtClean="0"/>
-              <a:t>10/15/2017</a:t>
+              <a:t>07-11-2017</a:t>
             </a:fld>
             <a:endParaRPr lang="en-US"/>
           </a:p>
@@ -2860,7 +2860,7 @@
           <a:p>
             <a:fld id="{78C97017-6FC3-485B-9764-EAC9E56C1D49}" type="datetimeFigureOut">
               <a:rPr lang="en-US" smtClean="0"/>
-              <a:t>10/15/2017</a:t>
+              <a:t>07-11-2017</a:t>
             </a:fld>
             <a:endParaRPr lang="en-US"/>
           </a:p>
@@ -3071,7 +3071,7 @@
           <a:p>
             <a:fld id="{78C97017-6FC3-485B-9764-EAC9E56C1D49}" type="datetimeFigureOut">
               <a:rPr lang="en-US" smtClean="0"/>
-              <a:t>10/15/2017</a:t>
+              <a:t>07-11-2017</a:t>
             </a:fld>
             <a:endParaRPr lang="en-US"/>
           </a:p>
@@ -3454,7 +3454,7 @@
         </p:nvSpPr>
         <p:spPr>
           <a:xfrm>
-            <a:off x="1119865" y="1727200"/>
+            <a:off x="1119865" y="1738947"/>
             <a:ext cx="7490735" cy="2997200"/>
           </a:xfrm>
           <a:prstGeom prst="roundRect">
@@ -5475,6 +5475,14 @@
               </a:rPr>
               <a:t>&lt;&lt;interface&gt;&gt;</a:t>
             </a:r>
+            <a:r>
+              <a:rPr lang="en-US" sz="1050">
+                <a:solidFill>
+                  <a:srgbClr val="7030A0"/>
+                </a:solidFill>
+              </a:rPr>
+              <a:t/>
+            </a:r>
             <a:br>
               <a:rPr lang="en-US" sz="1050">
                 <a:solidFill>
@@ -5898,7 +5906,7 @@
           <p:cNvPr id="73" name="Rectangle 8">
             <a:extLst>
               <a:ext uri="{FF2B5EF4-FFF2-40B4-BE49-F238E27FC236}">
-                <a16:creationId xmlns:a16="http://schemas.microsoft.com/office/drawing/2014/main" id="{69839C1D-706B-432B-A682-474042554766}"/>
+                <a16:creationId xmlns:a16="http://schemas.microsoft.com/office/drawing/2014/main" xmlns="" id="{69839C1D-706B-432B-A682-474042554766}"/>
               </a:ext>
             </a:extLst>
           </p:cNvPr>
@@ -5960,7 +5968,7 @@
           <p:cNvPr id="74" name="Rectangle 8">
             <a:extLst>
               <a:ext uri="{FF2B5EF4-FFF2-40B4-BE49-F238E27FC236}">
-                <a16:creationId xmlns:a16="http://schemas.microsoft.com/office/drawing/2014/main" id="{1091B32D-B8E5-478C-84A4-452D554CCDC1}"/>
+                <a16:creationId xmlns:a16="http://schemas.microsoft.com/office/drawing/2014/main" xmlns="" id="{1091B32D-B8E5-478C-84A4-452D554CCDC1}"/>
               </a:ext>
             </a:extLst>
           </p:cNvPr>
@@ -6022,7 +6030,7 @@
           <p:cNvPr id="77" name="Elbow Connector 85">
             <a:extLst>
               <a:ext uri="{FF2B5EF4-FFF2-40B4-BE49-F238E27FC236}">
-                <a16:creationId xmlns:a16="http://schemas.microsoft.com/office/drawing/2014/main" id="{3A5110E0-6DAC-47A0-B7B1-C4500B96B97E}"/>
+                <a16:creationId xmlns:a16="http://schemas.microsoft.com/office/drawing/2014/main" xmlns="" id="{3A5110E0-6DAC-47A0-B7B1-C4500B96B97E}"/>
               </a:ext>
             </a:extLst>
           </p:cNvPr>
@@ -6072,7 +6080,7 @@
           <p:cNvPr id="82" name="Elbow Connector 85">
             <a:extLst>
               <a:ext uri="{FF2B5EF4-FFF2-40B4-BE49-F238E27FC236}">
-                <a16:creationId xmlns:a16="http://schemas.microsoft.com/office/drawing/2014/main" id="{3DDA3069-34F4-40C8-A953-0401FA6B11E7}"/>
+                <a16:creationId xmlns:a16="http://schemas.microsoft.com/office/drawing/2014/main" xmlns="" id="{3DDA3069-34F4-40C8-A953-0401FA6B11E7}"/>
               </a:ext>
             </a:extLst>
           </p:cNvPr>
@@ -6117,6 +6125,118 @@
           </a:fontRef>
         </p:style>
       </p:cxnSp>
+      <p:cxnSp>
+        <p:nvCxnSpPr>
+          <p:cNvPr id="88" name="Elbow Connector 85">
+            <a:extLst>
+              <a:ext uri="{FF2B5EF4-FFF2-40B4-BE49-F238E27FC236}">
+                <a16:creationId xmlns:a16="http://schemas.microsoft.com/office/drawing/2014/main" xmlns="" id="{3DDA3069-34F4-40C8-A953-0401FA6B11E7}"/>
+              </a:ext>
+            </a:extLst>
+          </p:cNvPr>
+          <p:cNvCxnSpPr>
+            <a:cxnSpLocks/>
+            <a:stCxn id="78" idx="3"/>
+            <a:endCxn id="89" idx="1"/>
+          </p:cNvCxnSpPr>
+          <p:nvPr/>
+        </p:nvCxnSpPr>
+        <p:spPr>
+          <a:xfrm flipV="1">
+            <a:off x="7277995" y="2369911"/>
+            <a:ext cx="433086" cy="664980"/>
+          </a:xfrm>
+          <a:prstGeom prst="bentConnector3">
+            <a:avLst>
+              <a:gd name="adj1" fmla="val 50000"/>
+            </a:avLst>
+          </a:prstGeom>
+          <a:ln w="19050">
+            <a:solidFill>
+              <a:srgbClr val="7030A0"/>
+            </a:solidFill>
+            <a:headEnd type="none" w="med" len="med"/>
+            <a:tailEnd type="arrow" w="med" len="med"/>
+          </a:ln>
+          <a:effectLst/>
+        </p:spPr>
+        <p:style>
+          <a:lnRef idx="1">
+            <a:schemeClr val="accent2"/>
+          </a:lnRef>
+          <a:fillRef idx="2">
+            <a:schemeClr val="accent2"/>
+          </a:fillRef>
+          <a:effectRef idx="1">
+            <a:schemeClr val="accent2"/>
+          </a:effectRef>
+          <a:fontRef idx="minor">
+            <a:schemeClr val="dk1"/>
+          </a:fontRef>
+        </p:style>
+      </p:cxnSp>
+      <p:sp>
+        <p:nvSpPr>
+          <p:cNvPr id="89" name="Rectangle 8">
+            <a:extLst>
+              <a:ext uri="{FF2B5EF4-FFF2-40B4-BE49-F238E27FC236}">
+                <a16:creationId xmlns:a16="http://schemas.microsoft.com/office/drawing/2014/main" xmlns="" id="{1091B32D-B8E5-478C-84A4-452D554CCDC1}"/>
+              </a:ext>
+            </a:extLst>
+          </p:cNvPr>
+          <p:cNvSpPr/>
+          <p:nvPr/>
+        </p:nvSpPr>
+        <p:spPr>
+          <a:xfrm>
+            <a:off x="7711081" y="2227019"/>
+            <a:ext cx="708186" cy="285783"/>
+          </a:xfrm>
+          <a:prstGeom prst="rect">
+            <a:avLst/>
+          </a:prstGeom>
+          <a:ln w="19050">
+            <a:solidFill>
+              <a:srgbClr val="7030A0"/>
+            </a:solidFill>
+          </a:ln>
+          <a:effectLst/>
+        </p:spPr>
+        <p:style>
+          <a:lnRef idx="1">
+            <a:schemeClr val="accent4"/>
+          </a:lnRef>
+          <a:fillRef idx="2">
+            <a:schemeClr val="accent4"/>
+          </a:fillRef>
+          <a:effectRef idx="1">
+            <a:schemeClr val="accent4"/>
+          </a:effectRef>
+          <a:fontRef idx="minor">
+            <a:schemeClr val="dk1"/>
+          </a:fontRef>
+        </p:style>
+        <p:txBody>
+          <a:bodyPr rtlCol="0" anchor="ctr"/>
+          <a:lstStyle/>
+          <a:p>
+            <a:pPr algn="ctr"/>
+            <a:r>
+              <a:rPr lang="en-US" sz="1050" dirty="0" smtClean="0">
+                <a:solidFill>
+                  <a:srgbClr val="7030A0"/>
+                </a:solidFill>
+              </a:rPr>
+              <a:t>Picture</a:t>
+            </a:r>
+            <a:endParaRPr lang="en-SG" sz="1050" dirty="0">
+              <a:solidFill>
+                <a:srgbClr val="7030A0"/>
+              </a:solidFill>
+            </a:endParaRPr>
+          </a:p>
+        </p:txBody>
+      </p:sp>
     </p:spTree>
     <p:extLst>
       <p:ext uri="{BB962C8B-B14F-4D97-AF65-F5344CB8AC3E}">

</xml_diff>

<commit_message>
Update diagrams in developer guide
</commit_message>
<xml_diff>
--- a/docs/diagrams/ModelComponentClassDiagram.pptx
+++ b/docs/diagrams/ModelComponentClassDiagram.pptx
@@ -208,7 +208,7 @@
           <a:p>
             <a:fld id="{F5CC4B3F-88C1-4FFA-B1B6-F41C21DC6924}" type="datetimeFigureOut">
               <a:rPr lang="en-US" smtClean="0"/>
-              <a:t>11/10/17</a:t>
+              <a:t>11/12/17</a:t>
             </a:fld>
             <a:endParaRPr lang="en-US"/>
           </a:p>
@@ -657,7 +657,7 @@
           <a:p>
             <a:fld id="{78C97017-6FC3-485B-9764-EAC9E56C1D49}" type="datetimeFigureOut">
               <a:rPr lang="en-US" smtClean="0"/>
-              <a:t>11/10/17</a:t>
+              <a:t>11/12/17</a:t>
             </a:fld>
             <a:endParaRPr lang="en-US"/>
           </a:p>
@@ -827,7 +827,7 @@
           <a:p>
             <a:fld id="{78C97017-6FC3-485B-9764-EAC9E56C1D49}" type="datetimeFigureOut">
               <a:rPr lang="en-US" smtClean="0"/>
-              <a:t>11/10/17</a:t>
+              <a:t>11/12/17</a:t>
             </a:fld>
             <a:endParaRPr lang="en-US"/>
           </a:p>
@@ -1007,7 +1007,7 @@
           <a:p>
             <a:fld id="{78C97017-6FC3-485B-9764-EAC9E56C1D49}" type="datetimeFigureOut">
               <a:rPr lang="en-US" smtClean="0"/>
-              <a:t>11/10/17</a:t>
+              <a:t>11/12/17</a:t>
             </a:fld>
             <a:endParaRPr lang="en-US"/>
           </a:p>
@@ -1177,7 +1177,7 @@
           <a:p>
             <a:fld id="{78C97017-6FC3-485B-9764-EAC9E56C1D49}" type="datetimeFigureOut">
               <a:rPr lang="en-US" smtClean="0"/>
-              <a:t>11/10/17</a:t>
+              <a:t>11/12/17</a:t>
             </a:fld>
             <a:endParaRPr lang="en-US"/>
           </a:p>
@@ -1423,7 +1423,7 @@
           <a:p>
             <a:fld id="{78C97017-6FC3-485B-9764-EAC9E56C1D49}" type="datetimeFigureOut">
               <a:rPr lang="en-US" smtClean="0"/>
-              <a:t>11/10/17</a:t>
+              <a:t>11/12/17</a:t>
             </a:fld>
             <a:endParaRPr lang="en-US"/>
           </a:p>
@@ -1711,7 +1711,7 @@
           <a:p>
             <a:fld id="{78C97017-6FC3-485B-9764-EAC9E56C1D49}" type="datetimeFigureOut">
               <a:rPr lang="en-US" smtClean="0"/>
-              <a:t>11/10/17</a:t>
+              <a:t>11/12/17</a:t>
             </a:fld>
             <a:endParaRPr lang="en-US"/>
           </a:p>
@@ -2133,7 +2133,7 @@
           <a:p>
             <a:fld id="{78C97017-6FC3-485B-9764-EAC9E56C1D49}" type="datetimeFigureOut">
               <a:rPr lang="en-US" smtClean="0"/>
-              <a:t>11/10/17</a:t>
+              <a:t>11/12/17</a:t>
             </a:fld>
             <a:endParaRPr lang="en-US"/>
           </a:p>
@@ -2251,7 +2251,7 @@
           <a:p>
             <a:fld id="{78C97017-6FC3-485B-9764-EAC9E56C1D49}" type="datetimeFigureOut">
               <a:rPr lang="en-US" smtClean="0"/>
-              <a:t>11/10/17</a:t>
+              <a:t>11/12/17</a:t>
             </a:fld>
             <a:endParaRPr lang="en-US"/>
           </a:p>
@@ -2346,7 +2346,7 @@
           <a:p>
             <a:fld id="{78C97017-6FC3-485B-9764-EAC9E56C1D49}" type="datetimeFigureOut">
               <a:rPr lang="en-US" smtClean="0"/>
-              <a:t>11/10/17</a:t>
+              <a:t>11/12/17</a:t>
             </a:fld>
             <a:endParaRPr lang="en-US"/>
           </a:p>
@@ -2623,7 +2623,7 @@
           <a:p>
             <a:fld id="{78C97017-6FC3-485B-9764-EAC9E56C1D49}" type="datetimeFigureOut">
               <a:rPr lang="en-US" smtClean="0"/>
-              <a:t>11/10/17</a:t>
+              <a:t>11/12/17</a:t>
             </a:fld>
             <a:endParaRPr lang="en-US"/>
           </a:p>
@@ -2876,7 +2876,7 @@
           <a:p>
             <a:fld id="{78C97017-6FC3-485B-9764-EAC9E56C1D49}" type="datetimeFigureOut">
               <a:rPr lang="en-US" smtClean="0"/>
-              <a:t>11/10/17</a:t>
+              <a:t>11/12/17</a:t>
             </a:fld>
             <a:endParaRPr lang="en-US"/>
           </a:p>
@@ -3089,7 +3089,7 @@
           <a:p>
             <a:fld id="{78C97017-6FC3-485B-9764-EAC9E56C1D49}" type="datetimeFigureOut">
               <a:rPr lang="en-US" smtClean="0"/>
-              <a:t>11/10/17</a:t>
+              <a:t>11/12/17</a:t>
             </a:fld>
             <a:endParaRPr lang="en-US"/>
           </a:p>
@@ -3472,8 +3472,8 @@
         </p:nvSpPr>
         <p:spPr>
           <a:xfrm>
-            <a:off x="1119865" y="413140"/>
-            <a:ext cx="7566935" cy="4844659"/>
+            <a:off x="454769" y="379162"/>
+            <a:ext cx="8689231" cy="4844659"/>
           </a:xfrm>
           <a:prstGeom prst="roundRect">
             <a:avLst>
@@ -3533,7 +3533,7 @@
         </p:nvSpPr>
         <p:spPr>
           <a:xfrm>
-            <a:off x="2880552" y="3700729"/>
+            <a:off x="2331556" y="3631064"/>
             <a:ext cx="1093635" cy="346760"/>
           </a:xfrm>
           <a:prstGeom prst="rect">
@@ -3592,7 +3592,7 @@
         </p:nvSpPr>
         <p:spPr>
           <a:xfrm rot="16200000">
-            <a:off x="1267984" y="2824622"/>
+            <a:off x="718988" y="2754957"/>
             <a:ext cx="1925593" cy="346760"/>
           </a:xfrm>
           <a:prstGeom prst="rect">
@@ -3651,7 +3651,7 @@
         </p:nvCxnSpPr>
         <p:spPr>
           <a:xfrm flipV="1">
-            <a:off x="6516875" y="2454643"/>
+            <a:off x="5967879" y="2384978"/>
             <a:ext cx="95385" cy="416514"/>
           </a:xfrm>
           <a:prstGeom prst="bentConnector2">
@@ -3690,7 +3690,7 @@
         </p:nvSpPr>
         <p:spPr>
           <a:xfrm rot="16200000">
-            <a:off x="956202" y="2861202"/>
+            <a:off x="407206" y="2791537"/>
             <a:ext cx="1093635" cy="346760"/>
           </a:xfrm>
           <a:prstGeom prst="rect">
@@ -3760,7 +3760,7 @@
         </p:nvSpPr>
         <p:spPr>
           <a:xfrm rot="16200000">
-            <a:off x="1626910" y="2952291"/>
+            <a:off x="1077914" y="2882626"/>
             <a:ext cx="270504" cy="175523"/>
           </a:xfrm>
           <a:prstGeom prst="triangle">
@@ -3809,7 +3809,7 @@
         </p:nvCxnSpPr>
         <p:spPr>
           <a:xfrm>
-            <a:off x="2636799" y="3874109"/>
+            <a:off x="2087803" y="3804444"/>
             <a:ext cx="240381" cy="0"/>
           </a:xfrm>
           <a:prstGeom prst="straightConnector1">
@@ -3847,7 +3847,7 @@
         </p:nvSpPr>
         <p:spPr>
           <a:xfrm rot="5400000" flipV="1">
-            <a:off x="6271687" y="2801226"/>
+            <a:off x="5722691" y="2731561"/>
             <a:ext cx="270504" cy="175523"/>
           </a:xfrm>
           <a:prstGeom prst="triangle">
@@ -3898,7 +3898,7 @@
         </p:nvCxnSpPr>
         <p:spPr>
           <a:xfrm>
-            <a:off x="910091" y="3040053"/>
+            <a:off x="361095" y="2970388"/>
             <a:ext cx="419548" cy="2860"/>
           </a:xfrm>
           <a:prstGeom prst="bentConnector3">
@@ -3943,7 +3943,7 @@
         </p:nvCxnSpPr>
         <p:spPr>
           <a:xfrm flipV="1">
-            <a:off x="1849924" y="3040052"/>
+            <a:off x="1300928" y="2970387"/>
             <a:ext cx="216105" cy="1"/>
           </a:xfrm>
           <a:prstGeom prst="line">
@@ -3982,7 +3982,7 @@
         </p:nvSpPr>
         <p:spPr>
           <a:xfrm>
-            <a:off x="2400751" y="3787419"/>
+            <a:off x="1851755" y="3717754"/>
             <a:ext cx="236048" cy="173380"/>
           </a:xfrm>
           <a:prstGeom prst="flowChartDecision">
@@ -4027,7 +4027,7 @@
         </p:nvSpPr>
         <p:spPr>
           <a:xfrm>
-            <a:off x="2858595" y="1960981"/>
+            <a:off x="2309599" y="1891316"/>
             <a:ext cx="1093635" cy="346760"/>
           </a:xfrm>
           <a:prstGeom prst="rect">
@@ -4086,7 +4086,7 @@
         </p:nvCxnSpPr>
         <p:spPr>
           <a:xfrm>
-            <a:off x="2657373" y="2126028"/>
+            <a:off x="2108377" y="2056363"/>
             <a:ext cx="201222" cy="8333"/>
           </a:xfrm>
           <a:prstGeom prst="straightConnector1">
@@ -4124,7 +4124,7 @@
         </p:nvSpPr>
         <p:spPr>
           <a:xfrm>
-            <a:off x="2421325" y="2030692"/>
+            <a:off x="1872329" y="1961027"/>
             <a:ext cx="236048" cy="190671"/>
           </a:xfrm>
           <a:prstGeom prst="flowChartDecision">
@@ -4169,7 +4169,7 @@
         </p:nvSpPr>
         <p:spPr>
           <a:xfrm>
-            <a:off x="4514229" y="2254742"/>
+            <a:off x="3965233" y="2185077"/>
             <a:ext cx="1156969" cy="346760"/>
           </a:xfrm>
           <a:prstGeom prst="rect">
@@ -4225,7 +4225,7 @@
         </p:nvSpPr>
         <p:spPr>
           <a:xfrm>
-            <a:off x="3946006" y="2163162"/>
+            <a:off x="3397010" y="2093497"/>
             <a:ext cx="236048" cy="173380"/>
           </a:xfrm>
           <a:prstGeom prst="flowChartDecision">
@@ -4275,7 +4275,7 @@
         </p:nvCxnSpPr>
         <p:spPr>
           <a:xfrm>
-            <a:off x="4182054" y="2249852"/>
+            <a:off x="3633058" y="2180187"/>
             <a:ext cx="332175" cy="178270"/>
           </a:xfrm>
           <a:prstGeom prst="bentConnector3">
@@ -4313,7 +4313,7 @@
         </p:nvSpPr>
         <p:spPr>
           <a:xfrm>
-            <a:off x="4486258" y="1791253"/>
+            <a:off x="3937262" y="1721588"/>
             <a:ext cx="1156969" cy="346760"/>
           </a:xfrm>
           <a:prstGeom prst="rect">
@@ -4369,7 +4369,7 @@
         </p:nvCxnSpPr>
         <p:spPr>
           <a:xfrm flipV="1">
-            <a:off x="4229004" y="1936691"/>
+            <a:off x="3680008" y="1867026"/>
             <a:ext cx="256977" cy="306732"/>
           </a:xfrm>
           <a:prstGeom prst="bentConnector3">
@@ -4409,7 +4409,7 @@
         </p:nvSpPr>
         <p:spPr>
           <a:xfrm>
-            <a:off x="6258167" y="2118955"/>
+            <a:off x="5709171" y="2049290"/>
             <a:ext cx="708186" cy="346760"/>
           </a:xfrm>
           <a:prstGeom prst="rect">
@@ -4465,7 +4465,7 @@
         </p:nvSpPr>
         <p:spPr>
           <a:xfrm>
-            <a:off x="5654686" y="2334781"/>
+            <a:off x="5105690" y="2265116"/>
             <a:ext cx="236048" cy="173380"/>
           </a:xfrm>
           <a:prstGeom prst="flowChartDecision">
@@ -4513,7 +4513,7 @@
         </p:nvCxnSpPr>
         <p:spPr>
           <a:xfrm flipV="1">
-            <a:off x="5890734" y="2292335"/>
+            <a:off x="5341738" y="2222670"/>
             <a:ext cx="367433" cy="129136"/>
           </a:xfrm>
           <a:prstGeom prst="bentConnector3">
@@ -4551,7 +4551,7 @@
         </p:nvSpPr>
         <p:spPr>
           <a:xfrm>
-            <a:off x="5413952" y="1212665"/>
+            <a:off x="4864956" y="1143000"/>
             <a:ext cx="483700" cy="346760"/>
           </a:xfrm>
           <a:prstGeom prst="rect">
@@ -4607,7 +4607,7 @@
         </p:nvSpPr>
         <p:spPr>
           <a:xfrm rot="16200000">
-            <a:off x="4923543" y="1578507"/>
+            <a:off x="4374547" y="1508842"/>
             <a:ext cx="236048" cy="173380"/>
           </a:xfrm>
           <a:prstGeom prst="flowChartDecision">
@@ -4655,7 +4655,7 @@
         </p:nvCxnSpPr>
         <p:spPr>
           <a:xfrm rot="5400000" flipH="1" flipV="1">
-            <a:off x="5147195" y="1280417"/>
+            <a:off x="4598199" y="1210752"/>
             <a:ext cx="161128" cy="372385"/>
           </a:xfrm>
           <a:prstGeom prst="bentConnector2">
@@ -4693,7 +4693,7 @@
         </p:nvSpPr>
         <p:spPr>
           <a:xfrm>
-            <a:off x="5137400" y="2708025"/>
+            <a:off x="4588404" y="2638360"/>
             <a:ext cx="1156969" cy="346760"/>
           </a:xfrm>
           <a:prstGeom prst="rect">
@@ -4764,7 +4764,7 @@
         </p:nvSpPr>
         <p:spPr>
           <a:xfrm>
-            <a:off x="7712397" y="1225385"/>
+            <a:off x="7163401" y="1155720"/>
             <a:ext cx="708186" cy="285783"/>
           </a:xfrm>
           <a:prstGeom prst="rect">
@@ -4820,7 +4820,7 @@
         </p:nvSpPr>
         <p:spPr>
           <a:xfrm>
-            <a:off x="6980802" y="2205645"/>
+            <a:off x="6431806" y="2135980"/>
             <a:ext cx="236048" cy="173380"/>
           </a:xfrm>
           <a:prstGeom prst="flowChartDecision">
@@ -4870,7 +4870,7 @@
         </p:nvCxnSpPr>
         <p:spPr>
           <a:xfrm flipV="1">
-            <a:off x="7216850" y="1368277"/>
+            <a:off x="6667854" y="1298612"/>
             <a:ext cx="495547" cy="924058"/>
           </a:xfrm>
           <a:prstGeom prst="bentConnector3">
@@ -4908,7 +4908,7 @@
         </p:nvSpPr>
         <p:spPr>
           <a:xfrm>
-            <a:off x="7712397" y="1582477"/>
+            <a:off x="7163401" y="1512812"/>
             <a:ext cx="708186" cy="285783"/>
           </a:xfrm>
           <a:prstGeom prst="rect">
@@ -4967,7 +4967,7 @@
         </p:nvCxnSpPr>
         <p:spPr>
           <a:xfrm flipV="1">
-            <a:off x="7216850" y="1725369"/>
+            <a:off x="6667854" y="1655704"/>
             <a:ext cx="495547" cy="566966"/>
           </a:xfrm>
           <a:prstGeom prst="bentConnector3">
@@ -5005,7 +5005,7 @@
         </p:nvSpPr>
         <p:spPr>
           <a:xfrm>
-            <a:off x="7712397" y="1931045"/>
+            <a:off x="7163401" y="1861380"/>
             <a:ext cx="708186" cy="285783"/>
           </a:xfrm>
           <a:prstGeom prst="rect">
@@ -5064,7 +5064,7 @@
         </p:nvCxnSpPr>
         <p:spPr>
           <a:xfrm flipV="1">
-            <a:off x="7216850" y="2073937"/>
+            <a:off x="6667854" y="2004272"/>
             <a:ext cx="495547" cy="218398"/>
           </a:xfrm>
           <a:prstGeom prst="bentConnector3">
@@ -5102,7 +5102,7 @@
         </p:nvSpPr>
         <p:spPr>
           <a:xfrm>
-            <a:off x="7716754" y="2277982"/>
+            <a:off x="7167758" y="2208317"/>
             <a:ext cx="708186" cy="285783"/>
           </a:xfrm>
           <a:prstGeom prst="rect">
@@ -5161,7 +5161,7 @@
         </p:nvCxnSpPr>
         <p:spPr>
           <a:xfrm>
-            <a:off x="7216850" y="2292335"/>
+            <a:off x="6667854" y="2222670"/>
             <a:ext cx="499904" cy="128539"/>
           </a:xfrm>
           <a:prstGeom prst="bentConnector3">
@@ -5201,7 +5201,7 @@
         </p:nvCxnSpPr>
         <p:spPr>
           <a:xfrm rot="5400000">
-            <a:off x="3355510" y="1898541"/>
+            <a:off x="2806514" y="1828876"/>
             <a:ext cx="112685" cy="12700"/>
           </a:xfrm>
           <a:prstGeom prst="bentConnector3">
@@ -5242,7 +5242,7 @@
         </p:nvSpPr>
         <p:spPr>
           <a:xfrm rot="10800000" flipV="1">
-            <a:off x="3276600" y="1666676"/>
+            <a:off x="2727604" y="1597011"/>
             <a:ext cx="270504" cy="175523"/>
           </a:xfrm>
           <a:prstGeom prst="triangle">
@@ -5290,7 +5290,7 @@
         </p:nvSpPr>
         <p:spPr>
           <a:xfrm>
-            <a:off x="2687923" y="1289509"/>
+            <a:off x="2138927" y="1219844"/>
             <a:ext cx="1539926" cy="346760"/>
           </a:xfrm>
           <a:prstGeom prst="rect">
@@ -5361,7 +5361,7 @@
         </p:nvSpPr>
         <p:spPr>
           <a:xfrm>
-            <a:off x="2057401" y="4239491"/>
+            <a:off x="1508405" y="4169826"/>
             <a:ext cx="1066800" cy="346760"/>
           </a:xfrm>
           <a:prstGeom prst="rect">
@@ -5443,7 +5443,7 @@
         </p:nvCxnSpPr>
         <p:spPr>
           <a:xfrm rot="16200000" flipH="1">
-            <a:off x="1364475" y="3719944"/>
+            <a:off x="815479" y="3650279"/>
             <a:ext cx="831471" cy="554381"/>
           </a:xfrm>
           <a:prstGeom prst="bentConnector2">
@@ -5484,7 +5484,7 @@
         </p:nvCxnSpPr>
         <p:spPr>
           <a:xfrm rot="16200000" flipV="1">
-            <a:off x="6041574" y="1548269"/>
+            <a:off x="5492578" y="1478604"/>
             <a:ext cx="172340" cy="969032"/>
           </a:xfrm>
           <a:prstGeom prst="bentConnector2">
@@ -5522,7 +5522,7 @@
         </p:nvSpPr>
         <p:spPr>
           <a:xfrm>
-            <a:off x="4274132" y="1732826"/>
+            <a:off x="3725136" y="1663161"/>
             <a:ext cx="189257" cy="178683"/>
           </a:xfrm>
           <a:prstGeom prst="rect">
@@ -5561,7 +5561,7 @@
         </p:nvSpPr>
         <p:spPr>
           <a:xfrm>
-            <a:off x="4324972" y="3058864"/>
+            <a:off x="3775976" y="2989199"/>
             <a:ext cx="189257" cy="178683"/>
           </a:xfrm>
           <a:prstGeom prst="rect">
@@ -5600,7 +5600,7 @@
         </p:nvSpPr>
         <p:spPr>
           <a:xfrm>
-            <a:off x="5701477" y="2023232"/>
+            <a:off x="5152481" y="1953567"/>
             <a:ext cx="189257" cy="178683"/>
           </a:xfrm>
           <a:prstGeom prst="rect">
@@ -5639,7 +5639,7 @@
         </p:nvSpPr>
         <p:spPr>
           <a:xfrm>
-            <a:off x="5163172" y="1778919"/>
+            <a:off x="4614176" y="1709254"/>
             <a:ext cx="189257" cy="178683"/>
           </a:xfrm>
           <a:prstGeom prst="rect">
@@ -5678,7 +5678,7 @@
         </p:nvSpPr>
         <p:spPr>
           <a:xfrm>
-            <a:off x="6135256" y="3097917"/>
+            <a:off x="5586260" y="3028252"/>
             <a:ext cx="189257" cy="178683"/>
           </a:xfrm>
           <a:prstGeom prst="rect">
@@ -5717,7 +5717,7 @@
         </p:nvSpPr>
         <p:spPr>
           <a:xfrm>
-            <a:off x="2687923" y="2564238"/>
+            <a:off x="2138927" y="2494573"/>
             <a:ext cx="189257" cy="178683"/>
           </a:xfrm>
           <a:prstGeom prst="rect">
@@ -5756,7 +5756,7 @@
         </p:nvSpPr>
         <p:spPr>
           <a:xfrm>
-            <a:off x="2656370" y="3386050"/>
+            <a:off x="2107374" y="3316385"/>
             <a:ext cx="189257" cy="178683"/>
           </a:xfrm>
           <a:prstGeom prst="rect">
@@ -5795,7 +5795,7 @@
         </p:nvSpPr>
         <p:spPr>
           <a:xfrm>
-            <a:off x="6492212" y="2958969"/>
+            <a:off x="5943216" y="2889304"/>
             <a:ext cx="189257" cy="178683"/>
           </a:xfrm>
           <a:prstGeom prst="rect">
@@ -5834,7 +5834,7 @@
         </p:nvSpPr>
         <p:spPr>
           <a:xfrm>
-            <a:off x="2409523" y="3240457"/>
+            <a:off x="1860527" y="3170792"/>
             <a:ext cx="236048" cy="173380"/>
           </a:xfrm>
           <a:prstGeom prst="flowChartDecision">
@@ -5882,7 +5882,7 @@
         </p:nvCxnSpPr>
         <p:spPr>
           <a:xfrm>
-            <a:off x="2645571" y="3327147"/>
+            <a:off x="2096575" y="3257482"/>
             <a:ext cx="242522" cy="13718"/>
           </a:xfrm>
           <a:prstGeom prst="straightConnector1">
@@ -5920,7 +5920,7 @@
         </p:nvSpPr>
         <p:spPr>
           <a:xfrm>
-            <a:off x="2888093" y="3167485"/>
+            <a:off x="2339097" y="3097820"/>
             <a:ext cx="1093635" cy="346760"/>
           </a:xfrm>
           <a:prstGeom prst="rect">
@@ -5976,7 +5976,7 @@
         </p:nvSpPr>
         <p:spPr>
           <a:xfrm>
-            <a:off x="3999991" y="3247316"/>
+            <a:off x="3450995" y="3177651"/>
             <a:ext cx="236048" cy="173380"/>
           </a:xfrm>
           <a:prstGeom prst="flowChartDecision">
@@ -6023,7 +6023,7 @@
         </p:nvSpPr>
         <p:spPr>
           <a:xfrm rot="10800000" flipV="1">
-            <a:off x="3249838" y="2871157"/>
+            <a:off x="2700842" y="2801492"/>
             <a:ext cx="270504" cy="152402"/>
           </a:xfrm>
           <a:prstGeom prst="triangle">
@@ -6071,7 +6071,7 @@
         </p:nvCxnSpPr>
         <p:spPr>
           <a:xfrm rot="5400000">
-            <a:off x="3316322" y="3106538"/>
+            <a:off x="2767326" y="3036873"/>
             <a:ext cx="133822" cy="3712"/>
           </a:xfrm>
           <a:prstGeom prst="bentConnector3">
@@ -6112,7 +6112,7 @@
         </p:nvSpPr>
         <p:spPr>
           <a:xfrm>
-            <a:off x="2665210" y="2532162"/>
+            <a:off x="2116214" y="2462497"/>
             <a:ext cx="1539926" cy="346760"/>
           </a:xfrm>
           <a:prstGeom prst="rect">
@@ -6186,7 +6186,7 @@
         </p:nvCxnSpPr>
         <p:spPr>
           <a:xfrm rot="5400000" flipH="1" flipV="1">
-            <a:off x="3574104" y="2508543"/>
+            <a:off x="3025108" y="2438878"/>
             <a:ext cx="1456063" cy="368243"/>
           </a:xfrm>
           <a:prstGeom prst="bentConnector4">
@@ -6227,7 +6227,7 @@
         </p:nvCxnSpPr>
         <p:spPr>
           <a:xfrm flipV="1">
-            <a:off x="4224250" y="3327147"/>
+            <a:off x="3675254" y="3257482"/>
             <a:ext cx="305147" cy="1524"/>
           </a:xfrm>
           <a:prstGeom prst="bentConnector3">
@@ -6267,7 +6267,7 @@
         </p:nvSpPr>
         <p:spPr>
           <a:xfrm>
-            <a:off x="4529397" y="3137752"/>
+            <a:off x="3980401" y="3068087"/>
             <a:ext cx="1156969" cy="346760"/>
           </a:xfrm>
           <a:prstGeom prst="rect">
@@ -6323,7 +6323,7 @@
         </p:nvSpPr>
         <p:spPr>
           <a:xfrm>
-            <a:off x="5686366" y="3224442"/>
+            <a:off x="5137370" y="3154777"/>
             <a:ext cx="236048" cy="173380"/>
           </a:xfrm>
           <a:prstGeom prst="flowChartDecision">
@@ -6370,7 +6370,7 @@
         </p:nvCxnSpPr>
         <p:spPr>
           <a:xfrm>
-            <a:off x="5922414" y="3311132"/>
+            <a:off x="5373418" y="3241467"/>
             <a:ext cx="234082" cy="425305"/>
           </a:xfrm>
           <a:prstGeom prst="bentConnector2">
@@ -6408,7 +6408,7 @@
         </p:nvSpPr>
         <p:spPr>
           <a:xfrm>
-            <a:off x="5986274" y="3750748"/>
+            <a:off x="5437278" y="3681083"/>
             <a:ext cx="708186" cy="346760"/>
           </a:xfrm>
           <a:prstGeom prst="rect">
@@ -6461,7 +6461,7 @@
         </p:nvCxnSpPr>
         <p:spPr>
           <a:xfrm rot="16200000" flipV="1">
-            <a:off x="5047800" y="2458180"/>
+            <a:off x="4498804" y="2388515"/>
             <a:ext cx="1896736" cy="688399"/>
           </a:xfrm>
           <a:prstGeom prst="bentConnector3">
@@ -6501,7 +6501,7 @@
         </p:nvSpPr>
         <p:spPr>
           <a:xfrm>
-            <a:off x="5693997" y="1667296"/>
+            <a:off x="5145001" y="1597631"/>
             <a:ext cx="189257" cy="178683"/>
           </a:xfrm>
           <a:prstGeom prst="rect">
@@ -6540,7 +6540,7 @@
         </p:nvSpPr>
         <p:spPr>
           <a:xfrm>
-            <a:off x="4759249" y="4264483"/>
+            <a:off x="4210253" y="4194818"/>
             <a:ext cx="1156969" cy="346760"/>
           </a:xfrm>
           <a:prstGeom prst="rect">
@@ -6611,7 +6611,7 @@
         </p:nvCxnSpPr>
         <p:spPr>
           <a:xfrm flipV="1">
-            <a:off x="6032698" y="4082145"/>
+            <a:off x="5483702" y="4012480"/>
             <a:ext cx="450938" cy="380380"/>
           </a:xfrm>
           <a:prstGeom prst="bentConnector3">
@@ -6652,7 +6652,7 @@
         </p:nvSpPr>
         <p:spPr>
           <a:xfrm rot="5400000" flipV="1">
-            <a:off x="5901634" y="4355195"/>
+            <a:off x="5352638" y="4285530"/>
             <a:ext cx="270504" cy="175523"/>
           </a:xfrm>
           <a:prstGeom prst="triangle">
@@ -6703,7 +6703,7 @@
         </p:nvSpPr>
         <p:spPr>
           <a:xfrm>
-            <a:off x="6516875" y="4239546"/>
+            <a:off x="5967879" y="4169881"/>
             <a:ext cx="189257" cy="178683"/>
           </a:xfrm>
           <a:prstGeom prst="rect">
@@ -6742,7 +6742,7 @@
         </p:nvSpPr>
         <p:spPr>
           <a:xfrm>
-            <a:off x="6715034" y="3845645"/>
+            <a:off x="6166038" y="3775980"/>
             <a:ext cx="236048" cy="173380"/>
           </a:xfrm>
           <a:prstGeom prst="flowChartDecision">
@@ -6791,7 +6791,7 @@
         </p:nvCxnSpPr>
         <p:spPr>
           <a:xfrm>
-            <a:off x="6951082" y="3932335"/>
+            <a:off x="6402086" y="3862670"/>
             <a:ext cx="736358" cy="28328"/>
           </a:xfrm>
           <a:prstGeom prst="bentConnector3">
@@ -6831,7 +6831,7 @@
         </p:nvCxnSpPr>
         <p:spPr>
           <a:xfrm>
-            <a:off x="6980802" y="3938778"/>
+            <a:off x="6431806" y="3869113"/>
             <a:ext cx="710571" cy="333557"/>
           </a:xfrm>
           <a:prstGeom prst="bentConnector3">
@@ -6871,7 +6871,7 @@
         </p:nvSpPr>
         <p:spPr>
           <a:xfrm>
-            <a:off x="7691373" y="2755930"/>
+            <a:off x="7142377" y="2686265"/>
             <a:ext cx="708186" cy="285783"/>
           </a:xfrm>
           <a:prstGeom prst="rect">
@@ -6927,7 +6927,7 @@
         </p:nvSpPr>
         <p:spPr>
           <a:xfrm>
-            <a:off x="7603385" y="3097565"/>
+            <a:off x="7054389" y="3027900"/>
             <a:ext cx="889321" cy="285783"/>
           </a:xfrm>
           <a:prstGeom prst="rect">
@@ -6983,7 +6983,7 @@
         </p:nvSpPr>
         <p:spPr>
           <a:xfrm>
-            <a:off x="7691373" y="3432621"/>
+            <a:off x="7142377" y="3362956"/>
             <a:ext cx="708186" cy="285783"/>
           </a:xfrm>
           <a:prstGeom prst="rect">
@@ -7039,7 +7039,7 @@
         </p:nvSpPr>
         <p:spPr>
           <a:xfrm>
-            <a:off x="7694110" y="3777108"/>
+            <a:off x="7145114" y="3707443"/>
             <a:ext cx="708186" cy="285783"/>
           </a:xfrm>
           <a:prstGeom prst="rect">
@@ -7095,7 +7095,7 @@
         </p:nvSpPr>
         <p:spPr>
           <a:xfrm>
-            <a:off x="7691373" y="4129443"/>
+            <a:off x="7142377" y="4059778"/>
             <a:ext cx="708186" cy="285783"/>
           </a:xfrm>
           <a:prstGeom prst="rect">
@@ -7151,7 +7151,7 @@
         </p:nvSpPr>
         <p:spPr>
           <a:xfrm>
-            <a:off x="7691373" y="4467455"/>
+            <a:off x="7142377" y="4397790"/>
             <a:ext cx="708186" cy="285783"/>
           </a:xfrm>
           <a:prstGeom prst="rect">
@@ -7207,7 +7207,7 @@
         </p:nvSpPr>
         <p:spPr>
           <a:xfrm>
-            <a:off x="7712397" y="537498"/>
+            <a:off x="7163401" y="467833"/>
             <a:ext cx="708186" cy="285783"/>
           </a:xfrm>
           <a:prstGeom prst="rect">
@@ -7263,7 +7263,7 @@
         </p:nvSpPr>
         <p:spPr>
           <a:xfrm>
-            <a:off x="7712397" y="873800"/>
+            <a:off x="7163401" y="804135"/>
             <a:ext cx="708186" cy="285783"/>
           </a:xfrm>
           <a:prstGeom prst="rect">
@@ -7314,7 +7314,7 @@
         </p:nvSpPr>
         <p:spPr>
           <a:xfrm>
-            <a:off x="7691373" y="4819040"/>
+            <a:off x="7142377" y="4749375"/>
             <a:ext cx="708186" cy="285783"/>
           </a:xfrm>
           <a:prstGeom prst="rect">
@@ -7368,7 +7368,7 @@
         </p:nvCxnSpPr>
         <p:spPr>
           <a:xfrm>
-            <a:off x="6951082" y="3932335"/>
+            <a:off x="6402086" y="3862670"/>
             <a:ext cx="740291" cy="678012"/>
           </a:xfrm>
           <a:prstGeom prst="bentConnector3">
@@ -7411,7 +7411,7 @@
         </p:nvCxnSpPr>
         <p:spPr>
           <a:xfrm>
-            <a:off x="6951082" y="3932335"/>
+            <a:off x="6402086" y="3862670"/>
             <a:ext cx="740291" cy="1029597"/>
           </a:xfrm>
           <a:prstGeom prst="bentConnector3">
@@ -7452,7 +7452,7 @@
         </p:nvCxnSpPr>
         <p:spPr>
           <a:xfrm flipV="1">
-            <a:off x="6951082" y="3575513"/>
+            <a:off x="6402086" y="3505848"/>
             <a:ext cx="740291" cy="356822"/>
           </a:xfrm>
           <a:prstGeom prst="bentConnector3">
@@ -7493,7 +7493,7 @@
         </p:nvCxnSpPr>
         <p:spPr>
           <a:xfrm flipV="1">
-            <a:off x="6951082" y="3240457"/>
+            <a:off x="6402086" y="3170792"/>
             <a:ext cx="652303" cy="691878"/>
           </a:xfrm>
           <a:prstGeom prst="bentConnector3">
@@ -7536,7 +7536,7 @@
         </p:nvCxnSpPr>
         <p:spPr>
           <a:xfrm flipV="1">
-            <a:off x="6951082" y="2898822"/>
+            <a:off x="6402086" y="2829157"/>
             <a:ext cx="740291" cy="1033513"/>
           </a:xfrm>
           <a:prstGeom prst="bentConnector3">
@@ -7577,7 +7577,7 @@
         </p:nvCxnSpPr>
         <p:spPr>
           <a:xfrm flipV="1">
-            <a:off x="7216850" y="1016692"/>
+            <a:off x="6667854" y="947027"/>
             <a:ext cx="495547" cy="1275643"/>
           </a:xfrm>
           <a:prstGeom prst="bentConnector3">
@@ -7620,7 +7620,7 @@
         </p:nvCxnSpPr>
         <p:spPr>
           <a:xfrm flipV="1">
-            <a:off x="7216850" y="680390"/>
+            <a:off x="6667854" y="610725"/>
             <a:ext cx="495547" cy="1611945"/>
           </a:xfrm>
           <a:prstGeom prst="bentConnector3">
@@ -7652,6 +7652,244 @@
           </a:fontRef>
         </p:style>
       </p:cxnSp>
+      <p:sp>
+        <p:nvSpPr>
+          <p:cNvPr id="90" name="Isosceles Triangle 102"/>
+          <p:cNvSpPr/>
+          <p:nvPr/>
+        </p:nvSpPr>
+        <p:spPr>
+          <a:xfrm rot="5400000" flipV="1">
+            <a:off x="7822608" y="3443759"/>
+            <a:ext cx="270504" cy="175523"/>
+          </a:xfrm>
+          <a:prstGeom prst="triangle">
+            <a:avLst/>
+          </a:prstGeom>
+          <a:ln w="19050">
+            <a:solidFill>
+              <a:srgbClr val="7030A0"/>
+            </a:solidFill>
+          </a:ln>
+          <a:effectLst/>
+        </p:spPr>
+        <p:style>
+          <a:lnRef idx="1">
+            <a:schemeClr val="accent4"/>
+          </a:lnRef>
+          <a:fillRef idx="2">
+            <a:schemeClr val="accent4"/>
+          </a:fillRef>
+          <a:effectRef idx="1">
+            <a:schemeClr val="accent4"/>
+          </a:effectRef>
+          <a:fontRef idx="minor">
+            <a:schemeClr val="dk1"/>
+          </a:fontRef>
+        </p:style>
+        <p:txBody>
+          <a:bodyPr rtlCol="0" anchor="ctr"/>
+          <a:lstStyle/>
+          <a:p>
+            <a:pPr algn="ctr"/>
+            <a:endParaRPr lang="en-SG" sz="1050" b="1">
+              <a:solidFill>
+                <a:srgbClr val="92D050"/>
+              </a:solidFill>
+            </a:endParaRPr>
+          </a:p>
+        </p:txBody>
+      </p:sp>
+      <p:sp>
+        <p:nvSpPr>
+          <p:cNvPr id="94" name="Isosceles Triangle 102"/>
+          <p:cNvSpPr/>
+          <p:nvPr/>
+        </p:nvSpPr>
+        <p:spPr>
+          <a:xfrm rot="5400000" flipV="1">
+            <a:off x="7808458" y="3774909"/>
+            <a:ext cx="270504" cy="175523"/>
+          </a:xfrm>
+          <a:prstGeom prst="triangle">
+            <a:avLst/>
+          </a:prstGeom>
+          <a:ln w="19050">
+            <a:solidFill>
+              <a:srgbClr val="7030A0"/>
+            </a:solidFill>
+          </a:ln>
+          <a:effectLst/>
+        </p:spPr>
+        <p:style>
+          <a:lnRef idx="1">
+            <a:schemeClr val="accent4"/>
+          </a:lnRef>
+          <a:fillRef idx="2">
+            <a:schemeClr val="accent4"/>
+          </a:fillRef>
+          <a:effectRef idx="1">
+            <a:schemeClr val="accent4"/>
+          </a:effectRef>
+          <a:fontRef idx="minor">
+            <a:schemeClr val="dk1"/>
+          </a:fontRef>
+        </p:style>
+        <p:txBody>
+          <a:bodyPr rtlCol="0" anchor="ctr"/>
+          <a:lstStyle/>
+          <a:p>
+            <a:pPr algn="ctr"/>
+            <a:endParaRPr lang="en-SG" sz="1050" b="1">
+              <a:solidFill>
+                <a:srgbClr val="92D050"/>
+              </a:solidFill>
+            </a:endParaRPr>
+          </a:p>
+        </p:txBody>
+      </p:sp>
+      <p:cxnSp>
+        <p:nvCxnSpPr>
+          <p:cNvPr id="95" name="Elbow Connector 63"/>
+          <p:cNvCxnSpPr>
+            <a:stCxn id="90" idx="3"/>
+          </p:cNvCxnSpPr>
+          <p:nvPr/>
+        </p:nvCxnSpPr>
+        <p:spPr>
+          <a:xfrm>
+            <a:off x="8045622" y="3531521"/>
+            <a:ext cx="320782" cy="195897"/>
+          </a:xfrm>
+          <a:prstGeom prst="bentConnector3">
+            <a:avLst>
+              <a:gd name="adj1" fmla="val 50000"/>
+            </a:avLst>
+          </a:prstGeom>
+          <a:ln w="19050">
+            <a:solidFill>
+              <a:srgbClr val="7030A0"/>
+            </a:solidFill>
+            <a:prstDash val="sysDot"/>
+            <a:headEnd type="none" w="med" len="med"/>
+            <a:tailEnd type="none" w="med" len="med"/>
+          </a:ln>
+          <a:effectLst/>
+        </p:spPr>
+        <p:style>
+          <a:lnRef idx="1">
+            <a:schemeClr val="accent2"/>
+          </a:lnRef>
+          <a:fillRef idx="2">
+            <a:schemeClr val="accent2"/>
+          </a:fillRef>
+          <a:effectRef idx="1">
+            <a:schemeClr val="accent2"/>
+          </a:effectRef>
+          <a:fontRef idx="minor">
+            <a:schemeClr val="dk1"/>
+          </a:fontRef>
+        </p:style>
+      </p:cxnSp>
+      <p:cxnSp>
+        <p:nvCxnSpPr>
+          <p:cNvPr id="98" name="Elbow Connector 63"/>
+          <p:cNvCxnSpPr>
+            <a:stCxn id="94" idx="3"/>
+          </p:cNvCxnSpPr>
+          <p:nvPr/>
+        </p:nvCxnSpPr>
+        <p:spPr>
+          <a:xfrm flipV="1">
+            <a:off x="8031472" y="3745452"/>
+            <a:ext cx="334932" cy="117219"/>
+          </a:xfrm>
+          <a:prstGeom prst="bentConnector3">
+            <a:avLst>
+              <a:gd name="adj1" fmla="val 50000"/>
+            </a:avLst>
+          </a:prstGeom>
+          <a:ln w="19050">
+            <a:solidFill>
+              <a:srgbClr val="7030A0"/>
+            </a:solidFill>
+            <a:prstDash val="sysDot"/>
+            <a:headEnd type="none" w="med" len="med"/>
+            <a:tailEnd type="none" w="med" len="med"/>
+          </a:ln>
+          <a:effectLst/>
+        </p:spPr>
+        <p:style>
+          <a:lnRef idx="1">
+            <a:schemeClr val="accent2"/>
+          </a:lnRef>
+          <a:fillRef idx="2">
+            <a:schemeClr val="accent2"/>
+          </a:fillRef>
+          <a:effectRef idx="1">
+            <a:schemeClr val="accent2"/>
+          </a:effectRef>
+          <a:fontRef idx="minor">
+            <a:schemeClr val="dk1"/>
+          </a:fontRef>
+        </p:style>
+      </p:cxnSp>
+      <p:sp>
+        <p:nvSpPr>
+          <p:cNvPr id="102" name="Rectangle 8"/>
+          <p:cNvSpPr/>
+          <p:nvPr/>
+        </p:nvSpPr>
+        <p:spPr>
+          <a:xfrm>
+            <a:off x="8363250" y="3576887"/>
+            <a:ext cx="763585" cy="285783"/>
+          </a:xfrm>
+          <a:prstGeom prst="rect">
+            <a:avLst/>
+          </a:prstGeom>
+          <a:ln w="19050">
+            <a:solidFill>
+              <a:srgbClr val="7030A0"/>
+            </a:solidFill>
+          </a:ln>
+          <a:effectLst/>
+        </p:spPr>
+        <p:style>
+          <a:lnRef idx="1">
+            <a:schemeClr val="accent4"/>
+          </a:lnRef>
+          <a:fillRef idx="2">
+            <a:schemeClr val="accent4"/>
+          </a:fillRef>
+          <a:effectRef idx="1">
+            <a:schemeClr val="accent4"/>
+          </a:effectRef>
+          <a:fontRef idx="minor">
+            <a:schemeClr val="dk1"/>
+          </a:fontRef>
+        </p:style>
+        <p:txBody>
+          <a:bodyPr rtlCol="0" anchor="ctr"/>
+          <a:lstStyle/>
+          <a:p>
+            <a:pPr algn="ctr"/>
+            <a:r>
+              <a:rPr lang="en-US" sz="1050" dirty="0" err="1" smtClean="0">
+                <a:solidFill>
+                  <a:srgbClr val="7030A0"/>
+                </a:solidFill>
+              </a:rPr>
+              <a:t>DateTime</a:t>
+            </a:r>
+            <a:endParaRPr lang="en-SG" sz="1050" dirty="0">
+              <a:solidFill>
+                <a:srgbClr val="7030A0"/>
+              </a:solidFill>
+            </a:endParaRPr>
+          </a:p>
+        </p:txBody>
+      </p:sp>
     </p:spTree>
     <p:extLst>
       <p:ext uri="{BB962C8B-B14F-4D97-AF65-F5344CB8AC3E}">

</xml_diff>

<commit_message>
Update ImportSequenceDiagram and ModelComponentClassDiagram
</commit_message>
<xml_diff>
--- a/docs/diagrams/ModelComponentClassDiagram.pptx
+++ b/docs/diagrams/ModelComponentClassDiagram.pptx
@@ -212,7 +212,7 @@
           <a:p>
             <a:fld id="{F5CC4B3F-88C1-4FFA-B1B6-F41C21DC6924}" type="datetimeFigureOut">
               <a:rPr lang="en-US" smtClean="0"/>
-              <a:t>11/8/2017</a:t>
+              <a:t>11/13/2017</a:t>
             </a:fld>
             <a:endParaRPr lang="en-US"/>
           </a:p>
@@ -658,7 +658,7 @@
           <a:p>
             <a:fld id="{78C97017-6FC3-485B-9764-EAC9E56C1D49}" type="datetimeFigureOut">
               <a:rPr lang="en-US" smtClean="0"/>
-              <a:t>11/8/2017</a:t>
+              <a:t>11/13/2017</a:t>
             </a:fld>
             <a:endParaRPr lang="en-US"/>
           </a:p>
@@ -826,7 +826,7 @@
           <a:p>
             <a:fld id="{78C97017-6FC3-485B-9764-EAC9E56C1D49}" type="datetimeFigureOut">
               <a:rPr lang="en-US" smtClean="0"/>
-              <a:t>11/8/2017</a:t>
+              <a:t>11/13/2017</a:t>
             </a:fld>
             <a:endParaRPr lang="en-US"/>
           </a:p>
@@ -1004,7 +1004,7 @@
           <a:p>
             <a:fld id="{78C97017-6FC3-485B-9764-EAC9E56C1D49}" type="datetimeFigureOut">
               <a:rPr lang="en-US" smtClean="0"/>
-              <a:t>11/8/2017</a:t>
+              <a:t>11/13/2017</a:t>
             </a:fld>
             <a:endParaRPr lang="en-US"/>
           </a:p>
@@ -1172,7 +1172,7 @@
           <a:p>
             <a:fld id="{78C97017-6FC3-485B-9764-EAC9E56C1D49}" type="datetimeFigureOut">
               <a:rPr lang="en-US" smtClean="0"/>
-              <a:t>11/8/2017</a:t>
+              <a:t>11/13/2017</a:t>
             </a:fld>
             <a:endParaRPr lang="en-US"/>
           </a:p>
@@ -1417,7 +1417,7 @@
           <a:p>
             <a:fld id="{78C97017-6FC3-485B-9764-EAC9E56C1D49}" type="datetimeFigureOut">
               <a:rPr lang="en-US" smtClean="0"/>
-              <a:t>11/8/2017</a:t>
+              <a:t>11/13/2017</a:t>
             </a:fld>
             <a:endParaRPr lang="en-US"/>
           </a:p>
@@ -1702,7 +1702,7 @@
           <a:p>
             <a:fld id="{78C97017-6FC3-485B-9764-EAC9E56C1D49}" type="datetimeFigureOut">
               <a:rPr lang="en-US" smtClean="0"/>
-              <a:t>11/8/2017</a:t>
+              <a:t>11/13/2017</a:t>
             </a:fld>
             <a:endParaRPr lang="en-US"/>
           </a:p>
@@ -2121,7 +2121,7 @@
           <a:p>
             <a:fld id="{78C97017-6FC3-485B-9764-EAC9E56C1D49}" type="datetimeFigureOut">
               <a:rPr lang="en-US" smtClean="0"/>
-              <a:t>11/8/2017</a:t>
+              <a:t>11/13/2017</a:t>
             </a:fld>
             <a:endParaRPr lang="en-US"/>
           </a:p>
@@ -2238,7 +2238,7 @@
           <a:p>
             <a:fld id="{78C97017-6FC3-485B-9764-EAC9E56C1D49}" type="datetimeFigureOut">
               <a:rPr lang="en-US" smtClean="0"/>
-              <a:t>11/8/2017</a:t>
+              <a:t>11/13/2017</a:t>
             </a:fld>
             <a:endParaRPr lang="en-US"/>
           </a:p>
@@ -2333,7 +2333,7 @@
           <a:p>
             <a:fld id="{78C97017-6FC3-485B-9764-EAC9E56C1D49}" type="datetimeFigureOut">
               <a:rPr lang="en-US" smtClean="0"/>
-              <a:t>11/8/2017</a:t>
+              <a:t>11/13/2017</a:t>
             </a:fld>
             <a:endParaRPr lang="en-US"/>
           </a:p>
@@ -2608,7 +2608,7 @@
           <a:p>
             <a:fld id="{78C97017-6FC3-485B-9764-EAC9E56C1D49}" type="datetimeFigureOut">
               <a:rPr lang="en-US" smtClean="0"/>
-              <a:t>11/8/2017</a:t>
+              <a:t>11/13/2017</a:t>
             </a:fld>
             <a:endParaRPr lang="en-US"/>
           </a:p>
@@ -2860,7 +2860,7 @@
           <a:p>
             <a:fld id="{78C97017-6FC3-485B-9764-EAC9E56C1D49}" type="datetimeFigureOut">
               <a:rPr lang="en-US" smtClean="0"/>
-              <a:t>11/8/2017</a:t>
+              <a:t>11/13/2017</a:t>
             </a:fld>
             <a:endParaRPr lang="en-US"/>
           </a:p>
@@ -3071,7 +3071,7 @@
           <a:p>
             <a:fld id="{78C97017-6FC3-485B-9764-EAC9E56C1D49}" type="datetimeFigureOut">
               <a:rPr lang="en-US" smtClean="0"/>
-              <a:t>11/8/2017</a:t>
+              <a:t>11/13/2017</a:t>
             </a:fld>
             <a:endParaRPr lang="en-US"/>
           </a:p>
@@ -5080,7 +5080,7 @@
         </p:nvSpPr>
         <p:spPr>
           <a:xfrm>
-            <a:off x="6125654" y="3416510"/>
+            <a:off x="6135139" y="3098133"/>
             <a:ext cx="708186" cy="285783"/>
           </a:xfrm>
           <a:prstGeom prst="rect">
@@ -5140,7 +5140,7 @@
         <p:spPr>
           <a:xfrm>
             <a:off x="5686292" y="2597159"/>
-            <a:ext cx="439362" cy="962243"/>
+            <a:ext cx="448847" cy="643866"/>
           </a:xfrm>
           <a:prstGeom prst="bentConnector3">
             <a:avLst/>
@@ -5850,7 +5850,7 @@
         </p:nvSpPr>
         <p:spPr>
           <a:xfrm>
-            <a:off x="8041987" y="3416510"/>
+            <a:off x="7492037" y="3108446"/>
             <a:ext cx="800583" cy="285783"/>
           </a:xfrm>
           <a:prstGeom prst="rect">
@@ -6057,7 +6057,7 @@
         </p:nvCxnSpPr>
         <p:spPr>
           <a:xfrm rot="16200000" flipH="1">
-            <a:off x="5294642" y="3114827"/>
+            <a:off x="5294642" y="3152950"/>
             <a:ext cx="1450000" cy="230993"/>
           </a:xfrm>
           <a:prstGeom prst="bentConnector2">
@@ -6101,7 +6101,7 @@
         </p:nvSpPr>
         <p:spPr>
           <a:xfrm>
-            <a:off x="6124627" y="3093189"/>
+            <a:off x="6132194" y="3431167"/>
             <a:ext cx="1104043" cy="285783"/>
           </a:xfrm>
           <a:prstGeom prst="rect">
@@ -6165,7 +6165,7 @@
         </p:nvCxnSpPr>
         <p:spPr>
           <a:xfrm>
-            <a:off x="5903492" y="3238024"/>
+            <a:off x="5914993" y="3559401"/>
             <a:ext cx="217201" cy="0"/>
           </a:xfrm>
           <a:prstGeom prst="straightConnector1">
@@ -6209,7 +6209,7 @@
         </p:nvSpPr>
         <p:spPr>
           <a:xfrm>
-            <a:off x="6841190" y="3472711"/>
+            <a:off x="6870905" y="3164648"/>
             <a:ext cx="236048" cy="173380"/>
           </a:xfrm>
           <a:prstGeom prst="flowChartDecision">
@@ -6262,7 +6262,7 @@
         </p:nvSpPr>
         <p:spPr>
           <a:xfrm>
-            <a:off x="6135139" y="4135050"/>
+            <a:off x="6135139" y="4168552"/>
             <a:ext cx="1296209" cy="693705"/>
           </a:xfrm>
           <a:prstGeom prst="rect">
@@ -6348,7 +6348,7 @@
         </p:nvSpPr>
         <p:spPr>
           <a:xfrm>
-            <a:off x="6135139" y="3762128"/>
+            <a:off x="6135139" y="3800251"/>
             <a:ext cx="1296209" cy="386392"/>
           </a:xfrm>
           <a:prstGeom prst="rect">
@@ -6402,56 +6402,6 @@
           </a:p>
         </p:txBody>
       </p:sp>
-      <p:cxnSp>
-        <p:nvCxnSpPr>
-          <p:cNvPr id="92" name="Elbow Connector 78">
-            <a:extLst>
-              <a:ext uri="{FF2B5EF4-FFF2-40B4-BE49-F238E27FC236}">
-                <a16:creationId xmlns:a16="http://schemas.microsoft.com/office/drawing/2014/main" id="{B7DF2F1D-7339-46CF-9116-C7AA834C6586}"/>
-              </a:ext>
-            </a:extLst>
-          </p:cNvPr>
-          <p:cNvCxnSpPr>
-            <a:cxnSpLocks/>
-            <a:stCxn id="73" idx="3"/>
-            <a:endCxn id="82" idx="1"/>
-          </p:cNvCxnSpPr>
-          <p:nvPr/>
-        </p:nvCxnSpPr>
-        <p:spPr>
-          <a:xfrm>
-            <a:off x="7077238" y="3559401"/>
-            <a:ext cx="964749" cy="1"/>
-          </a:xfrm>
-          <a:prstGeom prst="bentConnector3">
-            <a:avLst>
-              <a:gd name="adj1" fmla="val 50000"/>
-            </a:avLst>
-          </a:prstGeom>
-          <a:ln w="19050">
-            <a:solidFill>
-              <a:srgbClr val="7030A0"/>
-            </a:solidFill>
-            <a:headEnd type="none" w="med" len="med"/>
-            <a:tailEnd type="arrow" w="med" len="med"/>
-          </a:ln>
-          <a:effectLst/>
-        </p:spPr>
-        <p:style>
-          <a:lnRef idx="1">
-            <a:schemeClr val="accent2"/>
-          </a:lnRef>
-          <a:fillRef idx="2">
-            <a:schemeClr val="accent2"/>
-          </a:fillRef>
-          <a:effectRef idx="1">
-            <a:schemeClr val="accent2"/>
-          </a:effectRef>
-          <a:fontRef idx="minor">
-            <a:schemeClr val="dk1"/>
-          </a:fontRef>
-        </p:style>
-      </p:cxnSp>
       <p:sp>
         <p:nvSpPr>
           <p:cNvPr id="93" name="Rectangle 8">
@@ -6605,6 +6555,105 @@
           </a:p>
         </p:txBody>
       </p:sp>
+      <p:cxnSp>
+        <p:nvCxnSpPr>
+          <p:cNvPr id="77" name="Elbow Connector 83">
+            <a:extLst>
+              <a:ext uri="{FF2B5EF4-FFF2-40B4-BE49-F238E27FC236}">
+                <a16:creationId xmlns:a16="http://schemas.microsoft.com/office/drawing/2014/main" id="{34C15E77-0C9C-4FCE-9D2C-C5E861C325C8}"/>
+              </a:ext>
+            </a:extLst>
+          </p:cNvPr>
+          <p:cNvCxnSpPr>
+            <a:cxnSpLocks/>
+            <a:stCxn id="73" idx="3"/>
+            <a:endCxn id="82" idx="1"/>
+          </p:cNvCxnSpPr>
+          <p:nvPr/>
+        </p:nvCxnSpPr>
+        <p:spPr>
+          <a:xfrm>
+            <a:off x="7106953" y="3251338"/>
+            <a:ext cx="385084" cy="0"/>
+          </a:xfrm>
+          <a:prstGeom prst="straightConnector1">
+            <a:avLst/>
+          </a:prstGeom>
+          <a:ln w="19050">
+            <a:solidFill>
+              <a:srgbClr val="7030A0"/>
+            </a:solidFill>
+            <a:headEnd type="none" w="med" len="med"/>
+            <a:tailEnd type="arrow" w="med" len="med"/>
+          </a:ln>
+          <a:effectLst/>
+        </p:spPr>
+        <p:style>
+          <a:lnRef idx="1">
+            <a:schemeClr val="accent2"/>
+          </a:lnRef>
+          <a:fillRef idx="2">
+            <a:schemeClr val="accent2"/>
+          </a:fillRef>
+          <a:effectRef idx="1">
+            <a:schemeClr val="accent2"/>
+          </a:effectRef>
+          <a:fontRef idx="minor">
+            <a:schemeClr val="dk1"/>
+          </a:fontRef>
+        </p:style>
+      </p:cxnSp>
+      <p:cxnSp>
+        <p:nvCxnSpPr>
+          <p:cNvPr id="94" name="Elbow Connector 85">
+            <a:extLst>
+              <a:ext uri="{FF2B5EF4-FFF2-40B4-BE49-F238E27FC236}">
+                <a16:creationId xmlns:a16="http://schemas.microsoft.com/office/drawing/2014/main" id="{BF00286E-8CF2-450E-AEF0-941107C286B2}"/>
+              </a:ext>
+            </a:extLst>
+          </p:cNvPr>
+          <p:cNvCxnSpPr>
+            <a:cxnSpLocks/>
+            <a:stCxn id="89" idx="3"/>
+            <a:endCxn id="96" idx="3"/>
+          </p:cNvCxnSpPr>
+          <p:nvPr/>
+        </p:nvCxnSpPr>
+        <p:spPr>
+          <a:xfrm flipH="1" flipV="1">
+            <a:off x="7236237" y="3574059"/>
+            <a:ext cx="195111" cy="419388"/>
+          </a:xfrm>
+          <a:prstGeom prst="bentConnector3">
+            <a:avLst>
+              <a:gd name="adj1" fmla="val -117164"/>
+            </a:avLst>
+          </a:prstGeom>
+          <a:ln w="19050">
+            <a:solidFill>
+              <a:srgbClr val="7030A0"/>
+            </a:solidFill>
+            <a:prstDash val="dash"/>
+            <a:headEnd type="none" w="med" len="med"/>
+            <a:tailEnd type="arrow" w="med" len="med"/>
+          </a:ln>
+          <a:effectLst/>
+        </p:spPr>
+        <p:style>
+          <a:lnRef idx="1">
+            <a:schemeClr val="accent2"/>
+          </a:lnRef>
+          <a:fillRef idx="2">
+            <a:schemeClr val="accent2"/>
+          </a:fillRef>
+          <a:effectRef idx="1">
+            <a:schemeClr val="accent2"/>
+          </a:effectRef>
+          <a:fontRef idx="minor">
+            <a:schemeClr val="dk1"/>
+          </a:fontRef>
+        </p:style>
+      </p:cxnSp>
     </p:spTree>
     <p:extLst>
       <p:ext uri="{BB962C8B-B14F-4D97-AF65-F5344CB8AC3E}">

</xml_diff>